<commit_message>
additional docs and updates
Nov changes
</commit_message>
<xml_diff>
--- a/general-tech-figures.pptx
+++ b/general-tech-figures.pptx
@@ -6,6 +6,10 @@
   </p:sldMasterIdLst>
   <p:sldIdLst>
     <p:sldId id="256" r:id="rId2"/>
+    <p:sldId id="257" r:id="rId3"/>
+    <p:sldId id="258" r:id="rId4"/>
+    <p:sldId id="259" r:id="rId5"/>
+    <p:sldId id="260" r:id="rId6"/>
   </p:sldIdLst>
   <p:sldSz cx="6858000" cy="9144000" type="letter"/>
   <p:notesSz cx="6858000" cy="9144000"/>
@@ -254,7 +258,7 @@
           <a:p>
             <a:fld id="{BFBBFCFE-809B-4AE5-92DC-0D51595F6FEA}" type="datetimeFigureOut">
               <a:rPr lang="en-US" smtClean="0"/>
-              <a:t>10/12/2023</a:t>
+              <a:t>11/11/2023</a:t>
             </a:fld>
             <a:endParaRPr lang="en-US"/>
           </a:p>
@@ -424,7 +428,7 @@
           <a:p>
             <a:fld id="{BFBBFCFE-809B-4AE5-92DC-0D51595F6FEA}" type="datetimeFigureOut">
               <a:rPr lang="en-US" smtClean="0"/>
-              <a:t>10/12/2023</a:t>
+              <a:t>11/11/2023</a:t>
             </a:fld>
             <a:endParaRPr lang="en-US"/>
           </a:p>
@@ -604,7 +608,7 @@
           <a:p>
             <a:fld id="{BFBBFCFE-809B-4AE5-92DC-0D51595F6FEA}" type="datetimeFigureOut">
               <a:rPr lang="en-US" smtClean="0"/>
-              <a:t>10/12/2023</a:t>
+              <a:t>11/11/2023</a:t>
             </a:fld>
             <a:endParaRPr lang="en-US"/>
           </a:p>
@@ -774,7 +778,7 @@
           <a:p>
             <a:fld id="{BFBBFCFE-809B-4AE5-92DC-0D51595F6FEA}" type="datetimeFigureOut">
               <a:rPr lang="en-US" smtClean="0"/>
-              <a:t>10/12/2023</a:t>
+              <a:t>11/11/2023</a:t>
             </a:fld>
             <a:endParaRPr lang="en-US"/>
           </a:p>
@@ -1018,7 +1022,7 @@
           <a:p>
             <a:fld id="{BFBBFCFE-809B-4AE5-92DC-0D51595F6FEA}" type="datetimeFigureOut">
               <a:rPr lang="en-US" smtClean="0"/>
-              <a:t>10/12/2023</a:t>
+              <a:t>11/11/2023</a:t>
             </a:fld>
             <a:endParaRPr lang="en-US"/>
           </a:p>
@@ -1250,7 +1254,7 @@
           <a:p>
             <a:fld id="{BFBBFCFE-809B-4AE5-92DC-0D51595F6FEA}" type="datetimeFigureOut">
               <a:rPr lang="en-US" smtClean="0"/>
-              <a:t>10/12/2023</a:t>
+              <a:t>11/11/2023</a:t>
             </a:fld>
             <a:endParaRPr lang="en-US"/>
           </a:p>
@@ -1617,7 +1621,7 @@
           <a:p>
             <a:fld id="{BFBBFCFE-809B-4AE5-92DC-0D51595F6FEA}" type="datetimeFigureOut">
               <a:rPr lang="en-US" smtClean="0"/>
-              <a:t>10/12/2023</a:t>
+              <a:t>11/11/2023</a:t>
             </a:fld>
             <a:endParaRPr lang="en-US"/>
           </a:p>
@@ -1735,7 +1739,7 @@
           <a:p>
             <a:fld id="{BFBBFCFE-809B-4AE5-92DC-0D51595F6FEA}" type="datetimeFigureOut">
               <a:rPr lang="en-US" smtClean="0"/>
-              <a:t>10/12/2023</a:t>
+              <a:t>11/11/2023</a:t>
             </a:fld>
             <a:endParaRPr lang="en-US"/>
           </a:p>
@@ -1830,7 +1834,7 @@
           <a:p>
             <a:fld id="{BFBBFCFE-809B-4AE5-92DC-0D51595F6FEA}" type="datetimeFigureOut">
               <a:rPr lang="en-US" smtClean="0"/>
-              <a:t>10/12/2023</a:t>
+              <a:t>11/11/2023</a:t>
             </a:fld>
             <a:endParaRPr lang="en-US"/>
           </a:p>
@@ -2107,7 +2111,7 @@
           <a:p>
             <a:fld id="{BFBBFCFE-809B-4AE5-92DC-0D51595F6FEA}" type="datetimeFigureOut">
               <a:rPr lang="en-US" smtClean="0"/>
-              <a:t>10/12/2023</a:t>
+              <a:t>11/11/2023</a:t>
             </a:fld>
             <a:endParaRPr lang="en-US"/>
           </a:p>
@@ -2364,7 +2368,7 @@
           <a:p>
             <a:fld id="{BFBBFCFE-809B-4AE5-92DC-0D51595F6FEA}" type="datetimeFigureOut">
               <a:rPr lang="en-US" smtClean="0"/>
-              <a:t>10/12/2023</a:t>
+              <a:t>11/11/2023</a:t>
             </a:fld>
             <a:endParaRPr lang="en-US"/>
           </a:p>
@@ -2577,7 +2581,7 @@
           <a:p>
             <a:fld id="{BFBBFCFE-809B-4AE5-92DC-0D51595F6FEA}" type="datetimeFigureOut">
               <a:rPr lang="en-US" smtClean="0"/>
-              <a:t>10/12/2023</a:t>
+              <a:t>11/11/2023</a:t>
             </a:fld>
             <a:endParaRPr lang="en-US"/>
           </a:p>
@@ -4561,6 +4565,3839 @@
 </p:sld>
 </file>
 
+<file path=ppt/slides/slide2.xml><?xml version="1.0" encoding="utf-8"?>
+<p:sld xmlns:a="http://schemas.openxmlformats.org/drawingml/2006/main" xmlns:r="http://schemas.openxmlformats.org/officeDocument/2006/relationships" xmlns:p="http://schemas.openxmlformats.org/presentationml/2006/main">
+  <p:cSld>
+    <p:spTree>
+      <p:nvGrpSpPr>
+        <p:cNvPr id="1" name=""/>
+        <p:cNvGrpSpPr/>
+        <p:nvPr/>
+      </p:nvGrpSpPr>
+      <p:grpSpPr>
+        <a:xfrm>
+          <a:off x="0" y="0"/>
+          <a:ext cx="0" cy="0"/>
+          <a:chOff x="0" y="0"/>
+          <a:chExt cx="0" cy="0"/>
+        </a:xfrm>
+      </p:grpSpPr>
+      <p:grpSp>
+        <p:nvGrpSpPr>
+          <p:cNvPr id="1042" name="Group 1041">
+            <a:extLst>
+              <a:ext uri="{FF2B5EF4-FFF2-40B4-BE49-F238E27FC236}">
+                <a16:creationId xmlns:a16="http://schemas.microsoft.com/office/drawing/2014/main" id="{D30FDF22-A22D-67D6-3880-DCE375A00F87}"/>
+              </a:ext>
+            </a:extLst>
+          </p:cNvPr>
+          <p:cNvGrpSpPr/>
+          <p:nvPr/>
+        </p:nvGrpSpPr>
+        <p:grpSpPr>
+          <a:xfrm>
+            <a:off x="3636965" y="1146454"/>
+            <a:ext cx="2584450" cy="1263372"/>
+            <a:chOff x="3636965" y="1060729"/>
+            <a:chExt cx="2584450" cy="1263372"/>
+          </a:xfrm>
+        </p:grpSpPr>
+        <p:sp>
+          <p:nvSpPr>
+            <p:cNvPr id="2" name="Rectangle 1">
+              <a:extLst>
+                <a:ext uri="{FF2B5EF4-FFF2-40B4-BE49-F238E27FC236}">
+                  <a16:creationId xmlns:a16="http://schemas.microsoft.com/office/drawing/2014/main" id="{D5CFEBA9-8F1D-1892-DBB9-DC8DD48FABB8}"/>
+                </a:ext>
+              </a:extLst>
+            </p:cNvPr>
+            <p:cNvSpPr/>
+            <p:nvPr/>
+          </p:nvSpPr>
+          <p:spPr>
+            <a:xfrm>
+              <a:off x="3784602" y="1477086"/>
+              <a:ext cx="2289175" cy="591378"/>
+            </a:xfrm>
+            <a:prstGeom prst="rect">
+              <a:avLst/>
+            </a:prstGeom>
+            <a:noFill/>
+          </p:spPr>
+          <p:style>
+            <a:lnRef idx="2">
+              <a:schemeClr val="accent1">
+                <a:shade val="15000"/>
+              </a:schemeClr>
+            </a:lnRef>
+            <a:fillRef idx="1">
+              <a:schemeClr val="accent1"/>
+            </a:fillRef>
+            <a:effectRef idx="0">
+              <a:schemeClr val="accent1"/>
+            </a:effectRef>
+            <a:fontRef idx="minor">
+              <a:schemeClr val="lt1"/>
+            </a:fontRef>
+          </p:style>
+          <p:txBody>
+            <a:bodyPr rtlCol="0" anchor="ctr"/>
+            <a:lstStyle/>
+            <a:p>
+              <a:pPr algn="ctr"/>
+              <a:r>
+                <a:rPr lang="en-US" sz="1050" dirty="0">
+                  <a:solidFill>
+                    <a:schemeClr val="tx1"/>
+                  </a:solidFill>
+                </a:rPr>
+                <a:t>Transactional Tables</a:t>
+              </a:r>
+            </a:p>
+          </p:txBody>
+        </p:sp>
+        <p:sp>
+          <p:nvSpPr>
+            <p:cNvPr id="3" name="Rectangle 2">
+              <a:extLst>
+                <a:ext uri="{FF2B5EF4-FFF2-40B4-BE49-F238E27FC236}">
+                  <a16:creationId xmlns:a16="http://schemas.microsoft.com/office/drawing/2014/main" id="{3E894905-8535-493F-1D89-9BEA71A50AAB}"/>
+                </a:ext>
+              </a:extLst>
+            </p:cNvPr>
+            <p:cNvSpPr/>
+            <p:nvPr/>
+          </p:nvSpPr>
+          <p:spPr>
+            <a:xfrm>
+              <a:off x="3636965" y="1327063"/>
+              <a:ext cx="2584450" cy="997038"/>
+            </a:xfrm>
+            <a:prstGeom prst="rect">
+              <a:avLst/>
+            </a:prstGeom>
+            <a:noFill/>
+          </p:spPr>
+          <p:style>
+            <a:lnRef idx="2">
+              <a:schemeClr val="accent1">
+                <a:shade val="15000"/>
+              </a:schemeClr>
+            </a:lnRef>
+            <a:fillRef idx="1">
+              <a:schemeClr val="accent1"/>
+            </a:fillRef>
+            <a:effectRef idx="0">
+              <a:schemeClr val="accent1"/>
+            </a:effectRef>
+            <a:fontRef idx="minor">
+              <a:schemeClr val="lt1"/>
+            </a:fontRef>
+          </p:style>
+          <p:txBody>
+            <a:bodyPr rtlCol="0" anchor="ctr"/>
+            <a:lstStyle/>
+            <a:p>
+              <a:pPr algn="ctr"/>
+              <a:endParaRPr lang="en-US" sz="1400" dirty="0">
+                <a:solidFill>
+                  <a:schemeClr val="tx1"/>
+                </a:solidFill>
+              </a:endParaRPr>
+            </a:p>
+          </p:txBody>
+        </p:sp>
+        <p:sp>
+          <p:nvSpPr>
+            <p:cNvPr id="7" name="TextBox 6">
+              <a:extLst>
+                <a:ext uri="{FF2B5EF4-FFF2-40B4-BE49-F238E27FC236}">
+                  <a16:creationId xmlns:a16="http://schemas.microsoft.com/office/drawing/2014/main" id="{387B5F79-AE57-D139-69CD-8BAD4B77ACFA}"/>
+                </a:ext>
+              </a:extLst>
+            </p:cNvPr>
+            <p:cNvSpPr txBox="1"/>
+            <p:nvPr/>
+          </p:nvSpPr>
+          <p:spPr>
+            <a:xfrm flipH="1">
+              <a:off x="3636965" y="1060729"/>
+              <a:ext cx="1701800" cy="261610"/>
+            </a:xfrm>
+            <a:prstGeom prst="rect">
+              <a:avLst/>
+            </a:prstGeom>
+            <a:noFill/>
+          </p:spPr>
+          <p:txBody>
+            <a:bodyPr wrap="square" rtlCol="0">
+              <a:spAutoFit/>
+            </a:bodyPr>
+            <a:lstStyle/>
+            <a:p>
+              <a:r>
+                <a:rPr lang="en-US" sz="1100" dirty="0"/>
+                <a:t>Transactional DB</a:t>
+              </a:r>
+            </a:p>
+          </p:txBody>
+        </p:sp>
+      </p:grpSp>
+      <p:sp>
+        <p:nvSpPr>
+          <p:cNvPr id="13" name="Rectangle 12">
+            <a:extLst>
+              <a:ext uri="{FF2B5EF4-FFF2-40B4-BE49-F238E27FC236}">
+                <a16:creationId xmlns:a16="http://schemas.microsoft.com/office/drawing/2014/main" id="{F0CB5A7B-6E49-D392-D99B-50AA229A099B}"/>
+              </a:ext>
+            </a:extLst>
+          </p:cNvPr>
+          <p:cNvSpPr/>
+          <p:nvPr/>
+        </p:nvSpPr>
+        <p:spPr>
+          <a:xfrm>
+            <a:off x="679448" y="5058486"/>
+            <a:ext cx="2289175" cy="591378"/>
+          </a:xfrm>
+          <a:prstGeom prst="rect">
+            <a:avLst/>
+          </a:prstGeom>
+          <a:noFill/>
+        </p:spPr>
+        <p:style>
+          <a:lnRef idx="2">
+            <a:schemeClr val="accent1">
+              <a:shade val="15000"/>
+            </a:schemeClr>
+          </a:lnRef>
+          <a:fillRef idx="1">
+            <a:schemeClr val="accent1"/>
+          </a:fillRef>
+          <a:effectRef idx="0">
+            <a:schemeClr val="accent1"/>
+          </a:effectRef>
+          <a:fontRef idx="minor">
+            <a:schemeClr val="lt1"/>
+          </a:fontRef>
+        </p:style>
+        <p:txBody>
+          <a:bodyPr rtlCol="0" anchor="ctr"/>
+          <a:lstStyle/>
+          <a:p>
+            <a:pPr algn="ctr"/>
+            <a:r>
+              <a:rPr lang="en-US" sz="1050" dirty="0">
+                <a:solidFill>
+                  <a:schemeClr val="tx1"/>
+                </a:solidFill>
+              </a:rPr>
+              <a:t>Transactional Tables</a:t>
+            </a:r>
+          </a:p>
+        </p:txBody>
+      </p:sp>
+      <p:sp>
+        <p:nvSpPr>
+          <p:cNvPr id="17" name="Rectangle 16">
+            <a:extLst>
+              <a:ext uri="{FF2B5EF4-FFF2-40B4-BE49-F238E27FC236}">
+                <a16:creationId xmlns:a16="http://schemas.microsoft.com/office/drawing/2014/main" id="{02B8B0C7-68BC-71BB-EA1B-41F9379959C2}"/>
+              </a:ext>
+            </a:extLst>
+          </p:cNvPr>
+          <p:cNvSpPr/>
+          <p:nvPr/>
+        </p:nvSpPr>
+        <p:spPr>
+          <a:xfrm>
+            <a:off x="531811" y="4908462"/>
+            <a:ext cx="2584450" cy="1616155"/>
+          </a:xfrm>
+          <a:prstGeom prst="rect">
+            <a:avLst/>
+          </a:prstGeom>
+          <a:noFill/>
+        </p:spPr>
+        <p:style>
+          <a:lnRef idx="2">
+            <a:schemeClr val="accent1">
+              <a:shade val="15000"/>
+            </a:schemeClr>
+          </a:lnRef>
+          <a:fillRef idx="1">
+            <a:schemeClr val="accent1"/>
+          </a:fillRef>
+          <a:effectRef idx="0">
+            <a:schemeClr val="accent1"/>
+          </a:effectRef>
+          <a:fontRef idx="minor">
+            <a:schemeClr val="lt1"/>
+          </a:fontRef>
+        </p:style>
+        <p:txBody>
+          <a:bodyPr rtlCol="0" anchor="ctr"/>
+          <a:lstStyle/>
+          <a:p>
+            <a:pPr algn="ctr"/>
+            <a:endParaRPr lang="en-US" sz="1400" dirty="0">
+              <a:solidFill>
+                <a:schemeClr val="tx1"/>
+              </a:solidFill>
+            </a:endParaRPr>
+          </a:p>
+        </p:txBody>
+      </p:sp>
+      <p:sp>
+        <p:nvSpPr>
+          <p:cNvPr id="18" name="TextBox 17">
+            <a:extLst>
+              <a:ext uri="{FF2B5EF4-FFF2-40B4-BE49-F238E27FC236}">
+                <a16:creationId xmlns:a16="http://schemas.microsoft.com/office/drawing/2014/main" id="{489675B5-DBFA-471B-BAE3-7DC8DC5DB50B}"/>
+              </a:ext>
+            </a:extLst>
+          </p:cNvPr>
+          <p:cNvSpPr txBox="1"/>
+          <p:nvPr/>
+        </p:nvSpPr>
+        <p:spPr>
+          <a:xfrm flipH="1">
+            <a:off x="531810" y="4642129"/>
+            <a:ext cx="2289175" cy="261610"/>
+          </a:xfrm>
+          <a:prstGeom prst="rect">
+            <a:avLst/>
+          </a:prstGeom>
+          <a:noFill/>
+        </p:spPr>
+        <p:txBody>
+          <a:bodyPr wrap="square" rtlCol="0">
+            <a:spAutoFit/>
+          </a:bodyPr>
+          <a:lstStyle/>
+          <a:p>
+            <a:r>
+              <a:rPr lang="en-US" sz="1100" dirty="0"/>
+              <a:t>Transactional DB with Reporting</a:t>
+            </a:r>
+          </a:p>
+        </p:txBody>
+      </p:sp>
+      <p:sp>
+        <p:nvSpPr>
+          <p:cNvPr id="35" name="Rectangle 34">
+            <a:extLst>
+              <a:ext uri="{FF2B5EF4-FFF2-40B4-BE49-F238E27FC236}">
+                <a16:creationId xmlns:a16="http://schemas.microsoft.com/office/drawing/2014/main" id="{33A8124B-EDD5-242A-24BE-4B7443D9BBA7}"/>
+              </a:ext>
+            </a:extLst>
+          </p:cNvPr>
+          <p:cNvSpPr/>
+          <p:nvPr/>
+        </p:nvSpPr>
+        <p:spPr>
+          <a:xfrm>
+            <a:off x="679448" y="5716539"/>
+            <a:ext cx="1077914" cy="294564"/>
+          </a:xfrm>
+          <a:prstGeom prst="rect">
+            <a:avLst/>
+          </a:prstGeom>
+          <a:noFill/>
+        </p:spPr>
+        <p:style>
+          <a:lnRef idx="2">
+            <a:schemeClr val="accent1">
+              <a:shade val="15000"/>
+            </a:schemeClr>
+          </a:lnRef>
+          <a:fillRef idx="1">
+            <a:schemeClr val="accent1"/>
+          </a:fillRef>
+          <a:effectRef idx="0">
+            <a:schemeClr val="accent1"/>
+          </a:effectRef>
+          <a:fontRef idx="minor">
+            <a:schemeClr val="lt1"/>
+          </a:fontRef>
+        </p:style>
+        <p:txBody>
+          <a:bodyPr rtlCol="0" anchor="ctr"/>
+          <a:lstStyle/>
+          <a:p>
+            <a:pPr algn="ctr"/>
+            <a:r>
+              <a:rPr lang="en-US" sz="1050" dirty="0">
+                <a:solidFill>
+                  <a:schemeClr val="tx1"/>
+                </a:solidFill>
+              </a:rPr>
+              <a:t>Roll up Tables</a:t>
+            </a:r>
+          </a:p>
+        </p:txBody>
+      </p:sp>
+      <p:sp>
+        <p:nvSpPr>
+          <p:cNvPr id="42" name="Rectangle 41">
+            <a:extLst>
+              <a:ext uri="{FF2B5EF4-FFF2-40B4-BE49-F238E27FC236}">
+                <a16:creationId xmlns:a16="http://schemas.microsoft.com/office/drawing/2014/main" id="{3D7B481F-BF8C-C255-7DFF-E76CB609A6E5}"/>
+              </a:ext>
+            </a:extLst>
+          </p:cNvPr>
+          <p:cNvSpPr/>
+          <p:nvPr/>
+        </p:nvSpPr>
+        <p:spPr>
+          <a:xfrm>
+            <a:off x="1867691" y="5720875"/>
+            <a:ext cx="1077914" cy="294564"/>
+          </a:xfrm>
+          <a:prstGeom prst="rect">
+            <a:avLst/>
+          </a:prstGeom>
+          <a:noFill/>
+        </p:spPr>
+        <p:style>
+          <a:lnRef idx="2">
+            <a:schemeClr val="accent1">
+              <a:shade val="15000"/>
+            </a:schemeClr>
+          </a:lnRef>
+          <a:fillRef idx="1">
+            <a:schemeClr val="accent1"/>
+          </a:fillRef>
+          <a:effectRef idx="0">
+            <a:schemeClr val="accent1"/>
+          </a:effectRef>
+          <a:fontRef idx="minor">
+            <a:schemeClr val="lt1"/>
+          </a:fontRef>
+        </p:style>
+        <p:txBody>
+          <a:bodyPr rtlCol="0" anchor="ctr"/>
+          <a:lstStyle/>
+          <a:p>
+            <a:pPr algn="ctr"/>
+            <a:r>
+              <a:rPr lang="en-US" sz="1050" dirty="0">
+                <a:solidFill>
+                  <a:schemeClr val="tx1"/>
+                </a:solidFill>
+              </a:rPr>
+              <a:t>Aggregate Tables</a:t>
+            </a:r>
+          </a:p>
+        </p:txBody>
+      </p:sp>
+      <p:sp>
+        <p:nvSpPr>
+          <p:cNvPr id="43" name="Rectangle 42">
+            <a:extLst>
+              <a:ext uri="{FF2B5EF4-FFF2-40B4-BE49-F238E27FC236}">
+                <a16:creationId xmlns:a16="http://schemas.microsoft.com/office/drawing/2014/main" id="{65A8833D-8A0C-4239-D40A-7084296FE20F}"/>
+              </a:ext>
+            </a:extLst>
+          </p:cNvPr>
+          <p:cNvSpPr/>
+          <p:nvPr/>
+        </p:nvSpPr>
+        <p:spPr>
+          <a:xfrm>
+            <a:off x="1133472" y="6118410"/>
+            <a:ext cx="1077914" cy="294564"/>
+          </a:xfrm>
+          <a:prstGeom prst="rect">
+            <a:avLst/>
+          </a:prstGeom>
+          <a:noFill/>
+        </p:spPr>
+        <p:style>
+          <a:lnRef idx="2">
+            <a:schemeClr val="accent1">
+              <a:shade val="15000"/>
+            </a:schemeClr>
+          </a:lnRef>
+          <a:fillRef idx="1">
+            <a:schemeClr val="accent1"/>
+          </a:fillRef>
+          <a:effectRef idx="0">
+            <a:schemeClr val="accent1"/>
+          </a:effectRef>
+          <a:fontRef idx="minor">
+            <a:schemeClr val="lt1"/>
+          </a:fontRef>
+        </p:style>
+        <p:txBody>
+          <a:bodyPr rtlCol="0" anchor="ctr"/>
+          <a:lstStyle/>
+          <a:p>
+            <a:pPr algn="ctr"/>
+            <a:r>
+              <a:rPr lang="en-US" sz="1050" dirty="0">
+                <a:solidFill>
+                  <a:schemeClr val="tx1"/>
+                </a:solidFill>
+              </a:rPr>
+              <a:t>Materialized Views</a:t>
+            </a:r>
+          </a:p>
+        </p:txBody>
+      </p:sp>
+      <p:sp>
+        <p:nvSpPr>
+          <p:cNvPr id="48" name="Rectangle 47">
+            <a:extLst>
+              <a:ext uri="{FF2B5EF4-FFF2-40B4-BE49-F238E27FC236}">
+                <a16:creationId xmlns:a16="http://schemas.microsoft.com/office/drawing/2014/main" id="{624218C8-5323-5DE1-630C-DF31DC5D5B84}"/>
+              </a:ext>
+            </a:extLst>
+          </p:cNvPr>
+          <p:cNvSpPr/>
+          <p:nvPr/>
+        </p:nvSpPr>
+        <p:spPr>
+          <a:xfrm>
+            <a:off x="3927478" y="5047288"/>
+            <a:ext cx="1206498" cy="591378"/>
+          </a:xfrm>
+          <a:prstGeom prst="rect">
+            <a:avLst/>
+          </a:prstGeom>
+          <a:noFill/>
+        </p:spPr>
+        <p:style>
+          <a:lnRef idx="2">
+            <a:schemeClr val="accent1">
+              <a:shade val="15000"/>
+            </a:schemeClr>
+          </a:lnRef>
+          <a:fillRef idx="1">
+            <a:schemeClr val="accent1"/>
+          </a:fillRef>
+          <a:effectRef idx="0">
+            <a:schemeClr val="accent1"/>
+          </a:effectRef>
+          <a:fontRef idx="minor">
+            <a:schemeClr val="lt1"/>
+          </a:fontRef>
+        </p:style>
+        <p:txBody>
+          <a:bodyPr rtlCol="0" anchor="ctr"/>
+          <a:lstStyle/>
+          <a:p>
+            <a:pPr algn="ctr"/>
+            <a:r>
+              <a:rPr lang="en-US" sz="1050" dirty="0" err="1">
+                <a:solidFill>
+                  <a:schemeClr val="tx1"/>
+                </a:solidFill>
+              </a:rPr>
+              <a:t>PowerBI</a:t>
+            </a:r>
+            <a:endParaRPr lang="en-US" sz="1050" dirty="0">
+              <a:solidFill>
+                <a:schemeClr val="tx1"/>
+              </a:solidFill>
+            </a:endParaRPr>
+          </a:p>
+        </p:txBody>
+      </p:sp>
+      <p:grpSp>
+        <p:nvGrpSpPr>
+          <p:cNvPr id="50" name="Group 49">
+            <a:extLst>
+              <a:ext uri="{FF2B5EF4-FFF2-40B4-BE49-F238E27FC236}">
+                <a16:creationId xmlns:a16="http://schemas.microsoft.com/office/drawing/2014/main" id="{0AB841C9-CE25-FF4D-EEA7-B1B42A034B03}"/>
+              </a:ext>
+            </a:extLst>
+          </p:cNvPr>
+          <p:cNvGrpSpPr/>
+          <p:nvPr/>
+        </p:nvGrpSpPr>
+        <p:grpSpPr>
+          <a:xfrm>
+            <a:off x="5416834" y="4905989"/>
+            <a:ext cx="628650" cy="665291"/>
+            <a:chOff x="5273959" y="1431748"/>
+            <a:chExt cx="628650" cy="665291"/>
+          </a:xfrm>
+        </p:grpSpPr>
+        <p:pic>
+          <p:nvPicPr>
+            <p:cNvPr id="1026" name="Picture 2" descr="Stick figures - People I saw at the park today : r/AdobeIllustrator">
+              <a:extLst>
+                <a:ext uri="{FF2B5EF4-FFF2-40B4-BE49-F238E27FC236}">
+                  <a16:creationId xmlns:a16="http://schemas.microsoft.com/office/drawing/2014/main" id="{35B0DEC1-67E3-E6D8-6F84-6EF8089F3766}"/>
+                </a:ext>
+              </a:extLst>
+            </p:cNvPr>
+            <p:cNvPicPr>
+              <a:picLocks noChangeAspect="1" noChangeArrowheads="1"/>
+            </p:cNvPicPr>
+            <p:nvPr/>
+          </p:nvPicPr>
+          <p:blipFill>
+            <a:blip r:embed="rId2">
+              <a:extLst>
+                <a:ext uri="{28A0092B-C50C-407E-A947-70E740481C1C}">
+                  <a14:useLocalDpi xmlns:a14="http://schemas.microsoft.com/office/drawing/2010/main" val="0"/>
+                </a:ext>
+              </a:extLst>
+            </a:blip>
+            <a:srcRect/>
+            <a:stretch>
+              <a:fillRect/>
+            </a:stretch>
+          </p:blipFill>
+          <p:spPr bwMode="auto">
+            <a:xfrm>
+              <a:off x="5353050" y="1431748"/>
+              <a:ext cx="530509" cy="514221"/>
+            </a:xfrm>
+            <a:prstGeom prst="rect">
+              <a:avLst/>
+            </a:prstGeom>
+            <a:noFill/>
+            <a:extLst>
+              <a:ext uri="{909E8E84-426E-40DD-AFC4-6F175D3DCCD1}">
+                <a14:hiddenFill xmlns:a14="http://schemas.microsoft.com/office/drawing/2010/main">
+                  <a:solidFill>
+                    <a:srgbClr val="FFFFFF"/>
+                  </a:solidFill>
+                </a14:hiddenFill>
+              </a:ext>
+            </a:extLst>
+          </p:spPr>
+        </p:pic>
+        <p:sp>
+          <p:nvSpPr>
+            <p:cNvPr id="49" name="TextBox 48">
+              <a:extLst>
+                <a:ext uri="{FF2B5EF4-FFF2-40B4-BE49-F238E27FC236}">
+                  <a16:creationId xmlns:a16="http://schemas.microsoft.com/office/drawing/2014/main" id="{A0BA4084-106E-CAAD-A33E-D446F38192FD}"/>
+                </a:ext>
+              </a:extLst>
+            </p:cNvPr>
+            <p:cNvSpPr txBox="1"/>
+            <p:nvPr/>
+          </p:nvSpPr>
+          <p:spPr>
+            <a:xfrm flipH="1">
+              <a:off x="5273959" y="1835429"/>
+              <a:ext cx="628650" cy="261610"/>
+            </a:xfrm>
+            <a:prstGeom prst="rect">
+              <a:avLst/>
+            </a:prstGeom>
+            <a:noFill/>
+          </p:spPr>
+          <p:txBody>
+            <a:bodyPr wrap="square" rtlCol="0">
+              <a:spAutoFit/>
+            </a:bodyPr>
+            <a:lstStyle/>
+            <a:p>
+              <a:pPr algn="ctr"/>
+              <a:r>
+                <a:rPr lang="en-US" sz="1100" dirty="0"/>
+                <a:t>Users</a:t>
+              </a:r>
+            </a:p>
+          </p:txBody>
+        </p:sp>
+      </p:grpSp>
+      <p:grpSp>
+        <p:nvGrpSpPr>
+          <p:cNvPr id="51" name="Group 50">
+            <a:extLst>
+              <a:ext uri="{FF2B5EF4-FFF2-40B4-BE49-F238E27FC236}">
+                <a16:creationId xmlns:a16="http://schemas.microsoft.com/office/drawing/2014/main" id="{9D6B2AEA-BE02-6E97-B49E-33A201066AE6}"/>
+              </a:ext>
+            </a:extLst>
+          </p:cNvPr>
+          <p:cNvGrpSpPr/>
+          <p:nvPr/>
+        </p:nvGrpSpPr>
+        <p:grpSpPr>
+          <a:xfrm>
+            <a:off x="4094163" y="5956623"/>
+            <a:ext cx="835027" cy="665291"/>
+            <a:chOff x="5181882" y="1431748"/>
+            <a:chExt cx="835027" cy="665291"/>
+          </a:xfrm>
+        </p:grpSpPr>
+        <p:pic>
+          <p:nvPicPr>
+            <p:cNvPr id="52" name="Picture 2" descr="Stick figures - People I saw at the park today : r/AdobeIllustrator">
+              <a:extLst>
+                <a:ext uri="{FF2B5EF4-FFF2-40B4-BE49-F238E27FC236}">
+                  <a16:creationId xmlns:a16="http://schemas.microsoft.com/office/drawing/2014/main" id="{C5D0775E-2843-D88A-FC22-3B33395D0660}"/>
+                </a:ext>
+              </a:extLst>
+            </p:cNvPr>
+            <p:cNvPicPr>
+              <a:picLocks noChangeAspect="1" noChangeArrowheads="1"/>
+            </p:cNvPicPr>
+            <p:nvPr/>
+          </p:nvPicPr>
+          <p:blipFill>
+            <a:blip r:embed="rId2">
+              <a:extLst>
+                <a:ext uri="{28A0092B-C50C-407E-A947-70E740481C1C}">
+                  <a14:useLocalDpi xmlns:a14="http://schemas.microsoft.com/office/drawing/2010/main" val="0"/>
+                </a:ext>
+              </a:extLst>
+            </a:blip>
+            <a:srcRect/>
+            <a:stretch>
+              <a:fillRect/>
+            </a:stretch>
+          </p:blipFill>
+          <p:spPr bwMode="auto">
+            <a:xfrm>
+              <a:off x="5353050" y="1431748"/>
+              <a:ext cx="530509" cy="514221"/>
+            </a:xfrm>
+            <a:prstGeom prst="rect">
+              <a:avLst/>
+            </a:prstGeom>
+            <a:noFill/>
+            <a:extLst>
+              <a:ext uri="{909E8E84-426E-40DD-AFC4-6F175D3DCCD1}">
+                <a14:hiddenFill xmlns:a14="http://schemas.microsoft.com/office/drawing/2010/main">
+                  <a:solidFill>
+                    <a:srgbClr val="FFFFFF"/>
+                  </a:solidFill>
+                </a14:hiddenFill>
+              </a:ext>
+            </a:extLst>
+          </p:spPr>
+        </p:pic>
+        <p:sp>
+          <p:nvSpPr>
+            <p:cNvPr id="53" name="TextBox 52">
+              <a:extLst>
+                <a:ext uri="{FF2B5EF4-FFF2-40B4-BE49-F238E27FC236}">
+                  <a16:creationId xmlns:a16="http://schemas.microsoft.com/office/drawing/2014/main" id="{D48C772D-EA5F-D3E7-80C0-05340C0026ED}"/>
+                </a:ext>
+              </a:extLst>
+            </p:cNvPr>
+            <p:cNvSpPr txBox="1"/>
+            <p:nvPr/>
+          </p:nvSpPr>
+          <p:spPr>
+            <a:xfrm flipH="1">
+              <a:off x="5181882" y="1835429"/>
+              <a:ext cx="835027" cy="261610"/>
+            </a:xfrm>
+            <a:prstGeom prst="rect">
+              <a:avLst/>
+            </a:prstGeom>
+            <a:noFill/>
+          </p:spPr>
+          <p:txBody>
+            <a:bodyPr wrap="square" rtlCol="0">
+              <a:spAutoFit/>
+            </a:bodyPr>
+            <a:lstStyle/>
+            <a:p>
+              <a:pPr algn="ctr"/>
+              <a:r>
+                <a:rPr lang="en-US" sz="1100" dirty="0"/>
+                <a:t>Developers</a:t>
+              </a:r>
+            </a:p>
+          </p:txBody>
+        </p:sp>
+      </p:grpSp>
+      <p:cxnSp>
+        <p:nvCxnSpPr>
+          <p:cNvPr id="55" name="Straight Arrow Connector 54">
+            <a:extLst>
+              <a:ext uri="{FF2B5EF4-FFF2-40B4-BE49-F238E27FC236}">
+                <a16:creationId xmlns:a16="http://schemas.microsoft.com/office/drawing/2014/main" id="{E97F37D6-54EA-1C7B-F71A-BE5B2B7338B6}"/>
+              </a:ext>
+            </a:extLst>
+          </p:cNvPr>
+          <p:cNvCxnSpPr>
+            <a:stCxn id="1026" idx="1"/>
+            <a:endCxn id="48" idx="3"/>
+          </p:cNvCxnSpPr>
+          <p:nvPr/>
+        </p:nvCxnSpPr>
+        <p:spPr>
+          <a:xfrm flipH="1">
+            <a:off x="5133976" y="5163100"/>
+            <a:ext cx="361949" cy="179877"/>
+          </a:xfrm>
+          <a:prstGeom prst="straightConnector1">
+            <a:avLst/>
+          </a:prstGeom>
+          <a:ln>
+            <a:tailEnd type="triangle"/>
+          </a:ln>
+        </p:spPr>
+        <p:style>
+          <a:lnRef idx="1">
+            <a:schemeClr val="accent1"/>
+          </a:lnRef>
+          <a:fillRef idx="0">
+            <a:schemeClr val="accent1"/>
+          </a:fillRef>
+          <a:effectRef idx="0">
+            <a:schemeClr val="accent1"/>
+          </a:effectRef>
+          <a:fontRef idx="minor">
+            <a:schemeClr val="tx1"/>
+          </a:fontRef>
+        </p:style>
+      </p:cxnSp>
+      <p:cxnSp>
+        <p:nvCxnSpPr>
+          <p:cNvPr id="56" name="Straight Arrow Connector 55">
+            <a:extLst>
+              <a:ext uri="{FF2B5EF4-FFF2-40B4-BE49-F238E27FC236}">
+                <a16:creationId xmlns:a16="http://schemas.microsoft.com/office/drawing/2014/main" id="{38DC8DE8-E01B-3107-A25F-5FEE6F17EBF3}"/>
+              </a:ext>
+            </a:extLst>
+          </p:cNvPr>
+          <p:cNvCxnSpPr>
+            <a:cxnSpLocks/>
+            <a:stCxn id="52" idx="0"/>
+            <a:endCxn id="48" idx="2"/>
+          </p:cNvCxnSpPr>
+          <p:nvPr/>
+        </p:nvCxnSpPr>
+        <p:spPr>
+          <a:xfrm flipV="1">
+            <a:off x="4530586" y="5638666"/>
+            <a:ext cx="141" cy="317957"/>
+          </a:xfrm>
+          <a:prstGeom prst="straightConnector1">
+            <a:avLst/>
+          </a:prstGeom>
+          <a:ln>
+            <a:tailEnd type="triangle"/>
+          </a:ln>
+        </p:spPr>
+        <p:style>
+          <a:lnRef idx="1">
+            <a:schemeClr val="accent1"/>
+          </a:lnRef>
+          <a:fillRef idx="0">
+            <a:schemeClr val="accent1"/>
+          </a:fillRef>
+          <a:effectRef idx="0">
+            <a:schemeClr val="accent1"/>
+          </a:effectRef>
+          <a:fontRef idx="minor">
+            <a:schemeClr val="tx1"/>
+          </a:fontRef>
+        </p:style>
+      </p:cxnSp>
+      <p:cxnSp>
+        <p:nvCxnSpPr>
+          <p:cNvPr id="61" name="Straight Arrow Connector 60">
+            <a:extLst>
+              <a:ext uri="{FF2B5EF4-FFF2-40B4-BE49-F238E27FC236}">
+                <a16:creationId xmlns:a16="http://schemas.microsoft.com/office/drawing/2014/main" id="{41C33A3D-B6B7-A8FD-E401-37D22625B84B}"/>
+              </a:ext>
+            </a:extLst>
+          </p:cNvPr>
+          <p:cNvCxnSpPr>
+            <a:cxnSpLocks/>
+            <a:stCxn id="48" idx="1"/>
+            <a:endCxn id="17" idx="3"/>
+          </p:cNvCxnSpPr>
+          <p:nvPr/>
+        </p:nvCxnSpPr>
+        <p:spPr>
+          <a:xfrm flipH="1">
+            <a:off x="3116261" y="5342977"/>
+            <a:ext cx="811217" cy="373563"/>
+          </a:xfrm>
+          <a:prstGeom prst="straightConnector1">
+            <a:avLst/>
+          </a:prstGeom>
+          <a:ln>
+            <a:tailEnd type="triangle"/>
+          </a:ln>
+        </p:spPr>
+        <p:style>
+          <a:lnRef idx="1">
+            <a:schemeClr val="accent1"/>
+          </a:lnRef>
+          <a:fillRef idx="0">
+            <a:schemeClr val="accent1"/>
+          </a:fillRef>
+          <a:effectRef idx="0">
+            <a:schemeClr val="accent1"/>
+          </a:effectRef>
+          <a:fontRef idx="minor">
+            <a:schemeClr val="tx1"/>
+          </a:fontRef>
+        </p:style>
+      </p:cxnSp>
+      <p:sp>
+        <p:nvSpPr>
+          <p:cNvPr id="1028" name="Rectangle 1027">
+            <a:extLst>
+              <a:ext uri="{FF2B5EF4-FFF2-40B4-BE49-F238E27FC236}">
+                <a16:creationId xmlns:a16="http://schemas.microsoft.com/office/drawing/2014/main" id="{A38B7109-28B8-5C03-0058-9B75E6A0F3DE}"/>
+              </a:ext>
+            </a:extLst>
+          </p:cNvPr>
+          <p:cNvSpPr/>
+          <p:nvPr/>
+        </p:nvSpPr>
+        <p:spPr>
+          <a:xfrm>
+            <a:off x="2743200" y="1616974"/>
+            <a:ext cx="477836" cy="591378"/>
+          </a:xfrm>
+          <a:prstGeom prst="rect">
+            <a:avLst/>
+          </a:prstGeom>
+          <a:noFill/>
+        </p:spPr>
+        <p:style>
+          <a:lnRef idx="2">
+            <a:schemeClr val="accent1">
+              <a:shade val="15000"/>
+            </a:schemeClr>
+          </a:lnRef>
+          <a:fillRef idx="1">
+            <a:schemeClr val="accent1"/>
+          </a:fillRef>
+          <a:effectRef idx="0">
+            <a:schemeClr val="accent1"/>
+          </a:effectRef>
+          <a:fontRef idx="minor">
+            <a:schemeClr val="lt1"/>
+          </a:fontRef>
+        </p:style>
+        <p:txBody>
+          <a:bodyPr rtlCol="0" anchor="ctr"/>
+          <a:lstStyle/>
+          <a:p>
+            <a:pPr algn="ctr"/>
+            <a:r>
+              <a:rPr lang="en-US" sz="1050" dirty="0">
+                <a:solidFill>
+                  <a:schemeClr val="tx1"/>
+                </a:solidFill>
+              </a:rPr>
+              <a:t>APIs</a:t>
+            </a:r>
+          </a:p>
+        </p:txBody>
+      </p:sp>
+      <p:sp>
+        <p:nvSpPr>
+          <p:cNvPr id="1029" name="Rectangle 1028">
+            <a:extLst>
+              <a:ext uri="{FF2B5EF4-FFF2-40B4-BE49-F238E27FC236}">
+                <a16:creationId xmlns:a16="http://schemas.microsoft.com/office/drawing/2014/main" id="{B8B32DAA-3F7C-2E60-D187-3937DD1D3907}"/>
+              </a:ext>
+            </a:extLst>
+          </p:cNvPr>
+          <p:cNvSpPr/>
+          <p:nvPr/>
+        </p:nvSpPr>
+        <p:spPr>
+          <a:xfrm>
+            <a:off x="1672429" y="1616974"/>
+            <a:ext cx="577847" cy="591378"/>
+          </a:xfrm>
+          <a:prstGeom prst="rect">
+            <a:avLst/>
+          </a:prstGeom>
+          <a:noFill/>
+        </p:spPr>
+        <p:style>
+          <a:lnRef idx="2">
+            <a:schemeClr val="accent1">
+              <a:shade val="15000"/>
+            </a:schemeClr>
+          </a:lnRef>
+          <a:fillRef idx="1">
+            <a:schemeClr val="accent1"/>
+          </a:fillRef>
+          <a:effectRef idx="0">
+            <a:schemeClr val="accent1"/>
+          </a:effectRef>
+          <a:fontRef idx="minor">
+            <a:schemeClr val="lt1"/>
+          </a:fontRef>
+        </p:style>
+        <p:txBody>
+          <a:bodyPr rtlCol="0" anchor="ctr"/>
+          <a:lstStyle/>
+          <a:p>
+            <a:pPr algn="ctr"/>
+            <a:r>
+              <a:rPr lang="en-US" sz="1050" dirty="0">
+                <a:solidFill>
+                  <a:schemeClr val="tx1"/>
+                </a:solidFill>
+              </a:rPr>
+              <a:t>UI</a:t>
+            </a:r>
+          </a:p>
+        </p:txBody>
+      </p:sp>
+      <p:grpSp>
+        <p:nvGrpSpPr>
+          <p:cNvPr id="1030" name="Group 1029">
+            <a:extLst>
+              <a:ext uri="{FF2B5EF4-FFF2-40B4-BE49-F238E27FC236}">
+                <a16:creationId xmlns:a16="http://schemas.microsoft.com/office/drawing/2014/main" id="{47585667-9CEE-7F31-A79F-9D59A92CDE10}"/>
+              </a:ext>
+            </a:extLst>
+          </p:cNvPr>
+          <p:cNvGrpSpPr/>
+          <p:nvPr/>
+        </p:nvGrpSpPr>
+        <p:grpSpPr>
+          <a:xfrm>
+            <a:off x="731834" y="1580017"/>
+            <a:ext cx="628650" cy="665291"/>
+            <a:chOff x="5273959" y="1431748"/>
+            <a:chExt cx="628650" cy="665291"/>
+          </a:xfrm>
+        </p:grpSpPr>
+        <p:pic>
+          <p:nvPicPr>
+            <p:cNvPr id="1031" name="Picture 2" descr="Stick figures - People I saw at the park today : r/AdobeIllustrator">
+              <a:extLst>
+                <a:ext uri="{FF2B5EF4-FFF2-40B4-BE49-F238E27FC236}">
+                  <a16:creationId xmlns:a16="http://schemas.microsoft.com/office/drawing/2014/main" id="{10E8DED9-CCD7-6DAC-7AA8-480DFC02EFA9}"/>
+                </a:ext>
+              </a:extLst>
+            </p:cNvPr>
+            <p:cNvPicPr>
+              <a:picLocks noChangeAspect="1" noChangeArrowheads="1"/>
+            </p:cNvPicPr>
+            <p:nvPr/>
+          </p:nvPicPr>
+          <p:blipFill>
+            <a:blip r:embed="rId2">
+              <a:extLst>
+                <a:ext uri="{28A0092B-C50C-407E-A947-70E740481C1C}">
+                  <a14:useLocalDpi xmlns:a14="http://schemas.microsoft.com/office/drawing/2010/main" val="0"/>
+                </a:ext>
+              </a:extLst>
+            </a:blip>
+            <a:srcRect/>
+            <a:stretch>
+              <a:fillRect/>
+            </a:stretch>
+          </p:blipFill>
+          <p:spPr bwMode="auto">
+            <a:xfrm>
+              <a:off x="5353050" y="1431748"/>
+              <a:ext cx="530509" cy="514221"/>
+            </a:xfrm>
+            <a:prstGeom prst="rect">
+              <a:avLst/>
+            </a:prstGeom>
+            <a:noFill/>
+            <a:extLst>
+              <a:ext uri="{909E8E84-426E-40DD-AFC4-6F175D3DCCD1}">
+                <a14:hiddenFill xmlns:a14="http://schemas.microsoft.com/office/drawing/2010/main">
+                  <a:solidFill>
+                    <a:srgbClr val="FFFFFF"/>
+                  </a:solidFill>
+                </a14:hiddenFill>
+              </a:ext>
+            </a:extLst>
+          </p:spPr>
+        </p:pic>
+        <p:sp>
+          <p:nvSpPr>
+            <p:cNvPr id="1032" name="TextBox 1031">
+              <a:extLst>
+                <a:ext uri="{FF2B5EF4-FFF2-40B4-BE49-F238E27FC236}">
+                  <a16:creationId xmlns:a16="http://schemas.microsoft.com/office/drawing/2014/main" id="{2A0177AC-399A-230E-6E4D-BC130347423B}"/>
+                </a:ext>
+              </a:extLst>
+            </p:cNvPr>
+            <p:cNvSpPr txBox="1"/>
+            <p:nvPr/>
+          </p:nvSpPr>
+          <p:spPr>
+            <a:xfrm flipH="1">
+              <a:off x="5273959" y="1835429"/>
+              <a:ext cx="628650" cy="261610"/>
+            </a:xfrm>
+            <a:prstGeom prst="rect">
+              <a:avLst/>
+            </a:prstGeom>
+            <a:noFill/>
+          </p:spPr>
+          <p:txBody>
+            <a:bodyPr wrap="square" rtlCol="0">
+              <a:spAutoFit/>
+            </a:bodyPr>
+            <a:lstStyle/>
+            <a:p>
+              <a:pPr algn="ctr"/>
+              <a:r>
+                <a:rPr lang="en-US" sz="1100" dirty="0"/>
+                <a:t>Users</a:t>
+              </a:r>
+            </a:p>
+          </p:txBody>
+        </p:sp>
+      </p:grpSp>
+      <p:cxnSp>
+        <p:nvCxnSpPr>
+          <p:cNvPr id="1033" name="Straight Arrow Connector 1032">
+            <a:extLst>
+              <a:ext uri="{FF2B5EF4-FFF2-40B4-BE49-F238E27FC236}">
+                <a16:creationId xmlns:a16="http://schemas.microsoft.com/office/drawing/2014/main" id="{74C12A29-1272-E10E-6772-D2380C887106}"/>
+              </a:ext>
+            </a:extLst>
+          </p:cNvPr>
+          <p:cNvCxnSpPr>
+            <a:cxnSpLocks/>
+            <a:stCxn id="1031" idx="3"/>
+            <a:endCxn id="1029" idx="1"/>
+          </p:cNvCxnSpPr>
+          <p:nvPr/>
+        </p:nvCxnSpPr>
+        <p:spPr>
+          <a:xfrm>
+            <a:off x="1341434" y="1837128"/>
+            <a:ext cx="330995" cy="75535"/>
+          </a:xfrm>
+          <a:prstGeom prst="straightConnector1">
+            <a:avLst/>
+          </a:prstGeom>
+          <a:ln>
+            <a:tailEnd type="triangle"/>
+          </a:ln>
+        </p:spPr>
+        <p:style>
+          <a:lnRef idx="1">
+            <a:schemeClr val="accent1"/>
+          </a:lnRef>
+          <a:fillRef idx="0">
+            <a:schemeClr val="accent1"/>
+          </a:fillRef>
+          <a:effectRef idx="0">
+            <a:schemeClr val="accent1"/>
+          </a:effectRef>
+          <a:fontRef idx="minor">
+            <a:schemeClr val="tx1"/>
+          </a:fontRef>
+        </p:style>
+      </p:cxnSp>
+      <p:cxnSp>
+        <p:nvCxnSpPr>
+          <p:cNvPr id="1036" name="Straight Arrow Connector 1035">
+            <a:extLst>
+              <a:ext uri="{FF2B5EF4-FFF2-40B4-BE49-F238E27FC236}">
+                <a16:creationId xmlns:a16="http://schemas.microsoft.com/office/drawing/2014/main" id="{14E267DC-1773-BE21-1ACD-3A37D84AFAAE}"/>
+              </a:ext>
+            </a:extLst>
+          </p:cNvPr>
+          <p:cNvCxnSpPr>
+            <a:cxnSpLocks/>
+            <a:stCxn id="1029" idx="3"/>
+            <a:endCxn id="1028" idx="1"/>
+          </p:cNvCxnSpPr>
+          <p:nvPr/>
+        </p:nvCxnSpPr>
+        <p:spPr>
+          <a:xfrm>
+            <a:off x="2250276" y="1912663"/>
+            <a:ext cx="492924" cy="0"/>
+          </a:xfrm>
+          <a:prstGeom prst="straightConnector1">
+            <a:avLst/>
+          </a:prstGeom>
+          <a:ln>
+            <a:tailEnd type="triangle"/>
+          </a:ln>
+        </p:spPr>
+        <p:style>
+          <a:lnRef idx="1">
+            <a:schemeClr val="accent1"/>
+          </a:lnRef>
+          <a:fillRef idx="0">
+            <a:schemeClr val="accent1"/>
+          </a:fillRef>
+          <a:effectRef idx="0">
+            <a:schemeClr val="accent1"/>
+          </a:effectRef>
+          <a:fontRef idx="minor">
+            <a:schemeClr val="tx1"/>
+          </a:fontRef>
+        </p:style>
+      </p:cxnSp>
+      <p:cxnSp>
+        <p:nvCxnSpPr>
+          <p:cNvPr id="1039" name="Straight Arrow Connector 1038">
+            <a:extLst>
+              <a:ext uri="{FF2B5EF4-FFF2-40B4-BE49-F238E27FC236}">
+                <a16:creationId xmlns:a16="http://schemas.microsoft.com/office/drawing/2014/main" id="{32934B40-063D-36B6-C483-8F90AACD1793}"/>
+              </a:ext>
+            </a:extLst>
+          </p:cNvPr>
+          <p:cNvCxnSpPr>
+            <a:cxnSpLocks/>
+            <a:stCxn id="1028" idx="3"/>
+            <a:endCxn id="3" idx="1"/>
+          </p:cNvCxnSpPr>
+          <p:nvPr/>
+        </p:nvCxnSpPr>
+        <p:spPr>
+          <a:xfrm flipV="1">
+            <a:off x="3221036" y="1911307"/>
+            <a:ext cx="415929" cy="1356"/>
+          </a:xfrm>
+          <a:prstGeom prst="straightConnector1">
+            <a:avLst/>
+          </a:prstGeom>
+          <a:ln>
+            <a:tailEnd type="triangle"/>
+          </a:ln>
+        </p:spPr>
+        <p:style>
+          <a:lnRef idx="1">
+            <a:schemeClr val="accent1"/>
+          </a:lnRef>
+          <a:fillRef idx="0">
+            <a:schemeClr val="accent1"/>
+          </a:fillRef>
+          <a:effectRef idx="0">
+            <a:schemeClr val="accent1"/>
+          </a:effectRef>
+          <a:fontRef idx="minor">
+            <a:schemeClr val="tx1"/>
+          </a:fontRef>
+        </p:style>
+      </p:cxnSp>
+    </p:spTree>
+    <p:extLst>
+      <p:ext uri="{BB962C8B-B14F-4D97-AF65-F5344CB8AC3E}">
+        <p14:creationId xmlns:p14="http://schemas.microsoft.com/office/powerpoint/2010/main" val="2899601620"/>
+      </p:ext>
+    </p:extLst>
+  </p:cSld>
+  <p:clrMapOvr>
+    <a:masterClrMapping/>
+  </p:clrMapOvr>
+</p:sld>
+</file>
+
+<file path=ppt/slides/slide3.xml><?xml version="1.0" encoding="utf-8"?>
+<p:sld xmlns:a="http://schemas.openxmlformats.org/drawingml/2006/main" xmlns:r="http://schemas.openxmlformats.org/officeDocument/2006/relationships" xmlns:p="http://schemas.openxmlformats.org/presentationml/2006/main">
+  <p:cSld>
+    <p:spTree>
+      <p:nvGrpSpPr>
+        <p:cNvPr id="1" name=""/>
+        <p:cNvGrpSpPr/>
+        <p:nvPr/>
+      </p:nvGrpSpPr>
+      <p:grpSpPr>
+        <a:xfrm>
+          <a:off x="0" y="0"/>
+          <a:ext cx="0" cy="0"/>
+          <a:chOff x="0" y="0"/>
+          <a:chExt cx="0" cy="0"/>
+        </a:xfrm>
+      </p:grpSpPr>
+      <p:sp>
+        <p:nvSpPr>
+          <p:cNvPr id="13" name="Rectangle 12">
+            <a:extLst>
+              <a:ext uri="{FF2B5EF4-FFF2-40B4-BE49-F238E27FC236}">
+                <a16:creationId xmlns:a16="http://schemas.microsoft.com/office/drawing/2014/main" id="{F0CB5A7B-6E49-D392-D99B-50AA229A099B}"/>
+              </a:ext>
+            </a:extLst>
+          </p:cNvPr>
+          <p:cNvSpPr/>
+          <p:nvPr/>
+        </p:nvSpPr>
+        <p:spPr>
+          <a:xfrm>
+            <a:off x="573109" y="1606029"/>
+            <a:ext cx="2289175" cy="591378"/>
+          </a:xfrm>
+          <a:prstGeom prst="rect">
+            <a:avLst/>
+          </a:prstGeom>
+          <a:noFill/>
+        </p:spPr>
+        <p:style>
+          <a:lnRef idx="2">
+            <a:schemeClr val="accent1">
+              <a:shade val="15000"/>
+            </a:schemeClr>
+          </a:lnRef>
+          <a:fillRef idx="1">
+            <a:schemeClr val="accent1"/>
+          </a:fillRef>
+          <a:effectRef idx="0">
+            <a:schemeClr val="accent1"/>
+          </a:effectRef>
+          <a:fontRef idx="minor">
+            <a:schemeClr val="lt1"/>
+          </a:fontRef>
+        </p:style>
+        <p:txBody>
+          <a:bodyPr rtlCol="0" anchor="ctr"/>
+          <a:lstStyle/>
+          <a:p>
+            <a:pPr algn="ctr"/>
+            <a:r>
+              <a:rPr lang="en-US" sz="1050" dirty="0">
+                <a:solidFill>
+                  <a:schemeClr val="tx1"/>
+                </a:solidFill>
+              </a:rPr>
+              <a:t>Transactional Tables</a:t>
+            </a:r>
+          </a:p>
+        </p:txBody>
+      </p:sp>
+      <p:sp>
+        <p:nvSpPr>
+          <p:cNvPr id="17" name="Rectangle 16">
+            <a:extLst>
+              <a:ext uri="{FF2B5EF4-FFF2-40B4-BE49-F238E27FC236}">
+                <a16:creationId xmlns:a16="http://schemas.microsoft.com/office/drawing/2014/main" id="{02B8B0C7-68BC-71BB-EA1B-41F9379959C2}"/>
+              </a:ext>
+            </a:extLst>
+          </p:cNvPr>
+          <p:cNvSpPr/>
+          <p:nvPr/>
+        </p:nvSpPr>
+        <p:spPr>
+          <a:xfrm>
+            <a:off x="425472" y="1456006"/>
+            <a:ext cx="2584450" cy="991920"/>
+          </a:xfrm>
+          <a:prstGeom prst="rect">
+            <a:avLst/>
+          </a:prstGeom>
+          <a:noFill/>
+        </p:spPr>
+        <p:style>
+          <a:lnRef idx="2">
+            <a:schemeClr val="accent1">
+              <a:shade val="15000"/>
+            </a:schemeClr>
+          </a:lnRef>
+          <a:fillRef idx="1">
+            <a:schemeClr val="accent1"/>
+          </a:fillRef>
+          <a:effectRef idx="0">
+            <a:schemeClr val="accent1"/>
+          </a:effectRef>
+          <a:fontRef idx="minor">
+            <a:schemeClr val="lt1"/>
+          </a:fontRef>
+        </p:style>
+        <p:txBody>
+          <a:bodyPr rtlCol="0" anchor="ctr"/>
+          <a:lstStyle/>
+          <a:p>
+            <a:pPr algn="ctr"/>
+            <a:endParaRPr lang="en-US" sz="1400" dirty="0">
+              <a:solidFill>
+                <a:schemeClr val="tx1"/>
+              </a:solidFill>
+            </a:endParaRPr>
+          </a:p>
+        </p:txBody>
+      </p:sp>
+      <p:sp>
+        <p:nvSpPr>
+          <p:cNvPr id="18" name="TextBox 17">
+            <a:extLst>
+              <a:ext uri="{FF2B5EF4-FFF2-40B4-BE49-F238E27FC236}">
+                <a16:creationId xmlns:a16="http://schemas.microsoft.com/office/drawing/2014/main" id="{489675B5-DBFA-471B-BAE3-7DC8DC5DB50B}"/>
+              </a:ext>
+            </a:extLst>
+          </p:cNvPr>
+          <p:cNvSpPr txBox="1"/>
+          <p:nvPr/>
+        </p:nvSpPr>
+        <p:spPr>
+          <a:xfrm flipH="1">
+            <a:off x="425471" y="1189672"/>
+            <a:ext cx="2289175" cy="261610"/>
+          </a:xfrm>
+          <a:prstGeom prst="rect">
+            <a:avLst/>
+          </a:prstGeom>
+          <a:noFill/>
+        </p:spPr>
+        <p:txBody>
+          <a:bodyPr wrap="square" rtlCol="0">
+            <a:spAutoFit/>
+          </a:bodyPr>
+          <a:lstStyle/>
+          <a:p>
+            <a:r>
+              <a:rPr lang="en-US" sz="1100" dirty="0"/>
+              <a:t>Transactional DB</a:t>
+            </a:r>
+          </a:p>
+        </p:txBody>
+      </p:sp>
+      <p:sp>
+        <p:nvSpPr>
+          <p:cNvPr id="48" name="Rectangle 47">
+            <a:extLst>
+              <a:ext uri="{FF2B5EF4-FFF2-40B4-BE49-F238E27FC236}">
+                <a16:creationId xmlns:a16="http://schemas.microsoft.com/office/drawing/2014/main" id="{624218C8-5323-5DE1-630C-DF31DC5D5B84}"/>
+              </a:ext>
+            </a:extLst>
+          </p:cNvPr>
+          <p:cNvSpPr/>
+          <p:nvPr/>
+        </p:nvSpPr>
+        <p:spPr>
+          <a:xfrm>
+            <a:off x="3931468" y="3007594"/>
+            <a:ext cx="1206498" cy="591378"/>
+          </a:xfrm>
+          <a:prstGeom prst="rect">
+            <a:avLst/>
+          </a:prstGeom>
+          <a:noFill/>
+        </p:spPr>
+        <p:style>
+          <a:lnRef idx="2">
+            <a:schemeClr val="accent1">
+              <a:shade val="15000"/>
+            </a:schemeClr>
+          </a:lnRef>
+          <a:fillRef idx="1">
+            <a:schemeClr val="accent1"/>
+          </a:fillRef>
+          <a:effectRef idx="0">
+            <a:schemeClr val="accent1"/>
+          </a:effectRef>
+          <a:fontRef idx="minor">
+            <a:schemeClr val="lt1"/>
+          </a:fontRef>
+        </p:style>
+        <p:txBody>
+          <a:bodyPr rtlCol="0" anchor="ctr"/>
+          <a:lstStyle/>
+          <a:p>
+            <a:pPr algn="ctr"/>
+            <a:r>
+              <a:rPr lang="en-US" sz="1050" dirty="0" err="1">
+                <a:solidFill>
+                  <a:schemeClr val="tx1"/>
+                </a:solidFill>
+              </a:rPr>
+              <a:t>PowerBI</a:t>
+            </a:r>
+            <a:endParaRPr lang="en-US" sz="1050" dirty="0">
+              <a:solidFill>
+                <a:schemeClr val="tx1"/>
+              </a:solidFill>
+            </a:endParaRPr>
+          </a:p>
+        </p:txBody>
+      </p:sp>
+      <p:grpSp>
+        <p:nvGrpSpPr>
+          <p:cNvPr id="50" name="Group 49">
+            <a:extLst>
+              <a:ext uri="{FF2B5EF4-FFF2-40B4-BE49-F238E27FC236}">
+                <a16:creationId xmlns:a16="http://schemas.microsoft.com/office/drawing/2014/main" id="{0AB841C9-CE25-FF4D-EEA7-B1B42A034B03}"/>
+              </a:ext>
+            </a:extLst>
+          </p:cNvPr>
+          <p:cNvGrpSpPr/>
+          <p:nvPr/>
+        </p:nvGrpSpPr>
+        <p:grpSpPr>
+          <a:xfrm>
+            <a:off x="5420824" y="2866295"/>
+            <a:ext cx="628650" cy="665291"/>
+            <a:chOff x="5273959" y="1431748"/>
+            <a:chExt cx="628650" cy="665291"/>
+          </a:xfrm>
+        </p:grpSpPr>
+        <p:pic>
+          <p:nvPicPr>
+            <p:cNvPr id="1026" name="Picture 2" descr="Stick figures - People I saw at the park today : r/AdobeIllustrator">
+              <a:extLst>
+                <a:ext uri="{FF2B5EF4-FFF2-40B4-BE49-F238E27FC236}">
+                  <a16:creationId xmlns:a16="http://schemas.microsoft.com/office/drawing/2014/main" id="{35B0DEC1-67E3-E6D8-6F84-6EF8089F3766}"/>
+                </a:ext>
+              </a:extLst>
+            </p:cNvPr>
+            <p:cNvPicPr>
+              <a:picLocks noChangeAspect="1" noChangeArrowheads="1"/>
+            </p:cNvPicPr>
+            <p:nvPr/>
+          </p:nvPicPr>
+          <p:blipFill>
+            <a:blip r:embed="rId2">
+              <a:extLst>
+                <a:ext uri="{28A0092B-C50C-407E-A947-70E740481C1C}">
+                  <a14:useLocalDpi xmlns:a14="http://schemas.microsoft.com/office/drawing/2010/main" val="0"/>
+                </a:ext>
+              </a:extLst>
+            </a:blip>
+            <a:srcRect/>
+            <a:stretch>
+              <a:fillRect/>
+            </a:stretch>
+          </p:blipFill>
+          <p:spPr bwMode="auto">
+            <a:xfrm>
+              <a:off x="5353050" y="1431748"/>
+              <a:ext cx="530509" cy="514221"/>
+            </a:xfrm>
+            <a:prstGeom prst="rect">
+              <a:avLst/>
+            </a:prstGeom>
+            <a:noFill/>
+            <a:extLst>
+              <a:ext uri="{909E8E84-426E-40DD-AFC4-6F175D3DCCD1}">
+                <a14:hiddenFill xmlns:a14="http://schemas.microsoft.com/office/drawing/2010/main">
+                  <a:solidFill>
+                    <a:srgbClr val="FFFFFF"/>
+                  </a:solidFill>
+                </a14:hiddenFill>
+              </a:ext>
+            </a:extLst>
+          </p:spPr>
+        </p:pic>
+        <p:sp>
+          <p:nvSpPr>
+            <p:cNvPr id="49" name="TextBox 48">
+              <a:extLst>
+                <a:ext uri="{FF2B5EF4-FFF2-40B4-BE49-F238E27FC236}">
+                  <a16:creationId xmlns:a16="http://schemas.microsoft.com/office/drawing/2014/main" id="{A0BA4084-106E-CAAD-A33E-D446F38192FD}"/>
+                </a:ext>
+              </a:extLst>
+            </p:cNvPr>
+            <p:cNvSpPr txBox="1"/>
+            <p:nvPr/>
+          </p:nvSpPr>
+          <p:spPr>
+            <a:xfrm flipH="1">
+              <a:off x="5273959" y="1835429"/>
+              <a:ext cx="628650" cy="261610"/>
+            </a:xfrm>
+            <a:prstGeom prst="rect">
+              <a:avLst/>
+            </a:prstGeom>
+            <a:noFill/>
+          </p:spPr>
+          <p:txBody>
+            <a:bodyPr wrap="square" rtlCol="0">
+              <a:spAutoFit/>
+            </a:bodyPr>
+            <a:lstStyle/>
+            <a:p>
+              <a:pPr algn="ctr"/>
+              <a:r>
+                <a:rPr lang="en-US" sz="1100" dirty="0"/>
+                <a:t>Users</a:t>
+              </a:r>
+            </a:p>
+          </p:txBody>
+        </p:sp>
+      </p:grpSp>
+      <p:grpSp>
+        <p:nvGrpSpPr>
+          <p:cNvPr id="51" name="Group 50">
+            <a:extLst>
+              <a:ext uri="{FF2B5EF4-FFF2-40B4-BE49-F238E27FC236}">
+                <a16:creationId xmlns:a16="http://schemas.microsoft.com/office/drawing/2014/main" id="{9D6B2AEA-BE02-6E97-B49E-33A201066AE6}"/>
+              </a:ext>
+            </a:extLst>
+          </p:cNvPr>
+          <p:cNvGrpSpPr/>
+          <p:nvPr/>
+        </p:nvGrpSpPr>
+        <p:grpSpPr>
+          <a:xfrm>
+            <a:off x="4098153" y="3916929"/>
+            <a:ext cx="835027" cy="665291"/>
+            <a:chOff x="5181882" y="1431748"/>
+            <a:chExt cx="835027" cy="665291"/>
+          </a:xfrm>
+        </p:grpSpPr>
+        <p:pic>
+          <p:nvPicPr>
+            <p:cNvPr id="52" name="Picture 2" descr="Stick figures - People I saw at the park today : r/AdobeIllustrator">
+              <a:extLst>
+                <a:ext uri="{FF2B5EF4-FFF2-40B4-BE49-F238E27FC236}">
+                  <a16:creationId xmlns:a16="http://schemas.microsoft.com/office/drawing/2014/main" id="{C5D0775E-2843-D88A-FC22-3B33395D0660}"/>
+                </a:ext>
+              </a:extLst>
+            </p:cNvPr>
+            <p:cNvPicPr>
+              <a:picLocks noChangeAspect="1" noChangeArrowheads="1"/>
+            </p:cNvPicPr>
+            <p:nvPr/>
+          </p:nvPicPr>
+          <p:blipFill>
+            <a:blip r:embed="rId2">
+              <a:extLst>
+                <a:ext uri="{28A0092B-C50C-407E-A947-70E740481C1C}">
+                  <a14:useLocalDpi xmlns:a14="http://schemas.microsoft.com/office/drawing/2010/main" val="0"/>
+                </a:ext>
+              </a:extLst>
+            </a:blip>
+            <a:srcRect/>
+            <a:stretch>
+              <a:fillRect/>
+            </a:stretch>
+          </p:blipFill>
+          <p:spPr bwMode="auto">
+            <a:xfrm>
+              <a:off x="5353050" y="1431748"/>
+              <a:ext cx="530509" cy="514221"/>
+            </a:xfrm>
+            <a:prstGeom prst="rect">
+              <a:avLst/>
+            </a:prstGeom>
+            <a:noFill/>
+            <a:extLst>
+              <a:ext uri="{909E8E84-426E-40DD-AFC4-6F175D3DCCD1}">
+                <a14:hiddenFill xmlns:a14="http://schemas.microsoft.com/office/drawing/2010/main">
+                  <a:solidFill>
+                    <a:srgbClr val="FFFFFF"/>
+                  </a:solidFill>
+                </a14:hiddenFill>
+              </a:ext>
+            </a:extLst>
+          </p:spPr>
+        </p:pic>
+        <p:sp>
+          <p:nvSpPr>
+            <p:cNvPr id="53" name="TextBox 52">
+              <a:extLst>
+                <a:ext uri="{FF2B5EF4-FFF2-40B4-BE49-F238E27FC236}">
+                  <a16:creationId xmlns:a16="http://schemas.microsoft.com/office/drawing/2014/main" id="{D48C772D-EA5F-D3E7-80C0-05340C0026ED}"/>
+                </a:ext>
+              </a:extLst>
+            </p:cNvPr>
+            <p:cNvSpPr txBox="1"/>
+            <p:nvPr/>
+          </p:nvSpPr>
+          <p:spPr>
+            <a:xfrm flipH="1">
+              <a:off x="5181882" y="1835429"/>
+              <a:ext cx="835027" cy="261610"/>
+            </a:xfrm>
+            <a:prstGeom prst="rect">
+              <a:avLst/>
+            </a:prstGeom>
+            <a:noFill/>
+          </p:spPr>
+          <p:txBody>
+            <a:bodyPr wrap="square" rtlCol="0">
+              <a:spAutoFit/>
+            </a:bodyPr>
+            <a:lstStyle/>
+            <a:p>
+              <a:pPr algn="ctr"/>
+              <a:r>
+                <a:rPr lang="en-US" sz="1100" dirty="0"/>
+                <a:t>Developers</a:t>
+              </a:r>
+            </a:p>
+          </p:txBody>
+        </p:sp>
+      </p:grpSp>
+      <p:cxnSp>
+        <p:nvCxnSpPr>
+          <p:cNvPr id="55" name="Straight Arrow Connector 54">
+            <a:extLst>
+              <a:ext uri="{FF2B5EF4-FFF2-40B4-BE49-F238E27FC236}">
+                <a16:creationId xmlns:a16="http://schemas.microsoft.com/office/drawing/2014/main" id="{E97F37D6-54EA-1C7B-F71A-BE5B2B7338B6}"/>
+              </a:ext>
+            </a:extLst>
+          </p:cNvPr>
+          <p:cNvCxnSpPr>
+            <a:stCxn id="1026" idx="1"/>
+            <a:endCxn id="48" idx="3"/>
+          </p:cNvCxnSpPr>
+          <p:nvPr/>
+        </p:nvCxnSpPr>
+        <p:spPr>
+          <a:xfrm flipH="1">
+            <a:off x="5137966" y="3123406"/>
+            <a:ext cx="361949" cy="179877"/>
+          </a:xfrm>
+          <a:prstGeom prst="straightConnector1">
+            <a:avLst/>
+          </a:prstGeom>
+          <a:ln>
+            <a:tailEnd type="triangle"/>
+          </a:ln>
+        </p:spPr>
+        <p:style>
+          <a:lnRef idx="1">
+            <a:schemeClr val="accent1"/>
+          </a:lnRef>
+          <a:fillRef idx="0">
+            <a:schemeClr val="accent1"/>
+          </a:fillRef>
+          <a:effectRef idx="0">
+            <a:schemeClr val="accent1"/>
+          </a:effectRef>
+          <a:fontRef idx="minor">
+            <a:schemeClr val="tx1"/>
+          </a:fontRef>
+        </p:style>
+      </p:cxnSp>
+      <p:cxnSp>
+        <p:nvCxnSpPr>
+          <p:cNvPr id="56" name="Straight Arrow Connector 55">
+            <a:extLst>
+              <a:ext uri="{FF2B5EF4-FFF2-40B4-BE49-F238E27FC236}">
+                <a16:creationId xmlns:a16="http://schemas.microsoft.com/office/drawing/2014/main" id="{38DC8DE8-E01B-3107-A25F-5FEE6F17EBF3}"/>
+              </a:ext>
+            </a:extLst>
+          </p:cNvPr>
+          <p:cNvCxnSpPr>
+            <a:cxnSpLocks/>
+            <a:stCxn id="52" idx="0"/>
+            <a:endCxn id="48" idx="2"/>
+          </p:cNvCxnSpPr>
+          <p:nvPr/>
+        </p:nvCxnSpPr>
+        <p:spPr>
+          <a:xfrm flipV="1">
+            <a:off x="4534576" y="3598972"/>
+            <a:ext cx="141" cy="317957"/>
+          </a:xfrm>
+          <a:prstGeom prst="straightConnector1">
+            <a:avLst/>
+          </a:prstGeom>
+          <a:ln>
+            <a:tailEnd type="triangle"/>
+          </a:ln>
+        </p:spPr>
+        <p:style>
+          <a:lnRef idx="1">
+            <a:schemeClr val="accent1"/>
+          </a:lnRef>
+          <a:fillRef idx="0">
+            <a:schemeClr val="accent1"/>
+          </a:fillRef>
+          <a:effectRef idx="0">
+            <a:schemeClr val="accent1"/>
+          </a:effectRef>
+          <a:fontRef idx="minor">
+            <a:schemeClr val="tx1"/>
+          </a:fontRef>
+        </p:style>
+      </p:cxnSp>
+      <p:cxnSp>
+        <p:nvCxnSpPr>
+          <p:cNvPr id="61" name="Straight Arrow Connector 60">
+            <a:extLst>
+              <a:ext uri="{FF2B5EF4-FFF2-40B4-BE49-F238E27FC236}">
+                <a16:creationId xmlns:a16="http://schemas.microsoft.com/office/drawing/2014/main" id="{41C33A3D-B6B7-A8FD-E401-37D22625B84B}"/>
+              </a:ext>
+            </a:extLst>
+          </p:cNvPr>
+          <p:cNvCxnSpPr>
+            <a:cxnSpLocks/>
+            <a:stCxn id="48" idx="1"/>
+            <a:endCxn id="6" idx="3"/>
+          </p:cNvCxnSpPr>
+          <p:nvPr/>
+        </p:nvCxnSpPr>
+        <p:spPr>
+          <a:xfrm flipH="1">
+            <a:off x="3009922" y="3303283"/>
+            <a:ext cx="921546" cy="437175"/>
+          </a:xfrm>
+          <a:prstGeom prst="straightConnector1">
+            <a:avLst/>
+          </a:prstGeom>
+          <a:ln>
+            <a:tailEnd type="triangle"/>
+          </a:ln>
+        </p:spPr>
+        <p:style>
+          <a:lnRef idx="1">
+            <a:schemeClr val="accent1"/>
+          </a:lnRef>
+          <a:fillRef idx="0">
+            <a:schemeClr val="accent1"/>
+          </a:fillRef>
+          <a:effectRef idx="0">
+            <a:schemeClr val="accent1"/>
+          </a:effectRef>
+          <a:fontRef idx="minor">
+            <a:schemeClr val="tx1"/>
+          </a:fontRef>
+        </p:style>
+      </p:cxnSp>
+      <p:sp>
+        <p:nvSpPr>
+          <p:cNvPr id="5" name="Rectangle 4">
+            <a:extLst>
+              <a:ext uri="{FF2B5EF4-FFF2-40B4-BE49-F238E27FC236}">
+                <a16:creationId xmlns:a16="http://schemas.microsoft.com/office/drawing/2014/main" id="{C474B57F-0AD1-E7F8-735F-9AC6546A1428}"/>
+              </a:ext>
+            </a:extLst>
+          </p:cNvPr>
+          <p:cNvSpPr/>
+          <p:nvPr/>
+        </p:nvSpPr>
+        <p:spPr>
+          <a:xfrm>
+            <a:off x="573109" y="3082404"/>
+            <a:ext cx="2289175" cy="591378"/>
+          </a:xfrm>
+          <a:prstGeom prst="rect">
+            <a:avLst/>
+          </a:prstGeom>
+          <a:noFill/>
+        </p:spPr>
+        <p:style>
+          <a:lnRef idx="2">
+            <a:schemeClr val="accent1">
+              <a:shade val="15000"/>
+            </a:schemeClr>
+          </a:lnRef>
+          <a:fillRef idx="1">
+            <a:schemeClr val="accent1"/>
+          </a:fillRef>
+          <a:effectRef idx="0">
+            <a:schemeClr val="accent1"/>
+          </a:effectRef>
+          <a:fontRef idx="minor">
+            <a:schemeClr val="lt1"/>
+          </a:fontRef>
+        </p:style>
+        <p:txBody>
+          <a:bodyPr rtlCol="0" anchor="ctr"/>
+          <a:lstStyle/>
+          <a:p>
+            <a:pPr algn="ctr"/>
+            <a:r>
+              <a:rPr lang="en-US" sz="1050" dirty="0">
+                <a:solidFill>
+                  <a:schemeClr val="tx1"/>
+                </a:solidFill>
+              </a:rPr>
+              <a:t>Transactional Tables</a:t>
+            </a:r>
+          </a:p>
+        </p:txBody>
+      </p:sp>
+      <p:sp>
+        <p:nvSpPr>
+          <p:cNvPr id="6" name="Rectangle 5">
+            <a:extLst>
+              <a:ext uri="{FF2B5EF4-FFF2-40B4-BE49-F238E27FC236}">
+                <a16:creationId xmlns:a16="http://schemas.microsoft.com/office/drawing/2014/main" id="{E93743E9-C212-A901-3D17-991321843D9C}"/>
+              </a:ext>
+            </a:extLst>
+          </p:cNvPr>
+          <p:cNvSpPr/>
+          <p:nvPr/>
+        </p:nvSpPr>
+        <p:spPr>
+          <a:xfrm>
+            <a:off x="425472" y="2932380"/>
+            <a:ext cx="2584450" cy="1616155"/>
+          </a:xfrm>
+          <a:prstGeom prst="rect">
+            <a:avLst/>
+          </a:prstGeom>
+          <a:noFill/>
+        </p:spPr>
+        <p:style>
+          <a:lnRef idx="2">
+            <a:schemeClr val="accent1">
+              <a:shade val="15000"/>
+            </a:schemeClr>
+          </a:lnRef>
+          <a:fillRef idx="1">
+            <a:schemeClr val="accent1"/>
+          </a:fillRef>
+          <a:effectRef idx="0">
+            <a:schemeClr val="accent1"/>
+          </a:effectRef>
+          <a:fontRef idx="minor">
+            <a:schemeClr val="lt1"/>
+          </a:fontRef>
+        </p:style>
+        <p:txBody>
+          <a:bodyPr rtlCol="0" anchor="ctr"/>
+          <a:lstStyle/>
+          <a:p>
+            <a:pPr algn="ctr"/>
+            <a:endParaRPr lang="en-US" sz="1400" dirty="0">
+              <a:solidFill>
+                <a:schemeClr val="tx1"/>
+              </a:solidFill>
+            </a:endParaRPr>
+          </a:p>
+        </p:txBody>
+      </p:sp>
+      <p:sp>
+        <p:nvSpPr>
+          <p:cNvPr id="9" name="Rectangle 8">
+            <a:extLst>
+              <a:ext uri="{FF2B5EF4-FFF2-40B4-BE49-F238E27FC236}">
+                <a16:creationId xmlns:a16="http://schemas.microsoft.com/office/drawing/2014/main" id="{53C625D4-B7A3-E683-0760-96D12E69C6A8}"/>
+              </a:ext>
+            </a:extLst>
+          </p:cNvPr>
+          <p:cNvSpPr/>
+          <p:nvPr/>
+        </p:nvSpPr>
+        <p:spPr>
+          <a:xfrm>
+            <a:off x="573109" y="3740457"/>
+            <a:ext cx="1077914" cy="294564"/>
+          </a:xfrm>
+          <a:prstGeom prst="rect">
+            <a:avLst/>
+          </a:prstGeom>
+          <a:noFill/>
+        </p:spPr>
+        <p:style>
+          <a:lnRef idx="2">
+            <a:schemeClr val="accent1">
+              <a:shade val="15000"/>
+            </a:schemeClr>
+          </a:lnRef>
+          <a:fillRef idx="1">
+            <a:schemeClr val="accent1"/>
+          </a:fillRef>
+          <a:effectRef idx="0">
+            <a:schemeClr val="accent1"/>
+          </a:effectRef>
+          <a:fontRef idx="minor">
+            <a:schemeClr val="lt1"/>
+          </a:fontRef>
+        </p:style>
+        <p:txBody>
+          <a:bodyPr rtlCol="0" anchor="ctr"/>
+          <a:lstStyle/>
+          <a:p>
+            <a:pPr algn="ctr"/>
+            <a:r>
+              <a:rPr lang="en-US" sz="1050" dirty="0">
+                <a:solidFill>
+                  <a:schemeClr val="tx1"/>
+                </a:solidFill>
+              </a:rPr>
+              <a:t>Roll up Tables</a:t>
+            </a:r>
+          </a:p>
+        </p:txBody>
+      </p:sp>
+      <p:sp>
+        <p:nvSpPr>
+          <p:cNvPr id="10" name="Rectangle 9">
+            <a:extLst>
+              <a:ext uri="{FF2B5EF4-FFF2-40B4-BE49-F238E27FC236}">
+                <a16:creationId xmlns:a16="http://schemas.microsoft.com/office/drawing/2014/main" id="{5C6D89CF-FCB6-EE02-E641-D03DA16F888C}"/>
+              </a:ext>
+            </a:extLst>
+          </p:cNvPr>
+          <p:cNvSpPr/>
+          <p:nvPr/>
+        </p:nvSpPr>
+        <p:spPr>
+          <a:xfrm>
+            <a:off x="1761352" y="3744793"/>
+            <a:ext cx="1077914" cy="294564"/>
+          </a:xfrm>
+          <a:prstGeom prst="rect">
+            <a:avLst/>
+          </a:prstGeom>
+          <a:noFill/>
+        </p:spPr>
+        <p:style>
+          <a:lnRef idx="2">
+            <a:schemeClr val="accent1">
+              <a:shade val="15000"/>
+            </a:schemeClr>
+          </a:lnRef>
+          <a:fillRef idx="1">
+            <a:schemeClr val="accent1"/>
+          </a:fillRef>
+          <a:effectRef idx="0">
+            <a:schemeClr val="accent1"/>
+          </a:effectRef>
+          <a:fontRef idx="minor">
+            <a:schemeClr val="lt1"/>
+          </a:fontRef>
+        </p:style>
+        <p:txBody>
+          <a:bodyPr rtlCol="0" anchor="ctr"/>
+          <a:lstStyle/>
+          <a:p>
+            <a:pPr algn="ctr"/>
+            <a:r>
+              <a:rPr lang="en-US" sz="1050" dirty="0">
+                <a:solidFill>
+                  <a:schemeClr val="tx1"/>
+                </a:solidFill>
+              </a:rPr>
+              <a:t>Aggregate Tables</a:t>
+            </a:r>
+          </a:p>
+        </p:txBody>
+      </p:sp>
+      <p:sp>
+        <p:nvSpPr>
+          <p:cNvPr id="11" name="Rectangle 10">
+            <a:extLst>
+              <a:ext uri="{FF2B5EF4-FFF2-40B4-BE49-F238E27FC236}">
+                <a16:creationId xmlns:a16="http://schemas.microsoft.com/office/drawing/2014/main" id="{64B69E0A-5C6C-F88B-99A5-86A8600FF977}"/>
+              </a:ext>
+            </a:extLst>
+          </p:cNvPr>
+          <p:cNvSpPr/>
+          <p:nvPr/>
+        </p:nvSpPr>
+        <p:spPr>
+          <a:xfrm>
+            <a:off x="1027133" y="4142328"/>
+            <a:ext cx="1077914" cy="294564"/>
+          </a:xfrm>
+          <a:prstGeom prst="rect">
+            <a:avLst/>
+          </a:prstGeom>
+          <a:noFill/>
+        </p:spPr>
+        <p:style>
+          <a:lnRef idx="2">
+            <a:schemeClr val="accent1">
+              <a:shade val="15000"/>
+            </a:schemeClr>
+          </a:lnRef>
+          <a:fillRef idx="1">
+            <a:schemeClr val="accent1"/>
+          </a:fillRef>
+          <a:effectRef idx="0">
+            <a:schemeClr val="accent1"/>
+          </a:effectRef>
+          <a:fontRef idx="minor">
+            <a:schemeClr val="lt1"/>
+          </a:fontRef>
+        </p:style>
+        <p:txBody>
+          <a:bodyPr rtlCol="0" anchor="ctr"/>
+          <a:lstStyle/>
+          <a:p>
+            <a:pPr algn="ctr"/>
+            <a:r>
+              <a:rPr lang="en-US" sz="1050" dirty="0">
+                <a:solidFill>
+                  <a:schemeClr val="tx1"/>
+                </a:solidFill>
+              </a:rPr>
+              <a:t>Materialized Views</a:t>
+            </a:r>
+          </a:p>
+        </p:txBody>
+      </p:sp>
+      <p:sp>
+        <p:nvSpPr>
+          <p:cNvPr id="12" name="TextBox 11">
+            <a:extLst>
+              <a:ext uri="{FF2B5EF4-FFF2-40B4-BE49-F238E27FC236}">
+                <a16:creationId xmlns:a16="http://schemas.microsoft.com/office/drawing/2014/main" id="{03C2405F-B977-2285-9710-876CE865230E}"/>
+              </a:ext>
+            </a:extLst>
+          </p:cNvPr>
+          <p:cNvSpPr txBox="1"/>
+          <p:nvPr/>
+        </p:nvSpPr>
+        <p:spPr>
+          <a:xfrm flipH="1">
+            <a:off x="434223" y="4654545"/>
+            <a:ext cx="2289175" cy="261610"/>
+          </a:xfrm>
+          <a:prstGeom prst="rect">
+            <a:avLst/>
+          </a:prstGeom>
+          <a:noFill/>
+        </p:spPr>
+        <p:txBody>
+          <a:bodyPr wrap="square" rtlCol="0">
+            <a:spAutoFit/>
+          </a:bodyPr>
+          <a:lstStyle/>
+          <a:p>
+            <a:r>
+              <a:rPr lang="en-US" sz="1100" dirty="0"/>
+              <a:t>Replicated DB with Reporting</a:t>
+            </a:r>
+          </a:p>
+        </p:txBody>
+      </p:sp>
+      <p:cxnSp>
+        <p:nvCxnSpPr>
+          <p:cNvPr id="14" name="Straight Arrow Connector 13">
+            <a:extLst>
+              <a:ext uri="{FF2B5EF4-FFF2-40B4-BE49-F238E27FC236}">
+                <a16:creationId xmlns:a16="http://schemas.microsoft.com/office/drawing/2014/main" id="{DB4F2C52-DF61-5F85-5A3E-3F73F4B7DA2F}"/>
+              </a:ext>
+            </a:extLst>
+          </p:cNvPr>
+          <p:cNvCxnSpPr>
+            <a:cxnSpLocks/>
+            <a:stCxn id="13" idx="2"/>
+            <a:endCxn id="5" idx="0"/>
+          </p:cNvCxnSpPr>
+          <p:nvPr/>
+        </p:nvCxnSpPr>
+        <p:spPr>
+          <a:xfrm>
+            <a:off x="1717697" y="2197407"/>
+            <a:ext cx="0" cy="884997"/>
+          </a:xfrm>
+          <a:prstGeom prst="straightConnector1">
+            <a:avLst/>
+          </a:prstGeom>
+          <a:ln>
+            <a:tailEnd type="triangle"/>
+          </a:ln>
+        </p:spPr>
+        <p:style>
+          <a:lnRef idx="1">
+            <a:schemeClr val="accent1"/>
+          </a:lnRef>
+          <a:fillRef idx="0">
+            <a:schemeClr val="accent1"/>
+          </a:fillRef>
+          <a:effectRef idx="0">
+            <a:schemeClr val="accent1"/>
+          </a:effectRef>
+          <a:fontRef idx="minor">
+            <a:schemeClr val="tx1"/>
+          </a:fontRef>
+        </p:style>
+      </p:cxnSp>
+      <p:sp>
+        <p:nvSpPr>
+          <p:cNvPr id="20" name="TextBox 19">
+            <a:extLst>
+              <a:ext uri="{FF2B5EF4-FFF2-40B4-BE49-F238E27FC236}">
+                <a16:creationId xmlns:a16="http://schemas.microsoft.com/office/drawing/2014/main" id="{9F35BE12-DB73-07B5-EA3C-FD5A3EFB0AF3}"/>
+              </a:ext>
+            </a:extLst>
+          </p:cNvPr>
+          <p:cNvSpPr txBox="1"/>
+          <p:nvPr/>
+        </p:nvSpPr>
+        <p:spPr>
+          <a:xfrm flipH="1">
+            <a:off x="1761352" y="2522926"/>
+            <a:ext cx="2289175" cy="261610"/>
+          </a:xfrm>
+          <a:prstGeom prst="rect">
+            <a:avLst/>
+          </a:prstGeom>
+          <a:noFill/>
+        </p:spPr>
+        <p:txBody>
+          <a:bodyPr wrap="square" rtlCol="0">
+            <a:spAutoFit/>
+          </a:bodyPr>
+          <a:lstStyle/>
+          <a:p>
+            <a:r>
+              <a:rPr lang="en-US" sz="1100" dirty="0"/>
+              <a:t>Replicate using native DB</a:t>
+            </a:r>
+          </a:p>
+        </p:txBody>
+      </p:sp>
+    </p:spTree>
+    <p:extLst>
+      <p:ext uri="{BB962C8B-B14F-4D97-AF65-F5344CB8AC3E}">
+        <p14:creationId xmlns:p14="http://schemas.microsoft.com/office/powerpoint/2010/main" val="1585201268"/>
+      </p:ext>
+    </p:extLst>
+  </p:cSld>
+  <p:clrMapOvr>
+    <a:masterClrMapping/>
+  </p:clrMapOvr>
+</p:sld>
+</file>
+
+<file path=ppt/slides/slide4.xml><?xml version="1.0" encoding="utf-8"?>
+<p:sld xmlns:a="http://schemas.openxmlformats.org/drawingml/2006/main" xmlns:r="http://schemas.openxmlformats.org/officeDocument/2006/relationships" xmlns:p="http://schemas.openxmlformats.org/presentationml/2006/main">
+  <p:cSld>
+    <p:spTree>
+      <p:nvGrpSpPr>
+        <p:cNvPr id="1" name=""/>
+        <p:cNvGrpSpPr/>
+        <p:nvPr/>
+      </p:nvGrpSpPr>
+      <p:grpSpPr>
+        <a:xfrm>
+          <a:off x="0" y="0"/>
+          <a:ext cx="0" cy="0"/>
+          <a:chOff x="0" y="0"/>
+          <a:chExt cx="0" cy="0"/>
+        </a:xfrm>
+      </p:grpSpPr>
+      <p:sp>
+        <p:nvSpPr>
+          <p:cNvPr id="13" name="Rectangle 12">
+            <a:extLst>
+              <a:ext uri="{FF2B5EF4-FFF2-40B4-BE49-F238E27FC236}">
+                <a16:creationId xmlns:a16="http://schemas.microsoft.com/office/drawing/2014/main" id="{F0CB5A7B-6E49-D392-D99B-50AA229A099B}"/>
+              </a:ext>
+            </a:extLst>
+          </p:cNvPr>
+          <p:cNvSpPr/>
+          <p:nvPr/>
+        </p:nvSpPr>
+        <p:spPr>
+          <a:xfrm>
+            <a:off x="573109" y="1606029"/>
+            <a:ext cx="2289175" cy="591378"/>
+          </a:xfrm>
+          <a:prstGeom prst="rect">
+            <a:avLst/>
+          </a:prstGeom>
+          <a:noFill/>
+        </p:spPr>
+        <p:style>
+          <a:lnRef idx="2">
+            <a:schemeClr val="accent1">
+              <a:shade val="15000"/>
+            </a:schemeClr>
+          </a:lnRef>
+          <a:fillRef idx="1">
+            <a:schemeClr val="accent1"/>
+          </a:fillRef>
+          <a:effectRef idx="0">
+            <a:schemeClr val="accent1"/>
+          </a:effectRef>
+          <a:fontRef idx="minor">
+            <a:schemeClr val="lt1"/>
+          </a:fontRef>
+        </p:style>
+        <p:txBody>
+          <a:bodyPr rtlCol="0" anchor="ctr"/>
+          <a:lstStyle/>
+          <a:p>
+            <a:pPr algn="ctr"/>
+            <a:r>
+              <a:rPr lang="en-US" sz="1050" dirty="0">
+                <a:solidFill>
+                  <a:schemeClr val="tx1"/>
+                </a:solidFill>
+              </a:rPr>
+              <a:t>Transactional Tables</a:t>
+            </a:r>
+          </a:p>
+        </p:txBody>
+      </p:sp>
+      <p:sp>
+        <p:nvSpPr>
+          <p:cNvPr id="17" name="Rectangle 16">
+            <a:extLst>
+              <a:ext uri="{FF2B5EF4-FFF2-40B4-BE49-F238E27FC236}">
+                <a16:creationId xmlns:a16="http://schemas.microsoft.com/office/drawing/2014/main" id="{02B8B0C7-68BC-71BB-EA1B-41F9379959C2}"/>
+              </a:ext>
+            </a:extLst>
+          </p:cNvPr>
+          <p:cNvSpPr/>
+          <p:nvPr/>
+        </p:nvSpPr>
+        <p:spPr>
+          <a:xfrm>
+            <a:off x="425472" y="1456006"/>
+            <a:ext cx="2584450" cy="991920"/>
+          </a:xfrm>
+          <a:prstGeom prst="rect">
+            <a:avLst/>
+          </a:prstGeom>
+          <a:noFill/>
+        </p:spPr>
+        <p:style>
+          <a:lnRef idx="2">
+            <a:schemeClr val="accent1">
+              <a:shade val="15000"/>
+            </a:schemeClr>
+          </a:lnRef>
+          <a:fillRef idx="1">
+            <a:schemeClr val="accent1"/>
+          </a:fillRef>
+          <a:effectRef idx="0">
+            <a:schemeClr val="accent1"/>
+          </a:effectRef>
+          <a:fontRef idx="minor">
+            <a:schemeClr val="lt1"/>
+          </a:fontRef>
+        </p:style>
+        <p:txBody>
+          <a:bodyPr rtlCol="0" anchor="ctr"/>
+          <a:lstStyle/>
+          <a:p>
+            <a:pPr algn="ctr"/>
+            <a:endParaRPr lang="en-US" sz="1400" dirty="0">
+              <a:solidFill>
+                <a:schemeClr val="tx1"/>
+              </a:solidFill>
+            </a:endParaRPr>
+          </a:p>
+        </p:txBody>
+      </p:sp>
+      <p:sp>
+        <p:nvSpPr>
+          <p:cNvPr id="18" name="TextBox 17">
+            <a:extLst>
+              <a:ext uri="{FF2B5EF4-FFF2-40B4-BE49-F238E27FC236}">
+                <a16:creationId xmlns:a16="http://schemas.microsoft.com/office/drawing/2014/main" id="{489675B5-DBFA-471B-BAE3-7DC8DC5DB50B}"/>
+              </a:ext>
+            </a:extLst>
+          </p:cNvPr>
+          <p:cNvSpPr txBox="1"/>
+          <p:nvPr/>
+        </p:nvSpPr>
+        <p:spPr>
+          <a:xfrm flipH="1">
+            <a:off x="425471" y="1189672"/>
+            <a:ext cx="2289175" cy="261610"/>
+          </a:xfrm>
+          <a:prstGeom prst="rect">
+            <a:avLst/>
+          </a:prstGeom>
+          <a:noFill/>
+        </p:spPr>
+        <p:txBody>
+          <a:bodyPr wrap="square" rtlCol="0">
+            <a:spAutoFit/>
+          </a:bodyPr>
+          <a:lstStyle/>
+          <a:p>
+            <a:r>
+              <a:rPr lang="en-US" sz="1100" dirty="0"/>
+              <a:t>Transactional DB</a:t>
+            </a:r>
+          </a:p>
+        </p:txBody>
+      </p:sp>
+      <p:sp>
+        <p:nvSpPr>
+          <p:cNvPr id="48" name="Rectangle 47">
+            <a:extLst>
+              <a:ext uri="{FF2B5EF4-FFF2-40B4-BE49-F238E27FC236}">
+                <a16:creationId xmlns:a16="http://schemas.microsoft.com/office/drawing/2014/main" id="{624218C8-5323-5DE1-630C-DF31DC5D5B84}"/>
+              </a:ext>
+            </a:extLst>
+          </p:cNvPr>
+          <p:cNvSpPr/>
+          <p:nvPr/>
+        </p:nvSpPr>
+        <p:spPr>
+          <a:xfrm>
+            <a:off x="3931468" y="3007594"/>
+            <a:ext cx="1206498" cy="591378"/>
+          </a:xfrm>
+          <a:prstGeom prst="rect">
+            <a:avLst/>
+          </a:prstGeom>
+          <a:noFill/>
+        </p:spPr>
+        <p:style>
+          <a:lnRef idx="2">
+            <a:schemeClr val="accent1">
+              <a:shade val="15000"/>
+            </a:schemeClr>
+          </a:lnRef>
+          <a:fillRef idx="1">
+            <a:schemeClr val="accent1"/>
+          </a:fillRef>
+          <a:effectRef idx="0">
+            <a:schemeClr val="accent1"/>
+          </a:effectRef>
+          <a:fontRef idx="minor">
+            <a:schemeClr val="lt1"/>
+          </a:fontRef>
+        </p:style>
+        <p:txBody>
+          <a:bodyPr rtlCol="0" anchor="ctr"/>
+          <a:lstStyle/>
+          <a:p>
+            <a:pPr algn="ctr"/>
+            <a:r>
+              <a:rPr lang="en-US" sz="1050" dirty="0" err="1">
+                <a:solidFill>
+                  <a:schemeClr val="tx1"/>
+                </a:solidFill>
+              </a:rPr>
+              <a:t>PowerBI</a:t>
+            </a:r>
+            <a:endParaRPr lang="en-US" sz="1050" dirty="0">
+              <a:solidFill>
+                <a:schemeClr val="tx1"/>
+              </a:solidFill>
+            </a:endParaRPr>
+          </a:p>
+        </p:txBody>
+      </p:sp>
+      <p:grpSp>
+        <p:nvGrpSpPr>
+          <p:cNvPr id="50" name="Group 49">
+            <a:extLst>
+              <a:ext uri="{FF2B5EF4-FFF2-40B4-BE49-F238E27FC236}">
+                <a16:creationId xmlns:a16="http://schemas.microsoft.com/office/drawing/2014/main" id="{0AB841C9-CE25-FF4D-EEA7-B1B42A034B03}"/>
+              </a:ext>
+            </a:extLst>
+          </p:cNvPr>
+          <p:cNvGrpSpPr/>
+          <p:nvPr/>
+        </p:nvGrpSpPr>
+        <p:grpSpPr>
+          <a:xfrm>
+            <a:off x="5420824" y="2866295"/>
+            <a:ext cx="628650" cy="665291"/>
+            <a:chOff x="5273959" y="1431748"/>
+            <a:chExt cx="628650" cy="665291"/>
+          </a:xfrm>
+        </p:grpSpPr>
+        <p:pic>
+          <p:nvPicPr>
+            <p:cNvPr id="1026" name="Picture 2" descr="Stick figures - People I saw at the park today : r/AdobeIllustrator">
+              <a:extLst>
+                <a:ext uri="{FF2B5EF4-FFF2-40B4-BE49-F238E27FC236}">
+                  <a16:creationId xmlns:a16="http://schemas.microsoft.com/office/drawing/2014/main" id="{35B0DEC1-67E3-E6D8-6F84-6EF8089F3766}"/>
+                </a:ext>
+              </a:extLst>
+            </p:cNvPr>
+            <p:cNvPicPr>
+              <a:picLocks noChangeAspect="1" noChangeArrowheads="1"/>
+            </p:cNvPicPr>
+            <p:nvPr/>
+          </p:nvPicPr>
+          <p:blipFill>
+            <a:blip r:embed="rId2">
+              <a:extLst>
+                <a:ext uri="{28A0092B-C50C-407E-A947-70E740481C1C}">
+                  <a14:useLocalDpi xmlns:a14="http://schemas.microsoft.com/office/drawing/2010/main" val="0"/>
+                </a:ext>
+              </a:extLst>
+            </a:blip>
+            <a:srcRect/>
+            <a:stretch>
+              <a:fillRect/>
+            </a:stretch>
+          </p:blipFill>
+          <p:spPr bwMode="auto">
+            <a:xfrm>
+              <a:off x="5353050" y="1431748"/>
+              <a:ext cx="530509" cy="514221"/>
+            </a:xfrm>
+            <a:prstGeom prst="rect">
+              <a:avLst/>
+            </a:prstGeom>
+            <a:noFill/>
+            <a:extLst>
+              <a:ext uri="{909E8E84-426E-40DD-AFC4-6F175D3DCCD1}">
+                <a14:hiddenFill xmlns:a14="http://schemas.microsoft.com/office/drawing/2010/main">
+                  <a:solidFill>
+                    <a:srgbClr val="FFFFFF"/>
+                  </a:solidFill>
+                </a14:hiddenFill>
+              </a:ext>
+            </a:extLst>
+          </p:spPr>
+        </p:pic>
+        <p:sp>
+          <p:nvSpPr>
+            <p:cNvPr id="49" name="TextBox 48">
+              <a:extLst>
+                <a:ext uri="{FF2B5EF4-FFF2-40B4-BE49-F238E27FC236}">
+                  <a16:creationId xmlns:a16="http://schemas.microsoft.com/office/drawing/2014/main" id="{A0BA4084-106E-CAAD-A33E-D446F38192FD}"/>
+                </a:ext>
+              </a:extLst>
+            </p:cNvPr>
+            <p:cNvSpPr txBox="1"/>
+            <p:nvPr/>
+          </p:nvSpPr>
+          <p:spPr>
+            <a:xfrm flipH="1">
+              <a:off x="5273959" y="1835429"/>
+              <a:ext cx="628650" cy="261610"/>
+            </a:xfrm>
+            <a:prstGeom prst="rect">
+              <a:avLst/>
+            </a:prstGeom>
+            <a:noFill/>
+          </p:spPr>
+          <p:txBody>
+            <a:bodyPr wrap="square" rtlCol="0">
+              <a:spAutoFit/>
+            </a:bodyPr>
+            <a:lstStyle/>
+            <a:p>
+              <a:pPr algn="ctr"/>
+              <a:r>
+                <a:rPr lang="en-US" sz="1100" dirty="0"/>
+                <a:t>Users</a:t>
+              </a:r>
+            </a:p>
+          </p:txBody>
+        </p:sp>
+      </p:grpSp>
+      <p:grpSp>
+        <p:nvGrpSpPr>
+          <p:cNvPr id="51" name="Group 50">
+            <a:extLst>
+              <a:ext uri="{FF2B5EF4-FFF2-40B4-BE49-F238E27FC236}">
+                <a16:creationId xmlns:a16="http://schemas.microsoft.com/office/drawing/2014/main" id="{9D6B2AEA-BE02-6E97-B49E-33A201066AE6}"/>
+              </a:ext>
+            </a:extLst>
+          </p:cNvPr>
+          <p:cNvGrpSpPr/>
+          <p:nvPr/>
+        </p:nvGrpSpPr>
+        <p:grpSpPr>
+          <a:xfrm>
+            <a:off x="4098153" y="3916929"/>
+            <a:ext cx="835027" cy="665291"/>
+            <a:chOff x="5181882" y="1431748"/>
+            <a:chExt cx="835027" cy="665291"/>
+          </a:xfrm>
+        </p:grpSpPr>
+        <p:pic>
+          <p:nvPicPr>
+            <p:cNvPr id="52" name="Picture 2" descr="Stick figures - People I saw at the park today : r/AdobeIllustrator">
+              <a:extLst>
+                <a:ext uri="{FF2B5EF4-FFF2-40B4-BE49-F238E27FC236}">
+                  <a16:creationId xmlns:a16="http://schemas.microsoft.com/office/drawing/2014/main" id="{C5D0775E-2843-D88A-FC22-3B33395D0660}"/>
+                </a:ext>
+              </a:extLst>
+            </p:cNvPr>
+            <p:cNvPicPr>
+              <a:picLocks noChangeAspect="1" noChangeArrowheads="1"/>
+            </p:cNvPicPr>
+            <p:nvPr/>
+          </p:nvPicPr>
+          <p:blipFill>
+            <a:blip r:embed="rId2">
+              <a:extLst>
+                <a:ext uri="{28A0092B-C50C-407E-A947-70E740481C1C}">
+                  <a14:useLocalDpi xmlns:a14="http://schemas.microsoft.com/office/drawing/2010/main" val="0"/>
+                </a:ext>
+              </a:extLst>
+            </a:blip>
+            <a:srcRect/>
+            <a:stretch>
+              <a:fillRect/>
+            </a:stretch>
+          </p:blipFill>
+          <p:spPr bwMode="auto">
+            <a:xfrm>
+              <a:off x="5353050" y="1431748"/>
+              <a:ext cx="530509" cy="514221"/>
+            </a:xfrm>
+            <a:prstGeom prst="rect">
+              <a:avLst/>
+            </a:prstGeom>
+            <a:noFill/>
+            <a:extLst>
+              <a:ext uri="{909E8E84-426E-40DD-AFC4-6F175D3DCCD1}">
+                <a14:hiddenFill xmlns:a14="http://schemas.microsoft.com/office/drawing/2010/main">
+                  <a:solidFill>
+                    <a:srgbClr val="FFFFFF"/>
+                  </a:solidFill>
+                </a14:hiddenFill>
+              </a:ext>
+            </a:extLst>
+          </p:spPr>
+        </p:pic>
+        <p:sp>
+          <p:nvSpPr>
+            <p:cNvPr id="53" name="TextBox 52">
+              <a:extLst>
+                <a:ext uri="{FF2B5EF4-FFF2-40B4-BE49-F238E27FC236}">
+                  <a16:creationId xmlns:a16="http://schemas.microsoft.com/office/drawing/2014/main" id="{D48C772D-EA5F-D3E7-80C0-05340C0026ED}"/>
+                </a:ext>
+              </a:extLst>
+            </p:cNvPr>
+            <p:cNvSpPr txBox="1"/>
+            <p:nvPr/>
+          </p:nvSpPr>
+          <p:spPr>
+            <a:xfrm flipH="1">
+              <a:off x="5181882" y="1835429"/>
+              <a:ext cx="835027" cy="261610"/>
+            </a:xfrm>
+            <a:prstGeom prst="rect">
+              <a:avLst/>
+            </a:prstGeom>
+            <a:noFill/>
+          </p:spPr>
+          <p:txBody>
+            <a:bodyPr wrap="square" rtlCol="0">
+              <a:spAutoFit/>
+            </a:bodyPr>
+            <a:lstStyle/>
+            <a:p>
+              <a:pPr algn="ctr"/>
+              <a:r>
+                <a:rPr lang="en-US" sz="1100" dirty="0"/>
+                <a:t>Developers</a:t>
+              </a:r>
+            </a:p>
+          </p:txBody>
+        </p:sp>
+      </p:grpSp>
+      <p:cxnSp>
+        <p:nvCxnSpPr>
+          <p:cNvPr id="55" name="Straight Arrow Connector 54">
+            <a:extLst>
+              <a:ext uri="{FF2B5EF4-FFF2-40B4-BE49-F238E27FC236}">
+                <a16:creationId xmlns:a16="http://schemas.microsoft.com/office/drawing/2014/main" id="{E97F37D6-54EA-1C7B-F71A-BE5B2B7338B6}"/>
+              </a:ext>
+            </a:extLst>
+          </p:cNvPr>
+          <p:cNvCxnSpPr>
+            <a:stCxn id="1026" idx="1"/>
+            <a:endCxn id="48" idx="3"/>
+          </p:cNvCxnSpPr>
+          <p:nvPr/>
+        </p:nvCxnSpPr>
+        <p:spPr>
+          <a:xfrm flipH="1">
+            <a:off x="5137966" y="3123406"/>
+            <a:ext cx="361949" cy="179877"/>
+          </a:xfrm>
+          <a:prstGeom prst="straightConnector1">
+            <a:avLst/>
+          </a:prstGeom>
+          <a:ln>
+            <a:tailEnd type="triangle"/>
+          </a:ln>
+        </p:spPr>
+        <p:style>
+          <a:lnRef idx="1">
+            <a:schemeClr val="accent1"/>
+          </a:lnRef>
+          <a:fillRef idx="0">
+            <a:schemeClr val="accent1"/>
+          </a:fillRef>
+          <a:effectRef idx="0">
+            <a:schemeClr val="accent1"/>
+          </a:effectRef>
+          <a:fontRef idx="minor">
+            <a:schemeClr val="tx1"/>
+          </a:fontRef>
+        </p:style>
+      </p:cxnSp>
+      <p:cxnSp>
+        <p:nvCxnSpPr>
+          <p:cNvPr id="56" name="Straight Arrow Connector 55">
+            <a:extLst>
+              <a:ext uri="{FF2B5EF4-FFF2-40B4-BE49-F238E27FC236}">
+                <a16:creationId xmlns:a16="http://schemas.microsoft.com/office/drawing/2014/main" id="{38DC8DE8-E01B-3107-A25F-5FEE6F17EBF3}"/>
+              </a:ext>
+            </a:extLst>
+          </p:cNvPr>
+          <p:cNvCxnSpPr>
+            <a:cxnSpLocks/>
+            <a:stCxn id="52" idx="0"/>
+            <a:endCxn id="48" idx="2"/>
+          </p:cNvCxnSpPr>
+          <p:nvPr/>
+        </p:nvCxnSpPr>
+        <p:spPr>
+          <a:xfrm flipV="1">
+            <a:off x="4534576" y="3598972"/>
+            <a:ext cx="141" cy="317957"/>
+          </a:xfrm>
+          <a:prstGeom prst="straightConnector1">
+            <a:avLst/>
+          </a:prstGeom>
+          <a:ln>
+            <a:tailEnd type="triangle"/>
+          </a:ln>
+        </p:spPr>
+        <p:style>
+          <a:lnRef idx="1">
+            <a:schemeClr val="accent1"/>
+          </a:lnRef>
+          <a:fillRef idx="0">
+            <a:schemeClr val="accent1"/>
+          </a:fillRef>
+          <a:effectRef idx="0">
+            <a:schemeClr val="accent1"/>
+          </a:effectRef>
+          <a:fontRef idx="minor">
+            <a:schemeClr val="tx1"/>
+          </a:fontRef>
+        </p:style>
+      </p:cxnSp>
+      <p:cxnSp>
+        <p:nvCxnSpPr>
+          <p:cNvPr id="61" name="Straight Arrow Connector 60">
+            <a:extLst>
+              <a:ext uri="{FF2B5EF4-FFF2-40B4-BE49-F238E27FC236}">
+                <a16:creationId xmlns:a16="http://schemas.microsoft.com/office/drawing/2014/main" id="{41C33A3D-B6B7-A8FD-E401-37D22625B84B}"/>
+              </a:ext>
+            </a:extLst>
+          </p:cNvPr>
+          <p:cNvCxnSpPr>
+            <a:cxnSpLocks/>
+            <a:stCxn id="48" idx="1"/>
+            <a:endCxn id="6" idx="3"/>
+          </p:cNvCxnSpPr>
+          <p:nvPr/>
+        </p:nvCxnSpPr>
+        <p:spPr>
+          <a:xfrm flipH="1">
+            <a:off x="3009922" y="3303283"/>
+            <a:ext cx="921546" cy="437175"/>
+          </a:xfrm>
+          <a:prstGeom prst="straightConnector1">
+            <a:avLst/>
+          </a:prstGeom>
+          <a:ln>
+            <a:tailEnd type="triangle"/>
+          </a:ln>
+        </p:spPr>
+        <p:style>
+          <a:lnRef idx="1">
+            <a:schemeClr val="accent1"/>
+          </a:lnRef>
+          <a:fillRef idx="0">
+            <a:schemeClr val="accent1"/>
+          </a:fillRef>
+          <a:effectRef idx="0">
+            <a:schemeClr val="accent1"/>
+          </a:effectRef>
+          <a:fontRef idx="minor">
+            <a:schemeClr val="tx1"/>
+          </a:fontRef>
+        </p:style>
+      </p:cxnSp>
+      <p:sp>
+        <p:nvSpPr>
+          <p:cNvPr id="5" name="Rectangle 4">
+            <a:extLst>
+              <a:ext uri="{FF2B5EF4-FFF2-40B4-BE49-F238E27FC236}">
+                <a16:creationId xmlns:a16="http://schemas.microsoft.com/office/drawing/2014/main" id="{C474B57F-0AD1-E7F8-735F-9AC6546A1428}"/>
+              </a:ext>
+            </a:extLst>
+          </p:cNvPr>
+          <p:cNvSpPr/>
+          <p:nvPr/>
+        </p:nvSpPr>
+        <p:spPr>
+          <a:xfrm>
+            <a:off x="573109" y="3082404"/>
+            <a:ext cx="2289175" cy="886128"/>
+          </a:xfrm>
+          <a:prstGeom prst="rect">
+            <a:avLst/>
+          </a:prstGeom>
+          <a:noFill/>
+        </p:spPr>
+        <p:style>
+          <a:lnRef idx="2">
+            <a:schemeClr val="accent1">
+              <a:shade val="15000"/>
+            </a:schemeClr>
+          </a:lnRef>
+          <a:fillRef idx="1">
+            <a:schemeClr val="accent1"/>
+          </a:fillRef>
+          <a:effectRef idx="0">
+            <a:schemeClr val="accent1"/>
+          </a:effectRef>
+          <a:fontRef idx="minor">
+            <a:schemeClr val="lt1"/>
+          </a:fontRef>
+        </p:style>
+        <p:txBody>
+          <a:bodyPr rtlCol="0" anchor="ctr"/>
+          <a:lstStyle/>
+          <a:p>
+            <a:pPr algn="ctr"/>
+            <a:r>
+              <a:rPr lang="en-US" sz="1050" dirty="0">
+                <a:solidFill>
+                  <a:schemeClr val="tx1"/>
+                </a:solidFill>
+              </a:rPr>
+              <a:t>Transactional Tables</a:t>
+            </a:r>
+          </a:p>
+          <a:p>
+            <a:pPr algn="ctr"/>
+            <a:r>
+              <a:rPr lang="en-US" sz="1050" dirty="0">
+                <a:solidFill>
+                  <a:schemeClr val="tx1"/>
+                </a:solidFill>
+              </a:rPr>
+              <a:t>And, or New Schema</a:t>
+            </a:r>
+          </a:p>
+          <a:p>
+            <a:pPr algn="ctr"/>
+            <a:r>
+              <a:rPr lang="en-US" sz="1050" dirty="0">
+                <a:solidFill>
+                  <a:schemeClr val="tx1"/>
+                </a:solidFill>
+              </a:rPr>
+              <a:t>Roll up Tables</a:t>
+            </a:r>
+          </a:p>
+          <a:p>
+            <a:pPr algn="ctr"/>
+            <a:r>
+              <a:rPr lang="en-US" sz="1050" dirty="0">
+                <a:solidFill>
+                  <a:schemeClr val="tx1"/>
+                </a:solidFill>
+              </a:rPr>
+              <a:t>Aggregate Tables</a:t>
+            </a:r>
+          </a:p>
+        </p:txBody>
+      </p:sp>
+      <p:sp>
+        <p:nvSpPr>
+          <p:cNvPr id="6" name="Rectangle 5">
+            <a:extLst>
+              <a:ext uri="{FF2B5EF4-FFF2-40B4-BE49-F238E27FC236}">
+                <a16:creationId xmlns:a16="http://schemas.microsoft.com/office/drawing/2014/main" id="{E93743E9-C212-A901-3D17-991321843D9C}"/>
+              </a:ext>
+            </a:extLst>
+          </p:cNvPr>
+          <p:cNvSpPr/>
+          <p:nvPr/>
+        </p:nvSpPr>
+        <p:spPr>
+          <a:xfrm>
+            <a:off x="425472" y="2932380"/>
+            <a:ext cx="2584450" cy="1616155"/>
+          </a:xfrm>
+          <a:prstGeom prst="rect">
+            <a:avLst/>
+          </a:prstGeom>
+          <a:noFill/>
+        </p:spPr>
+        <p:style>
+          <a:lnRef idx="2">
+            <a:schemeClr val="accent1">
+              <a:shade val="15000"/>
+            </a:schemeClr>
+          </a:lnRef>
+          <a:fillRef idx="1">
+            <a:schemeClr val="accent1"/>
+          </a:fillRef>
+          <a:effectRef idx="0">
+            <a:schemeClr val="accent1"/>
+          </a:effectRef>
+          <a:fontRef idx="minor">
+            <a:schemeClr val="lt1"/>
+          </a:fontRef>
+        </p:style>
+        <p:txBody>
+          <a:bodyPr rtlCol="0" anchor="ctr"/>
+          <a:lstStyle/>
+          <a:p>
+            <a:pPr algn="ctr"/>
+            <a:endParaRPr lang="en-US" sz="1400" dirty="0">
+              <a:solidFill>
+                <a:schemeClr val="tx1"/>
+              </a:solidFill>
+            </a:endParaRPr>
+          </a:p>
+        </p:txBody>
+      </p:sp>
+      <p:sp>
+        <p:nvSpPr>
+          <p:cNvPr id="11" name="Rectangle 10">
+            <a:extLst>
+              <a:ext uri="{FF2B5EF4-FFF2-40B4-BE49-F238E27FC236}">
+                <a16:creationId xmlns:a16="http://schemas.microsoft.com/office/drawing/2014/main" id="{64B69E0A-5C6C-F88B-99A5-86A8600FF977}"/>
+              </a:ext>
+            </a:extLst>
+          </p:cNvPr>
+          <p:cNvSpPr/>
+          <p:nvPr/>
+        </p:nvSpPr>
+        <p:spPr>
+          <a:xfrm>
+            <a:off x="1178739" y="4106644"/>
+            <a:ext cx="1077914" cy="346342"/>
+          </a:xfrm>
+          <a:prstGeom prst="rect">
+            <a:avLst/>
+          </a:prstGeom>
+          <a:noFill/>
+        </p:spPr>
+        <p:style>
+          <a:lnRef idx="2">
+            <a:schemeClr val="accent1">
+              <a:shade val="15000"/>
+            </a:schemeClr>
+          </a:lnRef>
+          <a:fillRef idx="1">
+            <a:schemeClr val="accent1"/>
+          </a:fillRef>
+          <a:effectRef idx="0">
+            <a:schemeClr val="accent1"/>
+          </a:effectRef>
+          <a:fontRef idx="minor">
+            <a:schemeClr val="lt1"/>
+          </a:fontRef>
+        </p:style>
+        <p:txBody>
+          <a:bodyPr rtlCol="0" anchor="ctr"/>
+          <a:lstStyle/>
+          <a:p>
+            <a:pPr algn="ctr"/>
+            <a:r>
+              <a:rPr lang="en-US" sz="1050" dirty="0">
+                <a:solidFill>
+                  <a:schemeClr val="tx1"/>
+                </a:solidFill>
+              </a:rPr>
+              <a:t>Materialized Views</a:t>
+            </a:r>
+          </a:p>
+        </p:txBody>
+      </p:sp>
+      <p:sp>
+        <p:nvSpPr>
+          <p:cNvPr id="12" name="TextBox 11">
+            <a:extLst>
+              <a:ext uri="{FF2B5EF4-FFF2-40B4-BE49-F238E27FC236}">
+                <a16:creationId xmlns:a16="http://schemas.microsoft.com/office/drawing/2014/main" id="{03C2405F-B977-2285-9710-876CE865230E}"/>
+              </a:ext>
+            </a:extLst>
+          </p:cNvPr>
+          <p:cNvSpPr txBox="1"/>
+          <p:nvPr/>
+        </p:nvSpPr>
+        <p:spPr>
+          <a:xfrm flipH="1">
+            <a:off x="434223" y="4654545"/>
+            <a:ext cx="2289175" cy="261610"/>
+          </a:xfrm>
+          <a:prstGeom prst="rect">
+            <a:avLst/>
+          </a:prstGeom>
+          <a:noFill/>
+        </p:spPr>
+        <p:txBody>
+          <a:bodyPr wrap="square" rtlCol="0">
+            <a:spAutoFit/>
+          </a:bodyPr>
+          <a:lstStyle/>
+          <a:p>
+            <a:r>
+              <a:rPr lang="en-US" sz="1100" dirty="0"/>
+              <a:t>Replicated DB with Reporting</a:t>
+            </a:r>
+          </a:p>
+        </p:txBody>
+      </p:sp>
+      <p:cxnSp>
+        <p:nvCxnSpPr>
+          <p:cNvPr id="14" name="Straight Arrow Connector 13">
+            <a:extLst>
+              <a:ext uri="{FF2B5EF4-FFF2-40B4-BE49-F238E27FC236}">
+                <a16:creationId xmlns:a16="http://schemas.microsoft.com/office/drawing/2014/main" id="{DB4F2C52-DF61-5F85-5A3E-3F73F4B7DA2F}"/>
+              </a:ext>
+            </a:extLst>
+          </p:cNvPr>
+          <p:cNvCxnSpPr>
+            <a:cxnSpLocks/>
+            <a:stCxn id="13" idx="2"/>
+            <a:endCxn id="5" idx="0"/>
+          </p:cNvCxnSpPr>
+          <p:nvPr/>
+        </p:nvCxnSpPr>
+        <p:spPr>
+          <a:xfrm>
+            <a:off x="1717697" y="2197407"/>
+            <a:ext cx="0" cy="884997"/>
+          </a:xfrm>
+          <a:prstGeom prst="straightConnector1">
+            <a:avLst/>
+          </a:prstGeom>
+          <a:ln>
+            <a:tailEnd type="triangle"/>
+          </a:ln>
+        </p:spPr>
+        <p:style>
+          <a:lnRef idx="1">
+            <a:schemeClr val="accent1"/>
+          </a:lnRef>
+          <a:fillRef idx="0">
+            <a:schemeClr val="accent1"/>
+          </a:fillRef>
+          <a:effectRef idx="0">
+            <a:schemeClr val="accent1"/>
+          </a:effectRef>
+          <a:fontRef idx="minor">
+            <a:schemeClr val="tx1"/>
+          </a:fontRef>
+        </p:style>
+      </p:cxnSp>
+      <p:sp>
+        <p:nvSpPr>
+          <p:cNvPr id="20" name="TextBox 19">
+            <a:extLst>
+              <a:ext uri="{FF2B5EF4-FFF2-40B4-BE49-F238E27FC236}">
+                <a16:creationId xmlns:a16="http://schemas.microsoft.com/office/drawing/2014/main" id="{9F35BE12-DB73-07B5-EA3C-FD5A3EFB0AF3}"/>
+              </a:ext>
+            </a:extLst>
+          </p:cNvPr>
+          <p:cNvSpPr txBox="1"/>
+          <p:nvPr/>
+        </p:nvSpPr>
+        <p:spPr>
+          <a:xfrm flipH="1">
+            <a:off x="1761352" y="2522926"/>
+            <a:ext cx="2289175" cy="261610"/>
+          </a:xfrm>
+          <a:prstGeom prst="rect">
+            <a:avLst/>
+          </a:prstGeom>
+          <a:noFill/>
+        </p:spPr>
+        <p:txBody>
+          <a:bodyPr wrap="square" rtlCol="0">
+            <a:spAutoFit/>
+          </a:bodyPr>
+          <a:lstStyle/>
+          <a:p>
+            <a:r>
+              <a:rPr lang="en-US" sz="1100" dirty="0"/>
+              <a:t>Replicate using CDC</a:t>
+            </a:r>
+          </a:p>
+        </p:txBody>
+      </p:sp>
+    </p:spTree>
+    <p:extLst>
+      <p:ext uri="{BB962C8B-B14F-4D97-AF65-F5344CB8AC3E}">
+        <p14:creationId xmlns:p14="http://schemas.microsoft.com/office/powerpoint/2010/main" val="1369192777"/>
+      </p:ext>
+    </p:extLst>
+  </p:cSld>
+  <p:clrMapOvr>
+    <a:masterClrMapping/>
+  </p:clrMapOvr>
+</p:sld>
+</file>
+
+<file path=ppt/slides/slide5.xml><?xml version="1.0" encoding="utf-8"?>
+<p:sld xmlns:a="http://schemas.openxmlformats.org/drawingml/2006/main" xmlns:r="http://schemas.openxmlformats.org/officeDocument/2006/relationships" xmlns:p="http://schemas.openxmlformats.org/presentationml/2006/main">
+  <p:cSld>
+    <p:spTree>
+      <p:nvGrpSpPr>
+        <p:cNvPr id="1" name=""/>
+        <p:cNvGrpSpPr/>
+        <p:nvPr/>
+      </p:nvGrpSpPr>
+      <p:grpSpPr>
+        <a:xfrm>
+          <a:off x="0" y="0"/>
+          <a:ext cx="0" cy="0"/>
+          <a:chOff x="0" y="0"/>
+          <a:chExt cx="0" cy="0"/>
+        </a:xfrm>
+      </p:grpSpPr>
+      <p:sp>
+        <p:nvSpPr>
+          <p:cNvPr id="13" name="Rectangle 12">
+            <a:extLst>
+              <a:ext uri="{FF2B5EF4-FFF2-40B4-BE49-F238E27FC236}">
+                <a16:creationId xmlns:a16="http://schemas.microsoft.com/office/drawing/2014/main" id="{F0CB5A7B-6E49-D392-D99B-50AA229A099B}"/>
+              </a:ext>
+            </a:extLst>
+          </p:cNvPr>
+          <p:cNvSpPr/>
+          <p:nvPr/>
+        </p:nvSpPr>
+        <p:spPr>
+          <a:xfrm>
+            <a:off x="573109" y="1606029"/>
+            <a:ext cx="2289175" cy="591378"/>
+          </a:xfrm>
+          <a:prstGeom prst="rect">
+            <a:avLst/>
+          </a:prstGeom>
+          <a:noFill/>
+        </p:spPr>
+        <p:style>
+          <a:lnRef idx="2">
+            <a:schemeClr val="accent1">
+              <a:shade val="15000"/>
+            </a:schemeClr>
+          </a:lnRef>
+          <a:fillRef idx="1">
+            <a:schemeClr val="accent1"/>
+          </a:fillRef>
+          <a:effectRef idx="0">
+            <a:schemeClr val="accent1"/>
+          </a:effectRef>
+          <a:fontRef idx="minor">
+            <a:schemeClr val="lt1"/>
+          </a:fontRef>
+        </p:style>
+        <p:txBody>
+          <a:bodyPr rtlCol="0" anchor="ctr"/>
+          <a:lstStyle/>
+          <a:p>
+            <a:pPr algn="ctr"/>
+            <a:r>
+              <a:rPr lang="en-US" sz="1050" dirty="0">
+                <a:solidFill>
+                  <a:schemeClr val="tx1"/>
+                </a:solidFill>
+              </a:rPr>
+              <a:t>Transactional Tables</a:t>
+            </a:r>
+          </a:p>
+        </p:txBody>
+      </p:sp>
+      <p:sp>
+        <p:nvSpPr>
+          <p:cNvPr id="17" name="Rectangle 16">
+            <a:extLst>
+              <a:ext uri="{FF2B5EF4-FFF2-40B4-BE49-F238E27FC236}">
+                <a16:creationId xmlns:a16="http://schemas.microsoft.com/office/drawing/2014/main" id="{02B8B0C7-68BC-71BB-EA1B-41F9379959C2}"/>
+              </a:ext>
+            </a:extLst>
+          </p:cNvPr>
+          <p:cNvSpPr/>
+          <p:nvPr/>
+        </p:nvSpPr>
+        <p:spPr>
+          <a:xfrm>
+            <a:off x="425472" y="1456006"/>
+            <a:ext cx="2584450" cy="991920"/>
+          </a:xfrm>
+          <a:prstGeom prst="rect">
+            <a:avLst/>
+          </a:prstGeom>
+          <a:noFill/>
+        </p:spPr>
+        <p:style>
+          <a:lnRef idx="2">
+            <a:schemeClr val="accent1">
+              <a:shade val="15000"/>
+            </a:schemeClr>
+          </a:lnRef>
+          <a:fillRef idx="1">
+            <a:schemeClr val="accent1"/>
+          </a:fillRef>
+          <a:effectRef idx="0">
+            <a:schemeClr val="accent1"/>
+          </a:effectRef>
+          <a:fontRef idx="minor">
+            <a:schemeClr val="lt1"/>
+          </a:fontRef>
+        </p:style>
+        <p:txBody>
+          <a:bodyPr rtlCol="0" anchor="ctr"/>
+          <a:lstStyle/>
+          <a:p>
+            <a:pPr algn="ctr"/>
+            <a:endParaRPr lang="en-US" sz="1400" dirty="0">
+              <a:solidFill>
+                <a:schemeClr val="tx1"/>
+              </a:solidFill>
+            </a:endParaRPr>
+          </a:p>
+        </p:txBody>
+      </p:sp>
+      <p:sp>
+        <p:nvSpPr>
+          <p:cNvPr id="18" name="TextBox 17">
+            <a:extLst>
+              <a:ext uri="{FF2B5EF4-FFF2-40B4-BE49-F238E27FC236}">
+                <a16:creationId xmlns:a16="http://schemas.microsoft.com/office/drawing/2014/main" id="{489675B5-DBFA-471B-BAE3-7DC8DC5DB50B}"/>
+              </a:ext>
+            </a:extLst>
+          </p:cNvPr>
+          <p:cNvSpPr txBox="1"/>
+          <p:nvPr/>
+        </p:nvSpPr>
+        <p:spPr>
+          <a:xfrm flipH="1">
+            <a:off x="425471" y="1189672"/>
+            <a:ext cx="2289175" cy="261610"/>
+          </a:xfrm>
+          <a:prstGeom prst="rect">
+            <a:avLst/>
+          </a:prstGeom>
+          <a:noFill/>
+        </p:spPr>
+        <p:txBody>
+          <a:bodyPr wrap="square" rtlCol="0">
+            <a:spAutoFit/>
+          </a:bodyPr>
+          <a:lstStyle/>
+          <a:p>
+            <a:r>
+              <a:rPr lang="en-US" sz="1100" dirty="0"/>
+              <a:t>Transactional DB</a:t>
+            </a:r>
+          </a:p>
+        </p:txBody>
+      </p:sp>
+      <p:sp>
+        <p:nvSpPr>
+          <p:cNvPr id="48" name="Rectangle 47">
+            <a:extLst>
+              <a:ext uri="{FF2B5EF4-FFF2-40B4-BE49-F238E27FC236}">
+                <a16:creationId xmlns:a16="http://schemas.microsoft.com/office/drawing/2014/main" id="{624218C8-5323-5DE1-630C-DF31DC5D5B84}"/>
+              </a:ext>
+            </a:extLst>
+          </p:cNvPr>
+          <p:cNvSpPr/>
+          <p:nvPr/>
+        </p:nvSpPr>
+        <p:spPr>
+          <a:xfrm>
+            <a:off x="3931468" y="2426569"/>
+            <a:ext cx="1206498" cy="591378"/>
+          </a:xfrm>
+          <a:prstGeom prst="rect">
+            <a:avLst/>
+          </a:prstGeom>
+          <a:noFill/>
+        </p:spPr>
+        <p:style>
+          <a:lnRef idx="2">
+            <a:schemeClr val="accent1">
+              <a:shade val="15000"/>
+            </a:schemeClr>
+          </a:lnRef>
+          <a:fillRef idx="1">
+            <a:schemeClr val="accent1"/>
+          </a:fillRef>
+          <a:effectRef idx="0">
+            <a:schemeClr val="accent1"/>
+          </a:effectRef>
+          <a:fontRef idx="minor">
+            <a:schemeClr val="lt1"/>
+          </a:fontRef>
+        </p:style>
+        <p:txBody>
+          <a:bodyPr rtlCol="0" anchor="ctr"/>
+          <a:lstStyle/>
+          <a:p>
+            <a:pPr algn="ctr"/>
+            <a:r>
+              <a:rPr lang="en-US" sz="1050" dirty="0">
+                <a:solidFill>
+                  <a:schemeClr val="tx1"/>
+                </a:solidFill>
+              </a:rPr>
+              <a:t>Kibana</a:t>
+            </a:r>
+          </a:p>
+        </p:txBody>
+      </p:sp>
+      <p:grpSp>
+        <p:nvGrpSpPr>
+          <p:cNvPr id="50" name="Group 49">
+            <a:extLst>
+              <a:ext uri="{FF2B5EF4-FFF2-40B4-BE49-F238E27FC236}">
+                <a16:creationId xmlns:a16="http://schemas.microsoft.com/office/drawing/2014/main" id="{0AB841C9-CE25-FF4D-EEA7-B1B42A034B03}"/>
+              </a:ext>
+            </a:extLst>
+          </p:cNvPr>
+          <p:cNvGrpSpPr/>
+          <p:nvPr/>
+        </p:nvGrpSpPr>
+        <p:grpSpPr>
+          <a:xfrm>
+            <a:off x="5420824" y="2285270"/>
+            <a:ext cx="628650" cy="665291"/>
+            <a:chOff x="5273959" y="1431748"/>
+            <a:chExt cx="628650" cy="665291"/>
+          </a:xfrm>
+        </p:grpSpPr>
+        <p:pic>
+          <p:nvPicPr>
+            <p:cNvPr id="1026" name="Picture 2" descr="Stick figures - People I saw at the park today : r/AdobeIllustrator">
+              <a:extLst>
+                <a:ext uri="{FF2B5EF4-FFF2-40B4-BE49-F238E27FC236}">
+                  <a16:creationId xmlns:a16="http://schemas.microsoft.com/office/drawing/2014/main" id="{35B0DEC1-67E3-E6D8-6F84-6EF8089F3766}"/>
+                </a:ext>
+              </a:extLst>
+            </p:cNvPr>
+            <p:cNvPicPr>
+              <a:picLocks noChangeAspect="1" noChangeArrowheads="1"/>
+            </p:cNvPicPr>
+            <p:nvPr/>
+          </p:nvPicPr>
+          <p:blipFill>
+            <a:blip r:embed="rId2">
+              <a:extLst>
+                <a:ext uri="{28A0092B-C50C-407E-A947-70E740481C1C}">
+                  <a14:useLocalDpi xmlns:a14="http://schemas.microsoft.com/office/drawing/2010/main" val="0"/>
+                </a:ext>
+              </a:extLst>
+            </a:blip>
+            <a:srcRect/>
+            <a:stretch>
+              <a:fillRect/>
+            </a:stretch>
+          </p:blipFill>
+          <p:spPr bwMode="auto">
+            <a:xfrm>
+              <a:off x="5353050" y="1431748"/>
+              <a:ext cx="530509" cy="514221"/>
+            </a:xfrm>
+            <a:prstGeom prst="rect">
+              <a:avLst/>
+            </a:prstGeom>
+            <a:noFill/>
+            <a:extLst>
+              <a:ext uri="{909E8E84-426E-40DD-AFC4-6F175D3DCCD1}">
+                <a14:hiddenFill xmlns:a14="http://schemas.microsoft.com/office/drawing/2010/main">
+                  <a:solidFill>
+                    <a:srgbClr val="FFFFFF"/>
+                  </a:solidFill>
+                </a14:hiddenFill>
+              </a:ext>
+            </a:extLst>
+          </p:spPr>
+        </p:pic>
+        <p:sp>
+          <p:nvSpPr>
+            <p:cNvPr id="49" name="TextBox 48">
+              <a:extLst>
+                <a:ext uri="{FF2B5EF4-FFF2-40B4-BE49-F238E27FC236}">
+                  <a16:creationId xmlns:a16="http://schemas.microsoft.com/office/drawing/2014/main" id="{A0BA4084-106E-CAAD-A33E-D446F38192FD}"/>
+                </a:ext>
+              </a:extLst>
+            </p:cNvPr>
+            <p:cNvSpPr txBox="1"/>
+            <p:nvPr/>
+          </p:nvSpPr>
+          <p:spPr>
+            <a:xfrm flipH="1">
+              <a:off x="5273959" y="1835429"/>
+              <a:ext cx="628650" cy="261610"/>
+            </a:xfrm>
+            <a:prstGeom prst="rect">
+              <a:avLst/>
+            </a:prstGeom>
+            <a:noFill/>
+          </p:spPr>
+          <p:txBody>
+            <a:bodyPr wrap="square" rtlCol="0">
+              <a:spAutoFit/>
+            </a:bodyPr>
+            <a:lstStyle/>
+            <a:p>
+              <a:pPr algn="ctr"/>
+              <a:r>
+                <a:rPr lang="en-US" sz="1100" dirty="0"/>
+                <a:t>Users</a:t>
+              </a:r>
+            </a:p>
+          </p:txBody>
+        </p:sp>
+      </p:grpSp>
+      <p:grpSp>
+        <p:nvGrpSpPr>
+          <p:cNvPr id="51" name="Group 50">
+            <a:extLst>
+              <a:ext uri="{FF2B5EF4-FFF2-40B4-BE49-F238E27FC236}">
+                <a16:creationId xmlns:a16="http://schemas.microsoft.com/office/drawing/2014/main" id="{9D6B2AEA-BE02-6E97-B49E-33A201066AE6}"/>
+              </a:ext>
+            </a:extLst>
+          </p:cNvPr>
+          <p:cNvGrpSpPr/>
+          <p:nvPr/>
+        </p:nvGrpSpPr>
+        <p:grpSpPr>
+          <a:xfrm>
+            <a:off x="4098153" y="3335904"/>
+            <a:ext cx="835027" cy="665291"/>
+            <a:chOff x="5181882" y="1431748"/>
+            <a:chExt cx="835027" cy="665291"/>
+          </a:xfrm>
+        </p:grpSpPr>
+        <p:pic>
+          <p:nvPicPr>
+            <p:cNvPr id="52" name="Picture 2" descr="Stick figures - People I saw at the park today : r/AdobeIllustrator">
+              <a:extLst>
+                <a:ext uri="{FF2B5EF4-FFF2-40B4-BE49-F238E27FC236}">
+                  <a16:creationId xmlns:a16="http://schemas.microsoft.com/office/drawing/2014/main" id="{C5D0775E-2843-D88A-FC22-3B33395D0660}"/>
+                </a:ext>
+              </a:extLst>
+            </p:cNvPr>
+            <p:cNvPicPr>
+              <a:picLocks noChangeAspect="1" noChangeArrowheads="1"/>
+            </p:cNvPicPr>
+            <p:nvPr/>
+          </p:nvPicPr>
+          <p:blipFill>
+            <a:blip r:embed="rId2">
+              <a:extLst>
+                <a:ext uri="{28A0092B-C50C-407E-A947-70E740481C1C}">
+                  <a14:useLocalDpi xmlns:a14="http://schemas.microsoft.com/office/drawing/2010/main" val="0"/>
+                </a:ext>
+              </a:extLst>
+            </a:blip>
+            <a:srcRect/>
+            <a:stretch>
+              <a:fillRect/>
+            </a:stretch>
+          </p:blipFill>
+          <p:spPr bwMode="auto">
+            <a:xfrm>
+              <a:off x="5353050" y="1431748"/>
+              <a:ext cx="530509" cy="514221"/>
+            </a:xfrm>
+            <a:prstGeom prst="rect">
+              <a:avLst/>
+            </a:prstGeom>
+            <a:noFill/>
+            <a:extLst>
+              <a:ext uri="{909E8E84-426E-40DD-AFC4-6F175D3DCCD1}">
+                <a14:hiddenFill xmlns:a14="http://schemas.microsoft.com/office/drawing/2010/main">
+                  <a:solidFill>
+                    <a:srgbClr val="FFFFFF"/>
+                  </a:solidFill>
+                </a14:hiddenFill>
+              </a:ext>
+            </a:extLst>
+          </p:spPr>
+        </p:pic>
+        <p:sp>
+          <p:nvSpPr>
+            <p:cNvPr id="53" name="TextBox 52">
+              <a:extLst>
+                <a:ext uri="{FF2B5EF4-FFF2-40B4-BE49-F238E27FC236}">
+                  <a16:creationId xmlns:a16="http://schemas.microsoft.com/office/drawing/2014/main" id="{D48C772D-EA5F-D3E7-80C0-05340C0026ED}"/>
+                </a:ext>
+              </a:extLst>
+            </p:cNvPr>
+            <p:cNvSpPr txBox="1"/>
+            <p:nvPr/>
+          </p:nvSpPr>
+          <p:spPr>
+            <a:xfrm flipH="1">
+              <a:off x="5181882" y="1835429"/>
+              <a:ext cx="835027" cy="261610"/>
+            </a:xfrm>
+            <a:prstGeom prst="rect">
+              <a:avLst/>
+            </a:prstGeom>
+            <a:noFill/>
+          </p:spPr>
+          <p:txBody>
+            <a:bodyPr wrap="square" rtlCol="0">
+              <a:spAutoFit/>
+            </a:bodyPr>
+            <a:lstStyle/>
+            <a:p>
+              <a:pPr algn="ctr"/>
+              <a:r>
+                <a:rPr lang="en-US" sz="1100" dirty="0"/>
+                <a:t>Developers</a:t>
+              </a:r>
+            </a:p>
+          </p:txBody>
+        </p:sp>
+      </p:grpSp>
+      <p:cxnSp>
+        <p:nvCxnSpPr>
+          <p:cNvPr id="55" name="Straight Arrow Connector 54">
+            <a:extLst>
+              <a:ext uri="{FF2B5EF4-FFF2-40B4-BE49-F238E27FC236}">
+                <a16:creationId xmlns:a16="http://schemas.microsoft.com/office/drawing/2014/main" id="{E97F37D6-54EA-1C7B-F71A-BE5B2B7338B6}"/>
+              </a:ext>
+            </a:extLst>
+          </p:cNvPr>
+          <p:cNvCxnSpPr>
+            <a:stCxn id="1026" idx="1"/>
+            <a:endCxn id="48" idx="3"/>
+          </p:cNvCxnSpPr>
+          <p:nvPr/>
+        </p:nvCxnSpPr>
+        <p:spPr>
+          <a:xfrm flipH="1">
+            <a:off x="5137966" y="2542381"/>
+            <a:ext cx="361949" cy="179877"/>
+          </a:xfrm>
+          <a:prstGeom prst="straightConnector1">
+            <a:avLst/>
+          </a:prstGeom>
+          <a:ln>
+            <a:tailEnd type="triangle"/>
+          </a:ln>
+        </p:spPr>
+        <p:style>
+          <a:lnRef idx="1">
+            <a:schemeClr val="accent1"/>
+          </a:lnRef>
+          <a:fillRef idx="0">
+            <a:schemeClr val="accent1"/>
+          </a:fillRef>
+          <a:effectRef idx="0">
+            <a:schemeClr val="accent1"/>
+          </a:effectRef>
+          <a:fontRef idx="minor">
+            <a:schemeClr val="tx1"/>
+          </a:fontRef>
+        </p:style>
+      </p:cxnSp>
+      <p:cxnSp>
+        <p:nvCxnSpPr>
+          <p:cNvPr id="56" name="Straight Arrow Connector 55">
+            <a:extLst>
+              <a:ext uri="{FF2B5EF4-FFF2-40B4-BE49-F238E27FC236}">
+                <a16:creationId xmlns:a16="http://schemas.microsoft.com/office/drawing/2014/main" id="{38DC8DE8-E01B-3107-A25F-5FEE6F17EBF3}"/>
+              </a:ext>
+            </a:extLst>
+          </p:cNvPr>
+          <p:cNvCxnSpPr>
+            <a:cxnSpLocks/>
+            <a:stCxn id="52" idx="0"/>
+            <a:endCxn id="48" idx="2"/>
+          </p:cNvCxnSpPr>
+          <p:nvPr/>
+        </p:nvCxnSpPr>
+        <p:spPr>
+          <a:xfrm flipV="1">
+            <a:off x="4534576" y="3017947"/>
+            <a:ext cx="141" cy="317957"/>
+          </a:xfrm>
+          <a:prstGeom prst="straightConnector1">
+            <a:avLst/>
+          </a:prstGeom>
+          <a:ln>
+            <a:tailEnd type="triangle"/>
+          </a:ln>
+        </p:spPr>
+        <p:style>
+          <a:lnRef idx="1">
+            <a:schemeClr val="accent1"/>
+          </a:lnRef>
+          <a:fillRef idx="0">
+            <a:schemeClr val="accent1"/>
+          </a:fillRef>
+          <a:effectRef idx="0">
+            <a:schemeClr val="accent1"/>
+          </a:effectRef>
+          <a:fontRef idx="minor">
+            <a:schemeClr val="tx1"/>
+          </a:fontRef>
+        </p:style>
+      </p:cxnSp>
+      <p:cxnSp>
+        <p:nvCxnSpPr>
+          <p:cNvPr id="61" name="Straight Arrow Connector 60">
+            <a:extLst>
+              <a:ext uri="{FF2B5EF4-FFF2-40B4-BE49-F238E27FC236}">
+                <a16:creationId xmlns:a16="http://schemas.microsoft.com/office/drawing/2014/main" id="{41C33A3D-B6B7-A8FD-E401-37D22625B84B}"/>
+              </a:ext>
+            </a:extLst>
+          </p:cNvPr>
+          <p:cNvCxnSpPr>
+            <a:cxnSpLocks/>
+            <a:stCxn id="48" idx="1"/>
+            <a:endCxn id="6" idx="3"/>
+          </p:cNvCxnSpPr>
+          <p:nvPr/>
+        </p:nvCxnSpPr>
+        <p:spPr>
+          <a:xfrm flipH="1">
+            <a:off x="3009922" y="2722258"/>
+            <a:ext cx="921546" cy="810858"/>
+          </a:xfrm>
+          <a:prstGeom prst="straightConnector1">
+            <a:avLst/>
+          </a:prstGeom>
+          <a:ln>
+            <a:tailEnd type="triangle"/>
+          </a:ln>
+        </p:spPr>
+        <p:style>
+          <a:lnRef idx="1">
+            <a:schemeClr val="accent1"/>
+          </a:lnRef>
+          <a:fillRef idx="0">
+            <a:schemeClr val="accent1"/>
+          </a:fillRef>
+          <a:effectRef idx="0">
+            <a:schemeClr val="accent1"/>
+          </a:effectRef>
+          <a:fontRef idx="minor">
+            <a:schemeClr val="tx1"/>
+          </a:fontRef>
+        </p:style>
+      </p:cxnSp>
+      <p:sp>
+        <p:nvSpPr>
+          <p:cNvPr id="5" name="Rectangle 4">
+            <a:extLst>
+              <a:ext uri="{FF2B5EF4-FFF2-40B4-BE49-F238E27FC236}">
+                <a16:creationId xmlns:a16="http://schemas.microsoft.com/office/drawing/2014/main" id="{C474B57F-0AD1-E7F8-735F-9AC6546A1428}"/>
+              </a:ext>
+            </a:extLst>
+          </p:cNvPr>
+          <p:cNvSpPr/>
+          <p:nvPr/>
+        </p:nvSpPr>
+        <p:spPr>
+          <a:xfrm>
+            <a:off x="573109" y="3082404"/>
+            <a:ext cx="2289175" cy="886128"/>
+          </a:xfrm>
+          <a:prstGeom prst="rect">
+            <a:avLst/>
+          </a:prstGeom>
+          <a:noFill/>
+        </p:spPr>
+        <p:style>
+          <a:lnRef idx="2">
+            <a:schemeClr val="accent1">
+              <a:shade val="15000"/>
+            </a:schemeClr>
+          </a:lnRef>
+          <a:fillRef idx="1">
+            <a:schemeClr val="accent1"/>
+          </a:fillRef>
+          <a:effectRef idx="0">
+            <a:schemeClr val="accent1"/>
+          </a:effectRef>
+          <a:fontRef idx="minor">
+            <a:schemeClr val="lt1"/>
+          </a:fontRef>
+        </p:style>
+        <p:txBody>
+          <a:bodyPr rtlCol="0" anchor="ctr"/>
+          <a:lstStyle/>
+          <a:p>
+            <a:pPr algn="ctr"/>
+            <a:r>
+              <a:rPr lang="en-US" sz="1050" dirty="0">
+                <a:solidFill>
+                  <a:schemeClr val="tx1"/>
+                </a:solidFill>
+              </a:rPr>
+              <a:t>Planned Elastic documents</a:t>
+            </a:r>
+          </a:p>
+          <a:p>
+            <a:pPr algn="ctr"/>
+            <a:r>
+              <a:rPr lang="en-US" sz="1050" dirty="0">
+                <a:solidFill>
+                  <a:schemeClr val="tx1"/>
+                </a:solidFill>
+              </a:rPr>
+              <a:t>indexed</a:t>
+            </a:r>
+          </a:p>
+        </p:txBody>
+      </p:sp>
+      <p:sp>
+        <p:nvSpPr>
+          <p:cNvPr id="6" name="Rectangle 5">
+            <a:extLst>
+              <a:ext uri="{FF2B5EF4-FFF2-40B4-BE49-F238E27FC236}">
+                <a16:creationId xmlns:a16="http://schemas.microsoft.com/office/drawing/2014/main" id="{E93743E9-C212-A901-3D17-991321843D9C}"/>
+              </a:ext>
+            </a:extLst>
+          </p:cNvPr>
+          <p:cNvSpPr/>
+          <p:nvPr/>
+        </p:nvSpPr>
+        <p:spPr>
+          <a:xfrm>
+            <a:off x="425472" y="2932381"/>
+            <a:ext cx="2584450" cy="1201470"/>
+          </a:xfrm>
+          <a:prstGeom prst="rect">
+            <a:avLst/>
+          </a:prstGeom>
+          <a:noFill/>
+        </p:spPr>
+        <p:style>
+          <a:lnRef idx="2">
+            <a:schemeClr val="accent1">
+              <a:shade val="15000"/>
+            </a:schemeClr>
+          </a:lnRef>
+          <a:fillRef idx="1">
+            <a:schemeClr val="accent1"/>
+          </a:fillRef>
+          <a:effectRef idx="0">
+            <a:schemeClr val="accent1"/>
+          </a:effectRef>
+          <a:fontRef idx="minor">
+            <a:schemeClr val="lt1"/>
+          </a:fontRef>
+        </p:style>
+        <p:txBody>
+          <a:bodyPr rtlCol="0" anchor="ctr"/>
+          <a:lstStyle/>
+          <a:p>
+            <a:pPr algn="ctr"/>
+            <a:endParaRPr lang="en-US" sz="1400" dirty="0">
+              <a:solidFill>
+                <a:schemeClr val="tx1"/>
+              </a:solidFill>
+            </a:endParaRPr>
+          </a:p>
+        </p:txBody>
+      </p:sp>
+      <p:sp>
+        <p:nvSpPr>
+          <p:cNvPr id="12" name="TextBox 11">
+            <a:extLst>
+              <a:ext uri="{FF2B5EF4-FFF2-40B4-BE49-F238E27FC236}">
+                <a16:creationId xmlns:a16="http://schemas.microsoft.com/office/drawing/2014/main" id="{03C2405F-B977-2285-9710-876CE865230E}"/>
+              </a:ext>
+            </a:extLst>
+          </p:cNvPr>
+          <p:cNvSpPr txBox="1"/>
+          <p:nvPr/>
+        </p:nvSpPr>
+        <p:spPr>
+          <a:xfrm flipH="1">
+            <a:off x="358023" y="4161230"/>
+            <a:ext cx="2289175" cy="261610"/>
+          </a:xfrm>
+          <a:prstGeom prst="rect">
+            <a:avLst/>
+          </a:prstGeom>
+          <a:noFill/>
+        </p:spPr>
+        <p:txBody>
+          <a:bodyPr wrap="square" rtlCol="0">
+            <a:spAutoFit/>
+          </a:bodyPr>
+          <a:lstStyle/>
+          <a:p>
+            <a:r>
+              <a:rPr lang="en-US" sz="1100" dirty="0"/>
+              <a:t>Elasticsearch Schema</a:t>
+            </a:r>
+          </a:p>
+        </p:txBody>
+      </p:sp>
+      <p:cxnSp>
+        <p:nvCxnSpPr>
+          <p:cNvPr id="14" name="Straight Arrow Connector 13">
+            <a:extLst>
+              <a:ext uri="{FF2B5EF4-FFF2-40B4-BE49-F238E27FC236}">
+                <a16:creationId xmlns:a16="http://schemas.microsoft.com/office/drawing/2014/main" id="{DB4F2C52-DF61-5F85-5A3E-3F73F4B7DA2F}"/>
+              </a:ext>
+            </a:extLst>
+          </p:cNvPr>
+          <p:cNvCxnSpPr>
+            <a:cxnSpLocks/>
+            <a:stCxn id="13" idx="2"/>
+            <a:endCxn id="5" idx="0"/>
+          </p:cNvCxnSpPr>
+          <p:nvPr/>
+        </p:nvCxnSpPr>
+        <p:spPr>
+          <a:xfrm>
+            <a:off x="1717697" y="2197407"/>
+            <a:ext cx="0" cy="884997"/>
+          </a:xfrm>
+          <a:prstGeom prst="straightConnector1">
+            <a:avLst/>
+          </a:prstGeom>
+          <a:ln>
+            <a:tailEnd type="triangle"/>
+          </a:ln>
+        </p:spPr>
+        <p:style>
+          <a:lnRef idx="1">
+            <a:schemeClr val="accent1"/>
+          </a:lnRef>
+          <a:fillRef idx="0">
+            <a:schemeClr val="accent1"/>
+          </a:fillRef>
+          <a:effectRef idx="0">
+            <a:schemeClr val="accent1"/>
+          </a:effectRef>
+          <a:fontRef idx="minor">
+            <a:schemeClr val="tx1"/>
+          </a:fontRef>
+        </p:style>
+      </p:cxnSp>
+      <p:sp>
+        <p:nvSpPr>
+          <p:cNvPr id="20" name="TextBox 19">
+            <a:extLst>
+              <a:ext uri="{FF2B5EF4-FFF2-40B4-BE49-F238E27FC236}">
+                <a16:creationId xmlns:a16="http://schemas.microsoft.com/office/drawing/2014/main" id="{9F35BE12-DB73-07B5-EA3C-FD5A3EFB0AF3}"/>
+              </a:ext>
+            </a:extLst>
+          </p:cNvPr>
+          <p:cNvSpPr txBox="1"/>
+          <p:nvPr/>
+        </p:nvSpPr>
+        <p:spPr>
+          <a:xfrm flipH="1">
+            <a:off x="1761352" y="2522926"/>
+            <a:ext cx="2289175" cy="261610"/>
+          </a:xfrm>
+          <a:prstGeom prst="rect">
+            <a:avLst/>
+          </a:prstGeom>
+          <a:noFill/>
+        </p:spPr>
+        <p:txBody>
+          <a:bodyPr wrap="square" rtlCol="0">
+            <a:spAutoFit/>
+          </a:bodyPr>
+          <a:lstStyle/>
+          <a:p>
+            <a:r>
+              <a:rPr lang="en-US" sz="1100" dirty="0"/>
+              <a:t>Logstash</a:t>
+            </a:r>
+          </a:p>
+        </p:txBody>
+      </p:sp>
+    </p:spTree>
+    <p:extLst>
+      <p:ext uri="{BB962C8B-B14F-4D97-AF65-F5344CB8AC3E}">
+        <p14:creationId xmlns:p14="http://schemas.microsoft.com/office/powerpoint/2010/main" val="2432209182"/>
+      </p:ext>
+    </p:extLst>
+  </p:cSld>
+  <p:clrMapOvr>
+    <a:masterClrMapping/>
+  </p:clrMapOvr>
+</p:sld>
+</file>
+
 <file path=ppt/theme/theme1.xml><?xml version="1.0" encoding="utf-8"?>
 <a:theme xmlns:a="http://schemas.openxmlformats.org/drawingml/2006/main" name="Office Theme">
   <a:themeElements>

</xml_diff>

<commit_message>
Not sure what all the changes are.
Pharmacy coupons. 8/17/24
</commit_message>
<xml_diff>
--- a/general-tech-figures.pptx
+++ b/general-tech-figures.pptx
@@ -260,7 +260,7 @@
           <a:p>
             <a:fld id="{BFBBFCFE-809B-4AE5-92DC-0D51595F6FEA}" type="datetimeFigureOut">
               <a:rPr lang="en-US" smtClean="0"/>
-              <a:t>2/10/2024</a:t>
+              <a:t>8/17/2024</a:t>
             </a:fld>
             <a:endParaRPr lang="en-US"/>
           </a:p>
@@ -430,7 +430,7 @@
           <a:p>
             <a:fld id="{BFBBFCFE-809B-4AE5-92DC-0D51595F6FEA}" type="datetimeFigureOut">
               <a:rPr lang="en-US" smtClean="0"/>
-              <a:t>2/10/2024</a:t>
+              <a:t>8/17/2024</a:t>
             </a:fld>
             <a:endParaRPr lang="en-US"/>
           </a:p>
@@ -610,7 +610,7 @@
           <a:p>
             <a:fld id="{BFBBFCFE-809B-4AE5-92DC-0D51595F6FEA}" type="datetimeFigureOut">
               <a:rPr lang="en-US" smtClean="0"/>
-              <a:t>2/10/2024</a:t>
+              <a:t>8/17/2024</a:t>
             </a:fld>
             <a:endParaRPr lang="en-US"/>
           </a:p>
@@ -780,7 +780,7 @@
           <a:p>
             <a:fld id="{BFBBFCFE-809B-4AE5-92DC-0D51595F6FEA}" type="datetimeFigureOut">
               <a:rPr lang="en-US" smtClean="0"/>
-              <a:t>2/10/2024</a:t>
+              <a:t>8/17/2024</a:t>
             </a:fld>
             <a:endParaRPr lang="en-US"/>
           </a:p>
@@ -1024,7 +1024,7 @@
           <a:p>
             <a:fld id="{BFBBFCFE-809B-4AE5-92DC-0D51595F6FEA}" type="datetimeFigureOut">
               <a:rPr lang="en-US" smtClean="0"/>
-              <a:t>2/10/2024</a:t>
+              <a:t>8/17/2024</a:t>
             </a:fld>
             <a:endParaRPr lang="en-US"/>
           </a:p>
@@ -1256,7 +1256,7 @@
           <a:p>
             <a:fld id="{BFBBFCFE-809B-4AE5-92DC-0D51595F6FEA}" type="datetimeFigureOut">
               <a:rPr lang="en-US" smtClean="0"/>
-              <a:t>2/10/2024</a:t>
+              <a:t>8/17/2024</a:t>
             </a:fld>
             <a:endParaRPr lang="en-US"/>
           </a:p>
@@ -1623,7 +1623,7 @@
           <a:p>
             <a:fld id="{BFBBFCFE-809B-4AE5-92DC-0D51595F6FEA}" type="datetimeFigureOut">
               <a:rPr lang="en-US" smtClean="0"/>
-              <a:t>2/10/2024</a:t>
+              <a:t>8/17/2024</a:t>
             </a:fld>
             <a:endParaRPr lang="en-US"/>
           </a:p>
@@ -1741,7 +1741,7 @@
           <a:p>
             <a:fld id="{BFBBFCFE-809B-4AE5-92DC-0D51595F6FEA}" type="datetimeFigureOut">
               <a:rPr lang="en-US" smtClean="0"/>
-              <a:t>2/10/2024</a:t>
+              <a:t>8/17/2024</a:t>
             </a:fld>
             <a:endParaRPr lang="en-US"/>
           </a:p>
@@ -1836,7 +1836,7 @@
           <a:p>
             <a:fld id="{BFBBFCFE-809B-4AE5-92DC-0D51595F6FEA}" type="datetimeFigureOut">
               <a:rPr lang="en-US" smtClean="0"/>
-              <a:t>2/10/2024</a:t>
+              <a:t>8/17/2024</a:t>
             </a:fld>
             <a:endParaRPr lang="en-US"/>
           </a:p>
@@ -2113,7 +2113,7 @@
           <a:p>
             <a:fld id="{BFBBFCFE-809B-4AE5-92DC-0D51595F6FEA}" type="datetimeFigureOut">
               <a:rPr lang="en-US" smtClean="0"/>
-              <a:t>2/10/2024</a:t>
+              <a:t>8/17/2024</a:t>
             </a:fld>
             <a:endParaRPr lang="en-US"/>
           </a:p>
@@ -2370,7 +2370,7 @@
           <a:p>
             <a:fld id="{BFBBFCFE-809B-4AE5-92DC-0D51595F6FEA}" type="datetimeFigureOut">
               <a:rPr lang="en-US" smtClean="0"/>
-              <a:t>2/10/2024</a:t>
+              <a:t>8/17/2024</a:t>
             </a:fld>
             <a:endParaRPr lang="en-US"/>
           </a:p>
@@ -2583,7 +2583,7 @@
           <a:p>
             <a:fld id="{BFBBFCFE-809B-4AE5-92DC-0D51595F6FEA}" type="datetimeFigureOut">
               <a:rPr lang="en-US" smtClean="0"/>
-              <a:t>2/10/2024</a:t>
+              <a:t>8/17/2024</a:t>
             </a:fld>
             <a:endParaRPr lang="en-US"/>
           </a:p>
@@ -10213,10 +10213,10 @@
       </p:grpSpPr>
       <p:sp>
         <p:nvSpPr>
-          <p:cNvPr id="1041" name="Rectangle 1040">
-            <a:extLst>
-              <a:ext uri="{FF2B5EF4-FFF2-40B4-BE49-F238E27FC236}">
-                <a16:creationId xmlns:a16="http://schemas.microsoft.com/office/drawing/2014/main" id="{ADBF459A-93B9-4499-1CE7-02F992530570}"/>
+          <p:cNvPr id="3" name="Rectangle 2">
+            <a:extLst>
+              <a:ext uri="{FF2B5EF4-FFF2-40B4-BE49-F238E27FC236}">
+                <a16:creationId xmlns:a16="http://schemas.microsoft.com/office/drawing/2014/main" id="{7039FF8F-4340-B313-B73E-B8A64D3EA568}"/>
               </a:ext>
             </a:extLst>
           </p:cNvPr>
@@ -10225,8 +10225,8 @@
         </p:nvSpPr>
         <p:spPr>
           <a:xfrm>
-            <a:off x="2565019" y="5849459"/>
-            <a:ext cx="1450848" cy="676959"/>
+            <a:off x="2280045" y="2668714"/>
+            <a:ext cx="1165594" cy="676959"/>
           </a:xfrm>
           <a:prstGeom prst="rect">
             <a:avLst/>
@@ -10260,59 +10260,17 @@
                   <a:schemeClr val="tx1"/>
                 </a:solidFill>
               </a:rPr>
-              <a:t>Vector DB</a:t>
-            </a:r>
-          </a:p>
-        </p:txBody>
-      </p:sp>
-      <p:cxnSp>
-        <p:nvCxnSpPr>
-          <p:cNvPr id="1042" name="Connector: Elbow 1041">
-            <a:extLst>
-              <a:ext uri="{FF2B5EF4-FFF2-40B4-BE49-F238E27FC236}">
-                <a16:creationId xmlns:a16="http://schemas.microsoft.com/office/drawing/2014/main" id="{7E262E6A-C39A-9FA4-4F10-86EF10A3A6EC}"/>
-              </a:ext>
-            </a:extLst>
-          </p:cNvPr>
-          <p:cNvCxnSpPr>
-            <a:cxnSpLocks/>
-            <a:endCxn id="1041" idx="3"/>
-          </p:cNvCxnSpPr>
-          <p:nvPr/>
-        </p:nvCxnSpPr>
-        <p:spPr>
-          <a:xfrm rot="5400000">
-            <a:off x="4110847" y="5312257"/>
-            <a:ext cx="780703" cy="970661"/>
-          </a:xfrm>
-          <a:prstGeom prst="bentConnector2">
-            <a:avLst/>
-          </a:prstGeom>
-          <a:ln>
-            <a:tailEnd type="triangle"/>
-          </a:ln>
-        </p:spPr>
-        <p:style>
-          <a:lnRef idx="1">
-            <a:schemeClr val="accent1"/>
-          </a:lnRef>
-          <a:fillRef idx="0">
-            <a:schemeClr val="accent1"/>
-          </a:fillRef>
-          <a:effectRef idx="0">
-            <a:schemeClr val="accent1"/>
-          </a:effectRef>
-          <a:fontRef idx="minor">
-            <a:schemeClr val="tx1"/>
-          </a:fontRef>
-        </p:style>
-      </p:cxnSp>
-      <p:sp>
-        <p:nvSpPr>
-          <p:cNvPr id="1045" name="Oval 1044">
-            <a:extLst>
-              <a:ext uri="{FF2B5EF4-FFF2-40B4-BE49-F238E27FC236}">
-                <a16:creationId xmlns:a16="http://schemas.microsoft.com/office/drawing/2014/main" id="{906EAA34-E3E6-E742-A423-84ECC7FCAFBD}"/>
+              <a:t>Pharmacy</a:t>
+            </a:r>
+          </a:p>
+        </p:txBody>
+      </p:sp>
+      <p:sp>
+        <p:nvSpPr>
+          <p:cNvPr id="4" name="Rectangle 3">
+            <a:extLst>
+              <a:ext uri="{FF2B5EF4-FFF2-40B4-BE49-F238E27FC236}">
+                <a16:creationId xmlns:a16="http://schemas.microsoft.com/office/drawing/2014/main" id="{F8139555-A38D-6D41-C152-2C6D3B0C4184}"/>
               </a:ext>
             </a:extLst>
           </p:cNvPr>
@@ -10321,12 +10279,13 @@
         </p:nvSpPr>
         <p:spPr>
           <a:xfrm>
-            <a:off x="4377881" y="6291117"/>
-            <a:ext cx="390144" cy="390144"/>
-          </a:xfrm>
-          <a:prstGeom prst="ellipse">
-            <a:avLst/>
-          </a:prstGeom>
+            <a:off x="4691086" y="670216"/>
+            <a:ext cx="1165594" cy="676959"/>
+          </a:xfrm>
+          <a:prstGeom prst="rect">
+            <a:avLst/>
+          </a:prstGeom>
+          <a:noFill/>
         </p:spPr>
         <p:style>
           <a:lnRef idx="2">
@@ -10350,54 +10309,22 @@
           <a:p>
             <a:pPr algn="ctr"/>
             <a:r>
-              <a:rPr lang="en-US" dirty="0"/>
-              <a:t>6</a:t>
-            </a:r>
-          </a:p>
-        </p:txBody>
-      </p:sp>
-      <p:sp>
-        <p:nvSpPr>
-          <p:cNvPr id="1046" name="TextBox 1045">
-            <a:extLst>
-              <a:ext uri="{FF2B5EF4-FFF2-40B4-BE49-F238E27FC236}">
-                <a16:creationId xmlns:a16="http://schemas.microsoft.com/office/drawing/2014/main" id="{D3DE3D2F-F6C6-E7AD-EACA-0AA1C41C5B91}"/>
-              </a:ext>
-            </a:extLst>
-          </p:cNvPr>
-          <p:cNvSpPr txBox="1"/>
-          <p:nvPr/>
-        </p:nvSpPr>
-        <p:spPr>
-          <a:xfrm flipH="1">
-            <a:off x="4260084" y="5718654"/>
-            <a:ext cx="1295400" cy="261610"/>
-          </a:xfrm>
-          <a:prstGeom prst="rect">
-            <a:avLst/>
-          </a:prstGeom>
-          <a:noFill/>
-        </p:spPr>
-        <p:txBody>
-          <a:bodyPr wrap="square" rtlCol="0">
-            <a:spAutoFit/>
-          </a:bodyPr>
-          <a:lstStyle/>
-          <a:p>
-            <a:pPr algn="ctr"/>
-            <a:r>
-              <a:rPr lang="en-US" sz="1100" dirty="0"/>
-              <a:t>Store</a:t>
-            </a:r>
-          </a:p>
-        </p:txBody>
-      </p:sp>
-      <p:sp>
-        <p:nvSpPr>
-          <p:cNvPr id="1048" name="Rectangle 1047">
-            <a:extLst>
-              <a:ext uri="{FF2B5EF4-FFF2-40B4-BE49-F238E27FC236}">
-                <a16:creationId xmlns:a16="http://schemas.microsoft.com/office/drawing/2014/main" id="{66C440B6-B7B8-9301-568F-167E7CF88D8F}"/>
+              <a:rPr lang="en-US" sz="1400" dirty="0">
+                <a:solidFill>
+                  <a:schemeClr val="tx1"/>
+                </a:solidFill>
+              </a:rPr>
+              <a:t>Payer</a:t>
+            </a:r>
+          </a:p>
+        </p:txBody>
+      </p:sp>
+      <p:sp>
+        <p:nvSpPr>
+          <p:cNvPr id="5" name="Rectangle 4">
+            <a:extLst>
+              <a:ext uri="{FF2B5EF4-FFF2-40B4-BE49-F238E27FC236}">
+                <a16:creationId xmlns:a16="http://schemas.microsoft.com/office/drawing/2014/main" id="{DEA43BF2-7A6F-3A36-F410-01899D7C0FC4}"/>
               </a:ext>
             </a:extLst>
           </p:cNvPr>
@@ -10406,8 +10333,8 @@
         </p:nvSpPr>
         <p:spPr>
           <a:xfrm>
-            <a:off x="487934" y="7434207"/>
-            <a:ext cx="871500" cy="247155"/>
+            <a:off x="3114390" y="1392924"/>
+            <a:ext cx="1165594" cy="676959"/>
           </a:xfrm>
           <a:prstGeom prst="rect">
             <a:avLst/>
@@ -10441,17 +10368,17 @@
                   <a:schemeClr val="tx1"/>
                 </a:solidFill>
               </a:rPr>
-              <a:t>query</a:t>
-            </a:r>
-          </a:p>
-        </p:txBody>
-      </p:sp>
-      <p:sp>
-        <p:nvSpPr>
-          <p:cNvPr id="1049" name="Rectangle 1048">
-            <a:extLst>
-              <a:ext uri="{FF2B5EF4-FFF2-40B4-BE49-F238E27FC236}">
-                <a16:creationId xmlns:a16="http://schemas.microsoft.com/office/drawing/2014/main" id="{FE56AB2A-C9F5-EB32-710A-847E4F146625}"/>
+              <a:t>PBM</a:t>
+            </a:r>
+          </a:p>
+        </p:txBody>
+      </p:sp>
+      <p:sp>
+        <p:nvSpPr>
+          <p:cNvPr id="7" name="Rectangle 6">
+            <a:extLst>
+              <a:ext uri="{FF2B5EF4-FFF2-40B4-BE49-F238E27FC236}">
+                <a16:creationId xmlns:a16="http://schemas.microsoft.com/office/drawing/2014/main" id="{6BF9A167-0F94-E6D8-C45B-2304B4C12019}"/>
               </a:ext>
             </a:extLst>
           </p:cNvPr>
@@ -10460,8 +10387,8 @@
         </p:nvSpPr>
         <p:spPr>
           <a:xfrm>
-            <a:off x="676656" y="6681261"/>
-            <a:ext cx="1121664" cy="438868"/>
+            <a:off x="4548905" y="3339463"/>
+            <a:ext cx="1314830" cy="676959"/>
           </a:xfrm>
           <a:prstGeom prst="rect">
             <a:avLst/>
@@ -10495,36 +10422,80 @@
                   <a:schemeClr val="tx1"/>
                 </a:solidFill>
               </a:rPr>
-              <a:t>Vectorize it</a:t>
-            </a:r>
-          </a:p>
-        </p:txBody>
-      </p:sp>
+              <a:t>Wholesaler</a:t>
+            </a:r>
+          </a:p>
+        </p:txBody>
+      </p:sp>
+      <p:pic>
+        <p:nvPicPr>
+          <p:cNvPr id="1026" name="Picture 2" descr="Stick figure - Wikipedia">
+            <a:extLst>
+              <a:ext uri="{FF2B5EF4-FFF2-40B4-BE49-F238E27FC236}">
+                <a16:creationId xmlns:a16="http://schemas.microsoft.com/office/drawing/2014/main" id="{8C59DCC6-75D3-F8E2-D9C6-3ADD29C08268}"/>
+              </a:ext>
+            </a:extLst>
+          </p:cNvPr>
+          <p:cNvPicPr>
+            <a:picLocks noChangeAspect="1" noChangeArrowheads="1"/>
+          </p:cNvPicPr>
+          <p:nvPr/>
+        </p:nvPicPr>
+        <p:blipFill>
+          <a:blip r:embed="rId2">
+            <a:extLst>
+              <a:ext uri="{28A0092B-C50C-407E-A947-70E740481C1C}">
+                <a14:useLocalDpi xmlns:a14="http://schemas.microsoft.com/office/drawing/2010/main" val="0"/>
+              </a:ext>
+            </a:extLst>
+          </a:blip>
+          <a:srcRect/>
+          <a:stretch>
+            <a:fillRect/>
+          </a:stretch>
+        </p:blipFill>
+        <p:spPr bwMode="auto">
+          <a:xfrm>
+            <a:off x="1001320" y="2671381"/>
+            <a:ext cx="365027" cy="676959"/>
+          </a:xfrm>
+          <a:prstGeom prst="rect">
+            <a:avLst/>
+          </a:prstGeom>
+          <a:noFill/>
+          <a:extLst>
+            <a:ext uri="{909E8E84-426E-40DD-AFC4-6F175D3DCCD1}">
+              <a14:hiddenFill xmlns:a14="http://schemas.microsoft.com/office/drawing/2010/main">
+                <a:solidFill>
+                  <a:srgbClr val="FFFFFF"/>
+                </a:solidFill>
+              </a14:hiddenFill>
+            </a:ext>
+          </a:extLst>
+        </p:spPr>
+      </p:pic>
       <p:cxnSp>
         <p:nvCxnSpPr>
-          <p:cNvPr id="1050" name="Connector: Elbow 1049">
-            <a:extLst>
-              <a:ext uri="{FF2B5EF4-FFF2-40B4-BE49-F238E27FC236}">
-                <a16:creationId xmlns:a16="http://schemas.microsoft.com/office/drawing/2014/main" id="{970F5E67-D1EE-8FF8-1FE6-4516D490AE58}"/>
+          <p:cNvPr id="9" name="Straight Arrow Connector 8">
+            <a:extLst>
+              <a:ext uri="{FF2B5EF4-FFF2-40B4-BE49-F238E27FC236}">
+                <a16:creationId xmlns:a16="http://schemas.microsoft.com/office/drawing/2014/main" id="{E19E031F-112F-5A2B-210C-4B1AAE9FE861}"/>
               </a:ext>
             </a:extLst>
           </p:cNvPr>
           <p:cNvCxnSpPr>
             <a:cxnSpLocks/>
-            <a:stCxn id="1048" idx="0"/>
-            <a:endCxn id="1049" idx="2"/>
+            <a:stCxn id="1026" idx="3"/>
           </p:cNvCxnSpPr>
           <p:nvPr/>
         </p:nvCxnSpPr>
         <p:spPr>
-          <a:xfrm rot="5400000" flipH="1" flipV="1">
-            <a:off x="923547" y="7120266"/>
-            <a:ext cx="314078" cy="313804"/>
-          </a:xfrm>
-          <a:prstGeom prst="bentConnector3">
-            <a:avLst>
-              <a:gd name="adj1" fmla="val 50000"/>
-            </a:avLst>
+          <a:xfrm>
+            <a:off x="1366347" y="3009861"/>
+            <a:ext cx="523529" cy="0"/>
+          </a:xfrm>
+          <a:prstGeom prst="straightConnector1">
+            <a:avLst/>
           </a:prstGeom>
           <a:ln>
             <a:tailEnd type="triangle"/>
@@ -10547,24 +10518,24 @@
       </p:cxnSp>
       <p:cxnSp>
         <p:nvCxnSpPr>
-          <p:cNvPr id="1054" name="Connector: Elbow 1053">
-            <a:extLst>
-              <a:ext uri="{FF2B5EF4-FFF2-40B4-BE49-F238E27FC236}">
-                <a16:creationId xmlns:a16="http://schemas.microsoft.com/office/drawing/2014/main" id="{DC62B03A-6F51-95E9-CD80-5122A23D1E88}"/>
+          <p:cNvPr id="12" name="Connector: Elbow 11">
+            <a:extLst>
+              <a:ext uri="{FF2B5EF4-FFF2-40B4-BE49-F238E27FC236}">
+                <a16:creationId xmlns:a16="http://schemas.microsoft.com/office/drawing/2014/main" id="{EF071C52-BC77-9C65-D67C-7A1478209CDD}"/>
               </a:ext>
             </a:extLst>
           </p:cNvPr>
           <p:cNvCxnSpPr>
             <a:cxnSpLocks/>
-            <a:stCxn id="1049" idx="0"/>
-            <a:endCxn id="1041" idx="1"/>
+            <a:stCxn id="5" idx="1"/>
+            <a:endCxn id="3" idx="0"/>
           </p:cNvCxnSpPr>
           <p:nvPr/>
         </p:nvCxnSpPr>
         <p:spPr>
-          <a:xfrm rot="5400000" flipH="1" flipV="1">
-            <a:off x="1654592" y="5770835"/>
-            <a:ext cx="493322" cy="1327531"/>
+          <a:xfrm rot="10800000" flipV="1">
+            <a:off x="2862842" y="1731404"/>
+            <a:ext cx="251548" cy="937310"/>
           </a:xfrm>
           <a:prstGeom prst="bentConnector2">
             <a:avLst/>
@@ -10590,10 +10561,10 @@
       </p:cxnSp>
       <p:sp>
         <p:nvSpPr>
-          <p:cNvPr id="1057" name="TextBox 1056">
-            <a:extLst>
-              <a:ext uri="{FF2B5EF4-FFF2-40B4-BE49-F238E27FC236}">
-                <a16:creationId xmlns:a16="http://schemas.microsoft.com/office/drawing/2014/main" id="{78276C62-DBDE-B016-0E40-4945C3909CA6}"/>
+          <p:cNvPr id="16" name="TextBox 15">
+            <a:extLst>
+              <a:ext uri="{FF2B5EF4-FFF2-40B4-BE49-F238E27FC236}">
+                <a16:creationId xmlns:a16="http://schemas.microsoft.com/office/drawing/2014/main" id="{3DB87D32-7839-0351-C2CF-66AA1C50A2A2}"/>
               </a:ext>
             </a:extLst>
           </p:cNvPr>
@@ -10602,8 +10573,8 @@
         </p:nvSpPr>
         <p:spPr>
           <a:xfrm flipH="1">
-            <a:off x="923684" y="5926328"/>
-            <a:ext cx="1295400" cy="261610"/>
+            <a:off x="1133264" y="2378956"/>
+            <a:ext cx="1295400" cy="307777"/>
           </a:xfrm>
           <a:prstGeom prst="rect">
             <a:avLst/>
@@ -10618,8 +10589,623 @@
           <a:p>
             <a:pPr algn="ctr"/>
             <a:r>
-              <a:rPr lang="en-US" sz="1100" dirty="0"/>
-              <a:t>Search</a:t>
+              <a:rPr lang="en-US" sz="1400" dirty="0"/>
+              <a:t>Pay (portion)</a:t>
+            </a:r>
+          </a:p>
+        </p:txBody>
+      </p:sp>
+      <p:sp>
+        <p:nvSpPr>
+          <p:cNvPr id="17" name="TextBox 16">
+            <a:extLst>
+              <a:ext uri="{FF2B5EF4-FFF2-40B4-BE49-F238E27FC236}">
+                <a16:creationId xmlns:a16="http://schemas.microsoft.com/office/drawing/2014/main" id="{43CD727F-1234-5A5A-01CD-C29A756CC6D6}"/>
+              </a:ext>
+            </a:extLst>
+          </p:cNvPr>
+          <p:cNvSpPr txBox="1"/>
+          <p:nvPr/>
+        </p:nvSpPr>
+        <p:spPr>
+          <a:xfrm flipH="1">
+            <a:off x="1811920" y="1228908"/>
+            <a:ext cx="878784" cy="307777"/>
+          </a:xfrm>
+          <a:prstGeom prst="rect">
+            <a:avLst/>
+          </a:prstGeom>
+          <a:noFill/>
+        </p:spPr>
+        <p:txBody>
+          <a:bodyPr wrap="square" rtlCol="0">
+            <a:spAutoFit/>
+          </a:bodyPr>
+          <a:lstStyle/>
+          <a:p>
+            <a:pPr algn="ctr"/>
+            <a:r>
+              <a:rPr lang="en-US" sz="1400" dirty="0"/>
+              <a:t>Pay Rest</a:t>
+            </a:r>
+          </a:p>
+        </p:txBody>
+      </p:sp>
+      <p:cxnSp>
+        <p:nvCxnSpPr>
+          <p:cNvPr id="18" name="Connector: Elbow 17">
+            <a:extLst>
+              <a:ext uri="{FF2B5EF4-FFF2-40B4-BE49-F238E27FC236}">
+                <a16:creationId xmlns:a16="http://schemas.microsoft.com/office/drawing/2014/main" id="{BDBE046B-6C92-48F4-38D2-3F59A6D2B958}"/>
+              </a:ext>
+            </a:extLst>
+          </p:cNvPr>
+          <p:cNvCxnSpPr>
+            <a:cxnSpLocks/>
+            <a:stCxn id="4" idx="1"/>
+            <a:endCxn id="5" idx="0"/>
+          </p:cNvCxnSpPr>
+          <p:nvPr/>
+        </p:nvCxnSpPr>
+        <p:spPr>
+          <a:xfrm rot="10800000" flipV="1">
+            <a:off x="3697188" y="1008696"/>
+            <a:ext cx="993899" cy="384228"/>
+          </a:xfrm>
+          <a:prstGeom prst="bentConnector2">
+            <a:avLst/>
+          </a:prstGeom>
+          <a:ln>
+            <a:tailEnd type="triangle"/>
+          </a:ln>
+        </p:spPr>
+        <p:style>
+          <a:lnRef idx="1">
+            <a:schemeClr val="accent1"/>
+          </a:lnRef>
+          <a:fillRef idx="0">
+            <a:schemeClr val="accent1"/>
+          </a:fillRef>
+          <a:effectRef idx="0">
+            <a:schemeClr val="accent1"/>
+          </a:effectRef>
+          <a:fontRef idx="minor">
+            <a:schemeClr val="tx1"/>
+          </a:fontRef>
+        </p:style>
+      </p:cxnSp>
+      <p:sp>
+        <p:nvSpPr>
+          <p:cNvPr id="22" name="TextBox 21">
+            <a:extLst>
+              <a:ext uri="{FF2B5EF4-FFF2-40B4-BE49-F238E27FC236}">
+                <a16:creationId xmlns:a16="http://schemas.microsoft.com/office/drawing/2014/main" id="{14235B0B-242D-45E5-C69D-E5BE062721BA}"/>
+              </a:ext>
+            </a:extLst>
+          </p:cNvPr>
+          <p:cNvSpPr txBox="1"/>
+          <p:nvPr/>
+        </p:nvSpPr>
+        <p:spPr>
+          <a:xfrm flipH="1">
+            <a:off x="3346044" y="606671"/>
+            <a:ext cx="1295400" cy="307777"/>
+          </a:xfrm>
+          <a:prstGeom prst="rect">
+            <a:avLst/>
+          </a:prstGeom>
+          <a:noFill/>
+        </p:spPr>
+        <p:txBody>
+          <a:bodyPr wrap="square" rtlCol="0">
+            <a:spAutoFit/>
+          </a:bodyPr>
+          <a:lstStyle/>
+          <a:p>
+            <a:pPr algn="ctr"/>
+            <a:r>
+              <a:rPr lang="en-US" sz="1400" dirty="0"/>
+              <a:t>Get Paid</a:t>
+            </a:r>
+          </a:p>
+        </p:txBody>
+      </p:sp>
+      <p:cxnSp>
+        <p:nvCxnSpPr>
+          <p:cNvPr id="24" name="Connector: Elbow 23">
+            <a:extLst>
+              <a:ext uri="{FF2B5EF4-FFF2-40B4-BE49-F238E27FC236}">
+                <a16:creationId xmlns:a16="http://schemas.microsoft.com/office/drawing/2014/main" id="{61CE9DA5-2640-47EE-4380-3B72A4321E05}"/>
+              </a:ext>
+            </a:extLst>
+          </p:cNvPr>
+          <p:cNvCxnSpPr>
+            <a:cxnSpLocks/>
+            <a:stCxn id="3" idx="3"/>
+            <a:endCxn id="7" idx="0"/>
+          </p:cNvCxnSpPr>
+          <p:nvPr/>
+        </p:nvCxnSpPr>
+        <p:spPr>
+          <a:xfrm>
+            <a:off x="3445639" y="3007194"/>
+            <a:ext cx="1760681" cy="332269"/>
+          </a:xfrm>
+          <a:prstGeom prst="bentConnector2">
+            <a:avLst/>
+          </a:prstGeom>
+          <a:ln>
+            <a:tailEnd type="triangle"/>
+          </a:ln>
+        </p:spPr>
+        <p:style>
+          <a:lnRef idx="1">
+            <a:schemeClr val="accent1"/>
+          </a:lnRef>
+          <a:fillRef idx="0">
+            <a:schemeClr val="accent1"/>
+          </a:fillRef>
+          <a:effectRef idx="0">
+            <a:schemeClr val="accent1"/>
+          </a:effectRef>
+          <a:fontRef idx="minor">
+            <a:schemeClr val="tx1"/>
+          </a:fontRef>
+        </p:style>
+      </p:cxnSp>
+      <p:sp>
+        <p:nvSpPr>
+          <p:cNvPr id="27" name="TextBox 26">
+            <a:extLst>
+              <a:ext uri="{FF2B5EF4-FFF2-40B4-BE49-F238E27FC236}">
+                <a16:creationId xmlns:a16="http://schemas.microsoft.com/office/drawing/2014/main" id="{40D20E29-6F77-03A8-4D6B-4E9AA54FB01C}"/>
+              </a:ext>
+            </a:extLst>
+          </p:cNvPr>
+          <p:cNvSpPr txBox="1"/>
+          <p:nvPr/>
+        </p:nvSpPr>
+        <p:spPr>
+          <a:xfrm flipH="1">
+            <a:off x="3524933" y="2572639"/>
+            <a:ext cx="978371" cy="307777"/>
+          </a:xfrm>
+          <a:prstGeom prst="rect">
+            <a:avLst/>
+          </a:prstGeom>
+          <a:noFill/>
+        </p:spPr>
+        <p:txBody>
+          <a:bodyPr wrap="square" rtlCol="0">
+            <a:spAutoFit/>
+          </a:bodyPr>
+          <a:lstStyle/>
+          <a:p>
+            <a:pPr algn="ctr"/>
+            <a:r>
+              <a:rPr lang="en-US" sz="1400" dirty="0"/>
+              <a:t>Pay</a:t>
+            </a:r>
+          </a:p>
+        </p:txBody>
+      </p:sp>
+      <p:sp>
+        <p:nvSpPr>
+          <p:cNvPr id="28" name="Rectangle 27">
+            <a:extLst>
+              <a:ext uri="{FF2B5EF4-FFF2-40B4-BE49-F238E27FC236}">
+                <a16:creationId xmlns:a16="http://schemas.microsoft.com/office/drawing/2014/main" id="{E473607E-82FA-3E0C-E439-DEC6B5AA2443}"/>
+              </a:ext>
+            </a:extLst>
+          </p:cNvPr>
+          <p:cNvSpPr/>
+          <p:nvPr/>
+        </p:nvSpPr>
+        <p:spPr>
+          <a:xfrm>
+            <a:off x="2272513" y="4007666"/>
+            <a:ext cx="1314830" cy="676959"/>
+          </a:xfrm>
+          <a:prstGeom prst="rect">
+            <a:avLst/>
+          </a:prstGeom>
+          <a:noFill/>
+        </p:spPr>
+        <p:style>
+          <a:lnRef idx="2">
+            <a:schemeClr val="accent1">
+              <a:shade val="15000"/>
+            </a:schemeClr>
+          </a:lnRef>
+          <a:fillRef idx="1">
+            <a:schemeClr val="accent1"/>
+          </a:fillRef>
+          <a:effectRef idx="0">
+            <a:schemeClr val="accent1"/>
+          </a:effectRef>
+          <a:fontRef idx="minor">
+            <a:schemeClr val="lt1"/>
+          </a:fontRef>
+        </p:style>
+        <p:txBody>
+          <a:bodyPr rtlCol="0" anchor="ctr"/>
+          <a:lstStyle/>
+          <a:p>
+            <a:pPr algn="ctr"/>
+            <a:r>
+              <a:rPr lang="en-US" sz="1400" dirty="0">
+                <a:solidFill>
+                  <a:schemeClr val="tx1"/>
+                </a:solidFill>
+              </a:rPr>
+              <a:t>Manufacturer</a:t>
+            </a:r>
+          </a:p>
+        </p:txBody>
+      </p:sp>
+      <p:cxnSp>
+        <p:nvCxnSpPr>
+          <p:cNvPr id="29" name="Connector: Elbow 28">
+            <a:extLst>
+              <a:ext uri="{FF2B5EF4-FFF2-40B4-BE49-F238E27FC236}">
+                <a16:creationId xmlns:a16="http://schemas.microsoft.com/office/drawing/2014/main" id="{632E05D2-83FD-F634-E4C7-12F6A81BC2D3}"/>
+              </a:ext>
+            </a:extLst>
+          </p:cNvPr>
+          <p:cNvCxnSpPr>
+            <a:cxnSpLocks/>
+            <a:stCxn id="28" idx="1"/>
+            <a:endCxn id="1026" idx="2"/>
+          </p:cNvCxnSpPr>
+          <p:nvPr/>
+        </p:nvCxnSpPr>
+        <p:spPr>
+          <a:xfrm rot="10800000">
+            <a:off x="1183835" y="3348340"/>
+            <a:ext cx="1088679" cy="997806"/>
+          </a:xfrm>
+          <a:prstGeom prst="bentConnector2">
+            <a:avLst/>
+          </a:prstGeom>
+          <a:ln>
+            <a:tailEnd type="triangle"/>
+          </a:ln>
+        </p:spPr>
+        <p:style>
+          <a:lnRef idx="1">
+            <a:schemeClr val="accent1"/>
+          </a:lnRef>
+          <a:fillRef idx="0">
+            <a:schemeClr val="accent1"/>
+          </a:fillRef>
+          <a:effectRef idx="0">
+            <a:schemeClr val="accent1"/>
+          </a:effectRef>
+          <a:fontRef idx="minor">
+            <a:schemeClr val="tx1"/>
+          </a:fontRef>
+        </p:style>
+      </p:cxnSp>
+      <p:sp>
+        <p:nvSpPr>
+          <p:cNvPr id="37" name="TextBox 36">
+            <a:extLst>
+              <a:ext uri="{FF2B5EF4-FFF2-40B4-BE49-F238E27FC236}">
+                <a16:creationId xmlns:a16="http://schemas.microsoft.com/office/drawing/2014/main" id="{182D6E9C-D769-A3E7-F7F3-D75B20643D26}"/>
+              </a:ext>
+            </a:extLst>
+          </p:cNvPr>
+          <p:cNvSpPr txBox="1"/>
+          <p:nvPr/>
+        </p:nvSpPr>
+        <p:spPr>
+          <a:xfrm flipH="1">
+            <a:off x="582839" y="4530318"/>
+            <a:ext cx="839929" cy="307777"/>
+          </a:xfrm>
+          <a:prstGeom prst="rect">
+            <a:avLst/>
+          </a:prstGeom>
+          <a:noFill/>
+        </p:spPr>
+        <p:txBody>
+          <a:bodyPr wrap="square" rtlCol="0">
+            <a:spAutoFit/>
+          </a:bodyPr>
+          <a:lstStyle/>
+          <a:p>
+            <a:pPr algn="ctr"/>
+            <a:r>
+              <a:rPr lang="en-US" sz="1400" dirty="0"/>
+              <a:t>Coupons</a:t>
+            </a:r>
+          </a:p>
+        </p:txBody>
+      </p:sp>
+      <p:cxnSp>
+        <p:nvCxnSpPr>
+          <p:cNvPr id="47" name="Connector: Elbow 46">
+            <a:extLst>
+              <a:ext uri="{FF2B5EF4-FFF2-40B4-BE49-F238E27FC236}">
+                <a16:creationId xmlns:a16="http://schemas.microsoft.com/office/drawing/2014/main" id="{895823EA-A568-5629-7B37-CB1440B18DD2}"/>
+              </a:ext>
+            </a:extLst>
+          </p:cNvPr>
+          <p:cNvCxnSpPr>
+            <a:cxnSpLocks/>
+            <a:stCxn id="7" idx="2"/>
+            <a:endCxn id="28" idx="3"/>
+          </p:cNvCxnSpPr>
+          <p:nvPr/>
+        </p:nvCxnSpPr>
+        <p:spPr>
+          <a:xfrm rot="5400000">
+            <a:off x="4231970" y="3371796"/>
+            <a:ext cx="329724" cy="1618977"/>
+          </a:xfrm>
+          <a:prstGeom prst="bentConnector2">
+            <a:avLst/>
+          </a:prstGeom>
+          <a:ln>
+            <a:tailEnd type="triangle"/>
+          </a:ln>
+        </p:spPr>
+        <p:style>
+          <a:lnRef idx="1">
+            <a:schemeClr val="accent1"/>
+          </a:lnRef>
+          <a:fillRef idx="0">
+            <a:schemeClr val="accent1"/>
+          </a:fillRef>
+          <a:effectRef idx="0">
+            <a:schemeClr val="accent1"/>
+          </a:effectRef>
+          <a:fontRef idx="minor">
+            <a:schemeClr val="tx1"/>
+          </a:fontRef>
+        </p:style>
+      </p:cxnSp>
+      <p:sp>
+        <p:nvSpPr>
+          <p:cNvPr id="52" name="Oval 51">
+            <a:extLst>
+              <a:ext uri="{FF2B5EF4-FFF2-40B4-BE49-F238E27FC236}">
+                <a16:creationId xmlns:a16="http://schemas.microsoft.com/office/drawing/2014/main" id="{E37BAF94-78EA-DF80-47DD-5071B8155089}"/>
+              </a:ext>
+            </a:extLst>
+          </p:cNvPr>
+          <p:cNvSpPr/>
+          <p:nvPr/>
+        </p:nvSpPr>
+        <p:spPr>
+          <a:xfrm>
+            <a:off x="3234374" y="559957"/>
+            <a:ext cx="390144" cy="390144"/>
+          </a:xfrm>
+          <a:prstGeom prst="ellipse">
+            <a:avLst/>
+          </a:prstGeom>
+        </p:spPr>
+        <p:style>
+          <a:lnRef idx="2">
+            <a:schemeClr val="accent1">
+              <a:shade val="15000"/>
+            </a:schemeClr>
+          </a:lnRef>
+          <a:fillRef idx="1">
+            <a:schemeClr val="accent1"/>
+          </a:fillRef>
+          <a:effectRef idx="0">
+            <a:schemeClr val="accent1"/>
+          </a:effectRef>
+          <a:fontRef idx="minor">
+            <a:schemeClr val="lt1"/>
+          </a:fontRef>
+        </p:style>
+        <p:txBody>
+          <a:bodyPr rtlCol="0" anchor="ctr"/>
+          <a:lstStyle/>
+          <a:p>
+            <a:pPr algn="ctr"/>
+            <a:r>
+              <a:rPr lang="en-US" dirty="0"/>
+              <a:t>5</a:t>
+            </a:r>
+          </a:p>
+        </p:txBody>
+      </p:sp>
+      <p:sp>
+        <p:nvSpPr>
+          <p:cNvPr id="53" name="Oval 52">
+            <a:extLst>
+              <a:ext uri="{FF2B5EF4-FFF2-40B4-BE49-F238E27FC236}">
+                <a16:creationId xmlns:a16="http://schemas.microsoft.com/office/drawing/2014/main" id="{D1738F57-9B8F-4632-C55F-A93651BCE3EC}"/>
+              </a:ext>
+            </a:extLst>
+          </p:cNvPr>
+          <p:cNvSpPr/>
+          <p:nvPr/>
+        </p:nvSpPr>
+        <p:spPr>
+          <a:xfrm>
+            <a:off x="2598472" y="1190071"/>
+            <a:ext cx="390144" cy="390144"/>
+          </a:xfrm>
+          <a:prstGeom prst="ellipse">
+            <a:avLst/>
+          </a:prstGeom>
+        </p:spPr>
+        <p:style>
+          <a:lnRef idx="2">
+            <a:schemeClr val="accent1">
+              <a:shade val="15000"/>
+            </a:schemeClr>
+          </a:lnRef>
+          <a:fillRef idx="1">
+            <a:schemeClr val="accent1"/>
+          </a:fillRef>
+          <a:effectRef idx="0">
+            <a:schemeClr val="accent1"/>
+          </a:effectRef>
+          <a:fontRef idx="minor">
+            <a:schemeClr val="lt1"/>
+          </a:fontRef>
+        </p:style>
+        <p:txBody>
+          <a:bodyPr rtlCol="0" anchor="ctr"/>
+          <a:lstStyle/>
+          <a:p>
+            <a:pPr algn="ctr"/>
+            <a:r>
+              <a:rPr lang="en-US" dirty="0"/>
+              <a:t>3</a:t>
+            </a:r>
+          </a:p>
+        </p:txBody>
+      </p:sp>
+      <p:sp>
+        <p:nvSpPr>
+          <p:cNvPr id="54" name="Oval 53">
+            <a:extLst>
+              <a:ext uri="{FF2B5EF4-FFF2-40B4-BE49-F238E27FC236}">
+                <a16:creationId xmlns:a16="http://schemas.microsoft.com/office/drawing/2014/main" id="{5BB7AAE3-CFBC-68CE-FF57-874CF1D72F19}"/>
+              </a:ext>
+            </a:extLst>
+          </p:cNvPr>
+          <p:cNvSpPr/>
+          <p:nvPr/>
+        </p:nvSpPr>
+        <p:spPr>
+          <a:xfrm>
+            <a:off x="1533102" y="3200048"/>
+            <a:ext cx="390144" cy="390144"/>
+          </a:xfrm>
+          <a:prstGeom prst="ellipse">
+            <a:avLst/>
+          </a:prstGeom>
+        </p:spPr>
+        <p:style>
+          <a:lnRef idx="2">
+            <a:schemeClr val="accent1">
+              <a:shade val="15000"/>
+            </a:schemeClr>
+          </a:lnRef>
+          <a:fillRef idx="1">
+            <a:schemeClr val="accent1"/>
+          </a:fillRef>
+          <a:effectRef idx="0">
+            <a:schemeClr val="accent1"/>
+          </a:effectRef>
+          <a:fontRef idx="minor">
+            <a:schemeClr val="lt1"/>
+          </a:fontRef>
+        </p:style>
+        <p:txBody>
+          <a:bodyPr rtlCol="0" anchor="ctr"/>
+          <a:lstStyle/>
+          <a:p>
+            <a:pPr algn="ctr"/>
+            <a:r>
+              <a:rPr lang="en-US" dirty="0"/>
+              <a:t>2</a:t>
+            </a:r>
+          </a:p>
+        </p:txBody>
+      </p:sp>
+      <p:sp>
+        <p:nvSpPr>
+          <p:cNvPr id="55" name="Oval 54">
+            <a:extLst>
+              <a:ext uri="{FF2B5EF4-FFF2-40B4-BE49-F238E27FC236}">
+                <a16:creationId xmlns:a16="http://schemas.microsoft.com/office/drawing/2014/main" id="{29804457-956C-4A75-EDB0-047B0AFC4F66}"/>
+              </a:ext>
+            </a:extLst>
+          </p:cNvPr>
+          <p:cNvSpPr/>
+          <p:nvPr/>
+        </p:nvSpPr>
+        <p:spPr>
+          <a:xfrm>
+            <a:off x="1338030" y="4489135"/>
+            <a:ext cx="390144" cy="390144"/>
+          </a:xfrm>
+          <a:prstGeom prst="ellipse">
+            <a:avLst/>
+          </a:prstGeom>
+        </p:spPr>
+        <p:style>
+          <a:lnRef idx="2">
+            <a:schemeClr val="accent1">
+              <a:shade val="15000"/>
+            </a:schemeClr>
+          </a:lnRef>
+          <a:fillRef idx="1">
+            <a:schemeClr val="accent1"/>
+          </a:fillRef>
+          <a:effectRef idx="0">
+            <a:schemeClr val="accent1"/>
+          </a:effectRef>
+          <a:fontRef idx="minor">
+            <a:schemeClr val="lt1"/>
+          </a:fontRef>
+        </p:style>
+        <p:txBody>
+          <a:bodyPr rtlCol="0" anchor="ctr"/>
+          <a:lstStyle/>
+          <a:p>
+            <a:pPr algn="ctr"/>
+            <a:r>
+              <a:rPr lang="en-US" dirty="0"/>
+              <a:t>1</a:t>
+            </a:r>
+          </a:p>
+        </p:txBody>
+      </p:sp>
+      <p:sp>
+        <p:nvSpPr>
+          <p:cNvPr id="56" name="Oval 55">
+            <a:extLst>
+              <a:ext uri="{FF2B5EF4-FFF2-40B4-BE49-F238E27FC236}">
+                <a16:creationId xmlns:a16="http://schemas.microsoft.com/office/drawing/2014/main" id="{79E6B0EB-89FB-E266-027C-B4646D40CCB8}"/>
+              </a:ext>
+            </a:extLst>
+          </p:cNvPr>
+          <p:cNvSpPr/>
+          <p:nvPr/>
+        </p:nvSpPr>
+        <p:spPr>
+          <a:xfrm>
+            <a:off x="4251349" y="2548359"/>
+            <a:ext cx="390144" cy="390144"/>
+          </a:xfrm>
+          <a:prstGeom prst="ellipse">
+            <a:avLst/>
+          </a:prstGeom>
+        </p:spPr>
+        <p:style>
+          <a:lnRef idx="2">
+            <a:schemeClr val="accent1">
+              <a:shade val="15000"/>
+            </a:schemeClr>
+          </a:lnRef>
+          <a:fillRef idx="1">
+            <a:schemeClr val="accent1"/>
+          </a:fillRef>
+          <a:effectRef idx="0">
+            <a:schemeClr val="accent1"/>
+          </a:effectRef>
+          <a:fontRef idx="minor">
+            <a:schemeClr val="lt1"/>
+          </a:fontRef>
+        </p:style>
+        <p:txBody>
+          <a:bodyPr rtlCol="0" anchor="ctr"/>
+          <a:lstStyle/>
+          <a:p>
+            <a:pPr algn="ctr"/>
+            <a:r>
+              <a:rPr lang="en-US" dirty="0"/>
+              <a:t>4</a:t>
             </a:r>
           </a:p>
         </p:txBody>

</xml_diff>

<commit_message>
Lot of files. Mar 25
</commit_message>
<xml_diff>
--- a/general-tech-figures.pptx
+++ b/general-tech-figures.pptx
@@ -14,6 +14,9 @@
     <p:sldId id="262" r:id="rId8"/>
     <p:sldId id="263" r:id="rId9"/>
     <p:sldId id="264" r:id="rId10"/>
+    <p:sldId id="265" r:id="rId11"/>
+    <p:sldId id="266" r:id="rId12"/>
+    <p:sldId id="267" r:id="rId13"/>
   </p:sldIdLst>
   <p:sldSz cx="6858000" cy="9144000" type="letter"/>
   <p:notesSz cx="6858000" cy="9144000"/>
@@ -262,7 +265,7 @@
           <a:p>
             <a:fld id="{BFBBFCFE-809B-4AE5-92DC-0D51595F6FEA}" type="datetimeFigureOut">
               <a:rPr lang="en-US" smtClean="0"/>
-              <a:t>9/19/2024</a:t>
+              <a:t>3/7/2025</a:t>
             </a:fld>
             <a:endParaRPr lang="en-US"/>
           </a:p>
@@ -432,7 +435,7 @@
           <a:p>
             <a:fld id="{BFBBFCFE-809B-4AE5-92DC-0D51595F6FEA}" type="datetimeFigureOut">
               <a:rPr lang="en-US" smtClean="0"/>
-              <a:t>9/19/2024</a:t>
+              <a:t>3/7/2025</a:t>
             </a:fld>
             <a:endParaRPr lang="en-US"/>
           </a:p>
@@ -612,7 +615,7 @@
           <a:p>
             <a:fld id="{BFBBFCFE-809B-4AE5-92DC-0D51595F6FEA}" type="datetimeFigureOut">
               <a:rPr lang="en-US" smtClean="0"/>
-              <a:t>9/19/2024</a:t>
+              <a:t>3/7/2025</a:t>
             </a:fld>
             <a:endParaRPr lang="en-US"/>
           </a:p>
@@ -782,7 +785,7 @@
           <a:p>
             <a:fld id="{BFBBFCFE-809B-4AE5-92DC-0D51595F6FEA}" type="datetimeFigureOut">
               <a:rPr lang="en-US" smtClean="0"/>
-              <a:t>9/19/2024</a:t>
+              <a:t>3/7/2025</a:t>
             </a:fld>
             <a:endParaRPr lang="en-US"/>
           </a:p>
@@ -1026,7 +1029,7 @@
           <a:p>
             <a:fld id="{BFBBFCFE-809B-4AE5-92DC-0D51595F6FEA}" type="datetimeFigureOut">
               <a:rPr lang="en-US" smtClean="0"/>
-              <a:t>9/19/2024</a:t>
+              <a:t>3/7/2025</a:t>
             </a:fld>
             <a:endParaRPr lang="en-US"/>
           </a:p>
@@ -1258,7 +1261,7 @@
           <a:p>
             <a:fld id="{BFBBFCFE-809B-4AE5-92DC-0D51595F6FEA}" type="datetimeFigureOut">
               <a:rPr lang="en-US" smtClean="0"/>
-              <a:t>9/19/2024</a:t>
+              <a:t>3/7/2025</a:t>
             </a:fld>
             <a:endParaRPr lang="en-US"/>
           </a:p>
@@ -1625,7 +1628,7 @@
           <a:p>
             <a:fld id="{BFBBFCFE-809B-4AE5-92DC-0D51595F6FEA}" type="datetimeFigureOut">
               <a:rPr lang="en-US" smtClean="0"/>
-              <a:t>9/19/2024</a:t>
+              <a:t>3/7/2025</a:t>
             </a:fld>
             <a:endParaRPr lang="en-US"/>
           </a:p>
@@ -1743,7 +1746,7 @@
           <a:p>
             <a:fld id="{BFBBFCFE-809B-4AE5-92DC-0D51595F6FEA}" type="datetimeFigureOut">
               <a:rPr lang="en-US" smtClean="0"/>
-              <a:t>9/19/2024</a:t>
+              <a:t>3/7/2025</a:t>
             </a:fld>
             <a:endParaRPr lang="en-US"/>
           </a:p>
@@ -1838,7 +1841,7 @@
           <a:p>
             <a:fld id="{BFBBFCFE-809B-4AE5-92DC-0D51595F6FEA}" type="datetimeFigureOut">
               <a:rPr lang="en-US" smtClean="0"/>
-              <a:t>9/19/2024</a:t>
+              <a:t>3/7/2025</a:t>
             </a:fld>
             <a:endParaRPr lang="en-US"/>
           </a:p>
@@ -2115,7 +2118,7 @@
           <a:p>
             <a:fld id="{BFBBFCFE-809B-4AE5-92DC-0D51595F6FEA}" type="datetimeFigureOut">
               <a:rPr lang="en-US" smtClean="0"/>
-              <a:t>9/19/2024</a:t>
+              <a:t>3/7/2025</a:t>
             </a:fld>
             <a:endParaRPr lang="en-US"/>
           </a:p>
@@ -2372,7 +2375,7 @@
           <a:p>
             <a:fld id="{BFBBFCFE-809B-4AE5-92DC-0D51595F6FEA}" type="datetimeFigureOut">
               <a:rPr lang="en-US" smtClean="0"/>
-              <a:t>9/19/2024</a:t>
+              <a:t>3/7/2025</a:t>
             </a:fld>
             <a:endParaRPr lang="en-US"/>
           </a:p>
@@ -2585,7 +2588,7 @@
           <a:p>
             <a:fld id="{BFBBFCFE-809B-4AE5-92DC-0D51595F6FEA}" type="datetimeFigureOut">
               <a:rPr lang="en-US" smtClean="0"/>
-              <a:t>9/19/2024</a:t>
+              <a:t>3/7/2025</a:t>
             </a:fld>
             <a:endParaRPr lang="en-US"/>
           </a:p>
@@ -4569,6 +4572,4449 @@
 </p:sld>
 </file>
 
+<file path=ppt/slides/slide10.xml><?xml version="1.0" encoding="utf-8"?>
+<p:sld xmlns:a="http://schemas.openxmlformats.org/drawingml/2006/main" xmlns:r="http://schemas.openxmlformats.org/officeDocument/2006/relationships" xmlns:p="http://schemas.openxmlformats.org/presentationml/2006/main">
+  <p:cSld>
+    <p:spTree>
+      <p:nvGrpSpPr>
+        <p:cNvPr id="1" name="">
+          <a:extLst>
+            <a:ext uri="{FF2B5EF4-FFF2-40B4-BE49-F238E27FC236}">
+              <a16:creationId xmlns:a16="http://schemas.microsoft.com/office/drawing/2014/main" id="{8FCDAC28-FA91-ADAB-20DA-CFCEE63067F4}"/>
+            </a:ext>
+          </a:extLst>
+        </p:cNvPr>
+        <p:cNvGrpSpPr/>
+        <p:nvPr/>
+      </p:nvGrpSpPr>
+      <p:grpSpPr>
+        <a:xfrm>
+          <a:off x="0" y="0"/>
+          <a:ext cx="0" cy="0"/>
+          <a:chOff x="0" y="0"/>
+          <a:chExt cx="0" cy="0"/>
+        </a:xfrm>
+      </p:grpSpPr>
+      <p:grpSp>
+        <p:nvGrpSpPr>
+          <p:cNvPr id="34" name="Group 33">
+            <a:extLst>
+              <a:ext uri="{FF2B5EF4-FFF2-40B4-BE49-F238E27FC236}">
+                <a16:creationId xmlns:a16="http://schemas.microsoft.com/office/drawing/2014/main" id="{1DDA5644-4221-6D2E-037C-B224B593A4FF}"/>
+              </a:ext>
+            </a:extLst>
+          </p:cNvPr>
+          <p:cNvGrpSpPr/>
+          <p:nvPr/>
+        </p:nvGrpSpPr>
+        <p:grpSpPr>
+          <a:xfrm>
+            <a:off x="432843" y="1741551"/>
+            <a:ext cx="6131730" cy="3935918"/>
+            <a:chOff x="432843" y="1741551"/>
+            <a:chExt cx="6131730" cy="3935918"/>
+          </a:xfrm>
+        </p:grpSpPr>
+        <p:sp>
+          <p:nvSpPr>
+            <p:cNvPr id="3" name="Rectangle: Rounded Corners 2">
+              <a:extLst>
+                <a:ext uri="{FF2B5EF4-FFF2-40B4-BE49-F238E27FC236}">
+                  <a16:creationId xmlns:a16="http://schemas.microsoft.com/office/drawing/2014/main" id="{A3F643CB-BA3F-F4DF-AE48-A8B54EA4A26F}"/>
+                </a:ext>
+              </a:extLst>
+            </p:cNvPr>
+            <p:cNvSpPr/>
+            <p:nvPr/>
+          </p:nvSpPr>
+          <p:spPr>
+            <a:xfrm>
+              <a:off x="706651" y="2831911"/>
+              <a:ext cx="1545230" cy="825690"/>
+            </a:xfrm>
+            <a:prstGeom prst="roundRect">
+              <a:avLst/>
+            </a:prstGeom>
+            <a:noFill/>
+          </p:spPr>
+          <p:style>
+            <a:lnRef idx="2">
+              <a:schemeClr val="accent1">
+                <a:shade val="15000"/>
+              </a:schemeClr>
+            </a:lnRef>
+            <a:fillRef idx="1">
+              <a:schemeClr val="accent1"/>
+            </a:fillRef>
+            <a:effectRef idx="0">
+              <a:schemeClr val="accent1"/>
+            </a:effectRef>
+            <a:fontRef idx="minor">
+              <a:schemeClr val="lt1"/>
+            </a:fontRef>
+          </p:style>
+          <p:txBody>
+            <a:bodyPr rtlCol="0" anchor="ctr"/>
+            <a:lstStyle/>
+            <a:p>
+              <a:pPr algn="ctr"/>
+              <a:r>
+                <a:rPr lang="en-US" sz="1400" dirty="0">
+                  <a:solidFill>
+                    <a:schemeClr val="tx1"/>
+                  </a:solidFill>
+                </a:rPr>
+                <a:t>Crew AI Agents</a:t>
+              </a:r>
+            </a:p>
+            <a:p>
+              <a:pPr algn="ctr"/>
+              <a:r>
+                <a:rPr lang="en-US" sz="1400" dirty="0">
+                  <a:solidFill>
+                    <a:schemeClr val="tx1"/>
+                  </a:solidFill>
+                </a:rPr>
+                <a:t>.</a:t>
+              </a:r>
+              <a:r>
+                <a:rPr lang="en-US" sz="1400" dirty="0" err="1">
+                  <a:solidFill>
+                    <a:schemeClr val="tx1"/>
+                  </a:solidFill>
+                </a:rPr>
+                <a:t>py</a:t>
+              </a:r>
+              <a:r>
+                <a:rPr lang="en-US" sz="1400" dirty="0">
+                  <a:solidFill>
+                    <a:schemeClr val="tx1"/>
+                  </a:solidFill>
+                </a:rPr>
+                <a:t> file</a:t>
+              </a:r>
+            </a:p>
+            <a:p>
+              <a:pPr algn="ctr"/>
+              <a:r>
+                <a:rPr lang="en-US" sz="1400" dirty="0">
+                  <a:solidFill>
+                    <a:schemeClr val="tx1"/>
+                  </a:solidFill>
+                </a:rPr>
+                <a:t>In </a:t>
+              </a:r>
+              <a:r>
+                <a:rPr lang="en-US" sz="1400" dirty="0" err="1">
+                  <a:solidFill>
+                    <a:schemeClr val="tx1"/>
+                  </a:solidFill>
+                </a:rPr>
+                <a:t>github</a:t>
+              </a:r>
+              <a:endParaRPr lang="en-US" sz="1400" dirty="0">
+                <a:solidFill>
+                  <a:schemeClr val="tx1"/>
+                </a:solidFill>
+              </a:endParaRPr>
+            </a:p>
+          </p:txBody>
+        </p:sp>
+        <p:sp>
+          <p:nvSpPr>
+            <p:cNvPr id="4" name="Rectangle: Rounded Corners 3">
+              <a:extLst>
+                <a:ext uri="{FF2B5EF4-FFF2-40B4-BE49-F238E27FC236}">
+                  <a16:creationId xmlns:a16="http://schemas.microsoft.com/office/drawing/2014/main" id="{A2321DB9-EE6F-869D-3479-D8CA40C36E34}"/>
+                </a:ext>
+              </a:extLst>
+            </p:cNvPr>
+            <p:cNvSpPr/>
+            <p:nvPr/>
+          </p:nvSpPr>
+          <p:spPr>
+            <a:xfrm>
+              <a:off x="706651" y="4305869"/>
+              <a:ext cx="1545230" cy="825690"/>
+            </a:xfrm>
+            <a:prstGeom prst="roundRect">
+              <a:avLst/>
+            </a:prstGeom>
+            <a:noFill/>
+          </p:spPr>
+          <p:style>
+            <a:lnRef idx="2">
+              <a:schemeClr val="accent1">
+                <a:shade val="15000"/>
+              </a:schemeClr>
+            </a:lnRef>
+            <a:fillRef idx="1">
+              <a:schemeClr val="accent1"/>
+            </a:fillRef>
+            <a:effectRef idx="0">
+              <a:schemeClr val="accent1"/>
+            </a:effectRef>
+            <a:fontRef idx="minor">
+              <a:schemeClr val="lt1"/>
+            </a:fontRef>
+          </p:style>
+          <p:txBody>
+            <a:bodyPr rtlCol="0" anchor="ctr"/>
+            <a:lstStyle/>
+            <a:p>
+              <a:pPr algn="ctr"/>
+              <a:r>
+                <a:rPr lang="en-US" sz="1400" dirty="0">
+                  <a:solidFill>
+                    <a:schemeClr val="tx1"/>
+                  </a:solidFill>
+                </a:rPr>
+                <a:t>Prompt/Rules</a:t>
+              </a:r>
+            </a:p>
+            <a:p>
+              <a:pPr algn="ctr"/>
+              <a:r>
+                <a:rPr lang="en-US" sz="1400" dirty="0">
+                  <a:solidFill>
+                    <a:schemeClr val="tx1"/>
+                  </a:solidFill>
+                </a:rPr>
+                <a:t>.md file</a:t>
+              </a:r>
+            </a:p>
+            <a:p>
+              <a:pPr algn="ctr"/>
+              <a:r>
+                <a:rPr lang="en-US" sz="1400" dirty="0">
+                  <a:solidFill>
+                    <a:schemeClr val="tx1"/>
+                  </a:solidFill>
+                </a:rPr>
+                <a:t>In </a:t>
+              </a:r>
+              <a:r>
+                <a:rPr lang="en-US" sz="1400" dirty="0" err="1">
+                  <a:solidFill>
+                    <a:schemeClr val="tx1"/>
+                  </a:solidFill>
+                </a:rPr>
+                <a:t>github</a:t>
+              </a:r>
+              <a:endParaRPr lang="en-US" sz="1400" dirty="0">
+                <a:solidFill>
+                  <a:schemeClr val="tx1"/>
+                </a:solidFill>
+              </a:endParaRPr>
+            </a:p>
+          </p:txBody>
+        </p:sp>
+        <p:sp>
+          <p:nvSpPr>
+            <p:cNvPr id="5" name="Rectangle 4">
+              <a:extLst>
+                <a:ext uri="{FF2B5EF4-FFF2-40B4-BE49-F238E27FC236}">
+                  <a16:creationId xmlns:a16="http://schemas.microsoft.com/office/drawing/2014/main" id="{89D2F6B1-DD8A-1E79-5D9C-AE84FD1E0F30}"/>
+                </a:ext>
+              </a:extLst>
+            </p:cNvPr>
+            <p:cNvSpPr/>
+            <p:nvPr/>
+          </p:nvSpPr>
+          <p:spPr>
+            <a:xfrm>
+              <a:off x="2815307" y="3493831"/>
+              <a:ext cx="1227386" cy="846159"/>
+            </a:xfrm>
+            <a:prstGeom prst="rect">
+              <a:avLst/>
+            </a:prstGeom>
+            <a:noFill/>
+          </p:spPr>
+          <p:style>
+            <a:lnRef idx="2">
+              <a:schemeClr val="accent1">
+                <a:shade val="15000"/>
+              </a:schemeClr>
+            </a:lnRef>
+            <a:fillRef idx="1">
+              <a:schemeClr val="accent1"/>
+            </a:fillRef>
+            <a:effectRef idx="0">
+              <a:schemeClr val="accent1"/>
+            </a:effectRef>
+            <a:fontRef idx="minor">
+              <a:schemeClr val="lt1"/>
+            </a:fontRef>
+          </p:style>
+          <p:txBody>
+            <a:bodyPr rtlCol="0" anchor="ctr"/>
+            <a:lstStyle/>
+            <a:p>
+              <a:pPr algn="ctr"/>
+              <a:r>
+                <a:rPr lang="en-US" sz="1050" dirty="0">
+                  <a:solidFill>
+                    <a:schemeClr val="tx1"/>
+                  </a:solidFill>
+                </a:rPr>
+                <a:t>ChatGPT</a:t>
+              </a:r>
+            </a:p>
+            <a:p>
+              <a:pPr algn="ctr"/>
+              <a:r>
+                <a:rPr lang="en-US" sz="1050" dirty="0">
+                  <a:solidFill>
+                    <a:schemeClr val="tx1"/>
+                  </a:solidFill>
+                </a:rPr>
+                <a:t>with</a:t>
+              </a:r>
+            </a:p>
+            <a:p>
+              <a:pPr algn="ctr"/>
+              <a:r>
+                <a:rPr lang="en-US" sz="1050" dirty="0">
+                  <a:solidFill>
+                    <a:schemeClr val="tx1"/>
+                  </a:solidFill>
+                </a:rPr>
+                <a:t>Canvas</a:t>
+              </a:r>
+            </a:p>
+          </p:txBody>
+        </p:sp>
+        <p:cxnSp>
+          <p:nvCxnSpPr>
+            <p:cNvPr id="7" name="Connector: Elbow 6">
+              <a:extLst>
+                <a:ext uri="{FF2B5EF4-FFF2-40B4-BE49-F238E27FC236}">
+                  <a16:creationId xmlns:a16="http://schemas.microsoft.com/office/drawing/2014/main" id="{D37AA627-FF41-3FB6-257F-A5909A3D5269}"/>
+                </a:ext>
+              </a:extLst>
+            </p:cNvPr>
+            <p:cNvCxnSpPr>
+              <a:cxnSpLocks/>
+              <a:stCxn id="3" idx="3"/>
+              <a:endCxn id="5" idx="1"/>
+            </p:cNvCxnSpPr>
+            <p:nvPr/>
+          </p:nvCxnSpPr>
+          <p:spPr>
+            <a:xfrm>
+              <a:off x="2251881" y="3244756"/>
+              <a:ext cx="563426" cy="672155"/>
+            </a:xfrm>
+            <a:prstGeom prst="bentConnector3">
+              <a:avLst>
+                <a:gd name="adj1" fmla="val 50000"/>
+              </a:avLst>
+            </a:prstGeom>
+            <a:ln>
+              <a:tailEnd type="triangle"/>
+            </a:ln>
+          </p:spPr>
+          <p:style>
+            <a:lnRef idx="1">
+              <a:schemeClr val="accent1"/>
+            </a:lnRef>
+            <a:fillRef idx="0">
+              <a:schemeClr val="accent1"/>
+            </a:fillRef>
+            <a:effectRef idx="0">
+              <a:schemeClr val="accent1"/>
+            </a:effectRef>
+            <a:fontRef idx="minor">
+              <a:schemeClr val="tx1"/>
+            </a:fontRef>
+          </p:style>
+        </p:cxnSp>
+        <p:cxnSp>
+          <p:nvCxnSpPr>
+            <p:cNvPr id="15" name="Connector: Elbow 14">
+              <a:extLst>
+                <a:ext uri="{FF2B5EF4-FFF2-40B4-BE49-F238E27FC236}">
+                  <a16:creationId xmlns:a16="http://schemas.microsoft.com/office/drawing/2014/main" id="{18A959E5-15E3-D1BB-5058-BD631AF63935}"/>
+                </a:ext>
+              </a:extLst>
+            </p:cNvPr>
+            <p:cNvCxnSpPr>
+              <a:cxnSpLocks/>
+              <a:stCxn id="4" idx="3"/>
+              <a:endCxn id="5" idx="1"/>
+            </p:cNvCxnSpPr>
+            <p:nvPr/>
+          </p:nvCxnSpPr>
+          <p:spPr>
+            <a:xfrm flipV="1">
+              <a:off x="2251881" y="3916911"/>
+              <a:ext cx="563426" cy="801803"/>
+            </a:xfrm>
+            <a:prstGeom prst="bentConnector3">
+              <a:avLst>
+                <a:gd name="adj1" fmla="val 50000"/>
+              </a:avLst>
+            </a:prstGeom>
+            <a:ln>
+              <a:tailEnd type="triangle"/>
+            </a:ln>
+          </p:spPr>
+          <p:style>
+            <a:lnRef idx="1">
+              <a:schemeClr val="accent1"/>
+            </a:lnRef>
+            <a:fillRef idx="0">
+              <a:schemeClr val="accent1"/>
+            </a:fillRef>
+            <a:effectRef idx="0">
+              <a:schemeClr val="accent1"/>
+            </a:effectRef>
+            <a:fontRef idx="minor">
+              <a:schemeClr val="tx1"/>
+            </a:fontRef>
+          </p:style>
+        </p:cxnSp>
+        <p:sp>
+          <p:nvSpPr>
+            <p:cNvPr id="22" name="Rectangle: Rounded Corners 21">
+              <a:extLst>
+                <a:ext uri="{FF2B5EF4-FFF2-40B4-BE49-F238E27FC236}">
+                  <a16:creationId xmlns:a16="http://schemas.microsoft.com/office/drawing/2014/main" id="{38C8916C-6466-D338-8100-8D58BCB73E11}"/>
+                </a:ext>
+              </a:extLst>
+            </p:cNvPr>
+            <p:cNvSpPr/>
+            <p:nvPr/>
+          </p:nvSpPr>
+          <p:spPr>
+            <a:xfrm>
+              <a:off x="4715796" y="3493827"/>
+              <a:ext cx="1545230" cy="825690"/>
+            </a:xfrm>
+            <a:prstGeom prst="roundRect">
+              <a:avLst/>
+            </a:prstGeom>
+            <a:noFill/>
+          </p:spPr>
+          <p:style>
+            <a:lnRef idx="2">
+              <a:schemeClr val="accent1">
+                <a:shade val="15000"/>
+              </a:schemeClr>
+            </a:lnRef>
+            <a:fillRef idx="1">
+              <a:schemeClr val="accent1"/>
+            </a:fillRef>
+            <a:effectRef idx="0">
+              <a:schemeClr val="accent1"/>
+            </a:effectRef>
+            <a:fontRef idx="minor">
+              <a:schemeClr val="lt1"/>
+            </a:fontRef>
+          </p:style>
+          <p:txBody>
+            <a:bodyPr rtlCol="0" anchor="ctr"/>
+            <a:lstStyle/>
+            <a:p>
+              <a:pPr algn="ctr"/>
+              <a:r>
+                <a:rPr lang="en-US" sz="1400" dirty="0">
+                  <a:solidFill>
+                    <a:schemeClr val="tx1"/>
+                  </a:solidFill>
+                </a:rPr>
+                <a:t>Agentic English</a:t>
+              </a:r>
+            </a:p>
+            <a:p>
+              <a:pPr algn="ctr"/>
+              <a:r>
+                <a:rPr lang="en-US" sz="1400" dirty="0">
+                  <a:solidFill>
+                    <a:schemeClr val="tx1"/>
+                  </a:solidFill>
+                </a:rPr>
+                <a:t>.md file</a:t>
+              </a:r>
+            </a:p>
+            <a:p>
+              <a:pPr algn="ctr"/>
+              <a:r>
+                <a:rPr lang="en-US" sz="1400" dirty="0">
+                  <a:solidFill>
+                    <a:schemeClr val="tx1"/>
+                  </a:solidFill>
+                </a:rPr>
+                <a:t>In </a:t>
+              </a:r>
+              <a:r>
+                <a:rPr lang="en-US" sz="1400" dirty="0" err="1">
+                  <a:solidFill>
+                    <a:schemeClr val="tx1"/>
+                  </a:solidFill>
+                </a:rPr>
+                <a:t>github</a:t>
+              </a:r>
+              <a:endParaRPr lang="en-US" sz="1400" dirty="0">
+                <a:solidFill>
+                  <a:schemeClr val="tx1"/>
+                </a:solidFill>
+              </a:endParaRPr>
+            </a:p>
+          </p:txBody>
+        </p:sp>
+        <p:cxnSp>
+          <p:nvCxnSpPr>
+            <p:cNvPr id="24" name="Straight Arrow Connector 23">
+              <a:extLst>
+                <a:ext uri="{FF2B5EF4-FFF2-40B4-BE49-F238E27FC236}">
+                  <a16:creationId xmlns:a16="http://schemas.microsoft.com/office/drawing/2014/main" id="{620586F9-1E47-B66E-86C9-83935EC4123D}"/>
+                </a:ext>
+              </a:extLst>
+            </p:cNvPr>
+            <p:cNvCxnSpPr>
+              <a:cxnSpLocks/>
+              <a:stCxn id="5" idx="3"/>
+              <a:endCxn id="22" idx="1"/>
+            </p:cNvCxnSpPr>
+            <p:nvPr/>
+          </p:nvCxnSpPr>
+          <p:spPr>
+            <a:xfrm flipV="1">
+              <a:off x="4042693" y="3906672"/>
+              <a:ext cx="673103" cy="10239"/>
+            </a:xfrm>
+            <a:prstGeom prst="straightConnector1">
+              <a:avLst/>
+            </a:prstGeom>
+            <a:ln>
+              <a:tailEnd type="triangle"/>
+            </a:ln>
+          </p:spPr>
+          <p:style>
+            <a:lnRef idx="1">
+              <a:schemeClr val="accent1"/>
+            </a:lnRef>
+            <a:fillRef idx="0">
+              <a:schemeClr val="accent1"/>
+            </a:fillRef>
+            <a:effectRef idx="0">
+              <a:schemeClr val="accent1"/>
+            </a:effectRef>
+            <a:fontRef idx="minor">
+              <a:schemeClr val="tx1"/>
+            </a:fontRef>
+          </p:style>
+        </p:cxnSp>
+        <p:sp>
+          <p:nvSpPr>
+            <p:cNvPr id="29" name="TextBox 28">
+              <a:extLst>
+                <a:ext uri="{FF2B5EF4-FFF2-40B4-BE49-F238E27FC236}">
+                  <a16:creationId xmlns:a16="http://schemas.microsoft.com/office/drawing/2014/main" id="{F50BB485-54D0-7C14-526D-E46780EAD5AA}"/>
+                </a:ext>
+              </a:extLst>
+            </p:cNvPr>
+            <p:cNvSpPr txBox="1"/>
+            <p:nvPr/>
+          </p:nvSpPr>
+          <p:spPr>
+            <a:xfrm flipH="1">
+              <a:off x="1115948" y="1858178"/>
+              <a:ext cx="4626103" cy="584775"/>
+            </a:xfrm>
+            <a:prstGeom prst="rect">
+              <a:avLst/>
+            </a:prstGeom>
+            <a:noFill/>
+          </p:spPr>
+          <p:txBody>
+            <a:bodyPr wrap="square" rtlCol="0">
+              <a:spAutoFit/>
+            </a:bodyPr>
+            <a:lstStyle/>
+            <a:p>
+              <a:pPr algn="ctr"/>
+              <a:r>
+                <a:rPr lang="en-US" sz="1600" dirty="0"/>
+                <a:t>Extracting English from Python files</a:t>
+              </a:r>
+            </a:p>
+            <a:p>
+              <a:pPr algn="ctr"/>
+              <a:r>
+                <a:rPr lang="en-US" sz="1600" dirty="0"/>
+                <a:t>Github and ChatGPT Canvas</a:t>
+              </a:r>
+            </a:p>
+          </p:txBody>
+        </p:sp>
+        <p:sp>
+          <p:nvSpPr>
+            <p:cNvPr id="30" name="TextBox 29">
+              <a:extLst>
+                <a:ext uri="{FF2B5EF4-FFF2-40B4-BE49-F238E27FC236}">
+                  <a16:creationId xmlns:a16="http://schemas.microsoft.com/office/drawing/2014/main" id="{66BC5C15-0B82-AD75-5861-A017C0ED2676}"/>
+                </a:ext>
+              </a:extLst>
+            </p:cNvPr>
+            <p:cNvSpPr txBox="1"/>
+            <p:nvPr/>
+          </p:nvSpPr>
+          <p:spPr>
+            <a:xfrm flipH="1">
+              <a:off x="706651" y="2466483"/>
+              <a:ext cx="1539869" cy="307777"/>
+            </a:xfrm>
+            <a:prstGeom prst="rect">
+              <a:avLst/>
+            </a:prstGeom>
+            <a:noFill/>
+          </p:spPr>
+          <p:txBody>
+            <a:bodyPr wrap="square" rtlCol="0">
+              <a:spAutoFit/>
+            </a:bodyPr>
+            <a:lstStyle/>
+            <a:p>
+              <a:pPr algn="ctr"/>
+              <a:r>
+                <a:rPr lang="en-US" sz="1400" b="1" dirty="0"/>
+                <a:t>Public URL 1</a:t>
+              </a:r>
+            </a:p>
+          </p:txBody>
+        </p:sp>
+        <p:sp>
+          <p:nvSpPr>
+            <p:cNvPr id="31" name="TextBox 30">
+              <a:extLst>
+                <a:ext uri="{FF2B5EF4-FFF2-40B4-BE49-F238E27FC236}">
+                  <a16:creationId xmlns:a16="http://schemas.microsoft.com/office/drawing/2014/main" id="{AF08BD7B-C5D8-8B74-0C27-BE5D739334EA}"/>
+                </a:ext>
+              </a:extLst>
+            </p:cNvPr>
+            <p:cNvSpPr txBox="1"/>
+            <p:nvPr/>
+          </p:nvSpPr>
+          <p:spPr>
+            <a:xfrm flipH="1">
+              <a:off x="706651" y="5267684"/>
+              <a:ext cx="1539869" cy="307777"/>
+            </a:xfrm>
+            <a:prstGeom prst="rect">
+              <a:avLst/>
+            </a:prstGeom>
+            <a:noFill/>
+          </p:spPr>
+          <p:txBody>
+            <a:bodyPr wrap="square" rtlCol="0">
+              <a:spAutoFit/>
+            </a:bodyPr>
+            <a:lstStyle>
+              <a:defPPr>
+                <a:defRPr lang="en-US"/>
+              </a:defPPr>
+              <a:lvl1pPr algn="ctr">
+                <a:defRPr sz="1400" b="1"/>
+              </a:lvl1pPr>
+            </a:lstStyle>
+            <a:p>
+              <a:r>
+                <a:rPr lang="en-US" dirty="0"/>
+                <a:t>Public URL 2</a:t>
+              </a:r>
+            </a:p>
+          </p:txBody>
+        </p:sp>
+        <p:sp>
+          <p:nvSpPr>
+            <p:cNvPr id="33" name="Rectangle 32">
+              <a:extLst>
+                <a:ext uri="{FF2B5EF4-FFF2-40B4-BE49-F238E27FC236}">
+                  <a16:creationId xmlns:a16="http://schemas.microsoft.com/office/drawing/2014/main" id="{78A06EAA-FB41-0DBE-26AC-D679DC596A48}"/>
+                </a:ext>
+              </a:extLst>
+            </p:cNvPr>
+            <p:cNvSpPr/>
+            <p:nvPr/>
+          </p:nvSpPr>
+          <p:spPr>
+            <a:xfrm>
+              <a:off x="432843" y="1741551"/>
+              <a:ext cx="6131730" cy="3935918"/>
+            </a:xfrm>
+            <a:prstGeom prst="rect">
+              <a:avLst/>
+            </a:prstGeom>
+            <a:noFill/>
+          </p:spPr>
+          <p:style>
+            <a:lnRef idx="2">
+              <a:schemeClr val="accent1">
+                <a:shade val="15000"/>
+              </a:schemeClr>
+            </a:lnRef>
+            <a:fillRef idx="1">
+              <a:schemeClr val="accent1"/>
+            </a:fillRef>
+            <a:effectRef idx="0">
+              <a:schemeClr val="accent1"/>
+            </a:effectRef>
+            <a:fontRef idx="minor">
+              <a:schemeClr val="lt1"/>
+            </a:fontRef>
+          </p:style>
+          <p:txBody>
+            <a:bodyPr rtlCol="0" anchor="ctr"/>
+            <a:lstStyle/>
+            <a:p>
+              <a:pPr algn="ctr"/>
+              <a:endParaRPr lang="en-US" sz="1400" dirty="0">
+                <a:solidFill>
+                  <a:schemeClr val="tx1"/>
+                </a:solidFill>
+              </a:endParaRPr>
+            </a:p>
+          </p:txBody>
+        </p:sp>
+      </p:grpSp>
+    </p:spTree>
+    <p:extLst>
+      <p:ext uri="{BB962C8B-B14F-4D97-AF65-F5344CB8AC3E}">
+        <p14:creationId xmlns:p14="http://schemas.microsoft.com/office/powerpoint/2010/main" val="184519413"/>
+      </p:ext>
+    </p:extLst>
+  </p:cSld>
+  <p:clrMapOvr>
+    <a:masterClrMapping/>
+  </p:clrMapOvr>
+</p:sld>
+</file>
+
+<file path=ppt/slides/slide11.xml><?xml version="1.0" encoding="utf-8"?>
+<p:sld xmlns:a="http://schemas.openxmlformats.org/drawingml/2006/main" xmlns:r="http://schemas.openxmlformats.org/officeDocument/2006/relationships" xmlns:p="http://schemas.openxmlformats.org/presentationml/2006/main">
+  <p:cSld>
+    <p:spTree>
+      <p:nvGrpSpPr>
+        <p:cNvPr id="1" name="">
+          <a:extLst>
+            <a:ext uri="{FF2B5EF4-FFF2-40B4-BE49-F238E27FC236}">
+              <a16:creationId xmlns:a16="http://schemas.microsoft.com/office/drawing/2014/main" id="{8FCDAC28-FA91-ADAB-20DA-CFCEE63067F4}"/>
+            </a:ext>
+          </a:extLst>
+        </p:cNvPr>
+        <p:cNvGrpSpPr/>
+        <p:nvPr/>
+      </p:nvGrpSpPr>
+      <p:grpSpPr>
+        <a:xfrm>
+          <a:off x="0" y="0"/>
+          <a:ext cx="0" cy="0"/>
+          <a:chOff x="0" y="0"/>
+          <a:chExt cx="0" cy="0"/>
+        </a:xfrm>
+      </p:grpSpPr>
+      <p:grpSp>
+        <p:nvGrpSpPr>
+          <p:cNvPr id="50" name="Group 49">
+            <a:extLst>
+              <a:ext uri="{FF2B5EF4-FFF2-40B4-BE49-F238E27FC236}">
+                <a16:creationId xmlns:a16="http://schemas.microsoft.com/office/drawing/2014/main" id="{28FEC9E3-FEC4-013E-5022-C21A06A718FB}"/>
+              </a:ext>
+            </a:extLst>
+          </p:cNvPr>
+          <p:cNvGrpSpPr/>
+          <p:nvPr/>
+        </p:nvGrpSpPr>
+        <p:grpSpPr>
+          <a:xfrm>
+            <a:off x="327194" y="1610436"/>
+            <a:ext cx="6237379" cy="4653885"/>
+            <a:chOff x="327194" y="1610436"/>
+            <a:chExt cx="6237379" cy="4653885"/>
+          </a:xfrm>
+        </p:grpSpPr>
+        <p:sp>
+          <p:nvSpPr>
+            <p:cNvPr id="2" name="Rectangle 1">
+              <a:extLst>
+                <a:ext uri="{FF2B5EF4-FFF2-40B4-BE49-F238E27FC236}">
+                  <a16:creationId xmlns:a16="http://schemas.microsoft.com/office/drawing/2014/main" id="{26840436-E5DE-1B8C-3FD8-DB0418CDF0D4}"/>
+                </a:ext>
+              </a:extLst>
+            </p:cNvPr>
+            <p:cNvSpPr/>
+            <p:nvPr/>
+          </p:nvSpPr>
+          <p:spPr>
+            <a:xfrm>
+              <a:off x="1631485" y="3841559"/>
+              <a:ext cx="1207249" cy="730441"/>
+            </a:xfrm>
+            <a:prstGeom prst="rect">
+              <a:avLst/>
+            </a:prstGeom>
+            <a:noFill/>
+          </p:spPr>
+          <p:style>
+            <a:lnRef idx="2">
+              <a:schemeClr val="accent1">
+                <a:shade val="15000"/>
+              </a:schemeClr>
+            </a:lnRef>
+            <a:fillRef idx="1">
+              <a:schemeClr val="accent1"/>
+            </a:fillRef>
+            <a:effectRef idx="0">
+              <a:schemeClr val="accent1"/>
+            </a:effectRef>
+            <a:fontRef idx="minor">
+              <a:schemeClr val="lt1"/>
+            </a:fontRef>
+          </p:style>
+          <p:txBody>
+            <a:bodyPr rtlCol="0" anchor="ctr"/>
+            <a:lstStyle/>
+            <a:p>
+              <a:pPr algn="ctr"/>
+              <a:r>
+                <a:rPr lang="en-US" sz="1050" dirty="0">
+                  <a:solidFill>
+                    <a:schemeClr val="tx1"/>
+                  </a:solidFill>
+                </a:rPr>
+                <a:t>Global</a:t>
+              </a:r>
+            </a:p>
+            <a:p>
+              <a:pPr algn="ctr"/>
+              <a:r>
+                <a:rPr lang="en-US" sz="1050" dirty="0">
+                  <a:solidFill>
+                    <a:schemeClr val="tx1"/>
+                  </a:solidFill>
+                </a:rPr>
+                <a:t>Python</a:t>
+              </a:r>
+            </a:p>
+            <a:p>
+              <a:pPr algn="ctr"/>
+              <a:r>
+                <a:rPr lang="en-US" sz="1050" dirty="0">
+                  <a:solidFill>
+                    <a:schemeClr val="tx1"/>
+                  </a:solidFill>
+                </a:rPr>
+                <a:t>Installation</a:t>
+              </a:r>
+            </a:p>
+          </p:txBody>
+        </p:sp>
+        <p:sp>
+          <p:nvSpPr>
+            <p:cNvPr id="6" name="Rectangle: Rounded Corners 5">
+              <a:extLst>
+                <a:ext uri="{FF2B5EF4-FFF2-40B4-BE49-F238E27FC236}">
+                  <a16:creationId xmlns:a16="http://schemas.microsoft.com/office/drawing/2014/main" id="{2B8B0D58-9880-F110-E6F4-9D6CD15518DF}"/>
+                </a:ext>
+              </a:extLst>
+            </p:cNvPr>
+            <p:cNvSpPr/>
+            <p:nvPr/>
+          </p:nvSpPr>
+          <p:spPr>
+            <a:xfrm>
+              <a:off x="693004" y="3425302"/>
+              <a:ext cx="808250" cy="320722"/>
+            </a:xfrm>
+            <a:prstGeom prst="roundRect">
+              <a:avLst/>
+            </a:prstGeom>
+            <a:noFill/>
+          </p:spPr>
+          <p:style>
+            <a:lnRef idx="2">
+              <a:schemeClr val="accent1">
+                <a:shade val="15000"/>
+              </a:schemeClr>
+            </a:lnRef>
+            <a:fillRef idx="1">
+              <a:schemeClr val="accent1"/>
+            </a:fillRef>
+            <a:effectRef idx="0">
+              <a:schemeClr val="accent1"/>
+            </a:effectRef>
+            <a:fontRef idx="minor">
+              <a:schemeClr val="lt1"/>
+            </a:fontRef>
+          </p:style>
+          <p:txBody>
+            <a:bodyPr rtlCol="0" anchor="ctr"/>
+            <a:lstStyle/>
+            <a:p>
+              <a:pPr algn="ctr"/>
+              <a:r>
+                <a:rPr lang="en-US" sz="1400" dirty="0">
+                  <a:solidFill>
+                    <a:schemeClr val="tx1"/>
+                  </a:solidFill>
+                </a:rPr>
+                <a:t>lib</a:t>
+              </a:r>
+            </a:p>
+          </p:txBody>
+        </p:sp>
+        <p:sp>
+          <p:nvSpPr>
+            <p:cNvPr id="8" name="Rectangle: Rounded Corners 7">
+              <a:extLst>
+                <a:ext uri="{FF2B5EF4-FFF2-40B4-BE49-F238E27FC236}">
+                  <a16:creationId xmlns:a16="http://schemas.microsoft.com/office/drawing/2014/main" id="{A5AD39C8-123E-06C1-A5DB-279C7C23349D}"/>
+                </a:ext>
+              </a:extLst>
+            </p:cNvPr>
+            <p:cNvSpPr/>
+            <p:nvPr/>
+          </p:nvSpPr>
+          <p:spPr>
+            <a:xfrm>
+              <a:off x="693004" y="3790522"/>
+              <a:ext cx="808250" cy="320722"/>
+            </a:xfrm>
+            <a:prstGeom prst="roundRect">
+              <a:avLst/>
+            </a:prstGeom>
+            <a:noFill/>
+          </p:spPr>
+          <p:style>
+            <a:lnRef idx="2">
+              <a:schemeClr val="accent1">
+                <a:shade val="15000"/>
+              </a:schemeClr>
+            </a:lnRef>
+            <a:fillRef idx="1">
+              <a:schemeClr val="accent1"/>
+            </a:fillRef>
+            <a:effectRef idx="0">
+              <a:schemeClr val="accent1"/>
+            </a:effectRef>
+            <a:fontRef idx="minor">
+              <a:schemeClr val="lt1"/>
+            </a:fontRef>
+          </p:style>
+          <p:txBody>
+            <a:bodyPr rtlCol="0" anchor="ctr"/>
+            <a:lstStyle/>
+            <a:p>
+              <a:pPr algn="ctr"/>
+              <a:r>
+                <a:rPr lang="en-US" sz="1400" dirty="0">
+                  <a:solidFill>
+                    <a:schemeClr val="tx1"/>
+                  </a:solidFill>
+                </a:rPr>
+                <a:t>lib</a:t>
+              </a:r>
+            </a:p>
+          </p:txBody>
+        </p:sp>
+        <p:sp>
+          <p:nvSpPr>
+            <p:cNvPr id="9" name="Rectangle: Rounded Corners 8">
+              <a:extLst>
+                <a:ext uri="{FF2B5EF4-FFF2-40B4-BE49-F238E27FC236}">
+                  <a16:creationId xmlns:a16="http://schemas.microsoft.com/office/drawing/2014/main" id="{B24E5058-6803-933D-2FF8-45C691ED30EA}"/>
+                </a:ext>
+              </a:extLst>
+            </p:cNvPr>
+            <p:cNvSpPr/>
+            <p:nvPr/>
+          </p:nvSpPr>
+          <p:spPr>
+            <a:xfrm>
+              <a:off x="693004" y="4240898"/>
+              <a:ext cx="808250" cy="320722"/>
+            </a:xfrm>
+            <a:prstGeom prst="roundRect">
+              <a:avLst/>
+            </a:prstGeom>
+            <a:noFill/>
+          </p:spPr>
+          <p:style>
+            <a:lnRef idx="2">
+              <a:schemeClr val="accent1">
+                <a:shade val="15000"/>
+              </a:schemeClr>
+            </a:lnRef>
+            <a:fillRef idx="1">
+              <a:schemeClr val="accent1"/>
+            </a:fillRef>
+            <a:effectRef idx="0">
+              <a:schemeClr val="accent1"/>
+            </a:effectRef>
+            <a:fontRef idx="minor">
+              <a:schemeClr val="lt1"/>
+            </a:fontRef>
+          </p:style>
+          <p:txBody>
+            <a:bodyPr rtlCol="0" anchor="ctr"/>
+            <a:lstStyle/>
+            <a:p>
+              <a:pPr algn="ctr"/>
+              <a:r>
+                <a:rPr lang="en-US" sz="1400" dirty="0">
+                  <a:solidFill>
+                    <a:schemeClr val="tx1"/>
+                  </a:solidFill>
+                </a:rPr>
+                <a:t>lib</a:t>
+              </a:r>
+            </a:p>
+          </p:txBody>
+        </p:sp>
+        <p:sp>
+          <p:nvSpPr>
+            <p:cNvPr id="10" name="Rectangle: Rounded Corners 9">
+              <a:extLst>
+                <a:ext uri="{FF2B5EF4-FFF2-40B4-BE49-F238E27FC236}">
+                  <a16:creationId xmlns:a16="http://schemas.microsoft.com/office/drawing/2014/main" id="{CB7D9F3B-AF77-E320-5DC2-9C90976A7878}"/>
+                </a:ext>
+              </a:extLst>
+            </p:cNvPr>
+            <p:cNvSpPr/>
+            <p:nvPr/>
+          </p:nvSpPr>
+          <p:spPr>
+            <a:xfrm>
+              <a:off x="693004" y="4691274"/>
+              <a:ext cx="808250" cy="320722"/>
+            </a:xfrm>
+            <a:prstGeom prst="roundRect">
+              <a:avLst/>
+            </a:prstGeom>
+            <a:noFill/>
+          </p:spPr>
+          <p:style>
+            <a:lnRef idx="2">
+              <a:schemeClr val="accent1">
+                <a:shade val="15000"/>
+              </a:schemeClr>
+            </a:lnRef>
+            <a:fillRef idx="1">
+              <a:schemeClr val="accent1"/>
+            </a:fillRef>
+            <a:effectRef idx="0">
+              <a:schemeClr val="accent1"/>
+            </a:effectRef>
+            <a:fontRef idx="minor">
+              <a:schemeClr val="lt1"/>
+            </a:fontRef>
+          </p:style>
+          <p:txBody>
+            <a:bodyPr rtlCol="0" anchor="ctr"/>
+            <a:lstStyle/>
+            <a:p>
+              <a:pPr algn="ctr"/>
+              <a:r>
+                <a:rPr lang="en-US" sz="1400" dirty="0">
+                  <a:solidFill>
+                    <a:schemeClr val="tx1"/>
+                  </a:solidFill>
+                </a:rPr>
+                <a:t>lib</a:t>
+              </a:r>
+            </a:p>
+          </p:txBody>
+        </p:sp>
+        <p:grpSp>
+          <p:nvGrpSpPr>
+            <p:cNvPr id="16" name="Group 15">
+              <a:extLst>
+                <a:ext uri="{FF2B5EF4-FFF2-40B4-BE49-F238E27FC236}">
+                  <a16:creationId xmlns:a16="http://schemas.microsoft.com/office/drawing/2014/main" id="{E64D9A99-16FC-4B50-EE3F-EB8A0523D7FF}"/>
+                </a:ext>
+              </a:extLst>
+            </p:cNvPr>
+            <p:cNvGrpSpPr/>
+            <p:nvPr/>
+          </p:nvGrpSpPr>
+          <p:grpSpPr>
+            <a:xfrm>
+              <a:off x="3727359" y="2505785"/>
+              <a:ext cx="2437637" cy="919517"/>
+              <a:chOff x="3444547" y="3297067"/>
+              <a:chExt cx="2437637" cy="919517"/>
+            </a:xfrm>
+          </p:grpSpPr>
+          <p:sp>
+            <p:nvSpPr>
+              <p:cNvPr id="11" name="Rectangle 10">
+                <a:extLst>
+                  <a:ext uri="{FF2B5EF4-FFF2-40B4-BE49-F238E27FC236}">
+                    <a16:creationId xmlns:a16="http://schemas.microsoft.com/office/drawing/2014/main" id="{E9FB1B58-8E86-6E69-00F9-18112334625F}"/>
+                  </a:ext>
+                </a:extLst>
+              </p:cNvPr>
+              <p:cNvSpPr/>
+              <p:nvPr/>
+            </p:nvSpPr>
+            <p:spPr>
+              <a:xfrm>
+                <a:off x="3444547" y="3472924"/>
+                <a:ext cx="1207249" cy="546197"/>
+              </a:xfrm>
+              <a:prstGeom prst="rect">
+                <a:avLst/>
+              </a:prstGeom>
+              <a:noFill/>
+            </p:spPr>
+            <p:style>
+              <a:lnRef idx="2">
+                <a:schemeClr val="accent1">
+                  <a:shade val="15000"/>
+                </a:schemeClr>
+              </a:lnRef>
+              <a:fillRef idx="1">
+                <a:schemeClr val="accent1"/>
+              </a:fillRef>
+              <a:effectRef idx="0">
+                <a:schemeClr val="accent1"/>
+              </a:effectRef>
+              <a:fontRef idx="minor">
+                <a:schemeClr val="lt1"/>
+              </a:fontRef>
+            </p:style>
+            <p:txBody>
+              <a:bodyPr rtlCol="0" anchor="ctr"/>
+              <a:lstStyle/>
+              <a:p>
+                <a:pPr algn="ctr"/>
+                <a:r>
+                  <a:rPr lang="en-US" sz="1050" dirty="0">
+                    <a:solidFill>
+                      <a:schemeClr val="tx1"/>
+                    </a:solidFill>
+                  </a:rPr>
+                  <a:t>Project 1</a:t>
+                </a:r>
+              </a:p>
+            </p:txBody>
+          </p:sp>
+          <p:sp>
+            <p:nvSpPr>
+              <p:cNvPr id="12" name="Rectangle: Rounded Corners 11">
+                <a:extLst>
+                  <a:ext uri="{FF2B5EF4-FFF2-40B4-BE49-F238E27FC236}">
+                    <a16:creationId xmlns:a16="http://schemas.microsoft.com/office/drawing/2014/main" id="{B1252B3F-4BD4-85C7-E5B1-04AF847B3648}"/>
+                  </a:ext>
+                </a:extLst>
+              </p:cNvPr>
+              <p:cNvSpPr/>
+              <p:nvPr/>
+            </p:nvSpPr>
+            <p:spPr>
+              <a:xfrm>
+                <a:off x="4782027" y="3297067"/>
+                <a:ext cx="1100157" cy="256469"/>
+              </a:xfrm>
+              <a:prstGeom prst="roundRect">
+                <a:avLst/>
+              </a:prstGeom>
+              <a:noFill/>
+            </p:spPr>
+            <p:style>
+              <a:lnRef idx="2">
+                <a:schemeClr val="accent1">
+                  <a:shade val="15000"/>
+                </a:schemeClr>
+              </a:lnRef>
+              <a:fillRef idx="1">
+                <a:schemeClr val="accent1"/>
+              </a:fillRef>
+              <a:effectRef idx="0">
+                <a:schemeClr val="accent1"/>
+              </a:effectRef>
+              <a:fontRef idx="minor">
+                <a:schemeClr val="lt1"/>
+              </a:fontRef>
+            </p:style>
+            <p:txBody>
+              <a:bodyPr rtlCol="0" anchor="ctr"/>
+              <a:lstStyle/>
+              <a:p>
+                <a:pPr algn="ctr"/>
+                <a:r>
+                  <a:rPr lang="en-US" sz="1400" dirty="0">
+                    <a:solidFill>
+                      <a:schemeClr val="tx1"/>
+                    </a:solidFill>
+                  </a:rPr>
+                  <a:t>Sub </a:t>
+                </a:r>
+                <a:r>
+                  <a:rPr lang="en-US" sz="1400" dirty="0" err="1">
+                    <a:solidFill>
+                      <a:schemeClr val="tx1"/>
+                    </a:solidFill>
+                  </a:rPr>
+                  <a:t>dir</a:t>
+                </a:r>
+                <a:endParaRPr lang="en-US" sz="1400" dirty="0">
+                  <a:solidFill>
+                    <a:schemeClr val="tx1"/>
+                  </a:solidFill>
+                </a:endParaRPr>
+              </a:p>
+            </p:txBody>
+          </p:sp>
+          <p:sp>
+            <p:nvSpPr>
+              <p:cNvPr id="13" name="Rectangle: Rounded Corners 12">
+                <a:extLst>
+                  <a:ext uri="{FF2B5EF4-FFF2-40B4-BE49-F238E27FC236}">
+                    <a16:creationId xmlns:a16="http://schemas.microsoft.com/office/drawing/2014/main" id="{0E0F678C-D3A6-B480-53EF-DB6D3BFE91F3}"/>
+                  </a:ext>
+                </a:extLst>
+              </p:cNvPr>
+              <p:cNvSpPr/>
+              <p:nvPr/>
+            </p:nvSpPr>
+            <p:spPr>
+              <a:xfrm>
+                <a:off x="4782027" y="3617789"/>
+                <a:ext cx="1100157" cy="256469"/>
+              </a:xfrm>
+              <a:prstGeom prst="roundRect">
+                <a:avLst/>
+              </a:prstGeom>
+              <a:noFill/>
+            </p:spPr>
+            <p:style>
+              <a:lnRef idx="2">
+                <a:schemeClr val="accent1">
+                  <a:shade val="15000"/>
+                </a:schemeClr>
+              </a:lnRef>
+              <a:fillRef idx="1">
+                <a:schemeClr val="accent1"/>
+              </a:fillRef>
+              <a:effectRef idx="0">
+                <a:schemeClr val="accent1"/>
+              </a:effectRef>
+              <a:fontRef idx="minor">
+                <a:schemeClr val="lt1"/>
+              </a:fontRef>
+            </p:style>
+            <p:txBody>
+              <a:bodyPr rtlCol="0" anchor="ctr"/>
+              <a:lstStyle/>
+              <a:p>
+                <a:pPr algn="ctr"/>
+                <a:r>
+                  <a:rPr lang="en-US" sz="1400" dirty="0">
+                    <a:solidFill>
+                      <a:schemeClr val="tx1"/>
+                    </a:solidFill>
+                  </a:rPr>
+                  <a:t>Sub </a:t>
+                </a:r>
+                <a:r>
+                  <a:rPr lang="en-US" sz="1400" dirty="0" err="1">
+                    <a:solidFill>
+                      <a:schemeClr val="tx1"/>
+                    </a:solidFill>
+                  </a:rPr>
+                  <a:t>dir</a:t>
+                </a:r>
+                <a:endParaRPr lang="en-US" sz="1400" dirty="0">
+                  <a:solidFill>
+                    <a:schemeClr val="tx1"/>
+                  </a:solidFill>
+                </a:endParaRPr>
+              </a:p>
+            </p:txBody>
+          </p:sp>
+          <p:sp>
+            <p:nvSpPr>
+              <p:cNvPr id="14" name="Rectangle: Rounded Corners 13">
+                <a:extLst>
+                  <a:ext uri="{FF2B5EF4-FFF2-40B4-BE49-F238E27FC236}">
+                    <a16:creationId xmlns:a16="http://schemas.microsoft.com/office/drawing/2014/main" id="{A65B9C25-1823-20D9-83D7-C290367DD645}"/>
+                  </a:ext>
+                </a:extLst>
+              </p:cNvPr>
+              <p:cNvSpPr/>
+              <p:nvPr/>
+            </p:nvSpPr>
+            <p:spPr>
+              <a:xfrm>
+                <a:off x="4782027" y="3960115"/>
+                <a:ext cx="1100157" cy="256469"/>
+              </a:xfrm>
+              <a:prstGeom prst="roundRect">
+                <a:avLst/>
+              </a:prstGeom>
+              <a:noFill/>
+            </p:spPr>
+            <p:style>
+              <a:lnRef idx="2">
+                <a:schemeClr val="accent1">
+                  <a:shade val="15000"/>
+                </a:schemeClr>
+              </a:lnRef>
+              <a:fillRef idx="1">
+                <a:schemeClr val="accent1"/>
+              </a:fillRef>
+              <a:effectRef idx="0">
+                <a:schemeClr val="accent1"/>
+              </a:effectRef>
+              <a:fontRef idx="minor">
+                <a:schemeClr val="lt1"/>
+              </a:fontRef>
+            </p:style>
+            <p:txBody>
+              <a:bodyPr rtlCol="0" anchor="ctr"/>
+              <a:lstStyle/>
+              <a:p>
+                <a:pPr algn="ctr"/>
+                <a:r>
+                  <a:rPr lang="en-US" sz="1400" dirty="0">
+                    <a:solidFill>
+                      <a:schemeClr val="tx1"/>
+                    </a:solidFill>
+                  </a:rPr>
+                  <a:t>Sub </a:t>
+                </a:r>
+                <a:r>
+                  <a:rPr lang="en-US" sz="1400" dirty="0" err="1">
+                    <a:solidFill>
+                      <a:schemeClr val="tx1"/>
+                    </a:solidFill>
+                  </a:rPr>
+                  <a:t>dir</a:t>
+                </a:r>
+                <a:endParaRPr lang="en-US" sz="1400" dirty="0">
+                  <a:solidFill>
+                    <a:schemeClr val="tx1"/>
+                  </a:solidFill>
+                </a:endParaRPr>
+              </a:p>
+            </p:txBody>
+          </p:sp>
+        </p:grpSp>
+        <p:grpSp>
+          <p:nvGrpSpPr>
+            <p:cNvPr id="17" name="Group 16">
+              <a:extLst>
+                <a:ext uri="{FF2B5EF4-FFF2-40B4-BE49-F238E27FC236}">
+                  <a16:creationId xmlns:a16="http://schemas.microsoft.com/office/drawing/2014/main" id="{C6972DAC-8F2F-A1FD-1A0D-CA0204D43164}"/>
+                </a:ext>
+              </a:extLst>
+            </p:cNvPr>
+            <p:cNvGrpSpPr/>
+            <p:nvPr/>
+          </p:nvGrpSpPr>
+          <p:grpSpPr>
+            <a:xfrm>
+              <a:off x="3781949" y="3664567"/>
+              <a:ext cx="2437637" cy="919517"/>
+              <a:chOff x="3444547" y="3297067"/>
+              <a:chExt cx="2437637" cy="919517"/>
+            </a:xfrm>
+          </p:grpSpPr>
+          <p:sp>
+            <p:nvSpPr>
+              <p:cNvPr id="18" name="Rectangle 17">
+                <a:extLst>
+                  <a:ext uri="{FF2B5EF4-FFF2-40B4-BE49-F238E27FC236}">
+                    <a16:creationId xmlns:a16="http://schemas.microsoft.com/office/drawing/2014/main" id="{1285A463-F620-FB86-C190-E7F06BE46A34}"/>
+                  </a:ext>
+                </a:extLst>
+              </p:cNvPr>
+              <p:cNvSpPr/>
+              <p:nvPr/>
+            </p:nvSpPr>
+            <p:spPr>
+              <a:xfrm>
+                <a:off x="3444547" y="3472924"/>
+                <a:ext cx="1207249" cy="546197"/>
+              </a:xfrm>
+              <a:prstGeom prst="rect">
+                <a:avLst/>
+              </a:prstGeom>
+              <a:noFill/>
+            </p:spPr>
+            <p:style>
+              <a:lnRef idx="2">
+                <a:schemeClr val="accent1">
+                  <a:shade val="15000"/>
+                </a:schemeClr>
+              </a:lnRef>
+              <a:fillRef idx="1">
+                <a:schemeClr val="accent1"/>
+              </a:fillRef>
+              <a:effectRef idx="0">
+                <a:schemeClr val="accent1"/>
+              </a:effectRef>
+              <a:fontRef idx="minor">
+                <a:schemeClr val="lt1"/>
+              </a:fontRef>
+            </p:style>
+            <p:txBody>
+              <a:bodyPr rtlCol="0" anchor="ctr"/>
+              <a:lstStyle/>
+              <a:p>
+                <a:pPr algn="ctr"/>
+                <a:r>
+                  <a:rPr lang="en-US" sz="1050" dirty="0">
+                    <a:solidFill>
+                      <a:schemeClr val="tx1"/>
+                    </a:solidFill>
+                  </a:rPr>
+                  <a:t>Project 2</a:t>
+                </a:r>
+              </a:p>
+            </p:txBody>
+          </p:sp>
+          <p:sp>
+            <p:nvSpPr>
+              <p:cNvPr id="19" name="Rectangle: Rounded Corners 18">
+                <a:extLst>
+                  <a:ext uri="{FF2B5EF4-FFF2-40B4-BE49-F238E27FC236}">
+                    <a16:creationId xmlns:a16="http://schemas.microsoft.com/office/drawing/2014/main" id="{788CB140-AFD5-AA9E-041C-6DEEE92C45E0}"/>
+                  </a:ext>
+                </a:extLst>
+              </p:cNvPr>
+              <p:cNvSpPr/>
+              <p:nvPr/>
+            </p:nvSpPr>
+            <p:spPr>
+              <a:xfrm>
+                <a:off x="4782027" y="3297067"/>
+                <a:ext cx="1100157" cy="256469"/>
+              </a:xfrm>
+              <a:prstGeom prst="roundRect">
+                <a:avLst/>
+              </a:prstGeom>
+              <a:noFill/>
+            </p:spPr>
+            <p:style>
+              <a:lnRef idx="2">
+                <a:schemeClr val="accent1">
+                  <a:shade val="15000"/>
+                </a:schemeClr>
+              </a:lnRef>
+              <a:fillRef idx="1">
+                <a:schemeClr val="accent1"/>
+              </a:fillRef>
+              <a:effectRef idx="0">
+                <a:schemeClr val="accent1"/>
+              </a:effectRef>
+              <a:fontRef idx="minor">
+                <a:schemeClr val="lt1"/>
+              </a:fontRef>
+            </p:style>
+            <p:txBody>
+              <a:bodyPr rtlCol="0" anchor="ctr"/>
+              <a:lstStyle/>
+              <a:p>
+                <a:pPr algn="ctr"/>
+                <a:r>
+                  <a:rPr lang="en-US" sz="1400" dirty="0">
+                    <a:solidFill>
+                      <a:schemeClr val="tx1"/>
+                    </a:solidFill>
+                  </a:rPr>
+                  <a:t>Sub </a:t>
+                </a:r>
+                <a:r>
+                  <a:rPr lang="en-US" sz="1400" dirty="0" err="1">
+                    <a:solidFill>
+                      <a:schemeClr val="tx1"/>
+                    </a:solidFill>
+                  </a:rPr>
+                  <a:t>dir</a:t>
+                </a:r>
+                <a:endParaRPr lang="en-US" sz="1400" dirty="0">
+                  <a:solidFill>
+                    <a:schemeClr val="tx1"/>
+                  </a:solidFill>
+                </a:endParaRPr>
+              </a:p>
+            </p:txBody>
+          </p:sp>
+          <p:sp>
+            <p:nvSpPr>
+              <p:cNvPr id="20" name="Rectangle: Rounded Corners 19">
+                <a:extLst>
+                  <a:ext uri="{FF2B5EF4-FFF2-40B4-BE49-F238E27FC236}">
+                    <a16:creationId xmlns:a16="http://schemas.microsoft.com/office/drawing/2014/main" id="{D48BD2A1-E6D2-808F-4D30-5FE67B02C4EE}"/>
+                  </a:ext>
+                </a:extLst>
+              </p:cNvPr>
+              <p:cNvSpPr/>
+              <p:nvPr/>
+            </p:nvSpPr>
+            <p:spPr>
+              <a:xfrm>
+                <a:off x="4782027" y="3617789"/>
+                <a:ext cx="1100157" cy="256469"/>
+              </a:xfrm>
+              <a:prstGeom prst="roundRect">
+                <a:avLst/>
+              </a:prstGeom>
+              <a:noFill/>
+            </p:spPr>
+            <p:style>
+              <a:lnRef idx="2">
+                <a:schemeClr val="accent1">
+                  <a:shade val="15000"/>
+                </a:schemeClr>
+              </a:lnRef>
+              <a:fillRef idx="1">
+                <a:schemeClr val="accent1"/>
+              </a:fillRef>
+              <a:effectRef idx="0">
+                <a:schemeClr val="accent1"/>
+              </a:effectRef>
+              <a:fontRef idx="minor">
+                <a:schemeClr val="lt1"/>
+              </a:fontRef>
+            </p:style>
+            <p:txBody>
+              <a:bodyPr rtlCol="0" anchor="ctr"/>
+              <a:lstStyle/>
+              <a:p>
+                <a:pPr algn="ctr"/>
+                <a:r>
+                  <a:rPr lang="en-US" sz="1400" dirty="0">
+                    <a:solidFill>
+                      <a:schemeClr val="tx1"/>
+                    </a:solidFill>
+                  </a:rPr>
+                  <a:t>Sub </a:t>
+                </a:r>
+                <a:r>
+                  <a:rPr lang="en-US" sz="1400" dirty="0" err="1">
+                    <a:solidFill>
+                      <a:schemeClr val="tx1"/>
+                    </a:solidFill>
+                  </a:rPr>
+                  <a:t>dir</a:t>
+                </a:r>
+                <a:endParaRPr lang="en-US" sz="1400" dirty="0">
+                  <a:solidFill>
+                    <a:schemeClr val="tx1"/>
+                  </a:solidFill>
+                </a:endParaRPr>
+              </a:p>
+            </p:txBody>
+          </p:sp>
+          <p:sp>
+            <p:nvSpPr>
+              <p:cNvPr id="21" name="Rectangle: Rounded Corners 20">
+                <a:extLst>
+                  <a:ext uri="{FF2B5EF4-FFF2-40B4-BE49-F238E27FC236}">
+                    <a16:creationId xmlns:a16="http://schemas.microsoft.com/office/drawing/2014/main" id="{B0611147-C6D1-E24A-87C6-B8BBD07D945F}"/>
+                  </a:ext>
+                </a:extLst>
+              </p:cNvPr>
+              <p:cNvSpPr/>
+              <p:nvPr/>
+            </p:nvSpPr>
+            <p:spPr>
+              <a:xfrm>
+                <a:off x="4782027" y="3960115"/>
+                <a:ext cx="1100157" cy="256469"/>
+              </a:xfrm>
+              <a:prstGeom prst="roundRect">
+                <a:avLst/>
+              </a:prstGeom>
+              <a:noFill/>
+            </p:spPr>
+            <p:style>
+              <a:lnRef idx="2">
+                <a:schemeClr val="accent1">
+                  <a:shade val="15000"/>
+                </a:schemeClr>
+              </a:lnRef>
+              <a:fillRef idx="1">
+                <a:schemeClr val="accent1"/>
+              </a:fillRef>
+              <a:effectRef idx="0">
+                <a:schemeClr val="accent1"/>
+              </a:effectRef>
+              <a:fontRef idx="minor">
+                <a:schemeClr val="lt1"/>
+              </a:fontRef>
+            </p:style>
+            <p:txBody>
+              <a:bodyPr rtlCol="0" anchor="ctr"/>
+              <a:lstStyle/>
+              <a:p>
+                <a:pPr algn="ctr"/>
+                <a:r>
+                  <a:rPr lang="en-US" sz="1400" dirty="0">
+                    <a:solidFill>
+                      <a:schemeClr val="tx1"/>
+                    </a:solidFill>
+                  </a:rPr>
+                  <a:t>Sub </a:t>
+                </a:r>
+                <a:r>
+                  <a:rPr lang="en-US" sz="1400" dirty="0" err="1">
+                    <a:solidFill>
+                      <a:schemeClr val="tx1"/>
+                    </a:solidFill>
+                  </a:rPr>
+                  <a:t>dir</a:t>
+                </a:r>
+                <a:endParaRPr lang="en-US" sz="1400" dirty="0">
+                  <a:solidFill>
+                    <a:schemeClr val="tx1"/>
+                  </a:solidFill>
+                </a:endParaRPr>
+              </a:p>
+            </p:txBody>
+          </p:sp>
+        </p:grpSp>
+        <p:grpSp>
+          <p:nvGrpSpPr>
+            <p:cNvPr id="23" name="Group 22">
+              <a:extLst>
+                <a:ext uri="{FF2B5EF4-FFF2-40B4-BE49-F238E27FC236}">
+                  <a16:creationId xmlns:a16="http://schemas.microsoft.com/office/drawing/2014/main" id="{4E84C8D8-F6CE-8432-6071-64D42CAA04EF}"/>
+                </a:ext>
+              </a:extLst>
+            </p:cNvPr>
+            <p:cNvGrpSpPr/>
+            <p:nvPr/>
+          </p:nvGrpSpPr>
+          <p:grpSpPr>
+            <a:xfrm>
+              <a:off x="3791428" y="4855481"/>
+              <a:ext cx="2437637" cy="919517"/>
+              <a:chOff x="3444547" y="3297067"/>
+              <a:chExt cx="2437637" cy="919517"/>
+            </a:xfrm>
+          </p:grpSpPr>
+          <p:sp>
+            <p:nvSpPr>
+              <p:cNvPr id="25" name="Rectangle 24">
+                <a:extLst>
+                  <a:ext uri="{FF2B5EF4-FFF2-40B4-BE49-F238E27FC236}">
+                    <a16:creationId xmlns:a16="http://schemas.microsoft.com/office/drawing/2014/main" id="{F9BF82A2-13FE-923F-6E02-CD01C5CD5801}"/>
+                  </a:ext>
+                </a:extLst>
+              </p:cNvPr>
+              <p:cNvSpPr/>
+              <p:nvPr/>
+            </p:nvSpPr>
+            <p:spPr>
+              <a:xfrm>
+                <a:off x="3444547" y="3472924"/>
+                <a:ext cx="1207249" cy="546197"/>
+              </a:xfrm>
+              <a:prstGeom prst="rect">
+                <a:avLst/>
+              </a:prstGeom>
+              <a:noFill/>
+            </p:spPr>
+            <p:style>
+              <a:lnRef idx="2">
+                <a:schemeClr val="accent1">
+                  <a:shade val="15000"/>
+                </a:schemeClr>
+              </a:lnRef>
+              <a:fillRef idx="1">
+                <a:schemeClr val="accent1"/>
+              </a:fillRef>
+              <a:effectRef idx="0">
+                <a:schemeClr val="accent1"/>
+              </a:effectRef>
+              <a:fontRef idx="minor">
+                <a:schemeClr val="lt1"/>
+              </a:fontRef>
+            </p:style>
+            <p:txBody>
+              <a:bodyPr rtlCol="0" anchor="ctr"/>
+              <a:lstStyle/>
+              <a:p>
+                <a:pPr algn="ctr"/>
+                <a:r>
+                  <a:rPr lang="en-US" sz="1050" dirty="0">
+                    <a:solidFill>
+                      <a:schemeClr val="tx1"/>
+                    </a:solidFill>
+                  </a:rPr>
+                  <a:t>Project 3</a:t>
+                </a:r>
+              </a:p>
+            </p:txBody>
+          </p:sp>
+          <p:sp>
+            <p:nvSpPr>
+              <p:cNvPr id="26" name="Rectangle: Rounded Corners 25">
+                <a:extLst>
+                  <a:ext uri="{FF2B5EF4-FFF2-40B4-BE49-F238E27FC236}">
+                    <a16:creationId xmlns:a16="http://schemas.microsoft.com/office/drawing/2014/main" id="{761A58E5-D55A-CDF1-061A-344363BD4748}"/>
+                  </a:ext>
+                </a:extLst>
+              </p:cNvPr>
+              <p:cNvSpPr/>
+              <p:nvPr/>
+            </p:nvSpPr>
+            <p:spPr>
+              <a:xfrm>
+                <a:off x="4782027" y="3297067"/>
+                <a:ext cx="1100157" cy="256469"/>
+              </a:xfrm>
+              <a:prstGeom prst="roundRect">
+                <a:avLst/>
+              </a:prstGeom>
+              <a:noFill/>
+            </p:spPr>
+            <p:style>
+              <a:lnRef idx="2">
+                <a:schemeClr val="accent1">
+                  <a:shade val="15000"/>
+                </a:schemeClr>
+              </a:lnRef>
+              <a:fillRef idx="1">
+                <a:schemeClr val="accent1"/>
+              </a:fillRef>
+              <a:effectRef idx="0">
+                <a:schemeClr val="accent1"/>
+              </a:effectRef>
+              <a:fontRef idx="minor">
+                <a:schemeClr val="lt1"/>
+              </a:fontRef>
+            </p:style>
+            <p:txBody>
+              <a:bodyPr rtlCol="0" anchor="ctr"/>
+              <a:lstStyle/>
+              <a:p>
+                <a:pPr algn="ctr"/>
+                <a:r>
+                  <a:rPr lang="en-US" sz="1400" dirty="0">
+                    <a:solidFill>
+                      <a:schemeClr val="tx1"/>
+                    </a:solidFill>
+                  </a:rPr>
+                  <a:t>Sub </a:t>
+                </a:r>
+                <a:r>
+                  <a:rPr lang="en-US" sz="1400" dirty="0" err="1">
+                    <a:solidFill>
+                      <a:schemeClr val="tx1"/>
+                    </a:solidFill>
+                  </a:rPr>
+                  <a:t>dir</a:t>
+                </a:r>
+                <a:endParaRPr lang="en-US" sz="1400" dirty="0">
+                  <a:solidFill>
+                    <a:schemeClr val="tx1"/>
+                  </a:solidFill>
+                </a:endParaRPr>
+              </a:p>
+            </p:txBody>
+          </p:sp>
+          <p:sp>
+            <p:nvSpPr>
+              <p:cNvPr id="27" name="Rectangle: Rounded Corners 26">
+                <a:extLst>
+                  <a:ext uri="{FF2B5EF4-FFF2-40B4-BE49-F238E27FC236}">
+                    <a16:creationId xmlns:a16="http://schemas.microsoft.com/office/drawing/2014/main" id="{6808E0B9-52FA-41C4-0834-571B72559AA2}"/>
+                  </a:ext>
+                </a:extLst>
+              </p:cNvPr>
+              <p:cNvSpPr/>
+              <p:nvPr/>
+            </p:nvSpPr>
+            <p:spPr>
+              <a:xfrm>
+                <a:off x="4782027" y="3617789"/>
+                <a:ext cx="1100157" cy="256469"/>
+              </a:xfrm>
+              <a:prstGeom prst="roundRect">
+                <a:avLst/>
+              </a:prstGeom>
+              <a:noFill/>
+            </p:spPr>
+            <p:style>
+              <a:lnRef idx="2">
+                <a:schemeClr val="accent1">
+                  <a:shade val="15000"/>
+                </a:schemeClr>
+              </a:lnRef>
+              <a:fillRef idx="1">
+                <a:schemeClr val="accent1"/>
+              </a:fillRef>
+              <a:effectRef idx="0">
+                <a:schemeClr val="accent1"/>
+              </a:effectRef>
+              <a:fontRef idx="minor">
+                <a:schemeClr val="lt1"/>
+              </a:fontRef>
+            </p:style>
+            <p:txBody>
+              <a:bodyPr rtlCol="0" anchor="ctr"/>
+              <a:lstStyle/>
+              <a:p>
+                <a:pPr algn="ctr"/>
+                <a:r>
+                  <a:rPr lang="en-US" sz="1400" dirty="0">
+                    <a:solidFill>
+                      <a:schemeClr val="tx1"/>
+                    </a:solidFill>
+                  </a:rPr>
+                  <a:t>Sub </a:t>
+                </a:r>
+                <a:r>
+                  <a:rPr lang="en-US" sz="1400" dirty="0" err="1">
+                    <a:solidFill>
+                      <a:schemeClr val="tx1"/>
+                    </a:solidFill>
+                  </a:rPr>
+                  <a:t>dir</a:t>
+                </a:r>
+                <a:endParaRPr lang="en-US" sz="1400" dirty="0">
+                  <a:solidFill>
+                    <a:schemeClr val="tx1"/>
+                  </a:solidFill>
+                </a:endParaRPr>
+              </a:p>
+            </p:txBody>
+          </p:sp>
+          <p:sp>
+            <p:nvSpPr>
+              <p:cNvPr id="28" name="Rectangle: Rounded Corners 27">
+                <a:extLst>
+                  <a:ext uri="{FF2B5EF4-FFF2-40B4-BE49-F238E27FC236}">
+                    <a16:creationId xmlns:a16="http://schemas.microsoft.com/office/drawing/2014/main" id="{6D7E0A3E-DCAE-DE58-A705-7473A7A27643}"/>
+                  </a:ext>
+                </a:extLst>
+              </p:cNvPr>
+              <p:cNvSpPr/>
+              <p:nvPr/>
+            </p:nvSpPr>
+            <p:spPr>
+              <a:xfrm>
+                <a:off x="4782027" y="3960115"/>
+                <a:ext cx="1100157" cy="256469"/>
+              </a:xfrm>
+              <a:prstGeom prst="roundRect">
+                <a:avLst/>
+              </a:prstGeom>
+              <a:noFill/>
+            </p:spPr>
+            <p:style>
+              <a:lnRef idx="2">
+                <a:schemeClr val="accent1">
+                  <a:shade val="15000"/>
+                </a:schemeClr>
+              </a:lnRef>
+              <a:fillRef idx="1">
+                <a:schemeClr val="accent1"/>
+              </a:fillRef>
+              <a:effectRef idx="0">
+                <a:schemeClr val="accent1"/>
+              </a:effectRef>
+              <a:fontRef idx="minor">
+                <a:schemeClr val="lt1"/>
+              </a:fontRef>
+            </p:style>
+            <p:txBody>
+              <a:bodyPr rtlCol="0" anchor="ctr"/>
+              <a:lstStyle/>
+              <a:p>
+                <a:pPr algn="ctr"/>
+                <a:r>
+                  <a:rPr lang="en-US" sz="1400" dirty="0">
+                    <a:solidFill>
+                      <a:schemeClr val="tx1"/>
+                    </a:solidFill>
+                  </a:rPr>
+                  <a:t>Sub </a:t>
+                </a:r>
+                <a:r>
+                  <a:rPr lang="en-US" sz="1400" dirty="0" err="1">
+                    <a:solidFill>
+                      <a:schemeClr val="tx1"/>
+                    </a:solidFill>
+                  </a:rPr>
+                  <a:t>dir</a:t>
+                </a:r>
+                <a:endParaRPr lang="en-US" sz="1400" dirty="0">
+                  <a:solidFill>
+                    <a:schemeClr val="tx1"/>
+                  </a:solidFill>
+                </a:endParaRPr>
+              </a:p>
+            </p:txBody>
+          </p:sp>
+        </p:grpSp>
+        <p:cxnSp>
+          <p:nvCxnSpPr>
+            <p:cNvPr id="35" name="Straight Arrow Connector 34">
+              <a:extLst>
+                <a:ext uri="{FF2B5EF4-FFF2-40B4-BE49-F238E27FC236}">
+                  <a16:creationId xmlns:a16="http://schemas.microsoft.com/office/drawing/2014/main" id="{043CEF4C-5B84-722A-B697-608865728D6A}"/>
+                </a:ext>
+              </a:extLst>
+            </p:cNvPr>
+            <p:cNvCxnSpPr>
+              <a:cxnSpLocks/>
+              <a:stCxn id="11" idx="1"/>
+              <a:endCxn id="2" idx="3"/>
+            </p:cNvCxnSpPr>
+            <p:nvPr/>
+          </p:nvCxnSpPr>
+          <p:spPr>
+            <a:xfrm flipH="1">
+              <a:off x="2838734" y="2954741"/>
+              <a:ext cx="888625" cy="1252039"/>
+            </a:xfrm>
+            <a:prstGeom prst="straightConnector1">
+              <a:avLst/>
+            </a:prstGeom>
+            <a:ln>
+              <a:tailEnd type="triangle"/>
+            </a:ln>
+          </p:spPr>
+          <p:style>
+            <a:lnRef idx="1">
+              <a:schemeClr val="accent1"/>
+            </a:lnRef>
+            <a:fillRef idx="0">
+              <a:schemeClr val="accent1"/>
+            </a:fillRef>
+            <a:effectRef idx="0">
+              <a:schemeClr val="accent1"/>
+            </a:effectRef>
+            <a:fontRef idx="minor">
+              <a:schemeClr val="tx1"/>
+            </a:fontRef>
+          </p:style>
+        </p:cxnSp>
+        <p:cxnSp>
+          <p:nvCxnSpPr>
+            <p:cNvPr id="38" name="Straight Arrow Connector 37">
+              <a:extLst>
+                <a:ext uri="{FF2B5EF4-FFF2-40B4-BE49-F238E27FC236}">
+                  <a16:creationId xmlns:a16="http://schemas.microsoft.com/office/drawing/2014/main" id="{91AB55FE-BFDD-C81C-27D3-790D0F3DF445}"/>
+                </a:ext>
+              </a:extLst>
+            </p:cNvPr>
+            <p:cNvCxnSpPr>
+              <a:cxnSpLocks/>
+              <a:stCxn id="18" idx="1"/>
+              <a:endCxn id="2" idx="3"/>
+            </p:cNvCxnSpPr>
+            <p:nvPr/>
+          </p:nvCxnSpPr>
+          <p:spPr>
+            <a:xfrm flipH="1">
+              <a:off x="2838734" y="4113523"/>
+              <a:ext cx="943215" cy="93257"/>
+            </a:xfrm>
+            <a:prstGeom prst="straightConnector1">
+              <a:avLst/>
+            </a:prstGeom>
+            <a:ln>
+              <a:tailEnd type="triangle"/>
+            </a:ln>
+          </p:spPr>
+          <p:style>
+            <a:lnRef idx="1">
+              <a:schemeClr val="accent1"/>
+            </a:lnRef>
+            <a:fillRef idx="0">
+              <a:schemeClr val="accent1"/>
+            </a:fillRef>
+            <a:effectRef idx="0">
+              <a:schemeClr val="accent1"/>
+            </a:effectRef>
+            <a:fontRef idx="minor">
+              <a:schemeClr val="tx1"/>
+            </a:fontRef>
+          </p:style>
+        </p:cxnSp>
+        <p:cxnSp>
+          <p:nvCxnSpPr>
+            <p:cNvPr id="41" name="Straight Arrow Connector 40">
+              <a:extLst>
+                <a:ext uri="{FF2B5EF4-FFF2-40B4-BE49-F238E27FC236}">
+                  <a16:creationId xmlns:a16="http://schemas.microsoft.com/office/drawing/2014/main" id="{87F11D3C-9FDD-DE73-FFF7-A6D86F28F7E9}"/>
+                </a:ext>
+              </a:extLst>
+            </p:cNvPr>
+            <p:cNvCxnSpPr>
+              <a:cxnSpLocks/>
+              <a:stCxn id="25" idx="1"/>
+              <a:endCxn id="2" idx="3"/>
+            </p:cNvCxnSpPr>
+            <p:nvPr/>
+          </p:nvCxnSpPr>
+          <p:spPr>
+            <a:xfrm flipH="1" flipV="1">
+              <a:off x="2838734" y="4206780"/>
+              <a:ext cx="952694" cy="1097657"/>
+            </a:xfrm>
+            <a:prstGeom prst="straightConnector1">
+              <a:avLst/>
+            </a:prstGeom>
+            <a:ln>
+              <a:tailEnd type="triangle"/>
+            </a:ln>
+          </p:spPr>
+          <p:style>
+            <a:lnRef idx="1">
+              <a:schemeClr val="accent1"/>
+            </a:lnRef>
+            <a:fillRef idx="0">
+              <a:schemeClr val="accent1"/>
+            </a:fillRef>
+            <a:effectRef idx="0">
+              <a:schemeClr val="accent1"/>
+            </a:effectRef>
+            <a:fontRef idx="minor">
+              <a:schemeClr val="tx1"/>
+            </a:fontRef>
+          </p:style>
+        </p:cxnSp>
+        <p:sp>
+          <p:nvSpPr>
+            <p:cNvPr id="44" name="TextBox 43">
+              <a:extLst>
+                <a:ext uri="{FF2B5EF4-FFF2-40B4-BE49-F238E27FC236}">
+                  <a16:creationId xmlns:a16="http://schemas.microsoft.com/office/drawing/2014/main" id="{66C5F18E-534B-0CDA-2F5C-E3050F50C346}"/>
+                </a:ext>
+              </a:extLst>
+            </p:cNvPr>
+            <p:cNvSpPr txBox="1"/>
+            <p:nvPr/>
+          </p:nvSpPr>
+          <p:spPr>
+            <a:xfrm flipH="1">
+              <a:off x="327194" y="5073143"/>
+              <a:ext cx="1539869" cy="307777"/>
+            </a:xfrm>
+            <a:prstGeom prst="rect">
+              <a:avLst/>
+            </a:prstGeom>
+            <a:noFill/>
+          </p:spPr>
+          <p:txBody>
+            <a:bodyPr wrap="square" rtlCol="0">
+              <a:spAutoFit/>
+            </a:bodyPr>
+            <a:lstStyle/>
+            <a:p>
+              <a:pPr algn="ctr"/>
+              <a:r>
+                <a:rPr lang="en-US" sz="1400" b="1" dirty="0"/>
+                <a:t>Hundreds of libs</a:t>
+              </a:r>
+            </a:p>
+          </p:txBody>
+        </p:sp>
+        <p:sp>
+          <p:nvSpPr>
+            <p:cNvPr id="45" name="TextBox 44">
+              <a:extLst>
+                <a:ext uri="{FF2B5EF4-FFF2-40B4-BE49-F238E27FC236}">
+                  <a16:creationId xmlns:a16="http://schemas.microsoft.com/office/drawing/2014/main" id="{5CAD6F38-FE33-3486-CFFA-F7412DCF8DD3}"/>
+                </a:ext>
+              </a:extLst>
+            </p:cNvPr>
+            <p:cNvSpPr txBox="1"/>
+            <p:nvPr/>
+          </p:nvSpPr>
+          <p:spPr>
+            <a:xfrm flipH="1">
+              <a:off x="3579560" y="2358725"/>
+              <a:ext cx="1539869" cy="307777"/>
+            </a:xfrm>
+            <a:prstGeom prst="rect">
+              <a:avLst/>
+            </a:prstGeom>
+            <a:noFill/>
+          </p:spPr>
+          <p:txBody>
+            <a:bodyPr wrap="square" rtlCol="0">
+              <a:spAutoFit/>
+            </a:bodyPr>
+            <a:lstStyle/>
+            <a:p>
+              <a:pPr algn="ctr"/>
+              <a:r>
+                <a:rPr lang="en-US" sz="1400" b="1" dirty="0"/>
+                <a:t>Share libs</a:t>
+              </a:r>
+            </a:p>
+          </p:txBody>
+        </p:sp>
+        <p:sp>
+          <p:nvSpPr>
+            <p:cNvPr id="46" name="TextBox 45">
+              <a:extLst>
+                <a:ext uri="{FF2B5EF4-FFF2-40B4-BE49-F238E27FC236}">
+                  <a16:creationId xmlns:a16="http://schemas.microsoft.com/office/drawing/2014/main" id="{FCC6D55B-52D6-9A33-2C10-AD6FB7629A42}"/>
+                </a:ext>
+              </a:extLst>
+            </p:cNvPr>
+            <p:cNvSpPr txBox="1"/>
+            <p:nvPr/>
+          </p:nvSpPr>
+          <p:spPr>
+            <a:xfrm flipH="1">
+              <a:off x="3561048" y="5693612"/>
+              <a:ext cx="1539869" cy="307777"/>
+            </a:xfrm>
+            <a:prstGeom prst="rect">
+              <a:avLst/>
+            </a:prstGeom>
+            <a:noFill/>
+          </p:spPr>
+          <p:txBody>
+            <a:bodyPr wrap="square" rtlCol="0">
+              <a:spAutoFit/>
+            </a:bodyPr>
+            <a:lstStyle/>
+            <a:p>
+              <a:pPr algn="ctr"/>
+              <a:r>
+                <a:rPr lang="en-US" sz="1400" b="1" dirty="0"/>
+                <a:t>Share libs</a:t>
+              </a:r>
+            </a:p>
+          </p:txBody>
+        </p:sp>
+        <p:sp>
+          <p:nvSpPr>
+            <p:cNvPr id="47" name="TextBox 46">
+              <a:extLst>
+                <a:ext uri="{FF2B5EF4-FFF2-40B4-BE49-F238E27FC236}">
+                  <a16:creationId xmlns:a16="http://schemas.microsoft.com/office/drawing/2014/main" id="{960072FE-1690-24DB-3A98-A2D3AB92028F}"/>
+                </a:ext>
+              </a:extLst>
+            </p:cNvPr>
+            <p:cNvSpPr txBox="1"/>
+            <p:nvPr/>
+          </p:nvSpPr>
+          <p:spPr>
+            <a:xfrm flipH="1">
+              <a:off x="3524970" y="4454861"/>
+              <a:ext cx="1539869" cy="307777"/>
+            </a:xfrm>
+            <a:prstGeom prst="rect">
+              <a:avLst/>
+            </a:prstGeom>
+            <a:noFill/>
+          </p:spPr>
+          <p:txBody>
+            <a:bodyPr wrap="square" rtlCol="0">
+              <a:spAutoFit/>
+            </a:bodyPr>
+            <a:lstStyle/>
+            <a:p>
+              <a:pPr algn="ctr"/>
+              <a:r>
+                <a:rPr lang="en-US" sz="1400" b="1" dirty="0"/>
+                <a:t>Share libs</a:t>
+              </a:r>
+            </a:p>
+          </p:txBody>
+        </p:sp>
+        <p:sp>
+          <p:nvSpPr>
+            <p:cNvPr id="48" name="TextBox 47">
+              <a:extLst>
+                <a:ext uri="{FF2B5EF4-FFF2-40B4-BE49-F238E27FC236}">
+                  <a16:creationId xmlns:a16="http://schemas.microsoft.com/office/drawing/2014/main" id="{05C9876A-2E69-C88B-C9FB-79FDD326E7D1}"/>
+                </a:ext>
+              </a:extLst>
+            </p:cNvPr>
+            <p:cNvSpPr txBox="1"/>
+            <p:nvPr/>
+          </p:nvSpPr>
+          <p:spPr>
+            <a:xfrm flipH="1">
+              <a:off x="1211918" y="1733453"/>
+              <a:ext cx="4626103" cy="338554"/>
+            </a:xfrm>
+            <a:prstGeom prst="rect">
+              <a:avLst/>
+            </a:prstGeom>
+            <a:noFill/>
+          </p:spPr>
+          <p:txBody>
+            <a:bodyPr wrap="square" rtlCol="0">
+              <a:spAutoFit/>
+            </a:bodyPr>
+            <a:lstStyle/>
+            <a:p>
+              <a:pPr algn="ctr"/>
+              <a:r>
+                <a:rPr lang="en-US" sz="1600" dirty="0"/>
+                <a:t>Non-Virtual Environments</a:t>
+              </a:r>
+            </a:p>
+          </p:txBody>
+        </p:sp>
+        <p:sp>
+          <p:nvSpPr>
+            <p:cNvPr id="49" name="Rectangle 48">
+              <a:extLst>
+                <a:ext uri="{FF2B5EF4-FFF2-40B4-BE49-F238E27FC236}">
+                  <a16:creationId xmlns:a16="http://schemas.microsoft.com/office/drawing/2014/main" id="{EB2A6819-FFA3-DF74-53F3-FE2C1553BA33}"/>
+                </a:ext>
+              </a:extLst>
+            </p:cNvPr>
+            <p:cNvSpPr/>
+            <p:nvPr/>
+          </p:nvSpPr>
+          <p:spPr>
+            <a:xfrm>
+              <a:off x="327194" y="1610436"/>
+              <a:ext cx="6237379" cy="4653885"/>
+            </a:xfrm>
+            <a:prstGeom prst="rect">
+              <a:avLst/>
+            </a:prstGeom>
+            <a:noFill/>
+          </p:spPr>
+          <p:style>
+            <a:lnRef idx="2">
+              <a:schemeClr val="accent1">
+                <a:shade val="15000"/>
+              </a:schemeClr>
+            </a:lnRef>
+            <a:fillRef idx="1">
+              <a:schemeClr val="accent1"/>
+            </a:fillRef>
+            <a:effectRef idx="0">
+              <a:schemeClr val="accent1"/>
+            </a:effectRef>
+            <a:fontRef idx="minor">
+              <a:schemeClr val="lt1"/>
+            </a:fontRef>
+          </p:style>
+          <p:txBody>
+            <a:bodyPr rtlCol="0" anchor="ctr"/>
+            <a:lstStyle/>
+            <a:p>
+              <a:pPr algn="ctr"/>
+              <a:endParaRPr lang="en-US" sz="1400" dirty="0">
+                <a:solidFill>
+                  <a:schemeClr val="tx1"/>
+                </a:solidFill>
+              </a:endParaRPr>
+            </a:p>
+          </p:txBody>
+        </p:sp>
+      </p:grpSp>
+    </p:spTree>
+    <p:extLst>
+      <p:ext uri="{BB962C8B-B14F-4D97-AF65-F5344CB8AC3E}">
+        <p14:creationId xmlns:p14="http://schemas.microsoft.com/office/powerpoint/2010/main" val="1510544149"/>
+      </p:ext>
+    </p:extLst>
+  </p:cSld>
+  <p:clrMapOvr>
+    <a:masterClrMapping/>
+  </p:clrMapOvr>
+</p:sld>
+</file>
+
+<file path=ppt/slides/slide12.xml><?xml version="1.0" encoding="utf-8"?>
+<p:sld xmlns:a="http://schemas.openxmlformats.org/drawingml/2006/main" xmlns:r="http://schemas.openxmlformats.org/officeDocument/2006/relationships" xmlns:p="http://schemas.openxmlformats.org/presentationml/2006/main">
+  <p:cSld>
+    <p:spTree>
+      <p:nvGrpSpPr>
+        <p:cNvPr id="1" name="">
+          <a:extLst>
+            <a:ext uri="{FF2B5EF4-FFF2-40B4-BE49-F238E27FC236}">
+              <a16:creationId xmlns:a16="http://schemas.microsoft.com/office/drawing/2014/main" id="{8FCDAC28-FA91-ADAB-20DA-CFCEE63067F4}"/>
+            </a:ext>
+          </a:extLst>
+        </p:cNvPr>
+        <p:cNvGrpSpPr/>
+        <p:nvPr/>
+      </p:nvGrpSpPr>
+      <p:grpSpPr>
+        <a:xfrm>
+          <a:off x="0" y="0"/>
+          <a:ext cx="0" cy="0"/>
+          <a:chOff x="0" y="0"/>
+          <a:chExt cx="0" cy="0"/>
+        </a:xfrm>
+      </p:grpSpPr>
+      <p:grpSp>
+        <p:nvGrpSpPr>
+          <p:cNvPr id="62" name="Group 61">
+            <a:extLst>
+              <a:ext uri="{FF2B5EF4-FFF2-40B4-BE49-F238E27FC236}">
+                <a16:creationId xmlns:a16="http://schemas.microsoft.com/office/drawing/2014/main" id="{BA97BAA9-5B51-CF59-02F6-1DBEF347DE33}"/>
+              </a:ext>
+            </a:extLst>
+          </p:cNvPr>
+          <p:cNvGrpSpPr/>
+          <p:nvPr/>
+        </p:nvGrpSpPr>
+        <p:grpSpPr>
+          <a:xfrm>
+            <a:off x="327194" y="832513"/>
+            <a:ext cx="6237379" cy="7151427"/>
+            <a:chOff x="327194" y="832513"/>
+            <a:chExt cx="6237379" cy="7151427"/>
+          </a:xfrm>
+        </p:grpSpPr>
+        <p:sp>
+          <p:nvSpPr>
+            <p:cNvPr id="2" name="Rectangle 1">
+              <a:extLst>
+                <a:ext uri="{FF2B5EF4-FFF2-40B4-BE49-F238E27FC236}">
+                  <a16:creationId xmlns:a16="http://schemas.microsoft.com/office/drawing/2014/main" id="{26840436-E5DE-1B8C-3FD8-DB0418CDF0D4}"/>
+                </a:ext>
+              </a:extLst>
+            </p:cNvPr>
+            <p:cNvSpPr/>
+            <p:nvPr/>
+          </p:nvSpPr>
+          <p:spPr>
+            <a:xfrm>
+              <a:off x="1631485" y="3118227"/>
+              <a:ext cx="1207249" cy="730441"/>
+            </a:xfrm>
+            <a:prstGeom prst="rect">
+              <a:avLst/>
+            </a:prstGeom>
+            <a:noFill/>
+          </p:spPr>
+          <p:style>
+            <a:lnRef idx="2">
+              <a:schemeClr val="accent1">
+                <a:shade val="15000"/>
+              </a:schemeClr>
+            </a:lnRef>
+            <a:fillRef idx="1">
+              <a:schemeClr val="accent1"/>
+            </a:fillRef>
+            <a:effectRef idx="0">
+              <a:schemeClr val="accent1"/>
+            </a:effectRef>
+            <a:fontRef idx="minor">
+              <a:schemeClr val="lt1"/>
+            </a:fontRef>
+          </p:style>
+          <p:txBody>
+            <a:bodyPr rtlCol="0" anchor="ctr"/>
+            <a:lstStyle/>
+            <a:p>
+              <a:pPr algn="ctr"/>
+              <a:r>
+                <a:rPr lang="en-US" sz="1050" dirty="0">
+                  <a:solidFill>
+                    <a:schemeClr val="tx1"/>
+                  </a:solidFill>
+                </a:rPr>
+                <a:t>Global</a:t>
+              </a:r>
+            </a:p>
+            <a:p>
+              <a:pPr algn="ctr"/>
+              <a:r>
+                <a:rPr lang="en-US" sz="1050" dirty="0">
+                  <a:solidFill>
+                    <a:schemeClr val="tx1"/>
+                  </a:solidFill>
+                </a:rPr>
+                <a:t>Python</a:t>
+              </a:r>
+            </a:p>
+            <a:p>
+              <a:pPr algn="ctr"/>
+              <a:r>
+                <a:rPr lang="en-US" sz="1050" dirty="0">
+                  <a:solidFill>
+                    <a:schemeClr val="tx1"/>
+                  </a:solidFill>
+                </a:rPr>
+                <a:t>Installation</a:t>
+              </a:r>
+            </a:p>
+          </p:txBody>
+        </p:sp>
+        <p:sp>
+          <p:nvSpPr>
+            <p:cNvPr id="6" name="Rectangle: Rounded Corners 5">
+              <a:extLst>
+                <a:ext uri="{FF2B5EF4-FFF2-40B4-BE49-F238E27FC236}">
+                  <a16:creationId xmlns:a16="http://schemas.microsoft.com/office/drawing/2014/main" id="{2B8B0D58-9880-F110-E6F4-9D6CD15518DF}"/>
+                </a:ext>
+              </a:extLst>
+            </p:cNvPr>
+            <p:cNvSpPr/>
+            <p:nvPr/>
+          </p:nvSpPr>
+          <p:spPr>
+            <a:xfrm>
+              <a:off x="693004" y="2701970"/>
+              <a:ext cx="808250" cy="320722"/>
+            </a:xfrm>
+            <a:prstGeom prst="roundRect">
+              <a:avLst/>
+            </a:prstGeom>
+            <a:noFill/>
+          </p:spPr>
+          <p:style>
+            <a:lnRef idx="2">
+              <a:schemeClr val="accent1">
+                <a:shade val="15000"/>
+              </a:schemeClr>
+            </a:lnRef>
+            <a:fillRef idx="1">
+              <a:schemeClr val="accent1"/>
+            </a:fillRef>
+            <a:effectRef idx="0">
+              <a:schemeClr val="accent1"/>
+            </a:effectRef>
+            <a:fontRef idx="minor">
+              <a:schemeClr val="lt1"/>
+            </a:fontRef>
+          </p:style>
+          <p:txBody>
+            <a:bodyPr rtlCol="0" anchor="ctr"/>
+            <a:lstStyle/>
+            <a:p>
+              <a:pPr algn="ctr"/>
+              <a:r>
+                <a:rPr lang="en-US" sz="1400" dirty="0">
+                  <a:solidFill>
+                    <a:schemeClr val="tx1"/>
+                  </a:solidFill>
+                </a:rPr>
+                <a:t>lib</a:t>
+              </a:r>
+            </a:p>
+          </p:txBody>
+        </p:sp>
+        <p:sp>
+          <p:nvSpPr>
+            <p:cNvPr id="8" name="Rectangle: Rounded Corners 7">
+              <a:extLst>
+                <a:ext uri="{FF2B5EF4-FFF2-40B4-BE49-F238E27FC236}">
+                  <a16:creationId xmlns:a16="http://schemas.microsoft.com/office/drawing/2014/main" id="{A5AD39C8-123E-06C1-A5DB-279C7C23349D}"/>
+                </a:ext>
+              </a:extLst>
+            </p:cNvPr>
+            <p:cNvSpPr/>
+            <p:nvPr/>
+          </p:nvSpPr>
+          <p:spPr>
+            <a:xfrm>
+              <a:off x="693004" y="3067190"/>
+              <a:ext cx="808250" cy="320722"/>
+            </a:xfrm>
+            <a:prstGeom prst="roundRect">
+              <a:avLst/>
+            </a:prstGeom>
+            <a:noFill/>
+          </p:spPr>
+          <p:style>
+            <a:lnRef idx="2">
+              <a:schemeClr val="accent1">
+                <a:shade val="15000"/>
+              </a:schemeClr>
+            </a:lnRef>
+            <a:fillRef idx="1">
+              <a:schemeClr val="accent1"/>
+            </a:fillRef>
+            <a:effectRef idx="0">
+              <a:schemeClr val="accent1"/>
+            </a:effectRef>
+            <a:fontRef idx="minor">
+              <a:schemeClr val="lt1"/>
+            </a:fontRef>
+          </p:style>
+          <p:txBody>
+            <a:bodyPr rtlCol="0" anchor="ctr"/>
+            <a:lstStyle/>
+            <a:p>
+              <a:pPr algn="ctr"/>
+              <a:r>
+                <a:rPr lang="en-US" sz="1400" dirty="0">
+                  <a:solidFill>
+                    <a:schemeClr val="tx1"/>
+                  </a:solidFill>
+                </a:rPr>
+                <a:t>lib</a:t>
+              </a:r>
+            </a:p>
+          </p:txBody>
+        </p:sp>
+        <p:sp>
+          <p:nvSpPr>
+            <p:cNvPr id="9" name="Rectangle: Rounded Corners 8">
+              <a:extLst>
+                <a:ext uri="{FF2B5EF4-FFF2-40B4-BE49-F238E27FC236}">
+                  <a16:creationId xmlns:a16="http://schemas.microsoft.com/office/drawing/2014/main" id="{B24E5058-6803-933D-2FF8-45C691ED30EA}"/>
+                </a:ext>
+              </a:extLst>
+            </p:cNvPr>
+            <p:cNvSpPr/>
+            <p:nvPr/>
+          </p:nvSpPr>
+          <p:spPr>
+            <a:xfrm>
+              <a:off x="693004" y="3517566"/>
+              <a:ext cx="808250" cy="320722"/>
+            </a:xfrm>
+            <a:prstGeom prst="roundRect">
+              <a:avLst/>
+            </a:prstGeom>
+            <a:noFill/>
+          </p:spPr>
+          <p:style>
+            <a:lnRef idx="2">
+              <a:schemeClr val="accent1">
+                <a:shade val="15000"/>
+              </a:schemeClr>
+            </a:lnRef>
+            <a:fillRef idx="1">
+              <a:schemeClr val="accent1"/>
+            </a:fillRef>
+            <a:effectRef idx="0">
+              <a:schemeClr val="accent1"/>
+            </a:effectRef>
+            <a:fontRef idx="minor">
+              <a:schemeClr val="lt1"/>
+            </a:fontRef>
+          </p:style>
+          <p:txBody>
+            <a:bodyPr rtlCol="0" anchor="ctr"/>
+            <a:lstStyle/>
+            <a:p>
+              <a:pPr algn="ctr"/>
+              <a:r>
+                <a:rPr lang="en-US" sz="1400" dirty="0">
+                  <a:solidFill>
+                    <a:schemeClr val="tx1"/>
+                  </a:solidFill>
+                </a:rPr>
+                <a:t>lib</a:t>
+              </a:r>
+            </a:p>
+          </p:txBody>
+        </p:sp>
+        <p:sp>
+          <p:nvSpPr>
+            <p:cNvPr id="10" name="Rectangle: Rounded Corners 9">
+              <a:extLst>
+                <a:ext uri="{FF2B5EF4-FFF2-40B4-BE49-F238E27FC236}">
+                  <a16:creationId xmlns:a16="http://schemas.microsoft.com/office/drawing/2014/main" id="{CB7D9F3B-AF77-E320-5DC2-9C90976A7878}"/>
+                </a:ext>
+              </a:extLst>
+            </p:cNvPr>
+            <p:cNvSpPr/>
+            <p:nvPr/>
+          </p:nvSpPr>
+          <p:spPr>
+            <a:xfrm>
+              <a:off x="693004" y="3967942"/>
+              <a:ext cx="808250" cy="320722"/>
+            </a:xfrm>
+            <a:prstGeom prst="roundRect">
+              <a:avLst/>
+            </a:prstGeom>
+            <a:noFill/>
+          </p:spPr>
+          <p:style>
+            <a:lnRef idx="2">
+              <a:schemeClr val="accent1">
+                <a:shade val="15000"/>
+              </a:schemeClr>
+            </a:lnRef>
+            <a:fillRef idx="1">
+              <a:schemeClr val="accent1"/>
+            </a:fillRef>
+            <a:effectRef idx="0">
+              <a:schemeClr val="accent1"/>
+            </a:effectRef>
+            <a:fontRef idx="minor">
+              <a:schemeClr val="lt1"/>
+            </a:fontRef>
+          </p:style>
+          <p:txBody>
+            <a:bodyPr rtlCol="0" anchor="ctr"/>
+            <a:lstStyle/>
+            <a:p>
+              <a:pPr algn="ctr"/>
+              <a:r>
+                <a:rPr lang="en-US" sz="1400" dirty="0">
+                  <a:solidFill>
+                    <a:schemeClr val="tx1"/>
+                  </a:solidFill>
+                </a:rPr>
+                <a:t>lib</a:t>
+              </a:r>
+            </a:p>
+          </p:txBody>
+        </p:sp>
+        <p:grpSp>
+          <p:nvGrpSpPr>
+            <p:cNvPr id="16" name="Group 15">
+              <a:extLst>
+                <a:ext uri="{FF2B5EF4-FFF2-40B4-BE49-F238E27FC236}">
+                  <a16:creationId xmlns:a16="http://schemas.microsoft.com/office/drawing/2014/main" id="{E64D9A99-16FC-4B50-EE3F-EB8A0523D7FF}"/>
+                </a:ext>
+              </a:extLst>
+            </p:cNvPr>
+            <p:cNvGrpSpPr/>
+            <p:nvPr/>
+          </p:nvGrpSpPr>
+          <p:grpSpPr>
+            <a:xfrm>
+              <a:off x="3727359" y="1782453"/>
+              <a:ext cx="2437637" cy="919517"/>
+              <a:chOff x="3444547" y="3297067"/>
+              <a:chExt cx="2437637" cy="919517"/>
+            </a:xfrm>
+          </p:grpSpPr>
+          <p:sp>
+            <p:nvSpPr>
+              <p:cNvPr id="11" name="Rectangle 10">
+                <a:extLst>
+                  <a:ext uri="{FF2B5EF4-FFF2-40B4-BE49-F238E27FC236}">
+                    <a16:creationId xmlns:a16="http://schemas.microsoft.com/office/drawing/2014/main" id="{E9FB1B58-8E86-6E69-00F9-18112334625F}"/>
+                  </a:ext>
+                </a:extLst>
+              </p:cNvPr>
+              <p:cNvSpPr/>
+              <p:nvPr/>
+            </p:nvSpPr>
+            <p:spPr>
+              <a:xfrm>
+                <a:off x="3444547" y="3472924"/>
+                <a:ext cx="1207249" cy="546197"/>
+              </a:xfrm>
+              <a:prstGeom prst="rect">
+                <a:avLst/>
+              </a:prstGeom>
+              <a:noFill/>
+            </p:spPr>
+            <p:style>
+              <a:lnRef idx="2">
+                <a:schemeClr val="accent1">
+                  <a:shade val="15000"/>
+                </a:schemeClr>
+              </a:lnRef>
+              <a:fillRef idx="1">
+                <a:schemeClr val="accent1"/>
+              </a:fillRef>
+              <a:effectRef idx="0">
+                <a:schemeClr val="accent1"/>
+              </a:effectRef>
+              <a:fontRef idx="minor">
+                <a:schemeClr val="lt1"/>
+              </a:fontRef>
+            </p:style>
+            <p:txBody>
+              <a:bodyPr rtlCol="0" anchor="ctr"/>
+              <a:lstStyle/>
+              <a:p>
+                <a:pPr algn="ctr"/>
+                <a:r>
+                  <a:rPr lang="en-US" sz="1050" dirty="0">
+                    <a:solidFill>
+                      <a:schemeClr val="tx1"/>
+                    </a:solidFill>
+                  </a:rPr>
+                  <a:t>Project 1</a:t>
+                </a:r>
+              </a:p>
+            </p:txBody>
+          </p:sp>
+          <p:sp>
+            <p:nvSpPr>
+              <p:cNvPr id="12" name="Rectangle: Rounded Corners 11">
+                <a:extLst>
+                  <a:ext uri="{FF2B5EF4-FFF2-40B4-BE49-F238E27FC236}">
+                    <a16:creationId xmlns:a16="http://schemas.microsoft.com/office/drawing/2014/main" id="{B1252B3F-4BD4-85C7-E5B1-04AF847B3648}"/>
+                  </a:ext>
+                </a:extLst>
+              </p:cNvPr>
+              <p:cNvSpPr/>
+              <p:nvPr/>
+            </p:nvSpPr>
+            <p:spPr>
+              <a:xfrm>
+                <a:off x="4782027" y="3297067"/>
+                <a:ext cx="1100157" cy="256469"/>
+              </a:xfrm>
+              <a:prstGeom prst="roundRect">
+                <a:avLst/>
+              </a:prstGeom>
+              <a:noFill/>
+            </p:spPr>
+            <p:style>
+              <a:lnRef idx="2">
+                <a:schemeClr val="accent1">
+                  <a:shade val="15000"/>
+                </a:schemeClr>
+              </a:lnRef>
+              <a:fillRef idx="1">
+                <a:schemeClr val="accent1"/>
+              </a:fillRef>
+              <a:effectRef idx="0">
+                <a:schemeClr val="accent1"/>
+              </a:effectRef>
+              <a:fontRef idx="minor">
+                <a:schemeClr val="lt1"/>
+              </a:fontRef>
+            </p:style>
+            <p:txBody>
+              <a:bodyPr rtlCol="0" anchor="ctr"/>
+              <a:lstStyle/>
+              <a:p>
+                <a:pPr algn="ctr"/>
+                <a:r>
+                  <a:rPr lang="en-US" sz="1400" dirty="0">
+                    <a:solidFill>
+                      <a:schemeClr val="tx1"/>
+                    </a:solidFill>
+                  </a:rPr>
+                  <a:t>Sub </a:t>
+                </a:r>
+                <a:r>
+                  <a:rPr lang="en-US" sz="1400" dirty="0" err="1">
+                    <a:solidFill>
+                      <a:schemeClr val="tx1"/>
+                    </a:solidFill>
+                  </a:rPr>
+                  <a:t>dir</a:t>
+                </a:r>
+                <a:endParaRPr lang="en-US" sz="1400" dirty="0">
+                  <a:solidFill>
+                    <a:schemeClr val="tx1"/>
+                  </a:solidFill>
+                </a:endParaRPr>
+              </a:p>
+            </p:txBody>
+          </p:sp>
+          <p:sp>
+            <p:nvSpPr>
+              <p:cNvPr id="13" name="Rectangle: Rounded Corners 12">
+                <a:extLst>
+                  <a:ext uri="{FF2B5EF4-FFF2-40B4-BE49-F238E27FC236}">
+                    <a16:creationId xmlns:a16="http://schemas.microsoft.com/office/drawing/2014/main" id="{0E0F678C-D3A6-B480-53EF-DB6D3BFE91F3}"/>
+                  </a:ext>
+                </a:extLst>
+              </p:cNvPr>
+              <p:cNvSpPr/>
+              <p:nvPr/>
+            </p:nvSpPr>
+            <p:spPr>
+              <a:xfrm>
+                <a:off x="4782027" y="3617789"/>
+                <a:ext cx="1100157" cy="256469"/>
+              </a:xfrm>
+              <a:prstGeom prst="roundRect">
+                <a:avLst/>
+              </a:prstGeom>
+              <a:noFill/>
+            </p:spPr>
+            <p:style>
+              <a:lnRef idx="2">
+                <a:schemeClr val="accent1">
+                  <a:shade val="15000"/>
+                </a:schemeClr>
+              </a:lnRef>
+              <a:fillRef idx="1">
+                <a:schemeClr val="accent1"/>
+              </a:fillRef>
+              <a:effectRef idx="0">
+                <a:schemeClr val="accent1"/>
+              </a:effectRef>
+              <a:fontRef idx="minor">
+                <a:schemeClr val="lt1"/>
+              </a:fontRef>
+            </p:style>
+            <p:txBody>
+              <a:bodyPr rtlCol="0" anchor="ctr"/>
+              <a:lstStyle/>
+              <a:p>
+                <a:pPr algn="ctr"/>
+                <a:r>
+                  <a:rPr lang="en-US" sz="1400" dirty="0">
+                    <a:solidFill>
+                      <a:schemeClr val="tx1"/>
+                    </a:solidFill>
+                  </a:rPr>
+                  <a:t>Sub </a:t>
+                </a:r>
+                <a:r>
+                  <a:rPr lang="en-US" sz="1400" dirty="0" err="1">
+                    <a:solidFill>
+                      <a:schemeClr val="tx1"/>
+                    </a:solidFill>
+                  </a:rPr>
+                  <a:t>dir</a:t>
+                </a:r>
+                <a:endParaRPr lang="en-US" sz="1400" dirty="0">
+                  <a:solidFill>
+                    <a:schemeClr val="tx1"/>
+                  </a:solidFill>
+                </a:endParaRPr>
+              </a:p>
+            </p:txBody>
+          </p:sp>
+          <p:sp>
+            <p:nvSpPr>
+              <p:cNvPr id="14" name="Rectangle: Rounded Corners 13">
+                <a:extLst>
+                  <a:ext uri="{FF2B5EF4-FFF2-40B4-BE49-F238E27FC236}">
+                    <a16:creationId xmlns:a16="http://schemas.microsoft.com/office/drawing/2014/main" id="{A65B9C25-1823-20D9-83D7-C290367DD645}"/>
+                  </a:ext>
+                </a:extLst>
+              </p:cNvPr>
+              <p:cNvSpPr/>
+              <p:nvPr/>
+            </p:nvSpPr>
+            <p:spPr>
+              <a:xfrm>
+                <a:off x="4782027" y="3960115"/>
+                <a:ext cx="1100157" cy="256469"/>
+              </a:xfrm>
+              <a:prstGeom prst="roundRect">
+                <a:avLst/>
+              </a:prstGeom>
+              <a:noFill/>
+            </p:spPr>
+            <p:style>
+              <a:lnRef idx="2">
+                <a:schemeClr val="accent1">
+                  <a:shade val="15000"/>
+                </a:schemeClr>
+              </a:lnRef>
+              <a:fillRef idx="1">
+                <a:schemeClr val="accent1"/>
+              </a:fillRef>
+              <a:effectRef idx="0">
+                <a:schemeClr val="accent1"/>
+              </a:effectRef>
+              <a:fontRef idx="minor">
+                <a:schemeClr val="lt1"/>
+              </a:fontRef>
+            </p:style>
+            <p:txBody>
+              <a:bodyPr rtlCol="0" anchor="ctr"/>
+              <a:lstStyle/>
+              <a:p>
+                <a:pPr algn="ctr"/>
+                <a:r>
+                  <a:rPr lang="en-US" sz="1400" dirty="0">
+                    <a:solidFill>
+                      <a:schemeClr val="tx1"/>
+                    </a:solidFill>
+                  </a:rPr>
+                  <a:t>Sub </a:t>
+                </a:r>
+                <a:r>
+                  <a:rPr lang="en-US" sz="1400" dirty="0" err="1">
+                    <a:solidFill>
+                      <a:schemeClr val="tx1"/>
+                    </a:solidFill>
+                  </a:rPr>
+                  <a:t>dir</a:t>
+                </a:r>
+                <a:endParaRPr lang="en-US" sz="1400" dirty="0">
+                  <a:solidFill>
+                    <a:schemeClr val="tx1"/>
+                  </a:solidFill>
+                </a:endParaRPr>
+              </a:p>
+            </p:txBody>
+          </p:sp>
+        </p:grpSp>
+        <p:grpSp>
+          <p:nvGrpSpPr>
+            <p:cNvPr id="17" name="Group 16">
+              <a:extLst>
+                <a:ext uri="{FF2B5EF4-FFF2-40B4-BE49-F238E27FC236}">
+                  <a16:creationId xmlns:a16="http://schemas.microsoft.com/office/drawing/2014/main" id="{C6972DAC-8F2F-A1FD-1A0D-CA0204D43164}"/>
+                </a:ext>
+              </a:extLst>
+            </p:cNvPr>
+            <p:cNvGrpSpPr/>
+            <p:nvPr/>
+          </p:nvGrpSpPr>
+          <p:grpSpPr>
+            <a:xfrm>
+              <a:off x="3781949" y="2941235"/>
+              <a:ext cx="2437637" cy="919517"/>
+              <a:chOff x="3444547" y="3297067"/>
+              <a:chExt cx="2437637" cy="919517"/>
+            </a:xfrm>
+          </p:grpSpPr>
+          <p:sp>
+            <p:nvSpPr>
+              <p:cNvPr id="18" name="Rectangle 17">
+                <a:extLst>
+                  <a:ext uri="{FF2B5EF4-FFF2-40B4-BE49-F238E27FC236}">
+                    <a16:creationId xmlns:a16="http://schemas.microsoft.com/office/drawing/2014/main" id="{1285A463-F620-FB86-C190-E7F06BE46A34}"/>
+                  </a:ext>
+                </a:extLst>
+              </p:cNvPr>
+              <p:cNvSpPr/>
+              <p:nvPr/>
+            </p:nvSpPr>
+            <p:spPr>
+              <a:xfrm>
+                <a:off x="3444547" y="3472924"/>
+                <a:ext cx="1207249" cy="546197"/>
+              </a:xfrm>
+              <a:prstGeom prst="rect">
+                <a:avLst/>
+              </a:prstGeom>
+              <a:noFill/>
+            </p:spPr>
+            <p:style>
+              <a:lnRef idx="2">
+                <a:schemeClr val="accent1">
+                  <a:shade val="15000"/>
+                </a:schemeClr>
+              </a:lnRef>
+              <a:fillRef idx="1">
+                <a:schemeClr val="accent1"/>
+              </a:fillRef>
+              <a:effectRef idx="0">
+                <a:schemeClr val="accent1"/>
+              </a:effectRef>
+              <a:fontRef idx="minor">
+                <a:schemeClr val="lt1"/>
+              </a:fontRef>
+            </p:style>
+            <p:txBody>
+              <a:bodyPr rtlCol="0" anchor="ctr"/>
+              <a:lstStyle/>
+              <a:p>
+                <a:pPr algn="ctr"/>
+                <a:r>
+                  <a:rPr lang="en-US" sz="1050" dirty="0">
+                    <a:solidFill>
+                      <a:schemeClr val="tx1"/>
+                    </a:solidFill>
+                  </a:rPr>
+                  <a:t>Project 2</a:t>
+                </a:r>
+              </a:p>
+            </p:txBody>
+          </p:sp>
+          <p:sp>
+            <p:nvSpPr>
+              <p:cNvPr id="19" name="Rectangle: Rounded Corners 18">
+                <a:extLst>
+                  <a:ext uri="{FF2B5EF4-FFF2-40B4-BE49-F238E27FC236}">
+                    <a16:creationId xmlns:a16="http://schemas.microsoft.com/office/drawing/2014/main" id="{788CB140-AFD5-AA9E-041C-6DEEE92C45E0}"/>
+                  </a:ext>
+                </a:extLst>
+              </p:cNvPr>
+              <p:cNvSpPr/>
+              <p:nvPr/>
+            </p:nvSpPr>
+            <p:spPr>
+              <a:xfrm>
+                <a:off x="4782027" y="3297067"/>
+                <a:ext cx="1100157" cy="256469"/>
+              </a:xfrm>
+              <a:prstGeom prst="roundRect">
+                <a:avLst/>
+              </a:prstGeom>
+              <a:noFill/>
+            </p:spPr>
+            <p:style>
+              <a:lnRef idx="2">
+                <a:schemeClr val="accent1">
+                  <a:shade val="15000"/>
+                </a:schemeClr>
+              </a:lnRef>
+              <a:fillRef idx="1">
+                <a:schemeClr val="accent1"/>
+              </a:fillRef>
+              <a:effectRef idx="0">
+                <a:schemeClr val="accent1"/>
+              </a:effectRef>
+              <a:fontRef idx="minor">
+                <a:schemeClr val="lt1"/>
+              </a:fontRef>
+            </p:style>
+            <p:txBody>
+              <a:bodyPr rtlCol="0" anchor="ctr"/>
+              <a:lstStyle/>
+              <a:p>
+                <a:pPr algn="ctr"/>
+                <a:r>
+                  <a:rPr lang="en-US" sz="1400" dirty="0">
+                    <a:solidFill>
+                      <a:schemeClr val="tx1"/>
+                    </a:solidFill>
+                  </a:rPr>
+                  <a:t>Sub </a:t>
+                </a:r>
+                <a:r>
+                  <a:rPr lang="en-US" sz="1400" dirty="0" err="1">
+                    <a:solidFill>
+                      <a:schemeClr val="tx1"/>
+                    </a:solidFill>
+                  </a:rPr>
+                  <a:t>dir</a:t>
+                </a:r>
+                <a:endParaRPr lang="en-US" sz="1400" dirty="0">
+                  <a:solidFill>
+                    <a:schemeClr val="tx1"/>
+                  </a:solidFill>
+                </a:endParaRPr>
+              </a:p>
+            </p:txBody>
+          </p:sp>
+          <p:sp>
+            <p:nvSpPr>
+              <p:cNvPr id="20" name="Rectangle: Rounded Corners 19">
+                <a:extLst>
+                  <a:ext uri="{FF2B5EF4-FFF2-40B4-BE49-F238E27FC236}">
+                    <a16:creationId xmlns:a16="http://schemas.microsoft.com/office/drawing/2014/main" id="{D48BD2A1-E6D2-808F-4D30-5FE67B02C4EE}"/>
+                  </a:ext>
+                </a:extLst>
+              </p:cNvPr>
+              <p:cNvSpPr/>
+              <p:nvPr/>
+            </p:nvSpPr>
+            <p:spPr>
+              <a:xfrm>
+                <a:off x="4782027" y="3617789"/>
+                <a:ext cx="1100157" cy="256469"/>
+              </a:xfrm>
+              <a:prstGeom prst="roundRect">
+                <a:avLst/>
+              </a:prstGeom>
+              <a:noFill/>
+            </p:spPr>
+            <p:style>
+              <a:lnRef idx="2">
+                <a:schemeClr val="accent1">
+                  <a:shade val="15000"/>
+                </a:schemeClr>
+              </a:lnRef>
+              <a:fillRef idx="1">
+                <a:schemeClr val="accent1"/>
+              </a:fillRef>
+              <a:effectRef idx="0">
+                <a:schemeClr val="accent1"/>
+              </a:effectRef>
+              <a:fontRef idx="minor">
+                <a:schemeClr val="lt1"/>
+              </a:fontRef>
+            </p:style>
+            <p:txBody>
+              <a:bodyPr rtlCol="0" anchor="ctr"/>
+              <a:lstStyle/>
+              <a:p>
+                <a:pPr algn="ctr"/>
+                <a:r>
+                  <a:rPr lang="en-US" sz="1400" dirty="0">
+                    <a:solidFill>
+                      <a:schemeClr val="tx1"/>
+                    </a:solidFill>
+                  </a:rPr>
+                  <a:t>Sub </a:t>
+                </a:r>
+                <a:r>
+                  <a:rPr lang="en-US" sz="1400" dirty="0" err="1">
+                    <a:solidFill>
+                      <a:schemeClr val="tx1"/>
+                    </a:solidFill>
+                  </a:rPr>
+                  <a:t>dir</a:t>
+                </a:r>
+                <a:endParaRPr lang="en-US" sz="1400" dirty="0">
+                  <a:solidFill>
+                    <a:schemeClr val="tx1"/>
+                  </a:solidFill>
+                </a:endParaRPr>
+              </a:p>
+            </p:txBody>
+          </p:sp>
+          <p:sp>
+            <p:nvSpPr>
+              <p:cNvPr id="21" name="Rectangle: Rounded Corners 20">
+                <a:extLst>
+                  <a:ext uri="{FF2B5EF4-FFF2-40B4-BE49-F238E27FC236}">
+                    <a16:creationId xmlns:a16="http://schemas.microsoft.com/office/drawing/2014/main" id="{B0611147-C6D1-E24A-87C6-B8BBD07D945F}"/>
+                  </a:ext>
+                </a:extLst>
+              </p:cNvPr>
+              <p:cNvSpPr/>
+              <p:nvPr/>
+            </p:nvSpPr>
+            <p:spPr>
+              <a:xfrm>
+                <a:off x="4782027" y="3960115"/>
+                <a:ext cx="1100157" cy="256469"/>
+              </a:xfrm>
+              <a:prstGeom prst="roundRect">
+                <a:avLst/>
+              </a:prstGeom>
+              <a:noFill/>
+            </p:spPr>
+            <p:style>
+              <a:lnRef idx="2">
+                <a:schemeClr val="accent1">
+                  <a:shade val="15000"/>
+                </a:schemeClr>
+              </a:lnRef>
+              <a:fillRef idx="1">
+                <a:schemeClr val="accent1"/>
+              </a:fillRef>
+              <a:effectRef idx="0">
+                <a:schemeClr val="accent1"/>
+              </a:effectRef>
+              <a:fontRef idx="minor">
+                <a:schemeClr val="lt1"/>
+              </a:fontRef>
+            </p:style>
+            <p:txBody>
+              <a:bodyPr rtlCol="0" anchor="ctr"/>
+              <a:lstStyle/>
+              <a:p>
+                <a:pPr algn="ctr"/>
+                <a:r>
+                  <a:rPr lang="en-US" sz="1400" dirty="0">
+                    <a:solidFill>
+                      <a:schemeClr val="tx1"/>
+                    </a:solidFill>
+                  </a:rPr>
+                  <a:t>Sub </a:t>
+                </a:r>
+                <a:r>
+                  <a:rPr lang="en-US" sz="1400" dirty="0" err="1">
+                    <a:solidFill>
+                      <a:schemeClr val="tx1"/>
+                    </a:solidFill>
+                  </a:rPr>
+                  <a:t>dir</a:t>
+                </a:r>
+                <a:endParaRPr lang="en-US" sz="1400" dirty="0">
+                  <a:solidFill>
+                    <a:schemeClr val="tx1"/>
+                  </a:solidFill>
+                </a:endParaRPr>
+              </a:p>
+            </p:txBody>
+          </p:sp>
+        </p:grpSp>
+        <p:sp>
+          <p:nvSpPr>
+            <p:cNvPr id="25" name="Rectangle 24">
+              <a:extLst>
+                <a:ext uri="{FF2B5EF4-FFF2-40B4-BE49-F238E27FC236}">
+                  <a16:creationId xmlns:a16="http://schemas.microsoft.com/office/drawing/2014/main" id="{F9BF82A2-13FE-923F-6E02-CD01C5CD5801}"/>
+                </a:ext>
+              </a:extLst>
+            </p:cNvPr>
+            <p:cNvSpPr/>
+            <p:nvPr/>
+          </p:nvSpPr>
+          <p:spPr>
+            <a:xfrm>
+              <a:off x="1134059" y="5633467"/>
+              <a:ext cx="1207249" cy="546197"/>
+            </a:xfrm>
+            <a:prstGeom prst="rect">
+              <a:avLst/>
+            </a:prstGeom>
+            <a:noFill/>
+            <a:ln w="28575">
+              <a:solidFill>
+                <a:srgbClr val="FF0000"/>
+              </a:solidFill>
+            </a:ln>
+          </p:spPr>
+          <p:style>
+            <a:lnRef idx="2">
+              <a:schemeClr val="accent1">
+                <a:shade val="15000"/>
+              </a:schemeClr>
+            </a:lnRef>
+            <a:fillRef idx="1">
+              <a:schemeClr val="accent1"/>
+            </a:fillRef>
+            <a:effectRef idx="0">
+              <a:schemeClr val="accent1"/>
+            </a:effectRef>
+            <a:fontRef idx="minor">
+              <a:schemeClr val="lt1"/>
+            </a:fontRef>
+          </p:style>
+          <p:txBody>
+            <a:bodyPr rtlCol="0" anchor="ctr"/>
+            <a:lstStyle/>
+            <a:p>
+              <a:pPr algn="ctr"/>
+              <a:r>
+                <a:rPr lang="en-US" sz="1050" dirty="0">
+                  <a:solidFill>
+                    <a:schemeClr val="tx1"/>
+                  </a:solidFill>
+                </a:rPr>
+                <a:t>Project 3</a:t>
+              </a:r>
+            </a:p>
+          </p:txBody>
+        </p:sp>
+        <p:sp>
+          <p:nvSpPr>
+            <p:cNvPr id="26" name="Rectangle: Rounded Corners 25">
+              <a:extLst>
+                <a:ext uri="{FF2B5EF4-FFF2-40B4-BE49-F238E27FC236}">
+                  <a16:creationId xmlns:a16="http://schemas.microsoft.com/office/drawing/2014/main" id="{761A58E5-D55A-CDF1-061A-344363BD4748}"/>
+                </a:ext>
+              </a:extLst>
+            </p:cNvPr>
+            <p:cNvSpPr/>
+            <p:nvPr/>
+          </p:nvSpPr>
+          <p:spPr>
+            <a:xfrm>
+              <a:off x="3331026" y="5727643"/>
+              <a:ext cx="1100157" cy="256469"/>
+            </a:xfrm>
+            <a:prstGeom prst="roundRect">
+              <a:avLst/>
+            </a:prstGeom>
+            <a:noFill/>
+          </p:spPr>
+          <p:style>
+            <a:lnRef idx="2">
+              <a:schemeClr val="accent1">
+                <a:shade val="15000"/>
+              </a:schemeClr>
+            </a:lnRef>
+            <a:fillRef idx="1">
+              <a:schemeClr val="accent1"/>
+            </a:fillRef>
+            <a:effectRef idx="0">
+              <a:schemeClr val="accent1"/>
+            </a:effectRef>
+            <a:fontRef idx="minor">
+              <a:schemeClr val="lt1"/>
+            </a:fontRef>
+          </p:style>
+          <p:txBody>
+            <a:bodyPr rtlCol="0" anchor="ctr"/>
+            <a:lstStyle/>
+            <a:p>
+              <a:pPr algn="ctr"/>
+              <a:r>
+                <a:rPr lang="en-US" sz="1400" dirty="0">
+                  <a:solidFill>
+                    <a:schemeClr val="tx1"/>
+                  </a:solidFill>
+                </a:rPr>
+                <a:t>Sub </a:t>
+              </a:r>
+              <a:r>
+                <a:rPr lang="en-US" sz="1400" dirty="0" err="1">
+                  <a:solidFill>
+                    <a:schemeClr val="tx1"/>
+                  </a:solidFill>
+                </a:rPr>
+                <a:t>dir</a:t>
+              </a:r>
+              <a:endParaRPr lang="en-US" sz="1400" dirty="0">
+                <a:solidFill>
+                  <a:schemeClr val="tx1"/>
+                </a:solidFill>
+              </a:endParaRPr>
+            </a:p>
+          </p:txBody>
+        </p:sp>
+        <p:sp>
+          <p:nvSpPr>
+            <p:cNvPr id="27" name="Rectangle: Rounded Corners 26">
+              <a:extLst>
+                <a:ext uri="{FF2B5EF4-FFF2-40B4-BE49-F238E27FC236}">
+                  <a16:creationId xmlns:a16="http://schemas.microsoft.com/office/drawing/2014/main" id="{6808E0B9-52FA-41C4-0834-571B72559AA2}"/>
+                </a:ext>
+              </a:extLst>
+            </p:cNvPr>
+            <p:cNvSpPr/>
+            <p:nvPr/>
+          </p:nvSpPr>
+          <p:spPr>
+            <a:xfrm>
+              <a:off x="3331026" y="6048365"/>
+              <a:ext cx="1100157" cy="256469"/>
+            </a:xfrm>
+            <a:prstGeom prst="roundRect">
+              <a:avLst/>
+            </a:prstGeom>
+            <a:noFill/>
+          </p:spPr>
+          <p:style>
+            <a:lnRef idx="2">
+              <a:schemeClr val="accent1">
+                <a:shade val="15000"/>
+              </a:schemeClr>
+            </a:lnRef>
+            <a:fillRef idx="1">
+              <a:schemeClr val="accent1"/>
+            </a:fillRef>
+            <a:effectRef idx="0">
+              <a:schemeClr val="accent1"/>
+            </a:effectRef>
+            <a:fontRef idx="minor">
+              <a:schemeClr val="lt1"/>
+            </a:fontRef>
+          </p:style>
+          <p:txBody>
+            <a:bodyPr rtlCol="0" anchor="ctr"/>
+            <a:lstStyle/>
+            <a:p>
+              <a:pPr algn="ctr"/>
+              <a:r>
+                <a:rPr lang="en-US" sz="1400" dirty="0">
+                  <a:solidFill>
+                    <a:schemeClr val="tx1"/>
+                  </a:solidFill>
+                </a:rPr>
+                <a:t>Sub </a:t>
+              </a:r>
+              <a:r>
+                <a:rPr lang="en-US" sz="1400" dirty="0" err="1">
+                  <a:solidFill>
+                    <a:schemeClr val="tx1"/>
+                  </a:solidFill>
+                </a:rPr>
+                <a:t>dir</a:t>
+              </a:r>
+              <a:endParaRPr lang="en-US" sz="1400" dirty="0">
+                <a:solidFill>
+                  <a:schemeClr val="tx1"/>
+                </a:solidFill>
+              </a:endParaRPr>
+            </a:p>
+          </p:txBody>
+        </p:sp>
+        <p:sp>
+          <p:nvSpPr>
+            <p:cNvPr id="28" name="Rectangle: Rounded Corners 27">
+              <a:extLst>
+                <a:ext uri="{FF2B5EF4-FFF2-40B4-BE49-F238E27FC236}">
+                  <a16:creationId xmlns:a16="http://schemas.microsoft.com/office/drawing/2014/main" id="{6D7E0A3E-DCAE-DE58-A705-7473A7A27643}"/>
+                </a:ext>
+              </a:extLst>
+            </p:cNvPr>
+            <p:cNvSpPr/>
+            <p:nvPr/>
+          </p:nvSpPr>
+          <p:spPr>
+            <a:xfrm>
+              <a:off x="3331026" y="6390691"/>
+              <a:ext cx="1100157" cy="256469"/>
+            </a:xfrm>
+            <a:prstGeom prst="roundRect">
+              <a:avLst/>
+            </a:prstGeom>
+            <a:noFill/>
+          </p:spPr>
+          <p:style>
+            <a:lnRef idx="2">
+              <a:schemeClr val="accent1">
+                <a:shade val="15000"/>
+              </a:schemeClr>
+            </a:lnRef>
+            <a:fillRef idx="1">
+              <a:schemeClr val="accent1"/>
+            </a:fillRef>
+            <a:effectRef idx="0">
+              <a:schemeClr val="accent1"/>
+            </a:effectRef>
+            <a:fontRef idx="minor">
+              <a:schemeClr val="lt1"/>
+            </a:fontRef>
+          </p:style>
+          <p:txBody>
+            <a:bodyPr rtlCol="0" anchor="ctr"/>
+            <a:lstStyle/>
+            <a:p>
+              <a:pPr algn="ctr"/>
+              <a:r>
+                <a:rPr lang="en-US" sz="1400" dirty="0">
+                  <a:solidFill>
+                    <a:schemeClr val="tx1"/>
+                  </a:solidFill>
+                </a:rPr>
+                <a:t>Sub </a:t>
+              </a:r>
+              <a:r>
+                <a:rPr lang="en-US" sz="1400" dirty="0" err="1">
+                  <a:solidFill>
+                    <a:schemeClr val="tx1"/>
+                  </a:solidFill>
+                </a:rPr>
+                <a:t>dir</a:t>
+              </a:r>
+              <a:endParaRPr lang="en-US" sz="1400" dirty="0">
+                <a:solidFill>
+                  <a:schemeClr val="tx1"/>
+                </a:solidFill>
+              </a:endParaRPr>
+            </a:p>
+          </p:txBody>
+        </p:sp>
+        <p:cxnSp>
+          <p:nvCxnSpPr>
+            <p:cNvPr id="35" name="Straight Arrow Connector 34">
+              <a:extLst>
+                <a:ext uri="{FF2B5EF4-FFF2-40B4-BE49-F238E27FC236}">
+                  <a16:creationId xmlns:a16="http://schemas.microsoft.com/office/drawing/2014/main" id="{043CEF4C-5B84-722A-B697-608865728D6A}"/>
+                </a:ext>
+              </a:extLst>
+            </p:cNvPr>
+            <p:cNvCxnSpPr>
+              <a:cxnSpLocks/>
+              <a:stCxn id="11" idx="1"/>
+              <a:endCxn id="2" idx="3"/>
+            </p:cNvCxnSpPr>
+            <p:nvPr/>
+          </p:nvCxnSpPr>
+          <p:spPr>
+            <a:xfrm flipH="1">
+              <a:off x="2838734" y="2231409"/>
+              <a:ext cx="888625" cy="1252039"/>
+            </a:xfrm>
+            <a:prstGeom prst="straightConnector1">
+              <a:avLst/>
+            </a:prstGeom>
+            <a:ln>
+              <a:tailEnd type="triangle"/>
+            </a:ln>
+          </p:spPr>
+          <p:style>
+            <a:lnRef idx="1">
+              <a:schemeClr val="accent1"/>
+            </a:lnRef>
+            <a:fillRef idx="0">
+              <a:schemeClr val="accent1"/>
+            </a:fillRef>
+            <a:effectRef idx="0">
+              <a:schemeClr val="accent1"/>
+            </a:effectRef>
+            <a:fontRef idx="minor">
+              <a:schemeClr val="tx1"/>
+            </a:fontRef>
+          </p:style>
+        </p:cxnSp>
+        <p:cxnSp>
+          <p:nvCxnSpPr>
+            <p:cNvPr id="38" name="Straight Arrow Connector 37">
+              <a:extLst>
+                <a:ext uri="{FF2B5EF4-FFF2-40B4-BE49-F238E27FC236}">
+                  <a16:creationId xmlns:a16="http://schemas.microsoft.com/office/drawing/2014/main" id="{91AB55FE-BFDD-C81C-27D3-790D0F3DF445}"/>
+                </a:ext>
+              </a:extLst>
+            </p:cNvPr>
+            <p:cNvCxnSpPr>
+              <a:cxnSpLocks/>
+              <a:stCxn id="18" idx="1"/>
+              <a:endCxn id="2" idx="3"/>
+            </p:cNvCxnSpPr>
+            <p:nvPr/>
+          </p:nvCxnSpPr>
+          <p:spPr>
+            <a:xfrm flipH="1">
+              <a:off x="2838734" y="3390191"/>
+              <a:ext cx="943215" cy="93257"/>
+            </a:xfrm>
+            <a:prstGeom prst="straightConnector1">
+              <a:avLst/>
+            </a:prstGeom>
+            <a:ln>
+              <a:tailEnd type="triangle"/>
+            </a:ln>
+          </p:spPr>
+          <p:style>
+            <a:lnRef idx="1">
+              <a:schemeClr val="accent1"/>
+            </a:lnRef>
+            <a:fillRef idx="0">
+              <a:schemeClr val="accent1"/>
+            </a:fillRef>
+            <a:effectRef idx="0">
+              <a:schemeClr val="accent1"/>
+            </a:effectRef>
+            <a:fontRef idx="minor">
+              <a:schemeClr val="tx1"/>
+            </a:fontRef>
+          </p:style>
+        </p:cxnSp>
+        <p:sp>
+          <p:nvSpPr>
+            <p:cNvPr id="44" name="TextBox 43">
+              <a:extLst>
+                <a:ext uri="{FF2B5EF4-FFF2-40B4-BE49-F238E27FC236}">
+                  <a16:creationId xmlns:a16="http://schemas.microsoft.com/office/drawing/2014/main" id="{66C5F18E-534B-0CDA-2F5C-E3050F50C346}"/>
+                </a:ext>
+              </a:extLst>
+            </p:cNvPr>
+            <p:cNvSpPr txBox="1"/>
+            <p:nvPr/>
+          </p:nvSpPr>
+          <p:spPr>
+            <a:xfrm flipH="1">
+              <a:off x="327194" y="4349811"/>
+              <a:ext cx="1539869" cy="523220"/>
+            </a:xfrm>
+            <a:prstGeom prst="rect">
+              <a:avLst/>
+            </a:prstGeom>
+            <a:noFill/>
+          </p:spPr>
+          <p:txBody>
+            <a:bodyPr wrap="square" rtlCol="0">
+              <a:spAutoFit/>
+            </a:bodyPr>
+            <a:lstStyle/>
+            <a:p>
+              <a:pPr algn="ctr"/>
+              <a:r>
+                <a:rPr lang="en-US" sz="1400" b="1" dirty="0"/>
+                <a:t>Hundreds of shared libs</a:t>
+              </a:r>
+            </a:p>
+          </p:txBody>
+        </p:sp>
+        <p:sp>
+          <p:nvSpPr>
+            <p:cNvPr id="45" name="TextBox 44">
+              <a:extLst>
+                <a:ext uri="{FF2B5EF4-FFF2-40B4-BE49-F238E27FC236}">
+                  <a16:creationId xmlns:a16="http://schemas.microsoft.com/office/drawing/2014/main" id="{5CAD6F38-FE33-3486-CFFA-F7412DCF8DD3}"/>
+                </a:ext>
+              </a:extLst>
+            </p:cNvPr>
+            <p:cNvSpPr txBox="1"/>
+            <p:nvPr/>
+          </p:nvSpPr>
+          <p:spPr>
+            <a:xfrm flipH="1">
+              <a:off x="3579560" y="1635393"/>
+              <a:ext cx="1539869" cy="307777"/>
+            </a:xfrm>
+            <a:prstGeom prst="rect">
+              <a:avLst/>
+            </a:prstGeom>
+            <a:noFill/>
+          </p:spPr>
+          <p:txBody>
+            <a:bodyPr wrap="square" rtlCol="0">
+              <a:spAutoFit/>
+            </a:bodyPr>
+            <a:lstStyle/>
+            <a:p>
+              <a:pPr algn="ctr"/>
+              <a:r>
+                <a:rPr lang="en-US" sz="1400" b="1" dirty="0"/>
+                <a:t>Share libs</a:t>
+              </a:r>
+            </a:p>
+          </p:txBody>
+        </p:sp>
+        <p:sp>
+          <p:nvSpPr>
+            <p:cNvPr id="47" name="TextBox 46">
+              <a:extLst>
+                <a:ext uri="{FF2B5EF4-FFF2-40B4-BE49-F238E27FC236}">
+                  <a16:creationId xmlns:a16="http://schemas.microsoft.com/office/drawing/2014/main" id="{960072FE-1690-24DB-3A98-A2D3AB92028F}"/>
+                </a:ext>
+              </a:extLst>
+            </p:cNvPr>
+            <p:cNvSpPr txBox="1"/>
+            <p:nvPr/>
+          </p:nvSpPr>
+          <p:spPr>
+            <a:xfrm flipH="1">
+              <a:off x="3524970" y="3731529"/>
+              <a:ext cx="1539869" cy="307777"/>
+            </a:xfrm>
+            <a:prstGeom prst="rect">
+              <a:avLst/>
+            </a:prstGeom>
+            <a:noFill/>
+          </p:spPr>
+          <p:txBody>
+            <a:bodyPr wrap="square" rtlCol="0">
+              <a:spAutoFit/>
+            </a:bodyPr>
+            <a:lstStyle/>
+            <a:p>
+              <a:pPr algn="ctr"/>
+              <a:r>
+                <a:rPr lang="en-US" sz="1400" b="1" dirty="0"/>
+                <a:t>Share libs</a:t>
+              </a:r>
+            </a:p>
+          </p:txBody>
+        </p:sp>
+        <p:sp>
+          <p:nvSpPr>
+            <p:cNvPr id="48" name="TextBox 47">
+              <a:extLst>
+                <a:ext uri="{FF2B5EF4-FFF2-40B4-BE49-F238E27FC236}">
+                  <a16:creationId xmlns:a16="http://schemas.microsoft.com/office/drawing/2014/main" id="{05C9876A-2E69-C88B-C9FB-79FDD326E7D1}"/>
+                </a:ext>
+              </a:extLst>
+            </p:cNvPr>
+            <p:cNvSpPr txBox="1"/>
+            <p:nvPr/>
+          </p:nvSpPr>
+          <p:spPr>
+            <a:xfrm flipH="1">
+              <a:off x="1211918" y="1010121"/>
+              <a:ext cx="4626103" cy="338554"/>
+            </a:xfrm>
+            <a:prstGeom prst="rect">
+              <a:avLst/>
+            </a:prstGeom>
+            <a:noFill/>
+          </p:spPr>
+          <p:txBody>
+            <a:bodyPr wrap="square" rtlCol="0">
+              <a:spAutoFit/>
+            </a:bodyPr>
+            <a:lstStyle/>
+            <a:p>
+              <a:pPr algn="ctr"/>
+              <a:r>
+                <a:rPr lang="en-US" sz="1600" dirty="0"/>
+                <a:t>Example of Virtual Environment</a:t>
+              </a:r>
+            </a:p>
+          </p:txBody>
+        </p:sp>
+        <p:grpSp>
+          <p:nvGrpSpPr>
+            <p:cNvPr id="22" name="Group 21">
+              <a:extLst>
+                <a:ext uri="{FF2B5EF4-FFF2-40B4-BE49-F238E27FC236}">
+                  <a16:creationId xmlns:a16="http://schemas.microsoft.com/office/drawing/2014/main" id="{185DAE47-026C-E896-649A-2CA4CD3F74D6}"/>
+                </a:ext>
+              </a:extLst>
+            </p:cNvPr>
+            <p:cNvGrpSpPr/>
+            <p:nvPr/>
+          </p:nvGrpSpPr>
+          <p:grpSpPr>
+            <a:xfrm>
+              <a:off x="4588825" y="5451777"/>
+              <a:ext cx="1539869" cy="2386505"/>
+              <a:chOff x="4689196" y="6198004"/>
+              <a:chExt cx="1539869" cy="2386505"/>
+            </a:xfrm>
+          </p:grpSpPr>
+          <p:sp>
+            <p:nvSpPr>
+              <p:cNvPr id="3" name="Rectangle: Rounded Corners 2">
+                <a:extLst>
+                  <a:ext uri="{FF2B5EF4-FFF2-40B4-BE49-F238E27FC236}">
+                    <a16:creationId xmlns:a16="http://schemas.microsoft.com/office/drawing/2014/main" id="{5D9FFC9A-97C7-7F87-584A-FFCA5BA117B6}"/>
+                  </a:ext>
+                </a:extLst>
+              </p:cNvPr>
+              <p:cNvSpPr/>
+              <p:nvPr/>
+            </p:nvSpPr>
+            <p:spPr>
+              <a:xfrm>
+                <a:off x="5055006" y="6198004"/>
+                <a:ext cx="808250" cy="320722"/>
+              </a:xfrm>
+              <a:prstGeom prst="roundRect">
+                <a:avLst/>
+              </a:prstGeom>
+              <a:noFill/>
+            </p:spPr>
+            <p:style>
+              <a:lnRef idx="2">
+                <a:schemeClr val="accent1">
+                  <a:shade val="15000"/>
+                </a:schemeClr>
+              </a:lnRef>
+              <a:fillRef idx="1">
+                <a:schemeClr val="accent1"/>
+              </a:fillRef>
+              <a:effectRef idx="0">
+                <a:schemeClr val="accent1"/>
+              </a:effectRef>
+              <a:fontRef idx="minor">
+                <a:schemeClr val="lt1"/>
+              </a:fontRef>
+            </p:style>
+            <p:txBody>
+              <a:bodyPr rtlCol="0" anchor="ctr"/>
+              <a:lstStyle/>
+              <a:p>
+                <a:pPr algn="ctr"/>
+                <a:r>
+                  <a:rPr lang="en-US" sz="1400" dirty="0">
+                    <a:solidFill>
+                      <a:schemeClr val="tx1"/>
+                    </a:solidFill>
+                  </a:rPr>
+                  <a:t>python</a:t>
+                </a:r>
+              </a:p>
+            </p:txBody>
+          </p:sp>
+          <p:sp>
+            <p:nvSpPr>
+              <p:cNvPr id="4" name="Rectangle: Rounded Corners 3">
+                <a:extLst>
+                  <a:ext uri="{FF2B5EF4-FFF2-40B4-BE49-F238E27FC236}">
+                    <a16:creationId xmlns:a16="http://schemas.microsoft.com/office/drawing/2014/main" id="{BF60549D-CCC2-31CC-C4C5-7E4516F28C3B}"/>
+                  </a:ext>
+                </a:extLst>
+              </p:cNvPr>
+              <p:cNvSpPr/>
+              <p:nvPr/>
+            </p:nvSpPr>
+            <p:spPr>
+              <a:xfrm>
+                <a:off x="5055006" y="6563224"/>
+                <a:ext cx="808250" cy="320722"/>
+              </a:xfrm>
+              <a:prstGeom prst="roundRect">
+                <a:avLst/>
+              </a:prstGeom>
+              <a:noFill/>
+            </p:spPr>
+            <p:style>
+              <a:lnRef idx="2">
+                <a:schemeClr val="accent1">
+                  <a:shade val="15000"/>
+                </a:schemeClr>
+              </a:lnRef>
+              <a:fillRef idx="1">
+                <a:schemeClr val="accent1"/>
+              </a:fillRef>
+              <a:effectRef idx="0">
+                <a:schemeClr val="accent1"/>
+              </a:effectRef>
+              <a:fontRef idx="minor">
+                <a:schemeClr val="lt1"/>
+              </a:fontRef>
+            </p:style>
+            <p:txBody>
+              <a:bodyPr rtlCol="0" anchor="ctr"/>
+              <a:lstStyle/>
+              <a:p>
+                <a:pPr algn="ctr"/>
+                <a:r>
+                  <a:rPr lang="en-US" sz="1400" dirty="0">
+                    <a:solidFill>
+                      <a:schemeClr val="tx1"/>
+                    </a:solidFill>
+                  </a:rPr>
+                  <a:t>lib</a:t>
+                </a:r>
+              </a:p>
+            </p:txBody>
+          </p:sp>
+          <p:sp>
+            <p:nvSpPr>
+              <p:cNvPr id="5" name="Rectangle: Rounded Corners 4">
+                <a:extLst>
+                  <a:ext uri="{FF2B5EF4-FFF2-40B4-BE49-F238E27FC236}">
+                    <a16:creationId xmlns:a16="http://schemas.microsoft.com/office/drawing/2014/main" id="{1B84C36A-2DE6-3A55-5324-09EFD59E4214}"/>
+                  </a:ext>
+                </a:extLst>
+              </p:cNvPr>
+              <p:cNvSpPr/>
+              <p:nvPr/>
+            </p:nvSpPr>
+            <p:spPr>
+              <a:xfrm>
+                <a:off x="5055006" y="7013600"/>
+                <a:ext cx="808250" cy="320722"/>
+              </a:xfrm>
+              <a:prstGeom prst="roundRect">
+                <a:avLst/>
+              </a:prstGeom>
+              <a:noFill/>
+            </p:spPr>
+            <p:style>
+              <a:lnRef idx="2">
+                <a:schemeClr val="accent1">
+                  <a:shade val="15000"/>
+                </a:schemeClr>
+              </a:lnRef>
+              <a:fillRef idx="1">
+                <a:schemeClr val="accent1"/>
+              </a:fillRef>
+              <a:effectRef idx="0">
+                <a:schemeClr val="accent1"/>
+              </a:effectRef>
+              <a:fontRef idx="minor">
+                <a:schemeClr val="lt1"/>
+              </a:fontRef>
+            </p:style>
+            <p:txBody>
+              <a:bodyPr rtlCol="0" anchor="ctr"/>
+              <a:lstStyle/>
+              <a:p>
+                <a:pPr algn="ctr"/>
+                <a:r>
+                  <a:rPr lang="en-US" sz="1400" dirty="0">
+                    <a:solidFill>
+                      <a:schemeClr val="tx1"/>
+                    </a:solidFill>
+                  </a:rPr>
+                  <a:t>lib</a:t>
+                </a:r>
+              </a:p>
+            </p:txBody>
+          </p:sp>
+          <p:sp>
+            <p:nvSpPr>
+              <p:cNvPr id="7" name="Rectangle: Rounded Corners 6">
+                <a:extLst>
+                  <a:ext uri="{FF2B5EF4-FFF2-40B4-BE49-F238E27FC236}">
+                    <a16:creationId xmlns:a16="http://schemas.microsoft.com/office/drawing/2014/main" id="{1BF220CF-DC25-9BF2-D629-D7DE4B192D56}"/>
+                  </a:ext>
+                </a:extLst>
+              </p:cNvPr>
+              <p:cNvSpPr/>
+              <p:nvPr/>
+            </p:nvSpPr>
+            <p:spPr>
+              <a:xfrm>
+                <a:off x="5055006" y="7463976"/>
+                <a:ext cx="808250" cy="320722"/>
+              </a:xfrm>
+              <a:prstGeom prst="roundRect">
+                <a:avLst/>
+              </a:prstGeom>
+              <a:noFill/>
+            </p:spPr>
+            <p:style>
+              <a:lnRef idx="2">
+                <a:schemeClr val="accent1">
+                  <a:shade val="15000"/>
+                </a:schemeClr>
+              </a:lnRef>
+              <a:fillRef idx="1">
+                <a:schemeClr val="accent1"/>
+              </a:fillRef>
+              <a:effectRef idx="0">
+                <a:schemeClr val="accent1"/>
+              </a:effectRef>
+              <a:fontRef idx="minor">
+                <a:schemeClr val="lt1"/>
+              </a:fontRef>
+            </p:style>
+            <p:txBody>
+              <a:bodyPr rtlCol="0" anchor="ctr"/>
+              <a:lstStyle/>
+              <a:p>
+                <a:pPr algn="ctr"/>
+                <a:r>
+                  <a:rPr lang="en-US" sz="1400" dirty="0">
+                    <a:solidFill>
+                      <a:schemeClr val="tx1"/>
+                    </a:solidFill>
+                  </a:rPr>
+                  <a:t>lib</a:t>
+                </a:r>
+              </a:p>
+            </p:txBody>
+          </p:sp>
+          <p:sp>
+            <p:nvSpPr>
+              <p:cNvPr id="15" name="TextBox 14">
+                <a:extLst>
+                  <a:ext uri="{FF2B5EF4-FFF2-40B4-BE49-F238E27FC236}">
+                    <a16:creationId xmlns:a16="http://schemas.microsoft.com/office/drawing/2014/main" id="{713D997F-DB93-D706-4A71-2D2367AB16CC}"/>
+                  </a:ext>
+                </a:extLst>
+              </p:cNvPr>
+              <p:cNvSpPr txBox="1"/>
+              <p:nvPr/>
+            </p:nvSpPr>
+            <p:spPr>
+              <a:xfrm flipH="1">
+                <a:off x="4689196" y="7845845"/>
+                <a:ext cx="1539869" cy="738664"/>
+              </a:xfrm>
+              <a:prstGeom prst="rect">
+                <a:avLst/>
+              </a:prstGeom>
+              <a:noFill/>
+            </p:spPr>
+            <p:txBody>
+              <a:bodyPr wrap="square" rtlCol="0">
+                <a:spAutoFit/>
+              </a:bodyPr>
+              <a:lstStyle/>
+              <a:p>
+                <a:pPr algn="ctr"/>
+                <a:r>
+                  <a:rPr lang="en-US" sz="1400" b="1" dirty="0"/>
+                  <a:t>Hundreds of </a:t>
+                </a:r>
+              </a:p>
+              <a:p>
+                <a:pPr algn="ctr"/>
+                <a:r>
+                  <a:rPr lang="en-US" sz="1400" b="1" dirty="0"/>
+                  <a:t>Dedicated</a:t>
+                </a:r>
+              </a:p>
+              <a:p>
+                <a:pPr algn="ctr"/>
+                <a:r>
+                  <a:rPr lang="en-US" sz="1400" b="1" dirty="0"/>
+                  <a:t>libs</a:t>
+                </a:r>
+              </a:p>
+            </p:txBody>
+          </p:sp>
+        </p:grpSp>
+        <p:sp>
+          <p:nvSpPr>
+            <p:cNvPr id="30" name="Rectangle: Rounded Corners 29">
+              <a:extLst>
+                <a:ext uri="{FF2B5EF4-FFF2-40B4-BE49-F238E27FC236}">
+                  <a16:creationId xmlns:a16="http://schemas.microsoft.com/office/drawing/2014/main" id="{6FD10319-7FD9-965E-1535-0F46198CA659}"/>
+                </a:ext>
+              </a:extLst>
+            </p:cNvPr>
+            <p:cNvSpPr/>
+            <p:nvPr/>
+          </p:nvSpPr>
+          <p:spPr>
+            <a:xfrm>
+              <a:off x="3360164" y="4763425"/>
+              <a:ext cx="1100157" cy="809458"/>
+            </a:xfrm>
+            <a:prstGeom prst="roundRect">
+              <a:avLst/>
+            </a:prstGeom>
+            <a:noFill/>
+            <a:ln w="28575">
+              <a:solidFill>
+                <a:srgbClr val="FF0000"/>
+              </a:solidFill>
+            </a:ln>
+          </p:spPr>
+          <p:style>
+            <a:lnRef idx="2">
+              <a:schemeClr val="accent1">
+                <a:shade val="15000"/>
+              </a:schemeClr>
+            </a:lnRef>
+            <a:fillRef idx="1">
+              <a:schemeClr val="accent1"/>
+            </a:fillRef>
+            <a:effectRef idx="0">
+              <a:schemeClr val="accent1"/>
+            </a:effectRef>
+            <a:fontRef idx="minor">
+              <a:schemeClr val="lt1"/>
+            </a:fontRef>
+          </p:style>
+          <p:txBody>
+            <a:bodyPr rtlCol="0" anchor="ctr"/>
+            <a:lstStyle/>
+            <a:p>
+              <a:pPr algn="ctr"/>
+              <a:r>
+                <a:rPr lang="en-US" sz="1050" dirty="0">
+                  <a:solidFill>
+                    <a:schemeClr val="tx1"/>
+                  </a:solidFill>
+                </a:rPr>
+                <a:t>Dedicated Sub </a:t>
+              </a:r>
+              <a:r>
+                <a:rPr lang="en-US" sz="1050" dirty="0" err="1">
+                  <a:solidFill>
+                    <a:schemeClr val="tx1"/>
+                  </a:solidFill>
+                </a:rPr>
+                <a:t>dir</a:t>
+              </a:r>
+              <a:endParaRPr lang="en-US" sz="1050" dirty="0">
+                <a:solidFill>
+                  <a:schemeClr val="tx1"/>
+                </a:solidFill>
+              </a:endParaRPr>
+            </a:p>
+            <a:p>
+              <a:pPr algn="ctr"/>
+              <a:r>
+                <a:rPr lang="en-US" sz="1050" dirty="0">
+                  <a:solidFill>
+                    <a:schemeClr val="tx1"/>
+                  </a:solidFill>
+                </a:rPr>
+                <a:t>.</a:t>
+              </a:r>
+              <a:r>
+                <a:rPr lang="en-US" sz="1050" dirty="0" err="1">
+                  <a:solidFill>
+                    <a:schemeClr val="tx1"/>
+                  </a:solidFill>
+                </a:rPr>
+                <a:t>venv</a:t>
+              </a:r>
+              <a:endParaRPr lang="en-US" sz="1050" dirty="0">
+                <a:solidFill>
+                  <a:schemeClr val="tx1"/>
+                </a:solidFill>
+              </a:endParaRPr>
+            </a:p>
+          </p:txBody>
+        </p:sp>
+        <p:cxnSp>
+          <p:nvCxnSpPr>
+            <p:cNvPr id="32" name="Connector: Elbow 31">
+              <a:extLst>
+                <a:ext uri="{FF2B5EF4-FFF2-40B4-BE49-F238E27FC236}">
+                  <a16:creationId xmlns:a16="http://schemas.microsoft.com/office/drawing/2014/main" id="{865BE2ED-4388-C4E9-DBCA-96DBC324C75A}"/>
+                </a:ext>
+              </a:extLst>
+            </p:cNvPr>
+            <p:cNvCxnSpPr>
+              <a:cxnSpLocks/>
+              <a:stCxn id="30" idx="3"/>
+              <a:endCxn id="3" idx="0"/>
+            </p:cNvCxnSpPr>
+            <p:nvPr/>
+          </p:nvCxnSpPr>
+          <p:spPr>
+            <a:xfrm>
+              <a:off x="4460321" y="5168154"/>
+              <a:ext cx="898439" cy="283623"/>
+            </a:xfrm>
+            <a:prstGeom prst="bentConnector2">
+              <a:avLst/>
+            </a:prstGeom>
+            <a:ln>
+              <a:tailEnd type="triangle"/>
+            </a:ln>
+          </p:spPr>
+          <p:style>
+            <a:lnRef idx="1">
+              <a:schemeClr val="accent1"/>
+            </a:lnRef>
+            <a:fillRef idx="0">
+              <a:schemeClr val="accent1"/>
+            </a:fillRef>
+            <a:effectRef idx="0">
+              <a:schemeClr val="accent1"/>
+            </a:effectRef>
+            <a:fontRef idx="minor">
+              <a:schemeClr val="tx1"/>
+            </a:fontRef>
+          </p:style>
+        </p:cxnSp>
+        <p:sp>
+          <p:nvSpPr>
+            <p:cNvPr id="36" name="TextBox 35">
+              <a:extLst>
+                <a:ext uri="{FF2B5EF4-FFF2-40B4-BE49-F238E27FC236}">
+                  <a16:creationId xmlns:a16="http://schemas.microsoft.com/office/drawing/2014/main" id="{DD1DA4A6-F557-2E57-527B-BAD93DD22F84}"/>
+                </a:ext>
+              </a:extLst>
+            </p:cNvPr>
+            <p:cNvSpPr txBox="1"/>
+            <p:nvPr/>
+          </p:nvSpPr>
+          <p:spPr>
+            <a:xfrm flipH="1">
+              <a:off x="937482" y="6430170"/>
+              <a:ext cx="1539869" cy="1169551"/>
+            </a:xfrm>
+            <a:prstGeom prst="rect">
+              <a:avLst/>
+            </a:prstGeom>
+            <a:noFill/>
+          </p:spPr>
+          <p:txBody>
+            <a:bodyPr wrap="square" rtlCol="0">
+              <a:spAutoFit/>
+            </a:bodyPr>
+            <a:lstStyle/>
+            <a:p>
+              <a:pPr algn="ctr"/>
+              <a:r>
+                <a:rPr lang="en-US" sz="1400" b="1" dirty="0">
+                  <a:solidFill>
+                    <a:srgbClr val="FF0000"/>
+                  </a:solidFill>
+                </a:rPr>
+                <a:t>A project under virtual environment</a:t>
+              </a:r>
+            </a:p>
+            <a:p>
+              <a:pPr algn="ctr"/>
+              <a:endParaRPr lang="en-US" sz="1400" b="1" dirty="0">
+                <a:solidFill>
+                  <a:srgbClr val="FF0000"/>
+                </a:solidFill>
+              </a:endParaRPr>
+            </a:p>
+            <a:p>
+              <a:pPr algn="ctr"/>
+              <a:r>
+                <a:rPr lang="en-US" sz="1400" b="1" dirty="0">
+                  <a:solidFill>
+                    <a:srgbClr val="FF0000"/>
+                  </a:solidFill>
+                </a:rPr>
+                <a:t>Dedicated libs</a:t>
+              </a:r>
+            </a:p>
+          </p:txBody>
+        </p:sp>
+        <p:cxnSp>
+          <p:nvCxnSpPr>
+            <p:cNvPr id="37" name="Straight Arrow Connector 36">
+              <a:extLst>
+                <a:ext uri="{FF2B5EF4-FFF2-40B4-BE49-F238E27FC236}">
+                  <a16:creationId xmlns:a16="http://schemas.microsoft.com/office/drawing/2014/main" id="{BD358C11-3DD7-130A-439F-E4BEBE12E6F1}"/>
+                </a:ext>
+              </a:extLst>
+            </p:cNvPr>
+            <p:cNvCxnSpPr>
+              <a:cxnSpLocks/>
+              <a:stCxn id="25" idx="3"/>
+              <a:endCxn id="30" idx="1"/>
+            </p:cNvCxnSpPr>
+            <p:nvPr/>
+          </p:nvCxnSpPr>
+          <p:spPr>
+            <a:xfrm flipV="1">
+              <a:off x="2341308" y="5168154"/>
+              <a:ext cx="1018856" cy="738412"/>
+            </a:xfrm>
+            <a:prstGeom prst="straightConnector1">
+              <a:avLst/>
+            </a:prstGeom>
+            <a:ln>
+              <a:tailEnd type="triangle"/>
+            </a:ln>
+          </p:spPr>
+          <p:style>
+            <a:lnRef idx="1">
+              <a:schemeClr val="accent1"/>
+            </a:lnRef>
+            <a:fillRef idx="0">
+              <a:schemeClr val="accent1"/>
+            </a:fillRef>
+            <a:effectRef idx="0">
+              <a:schemeClr val="accent1"/>
+            </a:effectRef>
+            <a:fontRef idx="minor">
+              <a:schemeClr val="tx1"/>
+            </a:fontRef>
+          </p:style>
+        </p:cxnSp>
+        <p:cxnSp>
+          <p:nvCxnSpPr>
+            <p:cNvPr id="42" name="Straight Arrow Connector 41">
+              <a:extLst>
+                <a:ext uri="{FF2B5EF4-FFF2-40B4-BE49-F238E27FC236}">
+                  <a16:creationId xmlns:a16="http://schemas.microsoft.com/office/drawing/2014/main" id="{DD864346-EFE0-A9FF-9901-890A3C7CD4B7}"/>
+                </a:ext>
+              </a:extLst>
+            </p:cNvPr>
+            <p:cNvCxnSpPr>
+              <a:cxnSpLocks/>
+              <a:stCxn id="25" idx="3"/>
+              <a:endCxn id="26" idx="1"/>
+            </p:cNvCxnSpPr>
+            <p:nvPr/>
+          </p:nvCxnSpPr>
+          <p:spPr>
+            <a:xfrm flipV="1">
+              <a:off x="2341308" y="5855878"/>
+              <a:ext cx="989718" cy="50688"/>
+            </a:xfrm>
+            <a:prstGeom prst="straightConnector1">
+              <a:avLst/>
+            </a:prstGeom>
+            <a:ln>
+              <a:tailEnd type="triangle"/>
+            </a:ln>
+          </p:spPr>
+          <p:style>
+            <a:lnRef idx="1">
+              <a:schemeClr val="accent1"/>
+            </a:lnRef>
+            <a:fillRef idx="0">
+              <a:schemeClr val="accent1"/>
+            </a:fillRef>
+            <a:effectRef idx="0">
+              <a:schemeClr val="accent1"/>
+            </a:effectRef>
+            <a:fontRef idx="minor">
+              <a:schemeClr val="tx1"/>
+            </a:fontRef>
+          </p:style>
+        </p:cxnSp>
+        <p:cxnSp>
+          <p:nvCxnSpPr>
+            <p:cNvPr id="49" name="Straight Arrow Connector 48">
+              <a:extLst>
+                <a:ext uri="{FF2B5EF4-FFF2-40B4-BE49-F238E27FC236}">
+                  <a16:creationId xmlns:a16="http://schemas.microsoft.com/office/drawing/2014/main" id="{48952DB4-1DF3-2C49-C2D7-0A8B6FBF9775}"/>
+                </a:ext>
+              </a:extLst>
+            </p:cNvPr>
+            <p:cNvCxnSpPr>
+              <a:cxnSpLocks/>
+              <a:stCxn id="25" idx="3"/>
+              <a:endCxn id="28" idx="1"/>
+            </p:cNvCxnSpPr>
+            <p:nvPr/>
+          </p:nvCxnSpPr>
+          <p:spPr>
+            <a:xfrm>
+              <a:off x="2341308" y="5906566"/>
+              <a:ext cx="989718" cy="612360"/>
+            </a:xfrm>
+            <a:prstGeom prst="straightConnector1">
+              <a:avLst/>
+            </a:prstGeom>
+            <a:ln>
+              <a:tailEnd type="triangle"/>
+            </a:ln>
+          </p:spPr>
+          <p:style>
+            <a:lnRef idx="1">
+              <a:schemeClr val="accent1"/>
+            </a:lnRef>
+            <a:fillRef idx="0">
+              <a:schemeClr val="accent1"/>
+            </a:fillRef>
+            <a:effectRef idx="0">
+              <a:schemeClr val="accent1"/>
+            </a:effectRef>
+            <a:fontRef idx="minor">
+              <a:schemeClr val="tx1"/>
+            </a:fontRef>
+          </p:style>
+        </p:cxnSp>
+        <p:cxnSp>
+          <p:nvCxnSpPr>
+            <p:cNvPr id="52" name="Straight Arrow Connector 51">
+              <a:extLst>
+                <a:ext uri="{FF2B5EF4-FFF2-40B4-BE49-F238E27FC236}">
+                  <a16:creationId xmlns:a16="http://schemas.microsoft.com/office/drawing/2014/main" id="{028335FE-22FE-EC03-B6B6-ADFBF2DF4183}"/>
+                </a:ext>
+              </a:extLst>
+            </p:cNvPr>
+            <p:cNvCxnSpPr>
+              <a:cxnSpLocks/>
+              <a:stCxn id="25" idx="3"/>
+              <a:endCxn id="27" idx="1"/>
+            </p:cNvCxnSpPr>
+            <p:nvPr/>
+          </p:nvCxnSpPr>
+          <p:spPr>
+            <a:xfrm>
+              <a:off x="2341308" y="5906566"/>
+              <a:ext cx="989718" cy="270034"/>
+            </a:xfrm>
+            <a:prstGeom prst="straightConnector1">
+              <a:avLst/>
+            </a:prstGeom>
+            <a:ln>
+              <a:tailEnd type="triangle"/>
+            </a:ln>
+          </p:spPr>
+          <p:style>
+            <a:lnRef idx="1">
+              <a:schemeClr val="accent1"/>
+            </a:lnRef>
+            <a:fillRef idx="0">
+              <a:schemeClr val="accent1"/>
+            </a:fillRef>
+            <a:effectRef idx="0">
+              <a:schemeClr val="accent1"/>
+            </a:effectRef>
+            <a:fontRef idx="minor">
+              <a:schemeClr val="tx1"/>
+            </a:fontRef>
+          </p:style>
+        </p:cxnSp>
+        <p:cxnSp>
+          <p:nvCxnSpPr>
+            <p:cNvPr id="56" name="Connector: Elbow 55">
+              <a:extLst>
+                <a:ext uri="{FF2B5EF4-FFF2-40B4-BE49-F238E27FC236}">
+                  <a16:creationId xmlns:a16="http://schemas.microsoft.com/office/drawing/2014/main" id="{2B0B3B4B-4F5A-6316-E4A7-7846EFCB145F}"/>
+                </a:ext>
+              </a:extLst>
+            </p:cNvPr>
+            <p:cNvCxnSpPr>
+              <a:cxnSpLocks/>
+              <a:stCxn id="25" idx="0"/>
+              <a:endCxn id="2" idx="2"/>
+            </p:cNvCxnSpPr>
+            <p:nvPr/>
+          </p:nvCxnSpPr>
+          <p:spPr>
+            <a:xfrm rot="5400000" flipH="1" flipV="1">
+              <a:off x="1093998" y="4492355"/>
+              <a:ext cx="1784799" cy="497426"/>
+            </a:xfrm>
+            <a:prstGeom prst="bentConnector3">
+              <a:avLst>
+                <a:gd name="adj1" fmla="val 50000"/>
+              </a:avLst>
+            </a:prstGeom>
+            <a:ln>
+              <a:prstDash val="dashDot"/>
+              <a:tailEnd type="triangle"/>
+            </a:ln>
+          </p:spPr>
+          <p:style>
+            <a:lnRef idx="1">
+              <a:schemeClr val="accent1"/>
+            </a:lnRef>
+            <a:fillRef idx="0">
+              <a:schemeClr val="accent1"/>
+            </a:fillRef>
+            <a:effectRef idx="0">
+              <a:schemeClr val="accent1"/>
+            </a:effectRef>
+            <a:fontRef idx="minor">
+              <a:schemeClr val="tx1"/>
+            </a:fontRef>
+          </p:style>
+        </p:cxnSp>
+        <p:sp>
+          <p:nvSpPr>
+            <p:cNvPr id="59" name="TextBox 58">
+              <a:extLst>
+                <a:ext uri="{FF2B5EF4-FFF2-40B4-BE49-F238E27FC236}">
+                  <a16:creationId xmlns:a16="http://schemas.microsoft.com/office/drawing/2014/main" id="{F2F2AA04-FDB0-C401-7AAC-0A2EFF44FCA8}"/>
+                </a:ext>
+              </a:extLst>
+            </p:cNvPr>
+            <p:cNvSpPr txBox="1"/>
+            <p:nvPr/>
+          </p:nvSpPr>
+          <p:spPr>
+            <a:xfrm flipH="1">
+              <a:off x="1270289" y="4933382"/>
+              <a:ext cx="1539869" cy="307777"/>
+            </a:xfrm>
+            <a:prstGeom prst="rect">
+              <a:avLst/>
+            </a:prstGeom>
+            <a:noFill/>
+          </p:spPr>
+          <p:txBody>
+            <a:bodyPr wrap="square" rtlCol="0">
+              <a:spAutoFit/>
+            </a:bodyPr>
+            <a:lstStyle/>
+            <a:p>
+              <a:pPr algn="ctr"/>
+              <a:r>
+                <a:rPr lang="en-US" sz="1400" b="1" dirty="0" err="1"/>
+                <a:t>Loosley</a:t>
+              </a:r>
+              <a:r>
+                <a:rPr lang="en-US" sz="1400" b="1" dirty="0"/>
+                <a:t> coupled</a:t>
+              </a:r>
+            </a:p>
+          </p:txBody>
+        </p:sp>
+        <p:sp>
+          <p:nvSpPr>
+            <p:cNvPr id="61" name="Rectangle 60">
+              <a:extLst>
+                <a:ext uri="{FF2B5EF4-FFF2-40B4-BE49-F238E27FC236}">
+                  <a16:creationId xmlns:a16="http://schemas.microsoft.com/office/drawing/2014/main" id="{142101F3-32C8-70D2-59F8-EC2449007F00}"/>
+                </a:ext>
+              </a:extLst>
+            </p:cNvPr>
+            <p:cNvSpPr/>
+            <p:nvPr/>
+          </p:nvSpPr>
+          <p:spPr>
+            <a:xfrm>
+              <a:off x="327194" y="832513"/>
+              <a:ext cx="6237379" cy="7151427"/>
+            </a:xfrm>
+            <a:prstGeom prst="rect">
+              <a:avLst/>
+            </a:prstGeom>
+            <a:noFill/>
+          </p:spPr>
+          <p:style>
+            <a:lnRef idx="2">
+              <a:schemeClr val="accent1">
+                <a:shade val="15000"/>
+              </a:schemeClr>
+            </a:lnRef>
+            <a:fillRef idx="1">
+              <a:schemeClr val="accent1"/>
+            </a:fillRef>
+            <a:effectRef idx="0">
+              <a:schemeClr val="accent1"/>
+            </a:effectRef>
+            <a:fontRef idx="minor">
+              <a:schemeClr val="lt1"/>
+            </a:fontRef>
+          </p:style>
+          <p:txBody>
+            <a:bodyPr rtlCol="0" anchor="ctr"/>
+            <a:lstStyle/>
+            <a:p>
+              <a:pPr algn="ctr"/>
+              <a:endParaRPr lang="en-US" sz="1400" dirty="0">
+                <a:solidFill>
+                  <a:schemeClr val="tx1"/>
+                </a:solidFill>
+              </a:endParaRPr>
+            </a:p>
+          </p:txBody>
+        </p:sp>
+      </p:grpSp>
+    </p:spTree>
+    <p:extLst>
+      <p:ext uri="{BB962C8B-B14F-4D97-AF65-F5344CB8AC3E}">
+        <p14:creationId xmlns:p14="http://schemas.microsoft.com/office/powerpoint/2010/main" val="1335368783"/>
+      </p:ext>
+    </p:extLst>
+  </p:cSld>
+  <p:clrMapOvr>
+    <a:masterClrMapping/>
+  </p:clrMapOvr>
+</p:sld>
+</file>
+
 <file path=ppt/slides/slide2.xml><?xml version="1.0" encoding="utf-8"?>
 <p:sld xmlns:a="http://schemas.openxmlformats.org/drawingml/2006/main" xmlns:r="http://schemas.openxmlformats.org/officeDocument/2006/relationships" xmlns:p="http://schemas.openxmlformats.org/presentationml/2006/main">
   <p:cSld>
@@ -12294,9 +16740,10 @@
           <a:p>
             <a:pPr algn="ctr"/>
             <a:r>
-              <a:rPr lang="en-US" sz="1400" dirty="0"/>
+              <a:rPr lang="en-US" sz="1400"/>
               <a:t>Execute A Project</a:t>
             </a:r>
+            <a:endParaRPr lang="en-US" sz="1400" dirty="0"/>
           </a:p>
         </p:txBody>
       </p:sp>

</xml_diff>

<commit_message>
uv elaboration with pics
</commit_message>
<xml_diff>
--- a/general-tech-figures.pptx
+++ b/general-tech-figures.pptx
@@ -17,7 +17,9 @@
     <p:sldId id="265" r:id="rId11"/>
     <p:sldId id="266" r:id="rId12"/>
     <p:sldId id="267" r:id="rId13"/>
-    <p:sldId id="268" r:id="rId14"/>
+    <p:sldId id="269" r:id="rId14"/>
+    <p:sldId id="270" r:id="rId15"/>
+    <p:sldId id="268" r:id="rId16"/>
   </p:sldIdLst>
   <p:sldSz cx="6858000" cy="9144000" type="letter"/>
   <p:notesSz cx="6858000" cy="9144000"/>
@@ -266,7 +268,7 @@
           <a:p>
             <a:fld id="{BFBBFCFE-809B-4AE5-92DC-0D51595F6FEA}" type="datetimeFigureOut">
               <a:rPr lang="en-US" smtClean="0"/>
-              <a:t>3/11/2025</a:t>
+              <a:t>8/1/2025</a:t>
             </a:fld>
             <a:endParaRPr lang="en-US"/>
           </a:p>
@@ -436,7 +438,7 @@
           <a:p>
             <a:fld id="{BFBBFCFE-809B-4AE5-92DC-0D51595F6FEA}" type="datetimeFigureOut">
               <a:rPr lang="en-US" smtClean="0"/>
-              <a:t>3/11/2025</a:t>
+              <a:t>8/1/2025</a:t>
             </a:fld>
             <a:endParaRPr lang="en-US"/>
           </a:p>
@@ -616,7 +618,7 @@
           <a:p>
             <a:fld id="{BFBBFCFE-809B-4AE5-92DC-0D51595F6FEA}" type="datetimeFigureOut">
               <a:rPr lang="en-US" smtClean="0"/>
-              <a:t>3/11/2025</a:t>
+              <a:t>8/1/2025</a:t>
             </a:fld>
             <a:endParaRPr lang="en-US"/>
           </a:p>
@@ -786,7 +788,7 @@
           <a:p>
             <a:fld id="{BFBBFCFE-809B-4AE5-92DC-0D51595F6FEA}" type="datetimeFigureOut">
               <a:rPr lang="en-US" smtClean="0"/>
-              <a:t>3/11/2025</a:t>
+              <a:t>8/1/2025</a:t>
             </a:fld>
             <a:endParaRPr lang="en-US"/>
           </a:p>
@@ -1030,7 +1032,7 @@
           <a:p>
             <a:fld id="{BFBBFCFE-809B-4AE5-92DC-0D51595F6FEA}" type="datetimeFigureOut">
               <a:rPr lang="en-US" smtClean="0"/>
-              <a:t>3/11/2025</a:t>
+              <a:t>8/1/2025</a:t>
             </a:fld>
             <a:endParaRPr lang="en-US"/>
           </a:p>
@@ -1262,7 +1264,7 @@
           <a:p>
             <a:fld id="{BFBBFCFE-809B-4AE5-92DC-0D51595F6FEA}" type="datetimeFigureOut">
               <a:rPr lang="en-US" smtClean="0"/>
-              <a:t>3/11/2025</a:t>
+              <a:t>8/1/2025</a:t>
             </a:fld>
             <a:endParaRPr lang="en-US"/>
           </a:p>
@@ -1629,7 +1631,7 @@
           <a:p>
             <a:fld id="{BFBBFCFE-809B-4AE5-92DC-0D51595F6FEA}" type="datetimeFigureOut">
               <a:rPr lang="en-US" smtClean="0"/>
-              <a:t>3/11/2025</a:t>
+              <a:t>8/1/2025</a:t>
             </a:fld>
             <a:endParaRPr lang="en-US"/>
           </a:p>
@@ -1747,7 +1749,7 @@
           <a:p>
             <a:fld id="{BFBBFCFE-809B-4AE5-92DC-0D51595F6FEA}" type="datetimeFigureOut">
               <a:rPr lang="en-US" smtClean="0"/>
-              <a:t>3/11/2025</a:t>
+              <a:t>8/1/2025</a:t>
             </a:fld>
             <a:endParaRPr lang="en-US"/>
           </a:p>
@@ -1842,7 +1844,7 @@
           <a:p>
             <a:fld id="{BFBBFCFE-809B-4AE5-92DC-0D51595F6FEA}" type="datetimeFigureOut">
               <a:rPr lang="en-US" smtClean="0"/>
-              <a:t>3/11/2025</a:t>
+              <a:t>8/1/2025</a:t>
             </a:fld>
             <a:endParaRPr lang="en-US"/>
           </a:p>
@@ -2119,7 +2121,7 @@
           <a:p>
             <a:fld id="{BFBBFCFE-809B-4AE5-92DC-0D51595F6FEA}" type="datetimeFigureOut">
               <a:rPr lang="en-US" smtClean="0"/>
-              <a:t>3/11/2025</a:t>
+              <a:t>8/1/2025</a:t>
             </a:fld>
             <a:endParaRPr lang="en-US"/>
           </a:p>
@@ -2376,7 +2378,7 @@
           <a:p>
             <a:fld id="{BFBBFCFE-809B-4AE5-92DC-0D51595F6FEA}" type="datetimeFigureOut">
               <a:rPr lang="en-US" smtClean="0"/>
-              <a:t>3/11/2025</a:t>
+              <a:t>8/1/2025</a:t>
             </a:fld>
             <a:endParaRPr lang="en-US"/>
           </a:p>
@@ -2589,7 +2591,7 @@
           <a:p>
             <a:fld id="{BFBBFCFE-809B-4AE5-92DC-0D51595F6FEA}" type="datetimeFigureOut">
               <a:rPr lang="en-US" smtClean="0"/>
-              <a:t>3/11/2025</a:t>
+              <a:t>8/1/2025</a:t>
             </a:fld>
             <a:endParaRPr lang="en-US"/>
           </a:p>
@@ -9039,6 +9041,2705 @@
           <a:chExt cx="0" cy="0"/>
         </a:xfrm>
       </p:grpSpPr>
+      <p:sp>
+        <p:nvSpPr>
+          <p:cNvPr id="48" name="TextBox 47">
+            <a:extLst>
+              <a:ext uri="{FF2B5EF4-FFF2-40B4-BE49-F238E27FC236}">
+                <a16:creationId xmlns:a16="http://schemas.microsoft.com/office/drawing/2014/main" id="{05C9876A-2E69-C88B-C9FB-79FDD326E7D1}"/>
+              </a:ext>
+            </a:extLst>
+          </p:cNvPr>
+          <p:cNvSpPr txBox="1"/>
+          <p:nvPr/>
+        </p:nvSpPr>
+        <p:spPr>
+          <a:xfrm flipH="1">
+            <a:off x="1211918" y="1010121"/>
+            <a:ext cx="4626103" cy="338554"/>
+          </a:xfrm>
+          <a:prstGeom prst="rect">
+            <a:avLst/>
+          </a:prstGeom>
+          <a:noFill/>
+        </p:spPr>
+        <p:txBody>
+          <a:bodyPr wrap="square" rtlCol="0">
+            <a:spAutoFit/>
+          </a:bodyPr>
+          <a:lstStyle/>
+          <a:p>
+            <a:pPr algn="ctr"/>
+            <a:r>
+              <a:rPr lang="en-US" sz="1600" dirty="0" err="1"/>
+              <a:t>Uv</a:t>
+            </a:r>
+            <a:r>
+              <a:rPr lang="en-US" sz="1600" dirty="0"/>
+              <a:t> Features in pictures</a:t>
+            </a:r>
+          </a:p>
+        </p:txBody>
+      </p:sp>
+      <p:sp>
+        <p:nvSpPr>
+          <p:cNvPr id="61" name="Rectangle 60">
+            <a:extLst>
+              <a:ext uri="{FF2B5EF4-FFF2-40B4-BE49-F238E27FC236}">
+                <a16:creationId xmlns:a16="http://schemas.microsoft.com/office/drawing/2014/main" id="{142101F3-32C8-70D2-59F8-EC2449007F00}"/>
+              </a:ext>
+            </a:extLst>
+          </p:cNvPr>
+          <p:cNvSpPr/>
+          <p:nvPr/>
+        </p:nvSpPr>
+        <p:spPr>
+          <a:xfrm>
+            <a:off x="327194" y="832513"/>
+            <a:ext cx="6237379" cy="5038898"/>
+          </a:xfrm>
+          <a:prstGeom prst="rect">
+            <a:avLst/>
+          </a:prstGeom>
+          <a:noFill/>
+        </p:spPr>
+        <p:style>
+          <a:lnRef idx="2">
+            <a:schemeClr val="accent1">
+              <a:shade val="15000"/>
+            </a:schemeClr>
+          </a:lnRef>
+          <a:fillRef idx="1">
+            <a:schemeClr val="accent1"/>
+          </a:fillRef>
+          <a:effectRef idx="0">
+            <a:schemeClr val="accent1"/>
+          </a:effectRef>
+          <a:fontRef idx="minor">
+            <a:schemeClr val="lt1"/>
+          </a:fontRef>
+        </p:style>
+        <p:txBody>
+          <a:bodyPr rtlCol="0" anchor="ctr"/>
+          <a:lstStyle/>
+          <a:p>
+            <a:pPr algn="ctr"/>
+            <a:endParaRPr lang="en-US" sz="1400" dirty="0">
+              <a:solidFill>
+                <a:schemeClr val="tx1"/>
+              </a:solidFill>
+            </a:endParaRPr>
+          </a:p>
+        </p:txBody>
+      </p:sp>
+      <p:sp>
+        <p:nvSpPr>
+          <p:cNvPr id="34" name="Rectangle 33">
+            <a:extLst>
+              <a:ext uri="{FF2B5EF4-FFF2-40B4-BE49-F238E27FC236}">
+                <a16:creationId xmlns:a16="http://schemas.microsoft.com/office/drawing/2014/main" id="{EC89A492-E03B-15D6-AF09-212A4D4E14C0}"/>
+              </a:ext>
+            </a:extLst>
+          </p:cNvPr>
+          <p:cNvSpPr/>
+          <p:nvPr/>
+        </p:nvSpPr>
+        <p:spPr>
+          <a:xfrm>
+            <a:off x="1211918" y="2720759"/>
+            <a:ext cx="893329" cy="546198"/>
+          </a:xfrm>
+          <a:prstGeom prst="rect">
+            <a:avLst/>
+          </a:prstGeom>
+          <a:noFill/>
+        </p:spPr>
+        <p:style>
+          <a:lnRef idx="2">
+            <a:schemeClr val="accent1">
+              <a:shade val="15000"/>
+            </a:schemeClr>
+          </a:lnRef>
+          <a:fillRef idx="1">
+            <a:schemeClr val="accent1"/>
+          </a:fillRef>
+          <a:effectRef idx="0">
+            <a:schemeClr val="accent1"/>
+          </a:effectRef>
+          <a:fontRef idx="minor">
+            <a:schemeClr val="lt1"/>
+          </a:fontRef>
+        </p:style>
+        <p:txBody>
+          <a:bodyPr rtlCol="0" anchor="ctr"/>
+          <a:lstStyle/>
+          <a:p>
+            <a:pPr algn="ctr"/>
+            <a:r>
+              <a:rPr lang="en-US" sz="1050" dirty="0" err="1">
+                <a:solidFill>
+                  <a:schemeClr val="tx1"/>
+                </a:solidFill>
+              </a:rPr>
+              <a:t>Uv</a:t>
+            </a:r>
+            <a:endParaRPr lang="en-US" sz="1050" dirty="0">
+              <a:solidFill>
+                <a:schemeClr val="tx1"/>
+              </a:solidFill>
+            </a:endParaRPr>
+          </a:p>
+          <a:p>
+            <a:pPr algn="ctr"/>
+            <a:r>
+              <a:rPr lang="en-US" sz="1050" dirty="0">
+                <a:solidFill>
+                  <a:schemeClr val="tx1"/>
+                </a:solidFill>
+              </a:rPr>
+              <a:t>(Executable)</a:t>
+            </a:r>
+          </a:p>
+        </p:txBody>
+      </p:sp>
+      <p:sp>
+        <p:nvSpPr>
+          <p:cNvPr id="39" name="Rectangle 38">
+            <a:extLst>
+              <a:ext uri="{FF2B5EF4-FFF2-40B4-BE49-F238E27FC236}">
+                <a16:creationId xmlns:a16="http://schemas.microsoft.com/office/drawing/2014/main" id="{A569F8FB-EDE4-C367-189A-F868B4C578D0}"/>
+              </a:ext>
+            </a:extLst>
+          </p:cNvPr>
+          <p:cNvSpPr/>
+          <p:nvPr/>
+        </p:nvSpPr>
+        <p:spPr>
+          <a:xfrm>
+            <a:off x="3232297" y="1753404"/>
+            <a:ext cx="1198885" cy="338554"/>
+          </a:xfrm>
+          <a:prstGeom prst="rect">
+            <a:avLst/>
+          </a:prstGeom>
+          <a:noFill/>
+        </p:spPr>
+        <p:style>
+          <a:lnRef idx="2">
+            <a:schemeClr val="accent1">
+              <a:shade val="15000"/>
+            </a:schemeClr>
+          </a:lnRef>
+          <a:fillRef idx="1">
+            <a:schemeClr val="accent1"/>
+          </a:fillRef>
+          <a:effectRef idx="0">
+            <a:schemeClr val="accent1"/>
+          </a:effectRef>
+          <a:fontRef idx="minor">
+            <a:schemeClr val="lt1"/>
+          </a:fontRef>
+        </p:style>
+        <p:txBody>
+          <a:bodyPr rtlCol="0" anchor="ctr"/>
+          <a:lstStyle/>
+          <a:p>
+            <a:pPr algn="ctr"/>
+            <a:r>
+              <a:rPr lang="en-US" sz="1050" dirty="0">
+                <a:solidFill>
+                  <a:schemeClr val="tx1"/>
+                </a:solidFill>
+              </a:rPr>
+              <a:t>Install Python</a:t>
+            </a:r>
+          </a:p>
+        </p:txBody>
+      </p:sp>
+      <p:sp>
+        <p:nvSpPr>
+          <p:cNvPr id="41" name="Rectangle 40">
+            <a:extLst>
+              <a:ext uri="{FF2B5EF4-FFF2-40B4-BE49-F238E27FC236}">
+                <a16:creationId xmlns:a16="http://schemas.microsoft.com/office/drawing/2014/main" id="{1505B487-721A-0237-3FF7-ED20E82D9D49}"/>
+              </a:ext>
+            </a:extLst>
+          </p:cNvPr>
+          <p:cNvSpPr/>
+          <p:nvPr/>
+        </p:nvSpPr>
+        <p:spPr>
+          <a:xfrm>
+            <a:off x="3232295" y="2215649"/>
+            <a:ext cx="1198885" cy="338554"/>
+          </a:xfrm>
+          <a:prstGeom prst="rect">
+            <a:avLst/>
+          </a:prstGeom>
+          <a:noFill/>
+        </p:spPr>
+        <p:style>
+          <a:lnRef idx="2">
+            <a:schemeClr val="accent1">
+              <a:shade val="15000"/>
+            </a:schemeClr>
+          </a:lnRef>
+          <a:fillRef idx="1">
+            <a:schemeClr val="accent1"/>
+          </a:fillRef>
+          <a:effectRef idx="0">
+            <a:schemeClr val="accent1"/>
+          </a:effectRef>
+          <a:fontRef idx="minor">
+            <a:schemeClr val="lt1"/>
+          </a:fontRef>
+        </p:style>
+        <p:txBody>
+          <a:bodyPr rtlCol="0" anchor="ctr"/>
+          <a:lstStyle/>
+          <a:p>
+            <a:pPr algn="ctr"/>
+            <a:r>
+              <a:rPr lang="en-US" sz="1050" dirty="0">
+                <a:solidFill>
+                  <a:schemeClr val="tx1"/>
+                </a:solidFill>
+              </a:rPr>
+              <a:t>Install libs</a:t>
+            </a:r>
+          </a:p>
+        </p:txBody>
+      </p:sp>
+      <p:sp>
+        <p:nvSpPr>
+          <p:cNvPr id="43" name="Rectangle 42">
+            <a:extLst>
+              <a:ext uri="{FF2B5EF4-FFF2-40B4-BE49-F238E27FC236}">
+                <a16:creationId xmlns:a16="http://schemas.microsoft.com/office/drawing/2014/main" id="{DA547158-C51C-5555-97A0-DC769F5A8A96}"/>
+              </a:ext>
+            </a:extLst>
+          </p:cNvPr>
+          <p:cNvSpPr/>
+          <p:nvPr/>
+        </p:nvSpPr>
+        <p:spPr>
+          <a:xfrm>
+            <a:off x="3232295" y="2655304"/>
+            <a:ext cx="1198885" cy="338554"/>
+          </a:xfrm>
+          <a:prstGeom prst="rect">
+            <a:avLst/>
+          </a:prstGeom>
+          <a:noFill/>
+        </p:spPr>
+        <p:style>
+          <a:lnRef idx="2">
+            <a:schemeClr val="accent1">
+              <a:shade val="15000"/>
+            </a:schemeClr>
+          </a:lnRef>
+          <a:fillRef idx="1">
+            <a:schemeClr val="accent1"/>
+          </a:fillRef>
+          <a:effectRef idx="0">
+            <a:schemeClr val="accent1"/>
+          </a:effectRef>
+          <a:fontRef idx="minor">
+            <a:schemeClr val="lt1"/>
+          </a:fontRef>
+        </p:style>
+        <p:txBody>
+          <a:bodyPr rtlCol="0" anchor="ctr"/>
+          <a:lstStyle/>
+          <a:p>
+            <a:pPr algn="ctr"/>
+            <a:r>
+              <a:rPr lang="en-US" sz="1050" dirty="0">
+                <a:solidFill>
+                  <a:schemeClr val="tx1"/>
+                </a:solidFill>
+              </a:rPr>
+              <a:t>Run .</a:t>
+            </a:r>
+            <a:r>
+              <a:rPr lang="en-US" sz="1050" dirty="0" err="1">
+                <a:solidFill>
+                  <a:schemeClr val="tx1"/>
+                </a:solidFill>
+              </a:rPr>
+              <a:t>py</a:t>
+            </a:r>
+            <a:r>
+              <a:rPr lang="en-US" sz="1050" dirty="0">
+                <a:solidFill>
+                  <a:schemeClr val="tx1"/>
+                </a:solidFill>
+              </a:rPr>
+              <a:t> scripts</a:t>
+            </a:r>
+          </a:p>
+        </p:txBody>
+      </p:sp>
+      <p:sp>
+        <p:nvSpPr>
+          <p:cNvPr id="46" name="Rectangle 45">
+            <a:extLst>
+              <a:ext uri="{FF2B5EF4-FFF2-40B4-BE49-F238E27FC236}">
+                <a16:creationId xmlns:a16="http://schemas.microsoft.com/office/drawing/2014/main" id="{FFF75CB2-D92D-A3DF-BCC0-CB9F14B1E87E}"/>
+              </a:ext>
+            </a:extLst>
+          </p:cNvPr>
+          <p:cNvSpPr/>
+          <p:nvPr/>
+        </p:nvSpPr>
+        <p:spPr>
+          <a:xfrm>
+            <a:off x="3232294" y="3153766"/>
+            <a:ext cx="1198885" cy="338554"/>
+          </a:xfrm>
+          <a:prstGeom prst="rect">
+            <a:avLst/>
+          </a:prstGeom>
+          <a:noFill/>
+        </p:spPr>
+        <p:style>
+          <a:lnRef idx="2">
+            <a:schemeClr val="accent1">
+              <a:shade val="15000"/>
+            </a:schemeClr>
+          </a:lnRef>
+          <a:fillRef idx="1">
+            <a:schemeClr val="accent1"/>
+          </a:fillRef>
+          <a:effectRef idx="0">
+            <a:schemeClr val="accent1"/>
+          </a:effectRef>
+          <a:fontRef idx="minor">
+            <a:schemeClr val="lt1"/>
+          </a:fontRef>
+        </p:style>
+        <p:txBody>
+          <a:bodyPr rtlCol="0" anchor="ctr"/>
+          <a:lstStyle/>
+          <a:p>
+            <a:pPr algn="ctr"/>
+            <a:r>
+              <a:rPr lang="en-US" sz="1050" dirty="0">
+                <a:solidFill>
+                  <a:schemeClr val="tx1"/>
+                </a:solidFill>
+              </a:rPr>
+              <a:t>Manage Projects</a:t>
+            </a:r>
+          </a:p>
+        </p:txBody>
+      </p:sp>
+      <p:sp>
+        <p:nvSpPr>
+          <p:cNvPr id="50" name="Rectangle 49">
+            <a:extLst>
+              <a:ext uri="{FF2B5EF4-FFF2-40B4-BE49-F238E27FC236}">
+                <a16:creationId xmlns:a16="http://schemas.microsoft.com/office/drawing/2014/main" id="{E794498E-8F88-DFE5-C2EB-D1A0C9C4712A}"/>
+              </a:ext>
+            </a:extLst>
+          </p:cNvPr>
+          <p:cNvSpPr/>
+          <p:nvPr/>
+        </p:nvSpPr>
+        <p:spPr>
+          <a:xfrm>
+            <a:off x="3232293" y="3703139"/>
+            <a:ext cx="1198885" cy="790251"/>
+          </a:xfrm>
+          <a:prstGeom prst="rect">
+            <a:avLst/>
+          </a:prstGeom>
+          <a:noFill/>
+        </p:spPr>
+        <p:style>
+          <a:lnRef idx="2">
+            <a:schemeClr val="accent1">
+              <a:shade val="15000"/>
+            </a:schemeClr>
+          </a:lnRef>
+          <a:fillRef idx="1">
+            <a:schemeClr val="accent1"/>
+          </a:fillRef>
+          <a:effectRef idx="0">
+            <a:schemeClr val="accent1"/>
+          </a:effectRef>
+          <a:fontRef idx="minor">
+            <a:schemeClr val="lt1"/>
+          </a:fontRef>
+        </p:style>
+        <p:txBody>
+          <a:bodyPr rtlCol="0" anchor="ctr"/>
+          <a:lstStyle/>
+          <a:p>
+            <a:pPr algn="ctr"/>
+            <a:r>
+              <a:rPr lang="en-US" sz="1050" dirty="0">
+                <a:solidFill>
+                  <a:schemeClr val="tx1"/>
+                </a:solidFill>
+              </a:rPr>
+              <a:t>Run public </a:t>
+            </a:r>
+            <a:r>
+              <a:rPr lang="en-US" sz="1050" dirty="0" err="1">
+                <a:solidFill>
+                  <a:schemeClr val="tx1"/>
+                </a:solidFill>
+              </a:rPr>
+              <a:t>probrams</a:t>
+            </a:r>
+            <a:endParaRPr lang="en-US" sz="1050" dirty="0">
+              <a:solidFill>
+                <a:schemeClr val="tx1"/>
+              </a:solidFill>
+            </a:endParaRPr>
+          </a:p>
+          <a:p>
+            <a:pPr algn="ctr"/>
+            <a:r>
+              <a:rPr lang="en-US" sz="1050" dirty="0">
+                <a:solidFill>
+                  <a:schemeClr val="tx1"/>
+                </a:solidFill>
+              </a:rPr>
+              <a:t>With temp installs</a:t>
+            </a:r>
+          </a:p>
+          <a:p>
+            <a:pPr algn="ctr"/>
+            <a:r>
+              <a:rPr lang="en-US" sz="1050" dirty="0">
+                <a:solidFill>
+                  <a:schemeClr val="tx1"/>
+                </a:solidFill>
+              </a:rPr>
+              <a:t>(</a:t>
+            </a:r>
+            <a:r>
+              <a:rPr lang="en-US" sz="1050" dirty="0" err="1">
+                <a:solidFill>
+                  <a:schemeClr val="tx1"/>
+                </a:solidFill>
+              </a:rPr>
+              <a:t>uvx</a:t>
+            </a:r>
+            <a:r>
+              <a:rPr lang="en-US" sz="1050" dirty="0">
+                <a:solidFill>
+                  <a:schemeClr val="tx1"/>
+                </a:solidFill>
+              </a:rPr>
+              <a:t>)</a:t>
+            </a:r>
+          </a:p>
+        </p:txBody>
+      </p:sp>
+      <p:cxnSp>
+        <p:nvCxnSpPr>
+          <p:cNvPr id="53" name="Straight Arrow Connector 52">
+            <a:extLst>
+              <a:ext uri="{FF2B5EF4-FFF2-40B4-BE49-F238E27FC236}">
+                <a16:creationId xmlns:a16="http://schemas.microsoft.com/office/drawing/2014/main" id="{39D816BD-CC9F-D997-986F-A556F913E34A}"/>
+              </a:ext>
+            </a:extLst>
+          </p:cNvPr>
+          <p:cNvCxnSpPr>
+            <a:stCxn id="34" idx="3"/>
+            <a:endCxn id="39" idx="1"/>
+          </p:cNvCxnSpPr>
+          <p:nvPr/>
+        </p:nvCxnSpPr>
+        <p:spPr>
+          <a:xfrm flipV="1">
+            <a:off x="2105247" y="1922681"/>
+            <a:ext cx="1127050" cy="1071177"/>
+          </a:xfrm>
+          <a:prstGeom prst="straightConnector1">
+            <a:avLst/>
+          </a:prstGeom>
+          <a:ln>
+            <a:tailEnd type="triangle"/>
+          </a:ln>
+        </p:spPr>
+        <p:style>
+          <a:lnRef idx="1">
+            <a:schemeClr val="accent1"/>
+          </a:lnRef>
+          <a:fillRef idx="0">
+            <a:schemeClr val="accent1"/>
+          </a:fillRef>
+          <a:effectRef idx="0">
+            <a:schemeClr val="accent1"/>
+          </a:effectRef>
+          <a:fontRef idx="minor">
+            <a:schemeClr val="tx1"/>
+          </a:fontRef>
+        </p:style>
+      </p:cxnSp>
+      <p:cxnSp>
+        <p:nvCxnSpPr>
+          <p:cNvPr id="54" name="Straight Arrow Connector 53">
+            <a:extLst>
+              <a:ext uri="{FF2B5EF4-FFF2-40B4-BE49-F238E27FC236}">
+                <a16:creationId xmlns:a16="http://schemas.microsoft.com/office/drawing/2014/main" id="{20719E94-0A8C-7FAB-0647-A0B9C8FF8EDA}"/>
+              </a:ext>
+            </a:extLst>
+          </p:cNvPr>
+          <p:cNvCxnSpPr>
+            <a:cxnSpLocks/>
+            <a:stCxn id="34" idx="3"/>
+            <a:endCxn id="41" idx="1"/>
+          </p:cNvCxnSpPr>
+          <p:nvPr/>
+        </p:nvCxnSpPr>
+        <p:spPr>
+          <a:xfrm flipV="1">
+            <a:off x="2105247" y="2384926"/>
+            <a:ext cx="1127048" cy="608932"/>
+          </a:xfrm>
+          <a:prstGeom prst="straightConnector1">
+            <a:avLst/>
+          </a:prstGeom>
+          <a:ln>
+            <a:tailEnd type="triangle"/>
+          </a:ln>
+        </p:spPr>
+        <p:style>
+          <a:lnRef idx="1">
+            <a:schemeClr val="accent1"/>
+          </a:lnRef>
+          <a:fillRef idx="0">
+            <a:schemeClr val="accent1"/>
+          </a:fillRef>
+          <a:effectRef idx="0">
+            <a:schemeClr val="accent1"/>
+          </a:effectRef>
+          <a:fontRef idx="minor">
+            <a:schemeClr val="tx1"/>
+          </a:fontRef>
+        </p:style>
+      </p:cxnSp>
+      <p:cxnSp>
+        <p:nvCxnSpPr>
+          <p:cNvPr id="58" name="Straight Arrow Connector 57">
+            <a:extLst>
+              <a:ext uri="{FF2B5EF4-FFF2-40B4-BE49-F238E27FC236}">
+                <a16:creationId xmlns:a16="http://schemas.microsoft.com/office/drawing/2014/main" id="{41CF3686-5D4B-5AE3-D173-04CE14DBA25D}"/>
+              </a:ext>
+            </a:extLst>
+          </p:cNvPr>
+          <p:cNvCxnSpPr>
+            <a:cxnSpLocks/>
+            <a:stCxn id="34" idx="3"/>
+            <a:endCxn id="43" idx="1"/>
+          </p:cNvCxnSpPr>
+          <p:nvPr/>
+        </p:nvCxnSpPr>
+        <p:spPr>
+          <a:xfrm flipV="1">
+            <a:off x="2105247" y="2824581"/>
+            <a:ext cx="1127048" cy="169277"/>
+          </a:xfrm>
+          <a:prstGeom prst="straightConnector1">
+            <a:avLst/>
+          </a:prstGeom>
+          <a:ln>
+            <a:tailEnd type="triangle"/>
+          </a:ln>
+        </p:spPr>
+        <p:style>
+          <a:lnRef idx="1">
+            <a:schemeClr val="accent1"/>
+          </a:lnRef>
+          <a:fillRef idx="0">
+            <a:schemeClr val="accent1"/>
+          </a:fillRef>
+          <a:effectRef idx="0">
+            <a:schemeClr val="accent1"/>
+          </a:effectRef>
+          <a:fontRef idx="minor">
+            <a:schemeClr val="tx1"/>
+          </a:fontRef>
+        </p:style>
+      </p:cxnSp>
+      <p:cxnSp>
+        <p:nvCxnSpPr>
+          <p:cNvPr id="64" name="Straight Arrow Connector 63">
+            <a:extLst>
+              <a:ext uri="{FF2B5EF4-FFF2-40B4-BE49-F238E27FC236}">
+                <a16:creationId xmlns:a16="http://schemas.microsoft.com/office/drawing/2014/main" id="{FB1232F7-2B2B-79C5-8C99-57B821019BB5}"/>
+              </a:ext>
+            </a:extLst>
+          </p:cNvPr>
+          <p:cNvCxnSpPr>
+            <a:cxnSpLocks/>
+            <a:stCxn id="34" idx="3"/>
+            <a:endCxn id="46" idx="1"/>
+          </p:cNvCxnSpPr>
+          <p:nvPr/>
+        </p:nvCxnSpPr>
+        <p:spPr>
+          <a:xfrm>
+            <a:off x="2105247" y="2993858"/>
+            <a:ext cx="1127047" cy="329185"/>
+          </a:xfrm>
+          <a:prstGeom prst="straightConnector1">
+            <a:avLst/>
+          </a:prstGeom>
+          <a:ln>
+            <a:tailEnd type="triangle"/>
+          </a:ln>
+        </p:spPr>
+        <p:style>
+          <a:lnRef idx="1">
+            <a:schemeClr val="accent1"/>
+          </a:lnRef>
+          <a:fillRef idx="0">
+            <a:schemeClr val="accent1"/>
+          </a:fillRef>
+          <a:effectRef idx="0">
+            <a:schemeClr val="accent1"/>
+          </a:effectRef>
+          <a:fontRef idx="minor">
+            <a:schemeClr val="tx1"/>
+          </a:fontRef>
+        </p:style>
+      </p:cxnSp>
+      <p:cxnSp>
+        <p:nvCxnSpPr>
+          <p:cNvPr id="67" name="Straight Arrow Connector 66">
+            <a:extLst>
+              <a:ext uri="{FF2B5EF4-FFF2-40B4-BE49-F238E27FC236}">
+                <a16:creationId xmlns:a16="http://schemas.microsoft.com/office/drawing/2014/main" id="{787C1831-0AB9-B205-C91D-EAF3C69F2976}"/>
+              </a:ext>
+            </a:extLst>
+          </p:cNvPr>
+          <p:cNvCxnSpPr>
+            <a:cxnSpLocks/>
+            <a:stCxn id="34" idx="3"/>
+            <a:endCxn id="50" idx="1"/>
+          </p:cNvCxnSpPr>
+          <p:nvPr/>
+        </p:nvCxnSpPr>
+        <p:spPr>
+          <a:xfrm>
+            <a:off x="2105247" y="2993858"/>
+            <a:ext cx="1127046" cy="1104407"/>
+          </a:xfrm>
+          <a:prstGeom prst="straightConnector1">
+            <a:avLst/>
+          </a:prstGeom>
+          <a:ln>
+            <a:tailEnd type="triangle"/>
+          </a:ln>
+        </p:spPr>
+        <p:style>
+          <a:lnRef idx="1">
+            <a:schemeClr val="accent1"/>
+          </a:lnRef>
+          <a:fillRef idx="0">
+            <a:schemeClr val="accent1"/>
+          </a:fillRef>
+          <a:effectRef idx="0">
+            <a:schemeClr val="accent1"/>
+          </a:effectRef>
+          <a:fontRef idx="minor">
+            <a:schemeClr val="tx1"/>
+          </a:fontRef>
+        </p:style>
+      </p:cxnSp>
+      <p:sp>
+        <p:nvSpPr>
+          <p:cNvPr id="75" name="TextBox 74">
+            <a:extLst>
+              <a:ext uri="{FF2B5EF4-FFF2-40B4-BE49-F238E27FC236}">
+                <a16:creationId xmlns:a16="http://schemas.microsoft.com/office/drawing/2014/main" id="{B593F6E1-75BE-A144-84F1-513536BEF7CE}"/>
+              </a:ext>
+            </a:extLst>
+          </p:cNvPr>
+          <p:cNvSpPr txBox="1"/>
+          <p:nvPr/>
+        </p:nvSpPr>
+        <p:spPr>
+          <a:xfrm flipH="1">
+            <a:off x="1978772" y="4920790"/>
+            <a:ext cx="3092393" cy="523220"/>
+          </a:xfrm>
+          <a:prstGeom prst="rect">
+            <a:avLst/>
+          </a:prstGeom>
+          <a:noFill/>
+        </p:spPr>
+        <p:txBody>
+          <a:bodyPr wrap="square" lIns="0" rIns="0" rtlCol="0">
+            <a:spAutoFit/>
+          </a:bodyPr>
+          <a:lstStyle/>
+          <a:p>
+            <a:pPr algn="ctr"/>
+            <a:r>
+              <a:rPr lang="en-US" sz="1400" dirty="0"/>
+              <a:t>Idea:</a:t>
+            </a:r>
+            <a:br>
+              <a:rPr lang="en-US" sz="1400" dirty="0"/>
+            </a:br>
+            <a:r>
+              <a:rPr lang="en-US" sz="1400" dirty="0" err="1"/>
+              <a:t>uv</a:t>
+            </a:r>
+            <a:r>
+              <a:rPr lang="en-US" sz="1400" dirty="0"/>
+              <a:t> &lt;run-any-thing-you-want&gt;</a:t>
+            </a:r>
+          </a:p>
+        </p:txBody>
+      </p:sp>
+    </p:spTree>
+    <p:extLst>
+      <p:ext uri="{BB962C8B-B14F-4D97-AF65-F5344CB8AC3E}">
+        <p14:creationId xmlns:p14="http://schemas.microsoft.com/office/powerpoint/2010/main" val="2846325625"/>
+      </p:ext>
+    </p:extLst>
+  </p:cSld>
+  <p:clrMapOvr>
+    <a:masterClrMapping/>
+  </p:clrMapOvr>
+</p:sld>
+</file>
+
+<file path=ppt/slides/slide14.xml><?xml version="1.0" encoding="utf-8"?>
+<p:sld xmlns:a="http://schemas.openxmlformats.org/drawingml/2006/main" xmlns:r="http://schemas.openxmlformats.org/officeDocument/2006/relationships" xmlns:p="http://schemas.openxmlformats.org/presentationml/2006/main">
+  <p:cSld>
+    <p:spTree>
+      <p:nvGrpSpPr>
+        <p:cNvPr id="1" name="">
+          <a:extLst>
+            <a:ext uri="{FF2B5EF4-FFF2-40B4-BE49-F238E27FC236}">
+              <a16:creationId xmlns:a16="http://schemas.microsoft.com/office/drawing/2014/main" id="{8FCDAC28-FA91-ADAB-20DA-CFCEE63067F4}"/>
+            </a:ext>
+          </a:extLst>
+        </p:cNvPr>
+        <p:cNvGrpSpPr/>
+        <p:nvPr/>
+      </p:nvGrpSpPr>
+      <p:grpSpPr>
+        <a:xfrm>
+          <a:off x="0" y="0"/>
+          <a:ext cx="0" cy="0"/>
+          <a:chOff x="0" y="0"/>
+          <a:chExt cx="0" cy="0"/>
+        </a:xfrm>
+      </p:grpSpPr>
+      <p:sp>
+        <p:nvSpPr>
+          <p:cNvPr id="25" name="Rectangle 24">
+            <a:extLst>
+              <a:ext uri="{FF2B5EF4-FFF2-40B4-BE49-F238E27FC236}">
+                <a16:creationId xmlns:a16="http://schemas.microsoft.com/office/drawing/2014/main" id="{F9BF82A2-13FE-923F-6E02-CD01C5CD5801}"/>
+              </a:ext>
+            </a:extLst>
+          </p:cNvPr>
+          <p:cNvSpPr/>
+          <p:nvPr/>
+        </p:nvSpPr>
+        <p:spPr>
+          <a:xfrm>
+            <a:off x="1749219" y="4495848"/>
+            <a:ext cx="1207249" cy="546197"/>
+          </a:xfrm>
+          <a:prstGeom prst="rect">
+            <a:avLst/>
+          </a:prstGeom>
+          <a:noFill/>
+        </p:spPr>
+        <p:style>
+          <a:lnRef idx="2">
+            <a:schemeClr val="accent1">
+              <a:shade val="15000"/>
+            </a:schemeClr>
+          </a:lnRef>
+          <a:fillRef idx="1">
+            <a:schemeClr val="accent1"/>
+          </a:fillRef>
+          <a:effectRef idx="0">
+            <a:schemeClr val="accent1"/>
+          </a:effectRef>
+          <a:fontRef idx="minor">
+            <a:schemeClr val="lt1"/>
+          </a:fontRef>
+        </p:style>
+        <p:txBody>
+          <a:bodyPr rtlCol="0" anchor="ctr"/>
+          <a:lstStyle/>
+          <a:p>
+            <a:pPr algn="ctr"/>
+            <a:r>
+              <a:rPr lang="en-US" sz="1050" dirty="0">
+                <a:solidFill>
+                  <a:schemeClr val="tx1"/>
+                </a:solidFill>
+              </a:rPr>
+              <a:t>Project</a:t>
+            </a:r>
+          </a:p>
+        </p:txBody>
+      </p:sp>
+      <p:sp>
+        <p:nvSpPr>
+          <p:cNvPr id="26" name="Rectangle: Rounded Corners 25">
+            <a:extLst>
+              <a:ext uri="{FF2B5EF4-FFF2-40B4-BE49-F238E27FC236}">
+                <a16:creationId xmlns:a16="http://schemas.microsoft.com/office/drawing/2014/main" id="{761A58E5-D55A-CDF1-061A-344363BD4748}"/>
+              </a:ext>
+            </a:extLst>
+          </p:cNvPr>
+          <p:cNvSpPr/>
+          <p:nvPr/>
+        </p:nvSpPr>
+        <p:spPr>
+          <a:xfrm>
+            <a:off x="3946186" y="4590024"/>
+            <a:ext cx="1100157" cy="256469"/>
+          </a:xfrm>
+          <a:prstGeom prst="roundRect">
+            <a:avLst/>
+          </a:prstGeom>
+          <a:noFill/>
+        </p:spPr>
+        <p:style>
+          <a:lnRef idx="2">
+            <a:schemeClr val="accent1">
+              <a:shade val="15000"/>
+            </a:schemeClr>
+          </a:lnRef>
+          <a:fillRef idx="1">
+            <a:schemeClr val="accent1"/>
+          </a:fillRef>
+          <a:effectRef idx="0">
+            <a:schemeClr val="accent1"/>
+          </a:effectRef>
+          <a:fontRef idx="minor">
+            <a:schemeClr val="lt1"/>
+          </a:fontRef>
+        </p:style>
+        <p:txBody>
+          <a:bodyPr rtlCol="0" anchor="ctr"/>
+          <a:lstStyle/>
+          <a:p>
+            <a:pPr algn="ctr"/>
+            <a:r>
+              <a:rPr lang="en-US" sz="1400" dirty="0">
+                <a:solidFill>
+                  <a:schemeClr val="tx1"/>
+                </a:solidFill>
+              </a:rPr>
+              <a:t>Sub </a:t>
+            </a:r>
+            <a:r>
+              <a:rPr lang="en-US" sz="1400" dirty="0" err="1">
+                <a:solidFill>
+                  <a:schemeClr val="tx1"/>
+                </a:solidFill>
+              </a:rPr>
+              <a:t>dir</a:t>
+            </a:r>
+            <a:endParaRPr lang="en-US" sz="1400" dirty="0">
+              <a:solidFill>
+                <a:schemeClr val="tx1"/>
+              </a:solidFill>
+            </a:endParaRPr>
+          </a:p>
+        </p:txBody>
+      </p:sp>
+      <p:sp>
+        <p:nvSpPr>
+          <p:cNvPr id="27" name="Rectangle: Rounded Corners 26">
+            <a:extLst>
+              <a:ext uri="{FF2B5EF4-FFF2-40B4-BE49-F238E27FC236}">
+                <a16:creationId xmlns:a16="http://schemas.microsoft.com/office/drawing/2014/main" id="{6808E0B9-52FA-41C4-0834-571B72559AA2}"/>
+              </a:ext>
+            </a:extLst>
+          </p:cNvPr>
+          <p:cNvSpPr/>
+          <p:nvPr/>
+        </p:nvSpPr>
+        <p:spPr>
+          <a:xfrm>
+            <a:off x="3946186" y="4910746"/>
+            <a:ext cx="1100157" cy="256469"/>
+          </a:xfrm>
+          <a:prstGeom prst="roundRect">
+            <a:avLst/>
+          </a:prstGeom>
+          <a:noFill/>
+        </p:spPr>
+        <p:style>
+          <a:lnRef idx="2">
+            <a:schemeClr val="accent1">
+              <a:shade val="15000"/>
+            </a:schemeClr>
+          </a:lnRef>
+          <a:fillRef idx="1">
+            <a:schemeClr val="accent1"/>
+          </a:fillRef>
+          <a:effectRef idx="0">
+            <a:schemeClr val="accent1"/>
+          </a:effectRef>
+          <a:fontRef idx="minor">
+            <a:schemeClr val="lt1"/>
+          </a:fontRef>
+        </p:style>
+        <p:txBody>
+          <a:bodyPr rtlCol="0" anchor="ctr"/>
+          <a:lstStyle/>
+          <a:p>
+            <a:pPr algn="ctr"/>
+            <a:r>
+              <a:rPr lang="en-US" sz="1400" dirty="0">
+                <a:solidFill>
+                  <a:schemeClr val="tx1"/>
+                </a:solidFill>
+              </a:rPr>
+              <a:t>Sub </a:t>
+            </a:r>
+            <a:r>
+              <a:rPr lang="en-US" sz="1400" dirty="0" err="1">
+                <a:solidFill>
+                  <a:schemeClr val="tx1"/>
+                </a:solidFill>
+              </a:rPr>
+              <a:t>dir</a:t>
+            </a:r>
+            <a:endParaRPr lang="en-US" sz="1400" dirty="0">
+              <a:solidFill>
+                <a:schemeClr val="tx1"/>
+              </a:solidFill>
+            </a:endParaRPr>
+          </a:p>
+        </p:txBody>
+      </p:sp>
+      <p:sp>
+        <p:nvSpPr>
+          <p:cNvPr id="28" name="Rectangle: Rounded Corners 27">
+            <a:extLst>
+              <a:ext uri="{FF2B5EF4-FFF2-40B4-BE49-F238E27FC236}">
+                <a16:creationId xmlns:a16="http://schemas.microsoft.com/office/drawing/2014/main" id="{6D7E0A3E-DCAE-DE58-A705-7473A7A27643}"/>
+              </a:ext>
+            </a:extLst>
+          </p:cNvPr>
+          <p:cNvSpPr/>
+          <p:nvPr/>
+        </p:nvSpPr>
+        <p:spPr>
+          <a:xfrm>
+            <a:off x="3946186" y="5253072"/>
+            <a:ext cx="1100157" cy="256469"/>
+          </a:xfrm>
+          <a:prstGeom prst="roundRect">
+            <a:avLst/>
+          </a:prstGeom>
+          <a:noFill/>
+        </p:spPr>
+        <p:style>
+          <a:lnRef idx="2">
+            <a:schemeClr val="accent1">
+              <a:shade val="15000"/>
+            </a:schemeClr>
+          </a:lnRef>
+          <a:fillRef idx="1">
+            <a:schemeClr val="accent1"/>
+          </a:fillRef>
+          <a:effectRef idx="0">
+            <a:schemeClr val="accent1"/>
+          </a:effectRef>
+          <a:fontRef idx="minor">
+            <a:schemeClr val="lt1"/>
+          </a:fontRef>
+        </p:style>
+        <p:txBody>
+          <a:bodyPr rtlCol="0" anchor="ctr"/>
+          <a:lstStyle/>
+          <a:p>
+            <a:pPr algn="ctr"/>
+            <a:r>
+              <a:rPr lang="en-US" sz="1400" dirty="0">
+                <a:solidFill>
+                  <a:schemeClr val="tx1"/>
+                </a:solidFill>
+              </a:rPr>
+              <a:t>Sub </a:t>
+            </a:r>
+            <a:r>
+              <a:rPr lang="en-US" sz="1400" dirty="0" err="1">
+                <a:solidFill>
+                  <a:schemeClr val="tx1"/>
+                </a:solidFill>
+              </a:rPr>
+              <a:t>dir</a:t>
+            </a:r>
+            <a:endParaRPr lang="en-US" sz="1400" dirty="0">
+              <a:solidFill>
+                <a:schemeClr val="tx1"/>
+              </a:solidFill>
+            </a:endParaRPr>
+          </a:p>
+        </p:txBody>
+      </p:sp>
+      <p:sp>
+        <p:nvSpPr>
+          <p:cNvPr id="48" name="TextBox 47">
+            <a:extLst>
+              <a:ext uri="{FF2B5EF4-FFF2-40B4-BE49-F238E27FC236}">
+                <a16:creationId xmlns:a16="http://schemas.microsoft.com/office/drawing/2014/main" id="{05C9876A-2E69-C88B-C9FB-79FDD326E7D1}"/>
+              </a:ext>
+            </a:extLst>
+          </p:cNvPr>
+          <p:cNvSpPr txBox="1"/>
+          <p:nvPr/>
+        </p:nvSpPr>
+        <p:spPr>
+          <a:xfrm flipH="1">
+            <a:off x="1211918" y="1010121"/>
+            <a:ext cx="4626103" cy="338554"/>
+          </a:xfrm>
+          <a:prstGeom prst="rect">
+            <a:avLst/>
+          </a:prstGeom>
+          <a:noFill/>
+        </p:spPr>
+        <p:txBody>
+          <a:bodyPr wrap="square" rtlCol="0">
+            <a:spAutoFit/>
+          </a:bodyPr>
+          <a:lstStyle/>
+          <a:p>
+            <a:pPr algn="ctr"/>
+            <a:r>
+              <a:rPr lang="en-US" sz="1600" dirty="0"/>
+              <a:t>Ask “UV” to do all things Python</a:t>
+            </a:r>
+          </a:p>
+        </p:txBody>
+      </p:sp>
+      <p:grpSp>
+        <p:nvGrpSpPr>
+          <p:cNvPr id="22" name="Group 21">
+            <a:extLst>
+              <a:ext uri="{FF2B5EF4-FFF2-40B4-BE49-F238E27FC236}">
+                <a16:creationId xmlns:a16="http://schemas.microsoft.com/office/drawing/2014/main" id="{185DAE47-026C-E896-649A-2CA4CD3F74D6}"/>
+              </a:ext>
+            </a:extLst>
+          </p:cNvPr>
+          <p:cNvGrpSpPr/>
+          <p:nvPr/>
+        </p:nvGrpSpPr>
+        <p:grpSpPr>
+          <a:xfrm>
+            <a:off x="5182573" y="4535402"/>
+            <a:ext cx="1044129" cy="2220753"/>
+            <a:chOff x="4937066" y="6198004"/>
+            <a:chExt cx="1044129" cy="2220753"/>
+          </a:xfrm>
+        </p:grpSpPr>
+        <p:sp>
+          <p:nvSpPr>
+            <p:cNvPr id="3" name="Rectangle: Rounded Corners 2">
+              <a:extLst>
+                <a:ext uri="{FF2B5EF4-FFF2-40B4-BE49-F238E27FC236}">
+                  <a16:creationId xmlns:a16="http://schemas.microsoft.com/office/drawing/2014/main" id="{5D9FFC9A-97C7-7F87-584A-FFCA5BA117B6}"/>
+                </a:ext>
+              </a:extLst>
+            </p:cNvPr>
+            <p:cNvSpPr/>
+            <p:nvPr/>
+          </p:nvSpPr>
+          <p:spPr>
+            <a:xfrm>
+              <a:off x="5055006" y="6198004"/>
+              <a:ext cx="808250" cy="320722"/>
+            </a:xfrm>
+            <a:prstGeom prst="roundRect">
+              <a:avLst/>
+            </a:prstGeom>
+            <a:noFill/>
+          </p:spPr>
+          <p:style>
+            <a:lnRef idx="2">
+              <a:schemeClr val="accent1">
+                <a:shade val="15000"/>
+              </a:schemeClr>
+            </a:lnRef>
+            <a:fillRef idx="1">
+              <a:schemeClr val="accent1"/>
+            </a:fillRef>
+            <a:effectRef idx="0">
+              <a:schemeClr val="accent1"/>
+            </a:effectRef>
+            <a:fontRef idx="minor">
+              <a:schemeClr val="lt1"/>
+            </a:fontRef>
+          </p:style>
+          <p:txBody>
+            <a:bodyPr rtlCol="0" anchor="ctr"/>
+            <a:lstStyle/>
+            <a:p>
+              <a:pPr algn="ctr"/>
+              <a:r>
+                <a:rPr lang="en-US" sz="1400" dirty="0">
+                  <a:solidFill>
+                    <a:schemeClr val="tx1"/>
+                  </a:solidFill>
+                </a:rPr>
+                <a:t>python</a:t>
+              </a:r>
+            </a:p>
+          </p:txBody>
+        </p:sp>
+        <p:sp>
+          <p:nvSpPr>
+            <p:cNvPr id="4" name="Rectangle: Rounded Corners 3">
+              <a:extLst>
+                <a:ext uri="{FF2B5EF4-FFF2-40B4-BE49-F238E27FC236}">
+                  <a16:creationId xmlns:a16="http://schemas.microsoft.com/office/drawing/2014/main" id="{BF60549D-CCC2-31CC-C4C5-7E4516F28C3B}"/>
+                </a:ext>
+              </a:extLst>
+            </p:cNvPr>
+            <p:cNvSpPr/>
+            <p:nvPr/>
+          </p:nvSpPr>
+          <p:spPr>
+            <a:xfrm>
+              <a:off x="5055006" y="6563224"/>
+              <a:ext cx="808250" cy="320722"/>
+            </a:xfrm>
+            <a:prstGeom prst="roundRect">
+              <a:avLst/>
+            </a:prstGeom>
+            <a:noFill/>
+          </p:spPr>
+          <p:style>
+            <a:lnRef idx="2">
+              <a:schemeClr val="accent1">
+                <a:shade val="15000"/>
+              </a:schemeClr>
+            </a:lnRef>
+            <a:fillRef idx="1">
+              <a:schemeClr val="accent1"/>
+            </a:fillRef>
+            <a:effectRef idx="0">
+              <a:schemeClr val="accent1"/>
+            </a:effectRef>
+            <a:fontRef idx="minor">
+              <a:schemeClr val="lt1"/>
+            </a:fontRef>
+          </p:style>
+          <p:txBody>
+            <a:bodyPr rtlCol="0" anchor="ctr"/>
+            <a:lstStyle/>
+            <a:p>
+              <a:pPr algn="ctr"/>
+              <a:r>
+                <a:rPr lang="en-US" sz="1400" dirty="0">
+                  <a:solidFill>
+                    <a:schemeClr val="tx1"/>
+                  </a:solidFill>
+                </a:rPr>
+                <a:t>lib</a:t>
+              </a:r>
+            </a:p>
+          </p:txBody>
+        </p:sp>
+        <p:sp>
+          <p:nvSpPr>
+            <p:cNvPr id="5" name="Rectangle: Rounded Corners 4">
+              <a:extLst>
+                <a:ext uri="{FF2B5EF4-FFF2-40B4-BE49-F238E27FC236}">
+                  <a16:creationId xmlns:a16="http://schemas.microsoft.com/office/drawing/2014/main" id="{1B84C36A-2DE6-3A55-5324-09EFD59E4214}"/>
+                </a:ext>
+              </a:extLst>
+            </p:cNvPr>
+            <p:cNvSpPr/>
+            <p:nvPr/>
+          </p:nvSpPr>
+          <p:spPr>
+            <a:xfrm>
+              <a:off x="5055006" y="7013600"/>
+              <a:ext cx="808250" cy="320722"/>
+            </a:xfrm>
+            <a:prstGeom prst="roundRect">
+              <a:avLst/>
+            </a:prstGeom>
+            <a:noFill/>
+          </p:spPr>
+          <p:style>
+            <a:lnRef idx="2">
+              <a:schemeClr val="accent1">
+                <a:shade val="15000"/>
+              </a:schemeClr>
+            </a:lnRef>
+            <a:fillRef idx="1">
+              <a:schemeClr val="accent1"/>
+            </a:fillRef>
+            <a:effectRef idx="0">
+              <a:schemeClr val="accent1"/>
+            </a:effectRef>
+            <a:fontRef idx="minor">
+              <a:schemeClr val="lt1"/>
+            </a:fontRef>
+          </p:style>
+          <p:txBody>
+            <a:bodyPr rtlCol="0" anchor="ctr"/>
+            <a:lstStyle/>
+            <a:p>
+              <a:pPr algn="ctr"/>
+              <a:r>
+                <a:rPr lang="en-US" sz="1400" dirty="0">
+                  <a:solidFill>
+                    <a:schemeClr val="tx1"/>
+                  </a:solidFill>
+                </a:rPr>
+                <a:t>lib</a:t>
+              </a:r>
+            </a:p>
+          </p:txBody>
+        </p:sp>
+        <p:sp>
+          <p:nvSpPr>
+            <p:cNvPr id="7" name="Rectangle: Rounded Corners 6">
+              <a:extLst>
+                <a:ext uri="{FF2B5EF4-FFF2-40B4-BE49-F238E27FC236}">
+                  <a16:creationId xmlns:a16="http://schemas.microsoft.com/office/drawing/2014/main" id="{1BF220CF-DC25-9BF2-D629-D7DE4B192D56}"/>
+                </a:ext>
+              </a:extLst>
+            </p:cNvPr>
+            <p:cNvSpPr/>
+            <p:nvPr/>
+          </p:nvSpPr>
+          <p:spPr>
+            <a:xfrm>
+              <a:off x="5055006" y="7463976"/>
+              <a:ext cx="808250" cy="320722"/>
+            </a:xfrm>
+            <a:prstGeom prst="roundRect">
+              <a:avLst/>
+            </a:prstGeom>
+            <a:noFill/>
+          </p:spPr>
+          <p:style>
+            <a:lnRef idx="2">
+              <a:schemeClr val="accent1">
+                <a:shade val="15000"/>
+              </a:schemeClr>
+            </a:lnRef>
+            <a:fillRef idx="1">
+              <a:schemeClr val="accent1"/>
+            </a:fillRef>
+            <a:effectRef idx="0">
+              <a:schemeClr val="accent1"/>
+            </a:effectRef>
+            <a:fontRef idx="minor">
+              <a:schemeClr val="lt1"/>
+            </a:fontRef>
+          </p:style>
+          <p:txBody>
+            <a:bodyPr rtlCol="0" anchor="ctr"/>
+            <a:lstStyle/>
+            <a:p>
+              <a:pPr algn="ctr"/>
+              <a:r>
+                <a:rPr lang="en-US" sz="1400" dirty="0">
+                  <a:solidFill>
+                    <a:schemeClr val="tx1"/>
+                  </a:solidFill>
+                </a:rPr>
+                <a:t>lib</a:t>
+              </a:r>
+            </a:p>
+          </p:txBody>
+        </p:sp>
+        <p:sp>
+          <p:nvSpPr>
+            <p:cNvPr id="15" name="TextBox 14">
+              <a:extLst>
+                <a:ext uri="{FF2B5EF4-FFF2-40B4-BE49-F238E27FC236}">
+                  <a16:creationId xmlns:a16="http://schemas.microsoft.com/office/drawing/2014/main" id="{713D997F-DB93-D706-4A71-2D2367AB16CC}"/>
+                </a:ext>
+              </a:extLst>
+            </p:cNvPr>
+            <p:cNvSpPr txBox="1"/>
+            <p:nvPr/>
+          </p:nvSpPr>
+          <p:spPr>
+            <a:xfrm flipH="1">
+              <a:off x="4937066" y="7841676"/>
+              <a:ext cx="1044129" cy="577081"/>
+            </a:xfrm>
+            <a:prstGeom prst="rect">
+              <a:avLst/>
+            </a:prstGeom>
+            <a:noFill/>
+          </p:spPr>
+          <p:txBody>
+            <a:bodyPr wrap="square" rtlCol="0">
+              <a:spAutoFit/>
+            </a:bodyPr>
+            <a:lstStyle/>
+            <a:p>
+              <a:pPr algn="ctr"/>
+              <a:r>
+                <a:rPr lang="en-US" sz="1050" b="1" dirty="0"/>
+                <a:t>Hundreds of </a:t>
+              </a:r>
+            </a:p>
+            <a:p>
+              <a:pPr algn="ctr"/>
+              <a:r>
+                <a:rPr lang="en-US" sz="1050" b="1" dirty="0"/>
+                <a:t>Dedicated</a:t>
+              </a:r>
+            </a:p>
+            <a:p>
+              <a:pPr algn="ctr"/>
+              <a:r>
+                <a:rPr lang="en-US" sz="1050" b="1" dirty="0"/>
+                <a:t>libs</a:t>
+              </a:r>
+            </a:p>
+          </p:txBody>
+        </p:sp>
+      </p:grpSp>
+      <p:sp>
+        <p:nvSpPr>
+          <p:cNvPr id="30" name="Rectangle: Rounded Corners 29">
+            <a:extLst>
+              <a:ext uri="{FF2B5EF4-FFF2-40B4-BE49-F238E27FC236}">
+                <a16:creationId xmlns:a16="http://schemas.microsoft.com/office/drawing/2014/main" id="{6FD10319-7FD9-965E-1535-0F46198CA659}"/>
+              </a:ext>
+            </a:extLst>
+          </p:cNvPr>
+          <p:cNvSpPr/>
+          <p:nvPr/>
+        </p:nvSpPr>
+        <p:spPr>
+          <a:xfrm>
+            <a:off x="3975324" y="3971426"/>
+            <a:ext cx="1100157" cy="463838"/>
+          </a:xfrm>
+          <a:prstGeom prst="roundRect">
+            <a:avLst/>
+          </a:prstGeom>
+          <a:noFill/>
+          <a:ln w="28575">
+            <a:solidFill>
+              <a:srgbClr val="FF0000"/>
+            </a:solidFill>
+          </a:ln>
+        </p:spPr>
+        <p:style>
+          <a:lnRef idx="2">
+            <a:schemeClr val="accent1">
+              <a:shade val="15000"/>
+            </a:schemeClr>
+          </a:lnRef>
+          <a:fillRef idx="1">
+            <a:schemeClr val="accent1"/>
+          </a:fillRef>
+          <a:effectRef idx="0">
+            <a:schemeClr val="accent1"/>
+          </a:effectRef>
+          <a:fontRef idx="minor">
+            <a:schemeClr val="lt1"/>
+          </a:fontRef>
+        </p:style>
+        <p:txBody>
+          <a:bodyPr rtlCol="0" anchor="ctr"/>
+          <a:lstStyle/>
+          <a:p>
+            <a:pPr algn="ctr"/>
+            <a:r>
+              <a:rPr lang="en-US" sz="1050" dirty="0">
+                <a:solidFill>
+                  <a:schemeClr val="tx1"/>
+                </a:solidFill>
+              </a:rPr>
+              <a:t>Sub </a:t>
+            </a:r>
+            <a:r>
+              <a:rPr lang="en-US" sz="1050" dirty="0" err="1">
+                <a:solidFill>
+                  <a:schemeClr val="tx1"/>
+                </a:solidFill>
+              </a:rPr>
+              <a:t>dir</a:t>
+            </a:r>
+            <a:endParaRPr lang="en-US" sz="1050" dirty="0">
+              <a:solidFill>
+                <a:schemeClr val="tx1"/>
+              </a:solidFill>
+            </a:endParaRPr>
+          </a:p>
+          <a:p>
+            <a:pPr algn="ctr"/>
+            <a:r>
+              <a:rPr lang="en-US" sz="1050" dirty="0">
+                <a:solidFill>
+                  <a:schemeClr val="tx1"/>
+                </a:solidFill>
+              </a:rPr>
+              <a:t>.</a:t>
+            </a:r>
+            <a:r>
+              <a:rPr lang="en-US" sz="1050" dirty="0" err="1">
+                <a:solidFill>
+                  <a:schemeClr val="tx1"/>
+                </a:solidFill>
+              </a:rPr>
+              <a:t>venv</a:t>
+            </a:r>
+            <a:endParaRPr lang="en-US" sz="1050" dirty="0">
+              <a:solidFill>
+                <a:schemeClr val="tx1"/>
+              </a:solidFill>
+            </a:endParaRPr>
+          </a:p>
+        </p:txBody>
+      </p:sp>
+      <p:cxnSp>
+        <p:nvCxnSpPr>
+          <p:cNvPr id="32" name="Connector: Elbow 31">
+            <a:extLst>
+              <a:ext uri="{FF2B5EF4-FFF2-40B4-BE49-F238E27FC236}">
+                <a16:creationId xmlns:a16="http://schemas.microsoft.com/office/drawing/2014/main" id="{865BE2ED-4388-C4E9-DBCA-96DBC324C75A}"/>
+              </a:ext>
+            </a:extLst>
+          </p:cNvPr>
+          <p:cNvCxnSpPr>
+            <a:cxnSpLocks/>
+            <a:stCxn id="30" idx="3"/>
+            <a:endCxn id="3" idx="0"/>
+          </p:cNvCxnSpPr>
+          <p:nvPr/>
+        </p:nvCxnSpPr>
+        <p:spPr>
+          <a:xfrm>
+            <a:off x="5075481" y="4203345"/>
+            <a:ext cx="629157" cy="332057"/>
+          </a:xfrm>
+          <a:prstGeom prst="bentConnector2">
+            <a:avLst/>
+          </a:prstGeom>
+          <a:ln>
+            <a:tailEnd type="triangle"/>
+          </a:ln>
+        </p:spPr>
+        <p:style>
+          <a:lnRef idx="1">
+            <a:schemeClr val="accent1"/>
+          </a:lnRef>
+          <a:fillRef idx="0">
+            <a:schemeClr val="accent1"/>
+          </a:fillRef>
+          <a:effectRef idx="0">
+            <a:schemeClr val="accent1"/>
+          </a:effectRef>
+          <a:fontRef idx="minor">
+            <a:schemeClr val="tx1"/>
+          </a:fontRef>
+        </p:style>
+      </p:cxnSp>
+      <p:cxnSp>
+        <p:nvCxnSpPr>
+          <p:cNvPr id="37" name="Straight Arrow Connector 36">
+            <a:extLst>
+              <a:ext uri="{FF2B5EF4-FFF2-40B4-BE49-F238E27FC236}">
+                <a16:creationId xmlns:a16="http://schemas.microsoft.com/office/drawing/2014/main" id="{BD358C11-3DD7-130A-439F-E4BEBE12E6F1}"/>
+              </a:ext>
+            </a:extLst>
+          </p:cNvPr>
+          <p:cNvCxnSpPr>
+            <a:cxnSpLocks/>
+            <a:stCxn id="25" idx="3"/>
+            <a:endCxn id="30" idx="1"/>
+          </p:cNvCxnSpPr>
+          <p:nvPr/>
+        </p:nvCxnSpPr>
+        <p:spPr>
+          <a:xfrm flipV="1">
+            <a:off x="2956468" y="4203345"/>
+            <a:ext cx="1018856" cy="565602"/>
+          </a:xfrm>
+          <a:prstGeom prst="straightConnector1">
+            <a:avLst/>
+          </a:prstGeom>
+          <a:ln>
+            <a:tailEnd type="triangle"/>
+          </a:ln>
+        </p:spPr>
+        <p:style>
+          <a:lnRef idx="1">
+            <a:schemeClr val="accent1"/>
+          </a:lnRef>
+          <a:fillRef idx="0">
+            <a:schemeClr val="accent1"/>
+          </a:fillRef>
+          <a:effectRef idx="0">
+            <a:schemeClr val="accent1"/>
+          </a:effectRef>
+          <a:fontRef idx="minor">
+            <a:schemeClr val="tx1"/>
+          </a:fontRef>
+        </p:style>
+      </p:cxnSp>
+      <p:cxnSp>
+        <p:nvCxnSpPr>
+          <p:cNvPr id="42" name="Straight Arrow Connector 41">
+            <a:extLst>
+              <a:ext uri="{FF2B5EF4-FFF2-40B4-BE49-F238E27FC236}">
+                <a16:creationId xmlns:a16="http://schemas.microsoft.com/office/drawing/2014/main" id="{DD864346-EFE0-A9FF-9901-890A3C7CD4B7}"/>
+              </a:ext>
+            </a:extLst>
+          </p:cNvPr>
+          <p:cNvCxnSpPr>
+            <a:cxnSpLocks/>
+            <a:stCxn id="25" idx="3"/>
+            <a:endCxn id="26" idx="1"/>
+          </p:cNvCxnSpPr>
+          <p:nvPr/>
+        </p:nvCxnSpPr>
+        <p:spPr>
+          <a:xfrm flipV="1">
+            <a:off x="2956468" y="4718259"/>
+            <a:ext cx="989718" cy="50688"/>
+          </a:xfrm>
+          <a:prstGeom prst="straightConnector1">
+            <a:avLst/>
+          </a:prstGeom>
+          <a:ln>
+            <a:tailEnd type="triangle"/>
+          </a:ln>
+        </p:spPr>
+        <p:style>
+          <a:lnRef idx="1">
+            <a:schemeClr val="accent1"/>
+          </a:lnRef>
+          <a:fillRef idx="0">
+            <a:schemeClr val="accent1"/>
+          </a:fillRef>
+          <a:effectRef idx="0">
+            <a:schemeClr val="accent1"/>
+          </a:effectRef>
+          <a:fontRef idx="minor">
+            <a:schemeClr val="tx1"/>
+          </a:fontRef>
+        </p:style>
+      </p:cxnSp>
+      <p:cxnSp>
+        <p:nvCxnSpPr>
+          <p:cNvPr id="49" name="Straight Arrow Connector 48">
+            <a:extLst>
+              <a:ext uri="{FF2B5EF4-FFF2-40B4-BE49-F238E27FC236}">
+                <a16:creationId xmlns:a16="http://schemas.microsoft.com/office/drawing/2014/main" id="{48952DB4-1DF3-2C49-C2D7-0A8B6FBF9775}"/>
+              </a:ext>
+            </a:extLst>
+          </p:cNvPr>
+          <p:cNvCxnSpPr>
+            <a:cxnSpLocks/>
+            <a:stCxn id="25" idx="3"/>
+            <a:endCxn id="28" idx="1"/>
+          </p:cNvCxnSpPr>
+          <p:nvPr/>
+        </p:nvCxnSpPr>
+        <p:spPr>
+          <a:xfrm>
+            <a:off x="2956468" y="4768947"/>
+            <a:ext cx="989718" cy="612360"/>
+          </a:xfrm>
+          <a:prstGeom prst="straightConnector1">
+            <a:avLst/>
+          </a:prstGeom>
+          <a:ln>
+            <a:tailEnd type="triangle"/>
+          </a:ln>
+        </p:spPr>
+        <p:style>
+          <a:lnRef idx="1">
+            <a:schemeClr val="accent1"/>
+          </a:lnRef>
+          <a:fillRef idx="0">
+            <a:schemeClr val="accent1"/>
+          </a:fillRef>
+          <a:effectRef idx="0">
+            <a:schemeClr val="accent1"/>
+          </a:effectRef>
+          <a:fontRef idx="minor">
+            <a:schemeClr val="tx1"/>
+          </a:fontRef>
+        </p:style>
+      </p:cxnSp>
+      <p:cxnSp>
+        <p:nvCxnSpPr>
+          <p:cNvPr id="52" name="Straight Arrow Connector 51">
+            <a:extLst>
+              <a:ext uri="{FF2B5EF4-FFF2-40B4-BE49-F238E27FC236}">
+                <a16:creationId xmlns:a16="http://schemas.microsoft.com/office/drawing/2014/main" id="{028335FE-22FE-EC03-B6B6-ADFBF2DF4183}"/>
+              </a:ext>
+            </a:extLst>
+          </p:cNvPr>
+          <p:cNvCxnSpPr>
+            <a:cxnSpLocks/>
+            <a:stCxn id="25" idx="3"/>
+            <a:endCxn id="27" idx="1"/>
+          </p:cNvCxnSpPr>
+          <p:nvPr/>
+        </p:nvCxnSpPr>
+        <p:spPr>
+          <a:xfrm>
+            <a:off x="2956468" y="4768947"/>
+            <a:ext cx="989718" cy="270034"/>
+          </a:xfrm>
+          <a:prstGeom prst="straightConnector1">
+            <a:avLst/>
+          </a:prstGeom>
+          <a:ln>
+            <a:tailEnd type="triangle"/>
+          </a:ln>
+        </p:spPr>
+        <p:style>
+          <a:lnRef idx="1">
+            <a:schemeClr val="accent1"/>
+          </a:lnRef>
+          <a:fillRef idx="0">
+            <a:schemeClr val="accent1"/>
+          </a:fillRef>
+          <a:effectRef idx="0">
+            <a:schemeClr val="accent1"/>
+          </a:effectRef>
+          <a:fontRef idx="minor">
+            <a:schemeClr val="tx1"/>
+          </a:fontRef>
+        </p:style>
+      </p:cxnSp>
+      <p:sp>
+        <p:nvSpPr>
+          <p:cNvPr id="61" name="Rectangle 60">
+            <a:extLst>
+              <a:ext uri="{FF2B5EF4-FFF2-40B4-BE49-F238E27FC236}">
+                <a16:creationId xmlns:a16="http://schemas.microsoft.com/office/drawing/2014/main" id="{142101F3-32C8-70D2-59F8-EC2449007F00}"/>
+              </a:ext>
+            </a:extLst>
+          </p:cNvPr>
+          <p:cNvSpPr/>
+          <p:nvPr/>
+        </p:nvSpPr>
+        <p:spPr>
+          <a:xfrm>
+            <a:off x="327194" y="832513"/>
+            <a:ext cx="6237379" cy="6082429"/>
+          </a:xfrm>
+          <a:prstGeom prst="rect">
+            <a:avLst/>
+          </a:prstGeom>
+          <a:noFill/>
+        </p:spPr>
+        <p:style>
+          <a:lnRef idx="2">
+            <a:schemeClr val="accent1">
+              <a:shade val="15000"/>
+            </a:schemeClr>
+          </a:lnRef>
+          <a:fillRef idx="1">
+            <a:schemeClr val="accent1"/>
+          </a:fillRef>
+          <a:effectRef idx="0">
+            <a:schemeClr val="accent1"/>
+          </a:effectRef>
+          <a:fontRef idx="minor">
+            <a:schemeClr val="lt1"/>
+          </a:fontRef>
+        </p:style>
+        <p:txBody>
+          <a:bodyPr rtlCol="0" anchor="ctr"/>
+          <a:lstStyle/>
+          <a:p>
+            <a:pPr algn="ctr"/>
+            <a:endParaRPr lang="en-US" sz="1400" dirty="0">
+              <a:solidFill>
+                <a:schemeClr val="tx1"/>
+              </a:solidFill>
+            </a:endParaRPr>
+          </a:p>
+        </p:txBody>
+      </p:sp>
+      <p:sp>
+        <p:nvSpPr>
+          <p:cNvPr id="34" name="Rectangle 33">
+            <a:extLst>
+              <a:ext uri="{FF2B5EF4-FFF2-40B4-BE49-F238E27FC236}">
+                <a16:creationId xmlns:a16="http://schemas.microsoft.com/office/drawing/2014/main" id="{EC89A492-E03B-15D6-AF09-212A4D4E14C0}"/>
+              </a:ext>
+            </a:extLst>
+          </p:cNvPr>
+          <p:cNvSpPr/>
+          <p:nvPr/>
+        </p:nvSpPr>
+        <p:spPr>
+          <a:xfrm>
+            <a:off x="1806940" y="2711314"/>
+            <a:ext cx="893329" cy="546198"/>
+          </a:xfrm>
+          <a:prstGeom prst="rect">
+            <a:avLst/>
+          </a:prstGeom>
+          <a:noFill/>
+          <a:ln w="28575">
+            <a:solidFill>
+              <a:srgbClr val="FF0000"/>
+            </a:solidFill>
+          </a:ln>
+        </p:spPr>
+        <p:style>
+          <a:lnRef idx="2">
+            <a:schemeClr val="accent1">
+              <a:shade val="15000"/>
+            </a:schemeClr>
+          </a:lnRef>
+          <a:fillRef idx="1">
+            <a:schemeClr val="accent1"/>
+          </a:fillRef>
+          <a:effectRef idx="0">
+            <a:schemeClr val="accent1"/>
+          </a:effectRef>
+          <a:fontRef idx="minor">
+            <a:schemeClr val="lt1"/>
+          </a:fontRef>
+        </p:style>
+        <p:txBody>
+          <a:bodyPr rtlCol="0" anchor="ctr"/>
+          <a:lstStyle/>
+          <a:p>
+            <a:pPr algn="ctr"/>
+            <a:r>
+              <a:rPr lang="en-US" sz="1050" dirty="0" err="1">
+                <a:solidFill>
+                  <a:schemeClr val="tx1"/>
+                </a:solidFill>
+              </a:rPr>
+              <a:t>Uv</a:t>
+            </a:r>
+            <a:endParaRPr lang="en-US" sz="1050" dirty="0">
+              <a:solidFill>
+                <a:schemeClr val="tx1"/>
+              </a:solidFill>
+            </a:endParaRPr>
+          </a:p>
+          <a:p>
+            <a:pPr algn="ctr"/>
+            <a:r>
+              <a:rPr lang="en-US" sz="1050" dirty="0">
+                <a:solidFill>
+                  <a:schemeClr val="tx1"/>
+                </a:solidFill>
+              </a:rPr>
+              <a:t>(Executable)</a:t>
+            </a:r>
+          </a:p>
+        </p:txBody>
+      </p:sp>
+      <p:sp>
+        <p:nvSpPr>
+          <p:cNvPr id="10" name="Rectangle 9">
+            <a:extLst>
+              <a:ext uri="{FF2B5EF4-FFF2-40B4-BE49-F238E27FC236}">
+                <a16:creationId xmlns:a16="http://schemas.microsoft.com/office/drawing/2014/main" id="{C4448F91-D56D-625F-143D-AB02C7E69CB5}"/>
+              </a:ext>
+            </a:extLst>
+          </p:cNvPr>
+          <p:cNvSpPr/>
+          <p:nvPr/>
+        </p:nvSpPr>
+        <p:spPr>
+          <a:xfrm>
+            <a:off x="2939033" y="5755013"/>
+            <a:ext cx="1207249" cy="320722"/>
+          </a:xfrm>
+          <a:prstGeom prst="rect">
+            <a:avLst/>
+          </a:prstGeom>
+          <a:noFill/>
+          <a:ln w="28575">
+            <a:solidFill>
+              <a:srgbClr val="FF0000"/>
+            </a:solidFill>
+          </a:ln>
+        </p:spPr>
+        <p:style>
+          <a:lnRef idx="2">
+            <a:schemeClr val="accent1">
+              <a:shade val="15000"/>
+            </a:schemeClr>
+          </a:lnRef>
+          <a:fillRef idx="1">
+            <a:schemeClr val="accent1"/>
+          </a:fillRef>
+          <a:effectRef idx="0">
+            <a:schemeClr val="accent1"/>
+          </a:effectRef>
+          <a:fontRef idx="minor">
+            <a:schemeClr val="lt1"/>
+          </a:fontRef>
+        </p:style>
+        <p:txBody>
+          <a:bodyPr rtlCol="0" anchor="ctr"/>
+          <a:lstStyle/>
+          <a:p>
+            <a:pPr algn="ctr"/>
+            <a:r>
+              <a:rPr lang="en-US" sz="1050" dirty="0" err="1">
+                <a:solidFill>
+                  <a:schemeClr val="tx1"/>
+                </a:solidFill>
+              </a:rPr>
+              <a:t>pyproject.toml</a:t>
+            </a:r>
+            <a:endParaRPr lang="en-US" sz="1050" dirty="0">
+              <a:solidFill>
+                <a:schemeClr val="tx1"/>
+              </a:solidFill>
+            </a:endParaRPr>
+          </a:p>
+        </p:txBody>
+      </p:sp>
+      <p:sp>
+        <p:nvSpPr>
+          <p:cNvPr id="11" name="Rectangle 10">
+            <a:extLst>
+              <a:ext uri="{FF2B5EF4-FFF2-40B4-BE49-F238E27FC236}">
+                <a16:creationId xmlns:a16="http://schemas.microsoft.com/office/drawing/2014/main" id="{44D6655A-3E8F-A5B3-21F8-55997CC1923C}"/>
+              </a:ext>
+            </a:extLst>
+          </p:cNvPr>
+          <p:cNvSpPr/>
+          <p:nvPr/>
+        </p:nvSpPr>
+        <p:spPr>
+          <a:xfrm>
+            <a:off x="2939033" y="6225573"/>
+            <a:ext cx="1207249" cy="320722"/>
+          </a:xfrm>
+          <a:prstGeom prst="rect">
+            <a:avLst/>
+          </a:prstGeom>
+          <a:noFill/>
+          <a:ln w="28575">
+            <a:solidFill>
+              <a:srgbClr val="FF0000"/>
+            </a:solidFill>
+          </a:ln>
+        </p:spPr>
+        <p:style>
+          <a:lnRef idx="2">
+            <a:schemeClr val="accent1">
+              <a:shade val="15000"/>
+            </a:schemeClr>
+          </a:lnRef>
+          <a:fillRef idx="1">
+            <a:schemeClr val="accent1"/>
+          </a:fillRef>
+          <a:effectRef idx="0">
+            <a:schemeClr val="accent1"/>
+          </a:effectRef>
+          <a:fontRef idx="minor">
+            <a:schemeClr val="lt1"/>
+          </a:fontRef>
+        </p:style>
+        <p:txBody>
+          <a:bodyPr rtlCol="0" anchor="ctr"/>
+          <a:lstStyle/>
+          <a:p>
+            <a:pPr algn="ctr"/>
+            <a:r>
+              <a:rPr lang="en-US" sz="1050" dirty="0" err="1">
+                <a:solidFill>
+                  <a:schemeClr val="tx1"/>
+                </a:solidFill>
+              </a:rPr>
+              <a:t>Uv.lock</a:t>
+            </a:r>
+            <a:endParaRPr lang="en-US" sz="1050" dirty="0">
+              <a:solidFill>
+                <a:schemeClr val="tx1"/>
+              </a:solidFill>
+            </a:endParaRPr>
+          </a:p>
+        </p:txBody>
+      </p:sp>
+      <p:cxnSp>
+        <p:nvCxnSpPr>
+          <p:cNvPr id="12" name="Straight Arrow Connector 11">
+            <a:extLst>
+              <a:ext uri="{FF2B5EF4-FFF2-40B4-BE49-F238E27FC236}">
+                <a16:creationId xmlns:a16="http://schemas.microsoft.com/office/drawing/2014/main" id="{3BE0A3FE-E523-38EC-78FA-0DF3C6CCC90F}"/>
+              </a:ext>
+            </a:extLst>
+          </p:cNvPr>
+          <p:cNvCxnSpPr>
+            <a:cxnSpLocks/>
+            <a:stCxn id="25" idx="2"/>
+            <a:endCxn id="10" idx="1"/>
+          </p:cNvCxnSpPr>
+          <p:nvPr/>
+        </p:nvCxnSpPr>
+        <p:spPr>
+          <a:xfrm>
+            <a:off x="2352844" y="5042045"/>
+            <a:ext cx="586189" cy="873329"/>
+          </a:xfrm>
+          <a:prstGeom prst="straightConnector1">
+            <a:avLst/>
+          </a:prstGeom>
+          <a:ln>
+            <a:tailEnd type="triangle"/>
+          </a:ln>
+        </p:spPr>
+        <p:style>
+          <a:lnRef idx="1">
+            <a:schemeClr val="accent1"/>
+          </a:lnRef>
+          <a:fillRef idx="0">
+            <a:schemeClr val="accent1"/>
+          </a:fillRef>
+          <a:effectRef idx="0">
+            <a:schemeClr val="accent1"/>
+          </a:effectRef>
+          <a:fontRef idx="minor">
+            <a:schemeClr val="tx1"/>
+          </a:fontRef>
+        </p:style>
+      </p:cxnSp>
+      <p:cxnSp>
+        <p:nvCxnSpPr>
+          <p:cNvPr id="16" name="Straight Arrow Connector 15">
+            <a:extLst>
+              <a:ext uri="{FF2B5EF4-FFF2-40B4-BE49-F238E27FC236}">
+                <a16:creationId xmlns:a16="http://schemas.microsoft.com/office/drawing/2014/main" id="{1A4E8ED7-45CA-AB73-11C1-CFEEFE322C31}"/>
+              </a:ext>
+            </a:extLst>
+          </p:cNvPr>
+          <p:cNvCxnSpPr>
+            <a:cxnSpLocks/>
+            <a:stCxn id="25" idx="2"/>
+            <a:endCxn id="11" idx="1"/>
+          </p:cNvCxnSpPr>
+          <p:nvPr/>
+        </p:nvCxnSpPr>
+        <p:spPr>
+          <a:xfrm>
+            <a:off x="2352844" y="5042045"/>
+            <a:ext cx="586189" cy="1343889"/>
+          </a:xfrm>
+          <a:prstGeom prst="straightConnector1">
+            <a:avLst/>
+          </a:prstGeom>
+          <a:ln>
+            <a:tailEnd type="triangle"/>
+          </a:ln>
+        </p:spPr>
+        <p:style>
+          <a:lnRef idx="1">
+            <a:schemeClr val="accent1"/>
+          </a:lnRef>
+          <a:fillRef idx="0">
+            <a:schemeClr val="accent1"/>
+          </a:fillRef>
+          <a:effectRef idx="0">
+            <a:schemeClr val="accent1"/>
+          </a:effectRef>
+          <a:fontRef idx="minor">
+            <a:schemeClr val="tx1"/>
+          </a:fontRef>
+        </p:style>
+      </p:cxnSp>
+      <p:cxnSp>
+        <p:nvCxnSpPr>
+          <p:cNvPr id="19" name="Straight Arrow Connector 18">
+            <a:extLst>
+              <a:ext uri="{FF2B5EF4-FFF2-40B4-BE49-F238E27FC236}">
+                <a16:creationId xmlns:a16="http://schemas.microsoft.com/office/drawing/2014/main" id="{FA976E2C-14B1-0F21-D761-F7D405CC68CA}"/>
+              </a:ext>
+            </a:extLst>
+          </p:cNvPr>
+          <p:cNvCxnSpPr>
+            <a:cxnSpLocks/>
+            <a:stCxn id="34" idx="2"/>
+            <a:endCxn id="25" idx="0"/>
+          </p:cNvCxnSpPr>
+          <p:nvPr/>
+        </p:nvCxnSpPr>
+        <p:spPr>
+          <a:xfrm>
+            <a:off x="2253605" y="3257512"/>
+            <a:ext cx="99239" cy="1238336"/>
+          </a:xfrm>
+          <a:prstGeom prst="straightConnector1">
+            <a:avLst/>
+          </a:prstGeom>
+          <a:ln>
+            <a:tailEnd type="triangle"/>
+          </a:ln>
+        </p:spPr>
+        <p:style>
+          <a:lnRef idx="1">
+            <a:schemeClr val="accent1"/>
+          </a:lnRef>
+          <a:fillRef idx="0">
+            <a:schemeClr val="accent1"/>
+          </a:fillRef>
+          <a:effectRef idx="0">
+            <a:schemeClr val="accent1"/>
+          </a:effectRef>
+          <a:fontRef idx="minor">
+            <a:schemeClr val="tx1"/>
+          </a:fontRef>
+        </p:style>
+      </p:cxnSp>
+      <p:sp>
+        <p:nvSpPr>
+          <p:cNvPr id="23" name="TextBox 22">
+            <a:extLst>
+              <a:ext uri="{FF2B5EF4-FFF2-40B4-BE49-F238E27FC236}">
+                <a16:creationId xmlns:a16="http://schemas.microsoft.com/office/drawing/2014/main" id="{6C816312-74EA-A501-635A-25B776D3F451}"/>
+              </a:ext>
+            </a:extLst>
+          </p:cNvPr>
+          <p:cNvSpPr txBox="1"/>
+          <p:nvPr/>
+        </p:nvSpPr>
+        <p:spPr>
+          <a:xfrm flipH="1">
+            <a:off x="1851975" y="3684850"/>
+            <a:ext cx="1027019" cy="307777"/>
+          </a:xfrm>
+          <a:prstGeom prst="rect">
+            <a:avLst/>
+          </a:prstGeom>
+          <a:noFill/>
+        </p:spPr>
+        <p:txBody>
+          <a:bodyPr wrap="square" rtlCol="0">
+            <a:spAutoFit/>
+          </a:bodyPr>
+          <a:lstStyle/>
+          <a:p>
+            <a:pPr algn="ctr"/>
+            <a:r>
+              <a:rPr lang="en-US" sz="1400" dirty="0"/>
+              <a:t>Manage</a:t>
+            </a:r>
+          </a:p>
+        </p:txBody>
+      </p:sp>
+      <p:sp>
+        <p:nvSpPr>
+          <p:cNvPr id="24" name="Rectangle: Rounded Corners 23">
+            <a:extLst>
+              <a:ext uri="{FF2B5EF4-FFF2-40B4-BE49-F238E27FC236}">
+                <a16:creationId xmlns:a16="http://schemas.microsoft.com/office/drawing/2014/main" id="{4772D0C1-7048-B6A0-03C9-8D0B1D012D1E}"/>
+              </a:ext>
+            </a:extLst>
+          </p:cNvPr>
+          <p:cNvSpPr/>
+          <p:nvPr/>
+        </p:nvSpPr>
+        <p:spPr>
+          <a:xfrm>
+            <a:off x="3124412" y="2158362"/>
+            <a:ext cx="1371852" cy="320722"/>
+          </a:xfrm>
+          <a:prstGeom prst="roundRect">
+            <a:avLst/>
+          </a:prstGeom>
+          <a:noFill/>
+        </p:spPr>
+        <p:style>
+          <a:lnRef idx="2">
+            <a:schemeClr val="accent1">
+              <a:shade val="15000"/>
+            </a:schemeClr>
+          </a:lnRef>
+          <a:fillRef idx="1">
+            <a:schemeClr val="accent1"/>
+          </a:fillRef>
+          <a:effectRef idx="0">
+            <a:schemeClr val="accent1"/>
+          </a:effectRef>
+          <a:fontRef idx="minor">
+            <a:schemeClr val="lt1"/>
+          </a:fontRef>
+        </p:style>
+        <p:txBody>
+          <a:bodyPr rtlCol="0" anchor="ctr"/>
+          <a:lstStyle/>
+          <a:p>
+            <a:pPr algn="ctr"/>
+            <a:r>
+              <a:rPr lang="en-US" sz="1400" dirty="0">
+                <a:solidFill>
+                  <a:schemeClr val="tx1"/>
+                </a:solidFill>
+              </a:rPr>
+              <a:t>a.py</a:t>
+            </a:r>
+          </a:p>
+        </p:txBody>
+      </p:sp>
+      <p:sp>
+        <p:nvSpPr>
+          <p:cNvPr id="29" name="Rectangle: Rounded Corners 28">
+            <a:extLst>
+              <a:ext uri="{FF2B5EF4-FFF2-40B4-BE49-F238E27FC236}">
+                <a16:creationId xmlns:a16="http://schemas.microsoft.com/office/drawing/2014/main" id="{6F8DA5DA-E25C-1980-49D4-2E2B18FF42B8}"/>
+              </a:ext>
+            </a:extLst>
+          </p:cNvPr>
+          <p:cNvSpPr/>
+          <p:nvPr/>
+        </p:nvSpPr>
+        <p:spPr>
+          <a:xfrm>
+            <a:off x="3124411" y="2785646"/>
+            <a:ext cx="1371853" cy="320722"/>
+          </a:xfrm>
+          <a:prstGeom prst="roundRect">
+            <a:avLst/>
+          </a:prstGeom>
+          <a:noFill/>
+        </p:spPr>
+        <p:style>
+          <a:lnRef idx="2">
+            <a:schemeClr val="accent1">
+              <a:shade val="15000"/>
+            </a:schemeClr>
+          </a:lnRef>
+          <a:fillRef idx="1">
+            <a:schemeClr val="accent1"/>
+          </a:fillRef>
+          <a:effectRef idx="0">
+            <a:schemeClr val="accent1"/>
+          </a:effectRef>
+          <a:fontRef idx="minor">
+            <a:schemeClr val="lt1"/>
+          </a:fontRef>
+        </p:style>
+        <p:txBody>
+          <a:bodyPr rtlCol="0" anchor="ctr"/>
+          <a:lstStyle/>
+          <a:p>
+            <a:pPr algn="ctr"/>
+            <a:r>
+              <a:rPr lang="en-US" sz="1400" dirty="0">
+                <a:solidFill>
+                  <a:schemeClr val="tx1"/>
+                </a:solidFill>
+              </a:rPr>
+              <a:t>Some-lib</a:t>
+            </a:r>
+          </a:p>
+        </p:txBody>
+      </p:sp>
+      <p:cxnSp>
+        <p:nvCxnSpPr>
+          <p:cNvPr id="31" name="Straight Arrow Connector 30">
+            <a:extLst>
+              <a:ext uri="{FF2B5EF4-FFF2-40B4-BE49-F238E27FC236}">
+                <a16:creationId xmlns:a16="http://schemas.microsoft.com/office/drawing/2014/main" id="{936D2D76-688B-6957-0ADA-ED183122FCAC}"/>
+              </a:ext>
+            </a:extLst>
+          </p:cNvPr>
+          <p:cNvCxnSpPr>
+            <a:cxnSpLocks/>
+            <a:stCxn id="34" idx="3"/>
+            <a:endCxn id="24" idx="1"/>
+          </p:cNvCxnSpPr>
+          <p:nvPr/>
+        </p:nvCxnSpPr>
+        <p:spPr>
+          <a:xfrm flipV="1">
+            <a:off x="2700269" y="2318723"/>
+            <a:ext cx="424143" cy="665690"/>
+          </a:xfrm>
+          <a:prstGeom prst="straightConnector1">
+            <a:avLst/>
+          </a:prstGeom>
+          <a:ln>
+            <a:tailEnd type="triangle"/>
+          </a:ln>
+        </p:spPr>
+        <p:style>
+          <a:lnRef idx="1">
+            <a:schemeClr val="accent1"/>
+          </a:lnRef>
+          <a:fillRef idx="0">
+            <a:schemeClr val="accent1"/>
+          </a:fillRef>
+          <a:effectRef idx="0">
+            <a:schemeClr val="accent1"/>
+          </a:effectRef>
+          <a:fontRef idx="minor">
+            <a:schemeClr val="tx1"/>
+          </a:fontRef>
+        </p:style>
+      </p:cxnSp>
+      <p:sp>
+        <p:nvSpPr>
+          <p:cNvPr id="38" name="TextBox 37">
+            <a:extLst>
+              <a:ext uri="{FF2B5EF4-FFF2-40B4-BE49-F238E27FC236}">
+                <a16:creationId xmlns:a16="http://schemas.microsoft.com/office/drawing/2014/main" id="{2151408D-CA69-A283-03C4-5BD1520A72AD}"/>
+              </a:ext>
+            </a:extLst>
+          </p:cNvPr>
+          <p:cNvSpPr txBox="1"/>
+          <p:nvPr/>
+        </p:nvSpPr>
+        <p:spPr>
+          <a:xfrm flipH="1">
+            <a:off x="3417551" y="1847521"/>
+            <a:ext cx="728731" cy="307777"/>
+          </a:xfrm>
+          <a:prstGeom prst="rect">
+            <a:avLst/>
+          </a:prstGeom>
+          <a:noFill/>
+        </p:spPr>
+        <p:txBody>
+          <a:bodyPr wrap="square" rtlCol="0">
+            <a:spAutoFit/>
+          </a:bodyPr>
+          <a:lstStyle/>
+          <a:p>
+            <a:pPr algn="ctr"/>
+            <a:r>
+              <a:rPr lang="en-US" sz="1400" dirty="0" err="1"/>
+              <a:t>Uv</a:t>
+            </a:r>
+            <a:r>
+              <a:rPr lang="en-US" sz="1400" dirty="0"/>
+              <a:t> run</a:t>
+            </a:r>
+          </a:p>
+        </p:txBody>
+      </p:sp>
+      <p:cxnSp>
+        <p:nvCxnSpPr>
+          <p:cNvPr id="44" name="Straight Arrow Connector 43">
+            <a:extLst>
+              <a:ext uri="{FF2B5EF4-FFF2-40B4-BE49-F238E27FC236}">
+                <a16:creationId xmlns:a16="http://schemas.microsoft.com/office/drawing/2014/main" id="{47212487-78C1-F09F-1B63-AD709E9F6CA4}"/>
+              </a:ext>
+            </a:extLst>
+          </p:cNvPr>
+          <p:cNvCxnSpPr>
+            <a:cxnSpLocks/>
+            <a:stCxn id="34" idx="3"/>
+            <a:endCxn id="29" idx="1"/>
+          </p:cNvCxnSpPr>
+          <p:nvPr/>
+        </p:nvCxnSpPr>
+        <p:spPr>
+          <a:xfrm flipV="1">
+            <a:off x="2700269" y="2946007"/>
+            <a:ext cx="424142" cy="38406"/>
+          </a:xfrm>
+          <a:prstGeom prst="straightConnector1">
+            <a:avLst/>
+          </a:prstGeom>
+          <a:ln>
+            <a:tailEnd type="triangle"/>
+          </a:ln>
+        </p:spPr>
+        <p:style>
+          <a:lnRef idx="1">
+            <a:schemeClr val="accent1"/>
+          </a:lnRef>
+          <a:fillRef idx="0">
+            <a:schemeClr val="accent1"/>
+          </a:fillRef>
+          <a:effectRef idx="0">
+            <a:schemeClr val="accent1"/>
+          </a:effectRef>
+          <a:fontRef idx="minor">
+            <a:schemeClr val="tx1"/>
+          </a:fontRef>
+        </p:style>
+      </p:cxnSp>
+      <p:sp>
+        <p:nvSpPr>
+          <p:cNvPr id="53" name="TextBox 52">
+            <a:extLst>
+              <a:ext uri="{FF2B5EF4-FFF2-40B4-BE49-F238E27FC236}">
+                <a16:creationId xmlns:a16="http://schemas.microsoft.com/office/drawing/2014/main" id="{7100BF55-22A5-63E1-7713-D5B01B1D3C49}"/>
+              </a:ext>
+            </a:extLst>
+          </p:cNvPr>
+          <p:cNvSpPr txBox="1"/>
+          <p:nvPr/>
+        </p:nvSpPr>
+        <p:spPr>
+          <a:xfrm flipH="1">
+            <a:off x="3110120" y="3225124"/>
+            <a:ext cx="1252396" cy="307777"/>
+          </a:xfrm>
+          <a:prstGeom prst="rect">
+            <a:avLst/>
+          </a:prstGeom>
+          <a:noFill/>
+        </p:spPr>
+        <p:txBody>
+          <a:bodyPr wrap="square" rtlCol="0">
+            <a:spAutoFit/>
+          </a:bodyPr>
+          <a:lstStyle/>
+          <a:p>
+            <a:pPr algn="ctr"/>
+            <a:r>
+              <a:rPr lang="en-US" sz="1400" dirty="0" err="1"/>
+              <a:t>Uv</a:t>
+            </a:r>
+            <a:r>
+              <a:rPr lang="en-US" sz="1400" dirty="0"/>
+              <a:t> pip install</a:t>
+            </a:r>
+          </a:p>
+        </p:txBody>
+      </p:sp>
+      <p:pic>
+        <p:nvPicPr>
+          <p:cNvPr id="60" name="Picture 59">
+            <a:extLst>
+              <a:ext uri="{FF2B5EF4-FFF2-40B4-BE49-F238E27FC236}">
+                <a16:creationId xmlns:a16="http://schemas.microsoft.com/office/drawing/2014/main" id="{A7607558-CDAE-4589-070B-A083C038CD03}"/>
+              </a:ext>
+            </a:extLst>
+          </p:cNvPr>
+          <p:cNvPicPr>
+            <a:picLocks noChangeAspect="1"/>
+          </p:cNvPicPr>
+          <p:nvPr/>
+        </p:nvPicPr>
+        <p:blipFill>
+          <a:blip r:embed="rId2"/>
+          <a:stretch>
+            <a:fillRect/>
+          </a:stretch>
+        </p:blipFill>
+        <p:spPr>
+          <a:xfrm>
+            <a:off x="1509429" y="2843239"/>
+            <a:ext cx="356259" cy="327595"/>
+          </a:xfrm>
+          <a:prstGeom prst="rect">
+            <a:avLst/>
+          </a:prstGeom>
+        </p:spPr>
+      </p:pic>
+      <p:cxnSp>
+        <p:nvCxnSpPr>
+          <p:cNvPr id="1025" name="Straight Arrow Connector 1024">
+            <a:extLst>
+              <a:ext uri="{FF2B5EF4-FFF2-40B4-BE49-F238E27FC236}">
+                <a16:creationId xmlns:a16="http://schemas.microsoft.com/office/drawing/2014/main" id="{6DFDE9ED-4FD3-8766-30E6-E9CFB52F651B}"/>
+              </a:ext>
+            </a:extLst>
+          </p:cNvPr>
+          <p:cNvCxnSpPr>
+            <a:cxnSpLocks/>
+            <a:stCxn id="1033" idx="3"/>
+            <a:endCxn id="60" idx="1"/>
+          </p:cNvCxnSpPr>
+          <p:nvPr/>
+        </p:nvCxnSpPr>
+        <p:spPr>
+          <a:xfrm flipV="1">
+            <a:off x="870131" y="3007037"/>
+            <a:ext cx="639298" cy="1068682"/>
+          </a:xfrm>
+          <a:prstGeom prst="straightConnector1">
+            <a:avLst/>
+          </a:prstGeom>
+          <a:ln>
+            <a:tailEnd type="triangle"/>
+          </a:ln>
+        </p:spPr>
+        <p:style>
+          <a:lnRef idx="1">
+            <a:schemeClr val="accent1"/>
+          </a:lnRef>
+          <a:fillRef idx="0">
+            <a:schemeClr val="accent1"/>
+          </a:fillRef>
+          <a:effectRef idx="0">
+            <a:schemeClr val="accent1"/>
+          </a:effectRef>
+          <a:fontRef idx="minor">
+            <a:schemeClr val="tx1"/>
+          </a:fontRef>
+        </p:style>
+      </p:cxnSp>
+      <p:pic>
+        <p:nvPicPr>
+          <p:cNvPr id="1033" name="Picture 1032">
+            <a:extLst>
+              <a:ext uri="{FF2B5EF4-FFF2-40B4-BE49-F238E27FC236}">
+                <a16:creationId xmlns:a16="http://schemas.microsoft.com/office/drawing/2014/main" id="{080AF91D-A5A8-9C53-3DDB-21AD256C5CDF}"/>
+              </a:ext>
+            </a:extLst>
+          </p:cNvPr>
+          <p:cNvPicPr>
+            <a:picLocks noChangeAspect="1"/>
+          </p:cNvPicPr>
+          <p:nvPr/>
+        </p:nvPicPr>
+        <p:blipFill>
+          <a:blip r:embed="rId3"/>
+          <a:stretch>
+            <a:fillRect/>
+          </a:stretch>
+        </p:blipFill>
+        <p:spPr>
+          <a:xfrm>
+            <a:off x="528922" y="3876680"/>
+            <a:ext cx="341209" cy="398077"/>
+          </a:xfrm>
+          <a:prstGeom prst="rect">
+            <a:avLst/>
+          </a:prstGeom>
+        </p:spPr>
+      </p:pic>
+      <p:sp>
+        <p:nvSpPr>
+          <p:cNvPr id="1036" name="TextBox 1035">
+            <a:extLst>
+              <a:ext uri="{FF2B5EF4-FFF2-40B4-BE49-F238E27FC236}">
+                <a16:creationId xmlns:a16="http://schemas.microsoft.com/office/drawing/2014/main" id="{D61C2D64-5A89-0BD5-D404-93CECBD37A9F}"/>
+              </a:ext>
+            </a:extLst>
+          </p:cNvPr>
+          <p:cNvSpPr txBox="1"/>
+          <p:nvPr/>
+        </p:nvSpPr>
+        <p:spPr>
+          <a:xfrm flipH="1">
+            <a:off x="389391" y="3257512"/>
+            <a:ext cx="1121058" cy="461665"/>
+          </a:xfrm>
+          <a:prstGeom prst="rect">
+            <a:avLst/>
+          </a:prstGeom>
+          <a:noFill/>
+        </p:spPr>
+        <p:txBody>
+          <a:bodyPr wrap="square" rtlCol="0">
+            <a:spAutoFit/>
+          </a:bodyPr>
+          <a:lstStyle/>
+          <a:p>
+            <a:pPr algn="ctr"/>
+            <a:r>
+              <a:rPr lang="en-US" sz="1200" dirty="0"/>
+              <a:t>Do all things</a:t>
+            </a:r>
+          </a:p>
+          <a:p>
+            <a:pPr algn="ctr"/>
+            <a:r>
+              <a:rPr lang="en-US" sz="1200" dirty="0"/>
+              <a:t>Python</a:t>
+            </a:r>
+          </a:p>
+        </p:txBody>
+      </p:sp>
+      <p:sp>
+        <p:nvSpPr>
+          <p:cNvPr id="1038" name="TextBox 1037">
+            <a:extLst>
+              <a:ext uri="{FF2B5EF4-FFF2-40B4-BE49-F238E27FC236}">
+                <a16:creationId xmlns:a16="http://schemas.microsoft.com/office/drawing/2014/main" id="{ACE50921-B506-0E15-58DB-03E485450F01}"/>
+              </a:ext>
+            </a:extLst>
+          </p:cNvPr>
+          <p:cNvSpPr txBox="1"/>
+          <p:nvPr/>
+        </p:nvSpPr>
+        <p:spPr>
+          <a:xfrm flipH="1">
+            <a:off x="663665" y="2301314"/>
+            <a:ext cx="1176097" cy="523220"/>
+          </a:xfrm>
+          <a:prstGeom prst="rect">
+            <a:avLst/>
+          </a:prstGeom>
+          <a:noFill/>
+        </p:spPr>
+        <p:txBody>
+          <a:bodyPr wrap="square" lIns="0" rIns="0" rtlCol="0">
+            <a:spAutoFit/>
+          </a:bodyPr>
+          <a:lstStyle/>
+          <a:p>
+            <a:pPr algn="ctr"/>
+            <a:r>
+              <a:rPr lang="en-US" sz="1400" dirty="0"/>
+              <a:t>UV</a:t>
+            </a:r>
+          </a:p>
+          <a:p>
+            <a:pPr algn="ctr"/>
+            <a:r>
+              <a:rPr lang="en-US" sz="1400" dirty="0"/>
+              <a:t>As an Agent</a:t>
+            </a:r>
+          </a:p>
+        </p:txBody>
+      </p:sp>
+      <p:sp>
+        <p:nvSpPr>
+          <p:cNvPr id="1039" name="TextBox 1038">
+            <a:extLst>
+              <a:ext uri="{FF2B5EF4-FFF2-40B4-BE49-F238E27FC236}">
+                <a16:creationId xmlns:a16="http://schemas.microsoft.com/office/drawing/2014/main" id="{FA12364F-B618-B346-3684-472BF10BD864}"/>
+              </a:ext>
+            </a:extLst>
+          </p:cNvPr>
+          <p:cNvSpPr txBox="1"/>
+          <p:nvPr/>
+        </p:nvSpPr>
+        <p:spPr>
+          <a:xfrm flipH="1">
+            <a:off x="363149" y="4346024"/>
+            <a:ext cx="1176097" cy="307777"/>
+          </a:xfrm>
+          <a:prstGeom prst="rect">
+            <a:avLst/>
+          </a:prstGeom>
+          <a:noFill/>
+        </p:spPr>
+        <p:txBody>
+          <a:bodyPr wrap="square" lIns="0" rIns="0" rtlCol="0">
+            <a:spAutoFit/>
+          </a:bodyPr>
+          <a:lstStyle/>
+          <a:p>
+            <a:pPr algn="ctr"/>
+            <a:r>
+              <a:rPr lang="en-US" sz="1400" dirty="0"/>
+              <a:t>Programmer</a:t>
+            </a:r>
+          </a:p>
+        </p:txBody>
+      </p:sp>
+      <p:sp>
+        <p:nvSpPr>
+          <p:cNvPr id="1047" name="TextBox 1046">
+            <a:extLst>
+              <a:ext uri="{FF2B5EF4-FFF2-40B4-BE49-F238E27FC236}">
+                <a16:creationId xmlns:a16="http://schemas.microsoft.com/office/drawing/2014/main" id="{E054335B-F6F8-3DE9-D3EC-C82CB1C45AFD}"/>
+              </a:ext>
+            </a:extLst>
+          </p:cNvPr>
+          <p:cNvSpPr txBox="1"/>
+          <p:nvPr/>
+        </p:nvSpPr>
+        <p:spPr>
+          <a:xfrm flipH="1">
+            <a:off x="4625975" y="2460319"/>
+            <a:ext cx="1736500" cy="954107"/>
+          </a:xfrm>
+          <a:prstGeom prst="rect">
+            <a:avLst/>
+          </a:prstGeom>
+          <a:noFill/>
+        </p:spPr>
+        <p:txBody>
+          <a:bodyPr wrap="square" rtlCol="0">
+            <a:spAutoFit/>
+          </a:bodyPr>
+          <a:lstStyle/>
+          <a:p>
+            <a:pPr marL="168275" indent="-168275">
+              <a:buAutoNum type="arabicPeriod"/>
+              <a:tabLst>
+                <a:tab pos="60325" algn="l"/>
+              </a:tabLst>
+            </a:pPr>
+            <a:r>
+              <a:rPr lang="en-US" sz="1400" dirty="0"/>
+              <a:t>No activation necessary</a:t>
+            </a:r>
+          </a:p>
+          <a:p>
+            <a:pPr marL="168275" indent="-168275">
+              <a:buAutoNum type="arabicPeriod"/>
+              <a:tabLst>
+                <a:tab pos="60325" algn="l"/>
+              </a:tabLst>
+            </a:pPr>
+            <a:r>
+              <a:rPr lang="en-US" sz="1400" dirty="0"/>
+              <a:t>Creates .</a:t>
+            </a:r>
+            <a:r>
+              <a:rPr lang="en-US" sz="1400" dirty="0" err="1"/>
+              <a:t>venv</a:t>
+            </a:r>
+            <a:r>
+              <a:rPr lang="en-US" sz="1400" dirty="0"/>
+              <a:t> automatically</a:t>
+            </a:r>
+          </a:p>
+        </p:txBody>
+      </p:sp>
+    </p:spTree>
+    <p:extLst>
+      <p:ext uri="{BB962C8B-B14F-4D97-AF65-F5344CB8AC3E}">
+        <p14:creationId xmlns:p14="http://schemas.microsoft.com/office/powerpoint/2010/main" val="2113167129"/>
+      </p:ext>
+    </p:extLst>
+  </p:cSld>
+  <p:clrMapOvr>
+    <a:masterClrMapping/>
+  </p:clrMapOvr>
+</p:sld>
+</file>
+
+<file path=ppt/slides/slide15.xml><?xml version="1.0" encoding="utf-8"?>
+<p:sld xmlns:a="http://schemas.openxmlformats.org/drawingml/2006/main" xmlns:r="http://schemas.openxmlformats.org/officeDocument/2006/relationships" xmlns:p="http://schemas.openxmlformats.org/presentationml/2006/main">
+  <p:cSld>
+    <p:spTree>
+      <p:nvGrpSpPr>
+        <p:cNvPr id="1" name="">
+          <a:extLst>
+            <a:ext uri="{FF2B5EF4-FFF2-40B4-BE49-F238E27FC236}">
+              <a16:creationId xmlns:a16="http://schemas.microsoft.com/office/drawing/2014/main" id="{8FCDAC28-FA91-ADAB-20DA-CFCEE63067F4}"/>
+            </a:ext>
+          </a:extLst>
+        </p:cNvPr>
+        <p:cNvGrpSpPr/>
+        <p:nvPr/>
+      </p:nvGrpSpPr>
+      <p:grpSpPr>
+        <a:xfrm>
+          <a:off x="0" y="0"/>
+          <a:ext cx="0" cy="0"/>
+          <a:chOff x="0" y="0"/>
+          <a:chExt cx="0" cy="0"/>
+        </a:xfrm>
+      </p:grpSpPr>
       <p:pic>
         <p:nvPicPr>
           <p:cNvPr id="6" name="Picture 5">

</xml_diff>